<commit_message>
Updated PPT Font and Content
</commit_message>
<xml_diff>
--- a/Documents/Thesis/Indian Trade Analysis and Forecasting.pptx
+++ b/Documents/Thesis/Indian Trade Analysis and Forecasting.pptx
@@ -4,6 +4,9 @@
   <p:sldMasterIdLst>
     <p:sldMasterId id="2147483672" r:id="rId1"/>
   </p:sldMasterIdLst>
+  <p:notesMasterIdLst>
+    <p:notesMasterId r:id="rId20"/>
+  </p:notesMasterIdLst>
   <p:sldIdLst>
     <p:sldId id="256" r:id="rId2"/>
     <p:sldId id="257" r:id="rId3"/>
@@ -123,10 +126,370 @@
   </p:defaultTextStyle>
   <p:extLst>
     <p:ext uri="{EFAFB233-063F-42B5-8137-9DF3F51BA10A}">
-      <p15:sldGuideLst xmlns:p15="http://schemas.microsoft.com/office/powerpoint/2012/main" xmlns=""/>
+      <p15:sldGuideLst xmlns:p15="http://schemas.microsoft.com/office/powerpoint/2012/main">
+        <p15:guide id="1" orient="horz" pos="2160">
+          <p15:clr>
+            <a:srgbClr val="A4A3A4"/>
+          </p15:clr>
+        </p15:guide>
+        <p15:guide id="2" pos="3840">
+          <p15:clr>
+            <a:srgbClr val="A4A3A4"/>
+          </p15:clr>
+        </p15:guide>
+      </p15:sldGuideLst>
     </p:ext>
   </p:extLst>
 </p:presentation>
+</file>
+
+<file path=ppt/notesMasters/notesMaster1.xml><?xml version="1.0" encoding="utf-8"?>
+<p:notesMaster xmlns:a="http://schemas.openxmlformats.org/drawingml/2006/main" xmlns:r="http://schemas.openxmlformats.org/officeDocument/2006/relationships" xmlns:p="http://schemas.openxmlformats.org/presentationml/2006/main">
+  <p:cSld>
+    <p:bg>
+      <p:bgRef idx="1001">
+        <a:schemeClr val="bg1"/>
+      </p:bgRef>
+    </p:bg>
+    <p:spTree>
+      <p:nvGrpSpPr>
+        <p:cNvPr id="1" name=""/>
+        <p:cNvGrpSpPr/>
+        <p:nvPr/>
+      </p:nvGrpSpPr>
+      <p:grpSpPr>
+        <a:xfrm>
+          <a:off x="0" y="0"/>
+          <a:ext cx="0" cy="0"/>
+          <a:chOff x="0" y="0"/>
+          <a:chExt cx="0" cy="0"/>
+        </a:xfrm>
+      </p:grpSpPr>
+      <p:sp>
+        <p:nvSpPr>
+          <p:cNvPr id="2" name="Header Placeholder 1"/>
+          <p:cNvSpPr>
+            <a:spLocks noGrp="1"/>
+          </p:cNvSpPr>
+          <p:nvPr>
+            <p:ph type="hdr" sz="quarter"/>
+          </p:nvPr>
+        </p:nvSpPr>
+        <p:spPr>
+          <a:xfrm>
+            <a:off x="0" y="0"/>
+            <a:ext cx="2971800" cy="458788"/>
+          </a:xfrm>
+          <a:prstGeom prst="rect">
+            <a:avLst/>
+          </a:prstGeom>
+        </p:spPr>
+        <p:txBody>
+          <a:bodyPr vert="horz" lIns="91440" tIns="45720" rIns="91440" bIns="45720" rtlCol="0"/>
+          <a:lstStyle>
+            <a:lvl1pPr algn="l">
+              <a:defRPr sz="1200"/>
+            </a:lvl1pPr>
+          </a:lstStyle>
+          <a:p>
+            <a:endParaRPr lang="en-US"/>
+          </a:p>
+        </p:txBody>
+      </p:sp>
+      <p:sp>
+        <p:nvSpPr>
+          <p:cNvPr id="3" name="Date Placeholder 2"/>
+          <p:cNvSpPr>
+            <a:spLocks noGrp="1"/>
+          </p:cNvSpPr>
+          <p:nvPr>
+            <p:ph type="dt" idx="1"/>
+          </p:nvPr>
+        </p:nvSpPr>
+        <p:spPr>
+          <a:xfrm>
+            <a:off x="3884613" y="0"/>
+            <a:ext cx="2971800" cy="458788"/>
+          </a:xfrm>
+          <a:prstGeom prst="rect">
+            <a:avLst/>
+          </a:prstGeom>
+        </p:spPr>
+        <p:txBody>
+          <a:bodyPr vert="horz" lIns="91440" tIns="45720" rIns="91440" bIns="45720" rtlCol="0"/>
+          <a:lstStyle>
+            <a:lvl1pPr algn="r">
+              <a:defRPr sz="1200"/>
+            </a:lvl1pPr>
+          </a:lstStyle>
+          <a:p>
+            <a:fld id="{670D5557-884C-4FCB-95D9-08759F1375F5}" type="datetimeFigureOut">
+              <a:rPr lang="en-US" smtClean="0"/>
+              <a:t>6/13/2020</a:t>
+            </a:fld>
+            <a:endParaRPr lang="en-US"/>
+          </a:p>
+        </p:txBody>
+      </p:sp>
+      <p:sp>
+        <p:nvSpPr>
+          <p:cNvPr id="4" name="Slide Image Placeholder 3"/>
+          <p:cNvSpPr>
+            <a:spLocks noGrp="1" noRot="1" noChangeAspect="1"/>
+          </p:cNvSpPr>
+          <p:nvPr>
+            <p:ph type="sldImg" idx="2"/>
+          </p:nvPr>
+        </p:nvSpPr>
+        <p:spPr>
+          <a:xfrm>
+            <a:off x="685800" y="1143000"/>
+            <a:ext cx="5486400" cy="3086100"/>
+          </a:xfrm>
+          <a:prstGeom prst="rect">
+            <a:avLst/>
+          </a:prstGeom>
+          <a:noFill/>
+          <a:ln w="12700">
+            <a:solidFill>
+              <a:prstClr val="black"/>
+            </a:solidFill>
+          </a:ln>
+        </p:spPr>
+        <p:txBody>
+          <a:bodyPr vert="horz" lIns="91440" tIns="45720" rIns="91440" bIns="45720" rtlCol="0" anchor="ctr"/>
+          <a:lstStyle/>
+          <a:p>
+            <a:endParaRPr lang="en-US"/>
+          </a:p>
+        </p:txBody>
+      </p:sp>
+      <p:sp>
+        <p:nvSpPr>
+          <p:cNvPr id="5" name="Notes Placeholder 4"/>
+          <p:cNvSpPr>
+            <a:spLocks noGrp="1"/>
+          </p:cNvSpPr>
+          <p:nvPr>
+            <p:ph type="body" sz="quarter" idx="3"/>
+          </p:nvPr>
+        </p:nvSpPr>
+        <p:spPr>
+          <a:xfrm>
+            <a:off x="685800" y="4400550"/>
+            <a:ext cx="5486400" cy="3600450"/>
+          </a:xfrm>
+          <a:prstGeom prst="rect">
+            <a:avLst/>
+          </a:prstGeom>
+        </p:spPr>
+        <p:txBody>
+          <a:bodyPr vert="horz" lIns="91440" tIns="45720" rIns="91440" bIns="45720" rtlCol="0"/>
+          <a:lstStyle/>
+          <a:p>
+            <a:pPr lvl="0"/>
+            <a:r>
+              <a:rPr lang="en-US"/>
+              <a:t>Click to edit Master text styles</a:t>
+            </a:r>
+          </a:p>
+          <a:p>
+            <a:pPr lvl="1"/>
+            <a:r>
+              <a:rPr lang="en-US"/>
+              <a:t>Second level</a:t>
+            </a:r>
+          </a:p>
+          <a:p>
+            <a:pPr lvl="2"/>
+            <a:r>
+              <a:rPr lang="en-US"/>
+              <a:t>Third level</a:t>
+            </a:r>
+          </a:p>
+          <a:p>
+            <a:pPr lvl="3"/>
+            <a:r>
+              <a:rPr lang="en-US"/>
+              <a:t>Fourth level</a:t>
+            </a:r>
+          </a:p>
+          <a:p>
+            <a:pPr lvl="4"/>
+            <a:r>
+              <a:rPr lang="en-US"/>
+              <a:t>Fifth level</a:t>
+            </a:r>
+          </a:p>
+        </p:txBody>
+      </p:sp>
+      <p:sp>
+        <p:nvSpPr>
+          <p:cNvPr id="6" name="Footer Placeholder 5"/>
+          <p:cNvSpPr>
+            <a:spLocks noGrp="1"/>
+          </p:cNvSpPr>
+          <p:nvPr>
+            <p:ph type="ftr" sz="quarter" idx="4"/>
+          </p:nvPr>
+        </p:nvSpPr>
+        <p:spPr>
+          <a:xfrm>
+            <a:off x="0" y="8685213"/>
+            <a:ext cx="2971800" cy="458787"/>
+          </a:xfrm>
+          <a:prstGeom prst="rect">
+            <a:avLst/>
+          </a:prstGeom>
+        </p:spPr>
+        <p:txBody>
+          <a:bodyPr vert="horz" lIns="91440" tIns="45720" rIns="91440" bIns="45720" rtlCol="0" anchor="b"/>
+          <a:lstStyle>
+            <a:lvl1pPr algn="l">
+              <a:defRPr sz="1200"/>
+            </a:lvl1pPr>
+          </a:lstStyle>
+          <a:p>
+            <a:endParaRPr lang="en-US"/>
+          </a:p>
+        </p:txBody>
+      </p:sp>
+      <p:sp>
+        <p:nvSpPr>
+          <p:cNvPr id="7" name="Slide Number Placeholder 6"/>
+          <p:cNvSpPr>
+            <a:spLocks noGrp="1"/>
+          </p:cNvSpPr>
+          <p:nvPr>
+            <p:ph type="sldNum" sz="quarter" idx="5"/>
+          </p:nvPr>
+        </p:nvSpPr>
+        <p:spPr>
+          <a:xfrm>
+            <a:off x="3884613" y="8685213"/>
+            <a:ext cx="2971800" cy="458787"/>
+          </a:xfrm>
+          <a:prstGeom prst="rect">
+            <a:avLst/>
+          </a:prstGeom>
+        </p:spPr>
+        <p:txBody>
+          <a:bodyPr vert="horz" lIns="91440" tIns="45720" rIns="91440" bIns="45720" rtlCol="0" anchor="b"/>
+          <a:lstStyle>
+            <a:lvl1pPr algn="r">
+              <a:defRPr sz="1200"/>
+            </a:lvl1pPr>
+          </a:lstStyle>
+          <a:p>
+            <a:fld id="{7749F618-F654-4761-9935-9BE6E0A1F2CD}" type="slidenum">
+              <a:rPr lang="en-US" smtClean="0"/>
+              <a:t>‹#›</a:t>
+            </a:fld>
+            <a:endParaRPr lang="en-US"/>
+          </a:p>
+        </p:txBody>
+      </p:sp>
+    </p:spTree>
+    <p:extLst>
+      <p:ext uri="{BB962C8B-B14F-4D97-AF65-F5344CB8AC3E}">
+        <p14:creationId xmlns:p14="http://schemas.microsoft.com/office/powerpoint/2010/main" val="948622237"/>
+      </p:ext>
+    </p:extLst>
+  </p:cSld>
+  <p:clrMap bg1="lt1" tx1="dk1" bg2="lt2" tx2="dk2" accent1="accent1" accent2="accent2" accent3="accent3" accent4="accent4" accent5="accent5" accent6="accent6" hlink="hlink" folHlink="folHlink"/>
+  <p:notesStyle>
+    <a:lvl1pPr marL="0" algn="l" defTabSz="914400" rtl="0" eaLnBrk="1" latinLnBrk="0" hangingPunct="1">
+      <a:defRPr sz="1200" kern="1200">
+        <a:solidFill>
+          <a:schemeClr val="tx1"/>
+        </a:solidFill>
+        <a:latin typeface="+mn-lt"/>
+        <a:ea typeface="+mn-ea"/>
+        <a:cs typeface="+mn-cs"/>
+      </a:defRPr>
+    </a:lvl1pPr>
+    <a:lvl2pPr marL="457200" algn="l" defTabSz="914400" rtl="0" eaLnBrk="1" latinLnBrk="0" hangingPunct="1">
+      <a:defRPr sz="1200" kern="1200">
+        <a:solidFill>
+          <a:schemeClr val="tx1"/>
+        </a:solidFill>
+        <a:latin typeface="+mn-lt"/>
+        <a:ea typeface="+mn-ea"/>
+        <a:cs typeface="+mn-cs"/>
+      </a:defRPr>
+    </a:lvl2pPr>
+    <a:lvl3pPr marL="914400" algn="l" defTabSz="914400" rtl="0" eaLnBrk="1" latinLnBrk="0" hangingPunct="1">
+      <a:defRPr sz="1200" kern="1200">
+        <a:solidFill>
+          <a:schemeClr val="tx1"/>
+        </a:solidFill>
+        <a:latin typeface="+mn-lt"/>
+        <a:ea typeface="+mn-ea"/>
+        <a:cs typeface="+mn-cs"/>
+      </a:defRPr>
+    </a:lvl3pPr>
+    <a:lvl4pPr marL="1371600" algn="l" defTabSz="914400" rtl="0" eaLnBrk="1" latinLnBrk="0" hangingPunct="1">
+      <a:defRPr sz="1200" kern="1200">
+        <a:solidFill>
+          <a:schemeClr val="tx1"/>
+        </a:solidFill>
+        <a:latin typeface="+mn-lt"/>
+        <a:ea typeface="+mn-ea"/>
+        <a:cs typeface="+mn-cs"/>
+      </a:defRPr>
+    </a:lvl4pPr>
+    <a:lvl5pPr marL="1828800" algn="l" defTabSz="914400" rtl="0" eaLnBrk="1" latinLnBrk="0" hangingPunct="1">
+      <a:defRPr sz="1200" kern="1200">
+        <a:solidFill>
+          <a:schemeClr val="tx1"/>
+        </a:solidFill>
+        <a:latin typeface="+mn-lt"/>
+        <a:ea typeface="+mn-ea"/>
+        <a:cs typeface="+mn-cs"/>
+      </a:defRPr>
+    </a:lvl5pPr>
+    <a:lvl6pPr marL="2286000" algn="l" defTabSz="914400" rtl="0" eaLnBrk="1" latinLnBrk="0" hangingPunct="1">
+      <a:defRPr sz="1200" kern="1200">
+        <a:solidFill>
+          <a:schemeClr val="tx1"/>
+        </a:solidFill>
+        <a:latin typeface="+mn-lt"/>
+        <a:ea typeface="+mn-ea"/>
+        <a:cs typeface="+mn-cs"/>
+      </a:defRPr>
+    </a:lvl6pPr>
+    <a:lvl7pPr marL="2743200" algn="l" defTabSz="914400" rtl="0" eaLnBrk="1" latinLnBrk="0" hangingPunct="1">
+      <a:defRPr sz="1200" kern="1200">
+        <a:solidFill>
+          <a:schemeClr val="tx1"/>
+        </a:solidFill>
+        <a:latin typeface="+mn-lt"/>
+        <a:ea typeface="+mn-ea"/>
+        <a:cs typeface="+mn-cs"/>
+      </a:defRPr>
+    </a:lvl7pPr>
+    <a:lvl8pPr marL="3200400" algn="l" defTabSz="914400" rtl="0" eaLnBrk="1" latinLnBrk="0" hangingPunct="1">
+      <a:defRPr sz="1200" kern="1200">
+        <a:solidFill>
+          <a:schemeClr val="tx1"/>
+        </a:solidFill>
+        <a:latin typeface="+mn-lt"/>
+        <a:ea typeface="+mn-ea"/>
+        <a:cs typeface="+mn-cs"/>
+      </a:defRPr>
+    </a:lvl8pPr>
+    <a:lvl9pPr marL="3657600" algn="l" defTabSz="914400" rtl="0" eaLnBrk="1" latinLnBrk="0" hangingPunct="1">
+      <a:defRPr sz="1200" kern="1200">
+        <a:solidFill>
+          <a:schemeClr val="tx1"/>
+        </a:solidFill>
+        <a:latin typeface="+mn-lt"/>
+        <a:ea typeface="+mn-ea"/>
+        <a:cs typeface="+mn-cs"/>
+      </a:defRPr>
+    </a:lvl9pPr>
+  </p:notesStyle>
+</p:notesMaster>
 </file>
 
 <file path=ppt/slideLayouts/slideLayout1.xml><?xml version="1.0" encoding="utf-8"?>
@@ -178,7 +541,7 @@
           </a:lstStyle>
           <a:p>
             <a:r>
-              <a:rPr lang="en-US" smtClean="0"/>
+              <a:rPr lang="en-US"/>
               <a:t>Click to edit Master title style</a:t>
             </a:r>
             <a:endParaRPr lang="en-US" dirty="0"/>
@@ -299,31 +662,31 @@
           </a:lstStyle>
           <a:p>
             <a:r>
+              <a:rPr lang="en-US"/>
+              <a:t>Click to edit Master subtitle style</a:t>
+            </a:r>
+            <a:endParaRPr lang="en-US" dirty="0"/>
+          </a:p>
+        </p:txBody>
+      </p:sp>
+      <p:sp>
+        <p:nvSpPr>
+          <p:cNvPr id="4" name="Date Placeholder 3"/>
+          <p:cNvSpPr>
+            <a:spLocks noGrp="1"/>
+          </p:cNvSpPr>
+          <p:nvPr>
+            <p:ph type="dt" sz="half" idx="10"/>
+          </p:nvPr>
+        </p:nvSpPr>
+        <p:spPr/>
+        <p:txBody>
+          <a:bodyPr/>
+          <a:lstStyle/>
+          <a:p>
+            <a:fld id="{63092D24-85B5-400A-91B9-9495F0975DC4}" type="datetime1">
               <a:rPr lang="en-US" smtClean="0"/>
-              <a:t>Click to edit Master subtitle style</a:t>
-            </a:r>
-            <a:endParaRPr lang="en-US" dirty="0"/>
-          </a:p>
-        </p:txBody>
-      </p:sp>
-      <p:sp>
-        <p:nvSpPr>
-          <p:cNvPr id="4" name="Date Placeholder 3"/>
-          <p:cNvSpPr>
-            <a:spLocks noGrp="1"/>
-          </p:cNvSpPr>
-          <p:nvPr>
-            <p:ph type="dt" sz="half" idx="10"/>
-          </p:nvPr>
-        </p:nvSpPr>
-        <p:spPr/>
-        <p:txBody>
-          <a:bodyPr/>
-          <a:lstStyle/>
-          <a:p>
-            <a:fld id="{3A51130B-5554-4741-8142-56D17AB8E1DF}" type="datetimeFigureOut">
-              <a:rPr lang="en-US" smtClean="0"/>
-              <a:t>6/11/2020</a:t>
+              <a:t>6/13/2020</a:t>
             </a:fld>
             <a:endParaRPr lang="en-US"/>
           </a:p>
@@ -412,83 +775,81 @@
           <a:lstStyle/>
           <a:p>
             <a:r>
+              <a:rPr lang="en-US"/>
+              <a:t>Click to edit Master title style</a:t>
+            </a:r>
+          </a:p>
+        </p:txBody>
+      </p:sp>
+      <p:sp>
+        <p:nvSpPr>
+          <p:cNvPr id="3" name="Vertical Text Placeholder 2"/>
+          <p:cNvSpPr>
+            <a:spLocks noGrp="1"/>
+          </p:cNvSpPr>
+          <p:nvPr>
+            <p:ph type="body" orient="vert" idx="1"/>
+          </p:nvPr>
+        </p:nvSpPr>
+        <p:spPr/>
+        <p:txBody>
+          <a:bodyPr vert="eaVert"/>
+          <a:lstStyle/>
+          <a:p>
+            <a:pPr lvl="0"/>
+            <a:r>
+              <a:rPr lang="en-US"/>
+              <a:t>Click to edit Master text styles</a:t>
+            </a:r>
+          </a:p>
+          <a:p>
+            <a:pPr lvl="1"/>
+            <a:r>
+              <a:rPr lang="en-US"/>
+              <a:t>Second level</a:t>
+            </a:r>
+          </a:p>
+          <a:p>
+            <a:pPr lvl="2"/>
+            <a:r>
+              <a:rPr lang="en-US"/>
+              <a:t>Third level</a:t>
+            </a:r>
+          </a:p>
+          <a:p>
+            <a:pPr lvl="3"/>
+            <a:r>
+              <a:rPr lang="en-US"/>
+              <a:t>Fourth level</a:t>
+            </a:r>
+          </a:p>
+          <a:p>
+            <a:pPr lvl="4"/>
+            <a:r>
+              <a:rPr lang="en-US"/>
+              <a:t>Fifth level</a:t>
+            </a:r>
+          </a:p>
+        </p:txBody>
+      </p:sp>
+      <p:sp>
+        <p:nvSpPr>
+          <p:cNvPr id="4" name="Date Placeholder 3"/>
+          <p:cNvSpPr>
+            <a:spLocks noGrp="1"/>
+          </p:cNvSpPr>
+          <p:nvPr>
+            <p:ph type="dt" sz="half" idx="10"/>
+          </p:nvPr>
+        </p:nvSpPr>
+        <p:spPr/>
+        <p:txBody>
+          <a:bodyPr/>
+          <a:lstStyle/>
+          <a:p>
+            <a:fld id="{6622BA36-AAB8-4F8C-AF34-8AFAFFEDA801}" type="datetime1">
               <a:rPr lang="en-US" smtClean="0"/>
-              <a:t>Click to edit Master title style</a:t>
-            </a:r>
-            <a:endParaRPr lang="en-US"/>
-          </a:p>
-        </p:txBody>
-      </p:sp>
-      <p:sp>
-        <p:nvSpPr>
-          <p:cNvPr id="3" name="Vertical Text Placeholder 2"/>
-          <p:cNvSpPr>
-            <a:spLocks noGrp="1"/>
-          </p:cNvSpPr>
-          <p:nvPr>
-            <p:ph type="body" orient="vert" idx="1"/>
-          </p:nvPr>
-        </p:nvSpPr>
-        <p:spPr/>
-        <p:txBody>
-          <a:bodyPr vert="eaVert"/>
-          <a:lstStyle/>
-          <a:p>
-            <a:pPr lvl="0"/>
-            <a:r>
-              <a:rPr lang="en-US" smtClean="0"/>
-              <a:t>Click to edit Master text styles</a:t>
-            </a:r>
-          </a:p>
-          <a:p>
-            <a:pPr lvl="1"/>
-            <a:r>
-              <a:rPr lang="en-US" smtClean="0"/>
-              <a:t>Second level</a:t>
-            </a:r>
-          </a:p>
-          <a:p>
-            <a:pPr lvl="2"/>
-            <a:r>
-              <a:rPr lang="en-US" smtClean="0"/>
-              <a:t>Third level</a:t>
-            </a:r>
-          </a:p>
-          <a:p>
-            <a:pPr lvl="3"/>
-            <a:r>
-              <a:rPr lang="en-US" smtClean="0"/>
-              <a:t>Fourth level</a:t>
-            </a:r>
-          </a:p>
-          <a:p>
-            <a:pPr lvl="4"/>
-            <a:r>
-              <a:rPr lang="en-US" smtClean="0"/>
-              <a:t>Fifth level</a:t>
-            </a:r>
-            <a:endParaRPr lang="en-US"/>
-          </a:p>
-        </p:txBody>
-      </p:sp>
-      <p:sp>
-        <p:nvSpPr>
-          <p:cNvPr id="4" name="Date Placeholder 3"/>
-          <p:cNvSpPr>
-            <a:spLocks noGrp="1"/>
-          </p:cNvSpPr>
-          <p:nvPr>
-            <p:ph type="dt" sz="half" idx="10"/>
-          </p:nvPr>
-        </p:nvSpPr>
-        <p:spPr/>
-        <p:txBody>
-          <a:bodyPr/>
-          <a:lstStyle/>
-          <a:p>
-            <a:fld id="{3A51130B-5554-4741-8142-56D17AB8E1DF}" type="datetimeFigureOut">
-              <a:rPr lang="en-US" smtClean="0"/>
-              <a:t>6/11/2020</a:t>
+              <a:t>6/13/2020</a:t>
             </a:fld>
             <a:endParaRPr lang="en-US"/>
           </a:p>
@@ -582,7 +943,7 @@
           <a:lstStyle/>
           <a:p>
             <a:r>
-              <a:rPr lang="en-US" smtClean="0"/>
+              <a:rPr lang="en-US"/>
               <a:t>Click to edit Master title style</a:t>
             </a:r>
             <a:endParaRPr lang="en-US" dirty="0"/>
@@ -611,59 +972,58 @@
           <a:p>
             <a:pPr lvl="0"/>
             <a:r>
+              <a:rPr lang="en-US"/>
+              <a:t>Click to edit Master text styles</a:t>
+            </a:r>
+          </a:p>
+          <a:p>
+            <a:pPr lvl="1"/>
+            <a:r>
+              <a:rPr lang="en-US"/>
+              <a:t>Second level</a:t>
+            </a:r>
+          </a:p>
+          <a:p>
+            <a:pPr lvl="2"/>
+            <a:r>
+              <a:rPr lang="en-US"/>
+              <a:t>Third level</a:t>
+            </a:r>
+          </a:p>
+          <a:p>
+            <a:pPr lvl="3"/>
+            <a:r>
+              <a:rPr lang="en-US"/>
+              <a:t>Fourth level</a:t>
+            </a:r>
+          </a:p>
+          <a:p>
+            <a:pPr lvl="4"/>
+            <a:r>
+              <a:rPr lang="en-US"/>
+              <a:t>Fifth level</a:t>
+            </a:r>
+          </a:p>
+        </p:txBody>
+      </p:sp>
+      <p:sp>
+        <p:nvSpPr>
+          <p:cNvPr id="4" name="Date Placeholder 3"/>
+          <p:cNvSpPr>
+            <a:spLocks noGrp="1"/>
+          </p:cNvSpPr>
+          <p:nvPr>
+            <p:ph type="dt" sz="half" idx="10"/>
+          </p:nvPr>
+        </p:nvSpPr>
+        <p:spPr/>
+        <p:txBody>
+          <a:bodyPr/>
+          <a:lstStyle/>
+          <a:p>
+            <a:fld id="{E8A1E367-2725-418E-A4F2-1082DF34ECAF}" type="datetime1">
               <a:rPr lang="en-US" smtClean="0"/>
-              <a:t>Click to edit Master text styles</a:t>
-            </a:r>
-          </a:p>
-          <a:p>
-            <a:pPr lvl="1"/>
-            <a:r>
-              <a:rPr lang="en-US" smtClean="0"/>
-              <a:t>Second level</a:t>
-            </a:r>
-          </a:p>
-          <a:p>
-            <a:pPr lvl="2"/>
-            <a:r>
-              <a:rPr lang="en-US" smtClean="0"/>
-              <a:t>Third level</a:t>
-            </a:r>
-          </a:p>
-          <a:p>
-            <a:pPr lvl="3"/>
-            <a:r>
-              <a:rPr lang="en-US" smtClean="0"/>
-              <a:t>Fourth level</a:t>
-            </a:r>
-          </a:p>
-          <a:p>
-            <a:pPr lvl="4"/>
-            <a:r>
-              <a:rPr lang="en-US" smtClean="0"/>
-              <a:t>Fifth level</a:t>
-            </a:r>
-            <a:endParaRPr lang="en-US"/>
-          </a:p>
-        </p:txBody>
-      </p:sp>
-      <p:sp>
-        <p:nvSpPr>
-          <p:cNvPr id="4" name="Date Placeholder 3"/>
-          <p:cNvSpPr>
-            <a:spLocks noGrp="1"/>
-          </p:cNvSpPr>
-          <p:nvPr>
-            <p:ph type="dt" sz="half" idx="10"/>
-          </p:nvPr>
-        </p:nvSpPr>
-        <p:spPr/>
-        <p:txBody>
-          <a:bodyPr/>
-          <a:lstStyle/>
-          <a:p>
-            <a:fld id="{3A51130B-5554-4741-8142-56D17AB8E1DF}" type="datetimeFigureOut">
-              <a:rPr lang="en-US" smtClean="0"/>
-              <a:t>6/11/2020</a:t>
+              <a:t>6/13/2020</a:t>
             </a:fld>
             <a:endParaRPr lang="en-US"/>
           </a:p>
@@ -752,83 +1112,81 @@
           <a:lstStyle/>
           <a:p>
             <a:r>
+              <a:rPr lang="en-US"/>
+              <a:t>Click to edit Master title style</a:t>
+            </a:r>
+          </a:p>
+        </p:txBody>
+      </p:sp>
+      <p:sp>
+        <p:nvSpPr>
+          <p:cNvPr id="3" name="Content Placeholder 2"/>
+          <p:cNvSpPr>
+            <a:spLocks noGrp="1"/>
+          </p:cNvSpPr>
+          <p:nvPr>
+            <p:ph idx="1"/>
+          </p:nvPr>
+        </p:nvSpPr>
+        <p:spPr/>
+        <p:txBody>
+          <a:bodyPr/>
+          <a:lstStyle/>
+          <a:p>
+            <a:pPr lvl="0"/>
+            <a:r>
+              <a:rPr lang="en-US"/>
+              <a:t>Click to edit Master text styles</a:t>
+            </a:r>
+          </a:p>
+          <a:p>
+            <a:pPr lvl="1"/>
+            <a:r>
+              <a:rPr lang="en-US"/>
+              <a:t>Second level</a:t>
+            </a:r>
+          </a:p>
+          <a:p>
+            <a:pPr lvl="2"/>
+            <a:r>
+              <a:rPr lang="en-US"/>
+              <a:t>Third level</a:t>
+            </a:r>
+          </a:p>
+          <a:p>
+            <a:pPr lvl="3"/>
+            <a:r>
+              <a:rPr lang="en-US"/>
+              <a:t>Fourth level</a:t>
+            </a:r>
+          </a:p>
+          <a:p>
+            <a:pPr lvl="4"/>
+            <a:r>
+              <a:rPr lang="en-US"/>
+              <a:t>Fifth level</a:t>
+            </a:r>
+          </a:p>
+        </p:txBody>
+      </p:sp>
+      <p:sp>
+        <p:nvSpPr>
+          <p:cNvPr id="4" name="Date Placeholder 3"/>
+          <p:cNvSpPr>
+            <a:spLocks noGrp="1"/>
+          </p:cNvSpPr>
+          <p:nvPr>
+            <p:ph type="dt" sz="half" idx="10"/>
+          </p:nvPr>
+        </p:nvSpPr>
+        <p:spPr/>
+        <p:txBody>
+          <a:bodyPr/>
+          <a:lstStyle/>
+          <a:p>
+            <a:fld id="{AE6FF34B-B3FE-4DF3-ABAD-F52A80057AC1}" type="datetime1">
               <a:rPr lang="en-US" smtClean="0"/>
-              <a:t>Click to edit Master title style</a:t>
-            </a:r>
-            <a:endParaRPr lang="en-US"/>
-          </a:p>
-        </p:txBody>
-      </p:sp>
-      <p:sp>
-        <p:nvSpPr>
-          <p:cNvPr id="3" name="Content Placeholder 2"/>
-          <p:cNvSpPr>
-            <a:spLocks noGrp="1"/>
-          </p:cNvSpPr>
-          <p:nvPr>
-            <p:ph idx="1"/>
-          </p:nvPr>
-        </p:nvSpPr>
-        <p:spPr/>
-        <p:txBody>
-          <a:bodyPr/>
-          <a:lstStyle/>
-          <a:p>
-            <a:pPr lvl="0"/>
-            <a:r>
-              <a:rPr lang="en-US" smtClean="0"/>
-              <a:t>Click to edit Master text styles</a:t>
-            </a:r>
-          </a:p>
-          <a:p>
-            <a:pPr lvl="1"/>
-            <a:r>
-              <a:rPr lang="en-US" smtClean="0"/>
-              <a:t>Second level</a:t>
-            </a:r>
-          </a:p>
-          <a:p>
-            <a:pPr lvl="2"/>
-            <a:r>
-              <a:rPr lang="en-US" smtClean="0"/>
-              <a:t>Third level</a:t>
-            </a:r>
-          </a:p>
-          <a:p>
-            <a:pPr lvl="3"/>
-            <a:r>
-              <a:rPr lang="en-US" smtClean="0"/>
-              <a:t>Fourth level</a:t>
-            </a:r>
-          </a:p>
-          <a:p>
-            <a:pPr lvl="4"/>
-            <a:r>
-              <a:rPr lang="en-US" smtClean="0"/>
-              <a:t>Fifth level</a:t>
-            </a:r>
-            <a:endParaRPr lang="en-US"/>
-          </a:p>
-        </p:txBody>
-      </p:sp>
-      <p:sp>
-        <p:nvSpPr>
-          <p:cNvPr id="4" name="Date Placeholder 3"/>
-          <p:cNvSpPr>
-            <a:spLocks noGrp="1"/>
-          </p:cNvSpPr>
-          <p:nvPr>
-            <p:ph type="dt" sz="half" idx="10"/>
-          </p:nvPr>
-        </p:nvSpPr>
-        <p:spPr/>
-        <p:txBody>
-          <a:bodyPr/>
-          <a:lstStyle/>
-          <a:p>
-            <a:fld id="{3A51130B-5554-4741-8142-56D17AB8E1DF}" type="datetimeFigureOut">
-              <a:rPr lang="en-US" smtClean="0"/>
-              <a:t>6/11/2020</a:t>
+              <a:t>6/13/2020</a:t>
             </a:fld>
             <a:endParaRPr lang="en-US"/>
           </a:p>
@@ -926,7 +1284,7 @@
           </a:lstStyle>
           <a:p>
             <a:r>
-              <a:rPr lang="en-US" smtClean="0"/>
+              <a:rPr lang="en-US"/>
               <a:t>Click to edit Master title style</a:t>
             </a:r>
             <a:endParaRPr lang="en-US" dirty="0"/>
@@ -1046,30 +1404,30 @@
           <a:p>
             <a:pPr lvl="0"/>
             <a:r>
+              <a:rPr lang="en-US"/>
+              <a:t>Click to edit Master text styles</a:t>
+            </a:r>
+          </a:p>
+        </p:txBody>
+      </p:sp>
+      <p:sp>
+        <p:nvSpPr>
+          <p:cNvPr id="4" name="Date Placeholder 3"/>
+          <p:cNvSpPr>
+            <a:spLocks noGrp="1"/>
+          </p:cNvSpPr>
+          <p:nvPr>
+            <p:ph type="dt" sz="half" idx="10"/>
+          </p:nvPr>
+        </p:nvSpPr>
+        <p:spPr/>
+        <p:txBody>
+          <a:bodyPr/>
+          <a:lstStyle/>
+          <a:p>
+            <a:fld id="{13AFF1A5-D23C-49BB-8D18-15E32DC8403D}" type="datetime1">
               <a:rPr lang="en-US" smtClean="0"/>
-              <a:t>Click to edit Master text styles</a:t>
-            </a:r>
-          </a:p>
-        </p:txBody>
-      </p:sp>
-      <p:sp>
-        <p:nvSpPr>
-          <p:cNvPr id="4" name="Date Placeholder 3"/>
-          <p:cNvSpPr>
-            <a:spLocks noGrp="1"/>
-          </p:cNvSpPr>
-          <p:nvPr>
-            <p:ph type="dt" sz="half" idx="10"/>
-          </p:nvPr>
-        </p:nvSpPr>
-        <p:spPr/>
-        <p:txBody>
-          <a:bodyPr/>
-          <a:lstStyle/>
-          <a:p>
-            <a:fld id="{3A51130B-5554-4741-8142-56D17AB8E1DF}" type="datetimeFigureOut">
-              <a:rPr lang="en-US" smtClean="0"/>
-              <a:t>6/11/2020</a:t>
+              <a:t>6/13/2020</a:t>
             </a:fld>
             <a:endParaRPr lang="en-US"/>
           </a:p>
@@ -1158,10 +1516,9 @@
           <a:lstStyle/>
           <a:p>
             <a:r>
-              <a:rPr lang="en-US" smtClean="0"/>
+              <a:rPr lang="en-US"/>
               <a:t>Click to edit Master title style</a:t>
             </a:r>
-            <a:endParaRPr lang="en-US"/>
           </a:p>
         </p:txBody>
       </p:sp>
@@ -1215,35 +1572,35 @@
           <a:p>
             <a:pPr lvl="0"/>
             <a:r>
-              <a:rPr lang="en-US" smtClean="0"/>
+              <a:rPr lang="en-US"/>
               <a:t>Click to edit Master text styles</a:t>
             </a:r>
           </a:p>
           <a:p>
             <a:pPr lvl="1"/>
             <a:r>
-              <a:rPr lang="en-US" smtClean="0"/>
+              <a:rPr lang="en-US"/>
               <a:t>Second level</a:t>
             </a:r>
           </a:p>
           <a:p>
             <a:pPr lvl="2"/>
             <a:r>
-              <a:rPr lang="en-US" smtClean="0"/>
+              <a:rPr lang="en-US"/>
               <a:t>Third level</a:t>
             </a:r>
           </a:p>
           <a:p>
             <a:pPr lvl="3"/>
             <a:r>
-              <a:rPr lang="en-US" smtClean="0"/>
+              <a:rPr lang="en-US"/>
               <a:t>Fourth level</a:t>
             </a:r>
           </a:p>
           <a:p>
             <a:pPr lvl="4"/>
             <a:r>
-              <a:rPr lang="en-US" smtClean="0"/>
+              <a:rPr lang="en-US"/>
               <a:t>Fifth level</a:t>
             </a:r>
             <a:endParaRPr lang="en-US" dirty="0"/>
@@ -1300,59 +1657,59 @@
           <a:p>
             <a:pPr lvl="0"/>
             <a:r>
+              <a:rPr lang="en-US"/>
+              <a:t>Click to edit Master text styles</a:t>
+            </a:r>
+          </a:p>
+          <a:p>
+            <a:pPr lvl="1"/>
+            <a:r>
+              <a:rPr lang="en-US"/>
+              <a:t>Second level</a:t>
+            </a:r>
+          </a:p>
+          <a:p>
+            <a:pPr lvl="2"/>
+            <a:r>
+              <a:rPr lang="en-US"/>
+              <a:t>Third level</a:t>
+            </a:r>
+          </a:p>
+          <a:p>
+            <a:pPr lvl="3"/>
+            <a:r>
+              <a:rPr lang="en-US"/>
+              <a:t>Fourth level</a:t>
+            </a:r>
+          </a:p>
+          <a:p>
+            <a:pPr lvl="4"/>
+            <a:r>
+              <a:rPr lang="en-US"/>
+              <a:t>Fifth level</a:t>
+            </a:r>
+            <a:endParaRPr lang="en-US" dirty="0"/>
+          </a:p>
+        </p:txBody>
+      </p:sp>
+      <p:sp>
+        <p:nvSpPr>
+          <p:cNvPr id="5" name="Date Placeholder 4"/>
+          <p:cNvSpPr>
+            <a:spLocks noGrp="1"/>
+          </p:cNvSpPr>
+          <p:nvPr>
+            <p:ph type="dt" sz="half" idx="10"/>
+          </p:nvPr>
+        </p:nvSpPr>
+        <p:spPr/>
+        <p:txBody>
+          <a:bodyPr/>
+          <a:lstStyle/>
+          <a:p>
+            <a:fld id="{B55FFC0F-1496-41B8-BF5B-2C710A87D333}" type="datetime1">
               <a:rPr lang="en-US" smtClean="0"/>
-              <a:t>Click to edit Master text styles</a:t>
-            </a:r>
-          </a:p>
-          <a:p>
-            <a:pPr lvl="1"/>
-            <a:r>
-              <a:rPr lang="en-US" smtClean="0"/>
-              <a:t>Second level</a:t>
-            </a:r>
-          </a:p>
-          <a:p>
-            <a:pPr lvl="2"/>
-            <a:r>
-              <a:rPr lang="en-US" smtClean="0"/>
-              <a:t>Third level</a:t>
-            </a:r>
-          </a:p>
-          <a:p>
-            <a:pPr lvl="3"/>
-            <a:r>
-              <a:rPr lang="en-US" smtClean="0"/>
-              <a:t>Fourth level</a:t>
-            </a:r>
-          </a:p>
-          <a:p>
-            <a:pPr lvl="4"/>
-            <a:r>
-              <a:rPr lang="en-US" smtClean="0"/>
-              <a:t>Fifth level</a:t>
-            </a:r>
-            <a:endParaRPr lang="en-US" dirty="0"/>
-          </a:p>
-        </p:txBody>
-      </p:sp>
-      <p:sp>
-        <p:nvSpPr>
-          <p:cNvPr id="5" name="Date Placeholder 4"/>
-          <p:cNvSpPr>
-            <a:spLocks noGrp="1"/>
-          </p:cNvSpPr>
-          <p:nvPr>
-            <p:ph type="dt" sz="half" idx="10"/>
-          </p:nvPr>
-        </p:nvSpPr>
-        <p:spPr/>
-        <p:txBody>
-          <a:bodyPr/>
-          <a:lstStyle/>
-          <a:p>
-            <a:fld id="{3A51130B-5554-4741-8142-56D17AB8E1DF}" type="datetimeFigureOut">
-              <a:rPr lang="en-US" smtClean="0"/>
-              <a:t>6/11/2020</a:t>
+              <a:t>6/13/2020</a:t>
             </a:fld>
             <a:endParaRPr lang="en-US"/>
           </a:p>
@@ -1445,10 +1802,9 @@
           </a:lstStyle>
           <a:p>
             <a:r>
-              <a:rPr lang="en-US" smtClean="0"/>
+              <a:rPr lang="en-US"/>
               <a:t>Click to edit Master title style</a:t>
             </a:r>
-            <a:endParaRPr lang="en-US"/>
           </a:p>
         </p:txBody>
       </p:sp>
@@ -1517,7 +1873,7 @@
           <a:p>
             <a:pPr lvl="0"/>
             <a:r>
-              <a:rPr lang="en-US" smtClean="0"/>
+              <a:rPr lang="en-US"/>
               <a:t>Click to edit Master text styles</a:t>
             </a:r>
           </a:p>
@@ -1573,35 +1929,35 @@
           <a:p>
             <a:pPr lvl="0"/>
             <a:r>
-              <a:rPr lang="en-US" smtClean="0"/>
+              <a:rPr lang="en-US"/>
               <a:t>Click to edit Master text styles</a:t>
             </a:r>
           </a:p>
           <a:p>
             <a:pPr lvl="1"/>
             <a:r>
-              <a:rPr lang="en-US" smtClean="0"/>
+              <a:rPr lang="en-US"/>
               <a:t>Second level</a:t>
             </a:r>
           </a:p>
           <a:p>
             <a:pPr lvl="2"/>
             <a:r>
-              <a:rPr lang="en-US" smtClean="0"/>
+              <a:rPr lang="en-US"/>
               <a:t>Third level</a:t>
             </a:r>
           </a:p>
           <a:p>
             <a:pPr lvl="3"/>
             <a:r>
-              <a:rPr lang="en-US" smtClean="0"/>
+              <a:rPr lang="en-US"/>
               <a:t>Fourth level</a:t>
             </a:r>
           </a:p>
           <a:p>
             <a:pPr lvl="4"/>
             <a:r>
-              <a:rPr lang="en-US" smtClean="0"/>
+              <a:rPr lang="en-US"/>
               <a:t>Fifth level</a:t>
             </a:r>
             <a:endParaRPr lang="en-US" dirty="0"/>
@@ -1673,7 +2029,7 @@
           <a:p>
             <a:pPr lvl="0"/>
             <a:r>
-              <a:rPr lang="en-US" smtClean="0"/>
+              <a:rPr lang="en-US"/>
               <a:t>Click to edit Master text styles</a:t>
             </a:r>
           </a:p>
@@ -1729,59 +2085,58 @@
           <a:p>
             <a:pPr lvl="0"/>
             <a:r>
+              <a:rPr lang="en-US"/>
+              <a:t>Click to edit Master text styles</a:t>
+            </a:r>
+          </a:p>
+          <a:p>
+            <a:pPr lvl="1"/>
+            <a:r>
+              <a:rPr lang="en-US"/>
+              <a:t>Second level</a:t>
+            </a:r>
+          </a:p>
+          <a:p>
+            <a:pPr lvl="2"/>
+            <a:r>
+              <a:rPr lang="en-US"/>
+              <a:t>Third level</a:t>
+            </a:r>
+          </a:p>
+          <a:p>
+            <a:pPr lvl="3"/>
+            <a:r>
+              <a:rPr lang="en-US"/>
+              <a:t>Fourth level</a:t>
+            </a:r>
+          </a:p>
+          <a:p>
+            <a:pPr lvl="4"/>
+            <a:r>
+              <a:rPr lang="en-US"/>
+              <a:t>Fifth level</a:t>
+            </a:r>
+          </a:p>
+        </p:txBody>
+      </p:sp>
+      <p:sp>
+        <p:nvSpPr>
+          <p:cNvPr id="7" name="Date Placeholder 6"/>
+          <p:cNvSpPr>
+            <a:spLocks noGrp="1"/>
+          </p:cNvSpPr>
+          <p:nvPr>
+            <p:ph type="dt" sz="half" idx="10"/>
+          </p:nvPr>
+        </p:nvSpPr>
+        <p:spPr/>
+        <p:txBody>
+          <a:bodyPr/>
+          <a:lstStyle/>
+          <a:p>
+            <a:fld id="{B74AD9F6-07A4-4594-B0B6-BC831824C0FA}" type="datetime1">
               <a:rPr lang="en-US" smtClean="0"/>
-              <a:t>Click to edit Master text styles</a:t>
-            </a:r>
-          </a:p>
-          <a:p>
-            <a:pPr lvl="1"/>
-            <a:r>
-              <a:rPr lang="en-US" smtClean="0"/>
-              <a:t>Second level</a:t>
-            </a:r>
-          </a:p>
-          <a:p>
-            <a:pPr lvl="2"/>
-            <a:r>
-              <a:rPr lang="en-US" smtClean="0"/>
-              <a:t>Third level</a:t>
-            </a:r>
-          </a:p>
-          <a:p>
-            <a:pPr lvl="3"/>
-            <a:r>
-              <a:rPr lang="en-US" smtClean="0"/>
-              <a:t>Fourth level</a:t>
-            </a:r>
-          </a:p>
-          <a:p>
-            <a:pPr lvl="4"/>
-            <a:r>
-              <a:rPr lang="en-US" smtClean="0"/>
-              <a:t>Fifth level</a:t>
-            </a:r>
-            <a:endParaRPr lang="en-US"/>
-          </a:p>
-        </p:txBody>
-      </p:sp>
-      <p:sp>
-        <p:nvSpPr>
-          <p:cNvPr id="7" name="Date Placeholder 6"/>
-          <p:cNvSpPr>
-            <a:spLocks noGrp="1"/>
-          </p:cNvSpPr>
-          <p:nvPr>
-            <p:ph type="dt" sz="half" idx="10"/>
-          </p:nvPr>
-        </p:nvSpPr>
-        <p:spPr/>
-        <p:txBody>
-          <a:bodyPr/>
-          <a:lstStyle/>
-          <a:p>
-            <a:fld id="{3A51130B-5554-4741-8142-56D17AB8E1DF}" type="datetimeFigureOut">
-              <a:rPr lang="en-US" smtClean="0"/>
-              <a:t>6/11/2020</a:t>
+              <a:t>6/13/2020</a:t>
             </a:fld>
             <a:endParaRPr lang="en-US"/>
           </a:p>
@@ -1870,31 +2225,30 @@
           <a:lstStyle/>
           <a:p>
             <a:r>
+              <a:rPr lang="en-US"/>
+              <a:t>Click to edit Master title style</a:t>
+            </a:r>
+          </a:p>
+        </p:txBody>
+      </p:sp>
+      <p:sp>
+        <p:nvSpPr>
+          <p:cNvPr id="3" name="Date Placeholder 2"/>
+          <p:cNvSpPr>
+            <a:spLocks noGrp="1"/>
+          </p:cNvSpPr>
+          <p:nvPr>
+            <p:ph type="dt" sz="half" idx="10"/>
+          </p:nvPr>
+        </p:nvSpPr>
+        <p:spPr/>
+        <p:txBody>
+          <a:bodyPr/>
+          <a:lstStyle/>
+          <a:p>
+            <a:fld id="{ED82381B-490F-4E17-B2F0-C93B19F6129D}" type="datetime1">
               <a:rPr lang="en-US" smtClean="0"/>
-              <a:t>Click to edit Master title style</a:t>
-            </a:r>
-            <a:endParaRPr lang="en-US"/>
-          </a:p>
-        </p:txBody>
-      </p:sp>
-      <p:sp>
-        <p:nvSpPr>
-          <p:cNvPr id="3" name="Date Placeholder 2"/>
-          <p:cNvSpPr>
-            <a:spLocks noGrp="1"/>
-          </p:cNvSpPr>
-          <p:nvPr>
-            <p:ph type="dt" sz="half" idx="10"/>
-          </p:nvPr>
-        </p:nvSpPr>
-        <p:spPr/>
-        <p:txBody>
-          <a:bodyPr/>
-          <a:lstStyle/>
-          <a:p>
-            <a:fld id="{3A51130B-5554-4741-8142-56D17AB8E1DF}" type="datetimeFigureOut">
-              <a:rPr lang="en-US" smtClean="0"/>
-              <a:t>6/11/2020</a:t>
+              <a:t>6/13/2020</a:t>
             </a:fld>
             <a:endParaRPr lang="en-US"/>
           </a:p>
@@ -1982,9 +2336,9 @@
           <a:bodyPr/>
           <a:lstStyle/>
           <a:p>
-            <a:fld id="{3A51130B-5554-4741-8142-56D17AB8E1DF}" type="datetimeFigureOut">
+            <a:fld id="{2ABE7C3F-2FCB-4D47-8790-CF330D8A8D95}" type="datetime1">
               <a:rPr lang="en-US" smtClean="0"/>
-              <a:t>6/11/2020</a:t>
+              <a:t>6/13/2020</a:t>
             </a:fld>
             <a:endParaRPr lang="en-US"/>
           </a:p>
@@ -2082,7 +2436,7 @@
           </a:lstStyle>
           <a:p>
             <a:r>
-              <a:rPr lang="en-US" smtClean="0"/>
+              <a:rPr lang="en-US"/>
               <a:t>Click to edit Master title style</a:t>
             </a:r>
             <a:endParaRPr lang="en-US" dirty="0"/>
@@ -2150,30 +2504,30 @@
           <a:p>
             <a:pPr lvl="0"/>
             <a:r>
+              <a:rPr lang="en-US"/>
+              <a:t>Click to edit Master text styles</a:t>
+            </a:r>
+          </a:p>
+        </p:txBody>
+      </p:sp>
+      <p:sp>
+        <p:nvSpPr>
+          <p:cNvPr id="5" name="Date Placeholder 4"/>
+          <p:cNvSpPr>
+            <a:spLocks noGrp="1"/>
+          </p:cNvSpPr>
+          <p:nvPr>
+            <p:ph type="dt" sz="half" idx="10"/>
+          </p:nvPr>
+        </p:nvSpPr>
+        <p:spPr/>
+        <p:txBody>
+          <a:bodyPr/>
+          <a:lstStyle/>
+          <a:p>
+            <a:fld id="{BB4329BA-C0F9-4D10-847B-834D10DF3912}" type="datetime1">
               <a:rPr lang="en-US" smtClean="0"/>
-              <a:t>Click to edit Master text styles</a:t>
-            </a:r>
-          </a:p>
-        </p:txBody>
-      </p:sp>
-      <p:sp>
-        <p:nvSpPr>
-          <p:cNvPr id="5" name="Date Placeholder 4"/>
-          <p:cNvSpPr>
-            <a:spLocks noGrp="1"/>
-          </p:cNvSpPr>
-          <p:nvPr>
-            <p:ph type="dt" sz="half" idx="10"/>
-          </p:nvPr>
-        </p:nvSpPr>
-        <p:spPr/>
-        <p:txBody>
-          <a:bodyPr/>
-          <a:lstStyle/>
-          <a:p>
-            <a:fld id="{3A51130B-5554-4741-8142-56D17AB8E1DF}" type="datetimeFigureOut">
-              <a:rPr lang="en-US" smtClean="0"/>
-              <a:t>6/11/2020</a:t>
+              <a:t>6/13/2020</a:t>
             </a:fld>
             <a:endParaRPr lang="en-US"/>
           </a:p>
@@ -2243,38 +2597,37 @@
           <a:p>
             <a:pPr lvl="0"/>
             <a:r>
-              <a:rPr lang="en-US" smtClean="0"/>
+              <a:rPr lang="en-US"/>
               <a:t>Click to edit Master text styles</a:t>
             </a:r>
           </a:p>
           <a:p>
             <a:pPr lvl="1"/>
             <a:r>
-              <a:rPr lang="en-US" smtClean="0"/>
+              <a:rPr lang="en-US"/>
               <a:t>Second level</a:t>
             </a:r>
           </a:p>
           <a:p>
             <a:pPr lvl="2"/>
             <a:r>
-              <a:rPr lang="en-US" smtClean="0"/>
+              <a:rPr lang="en-US"/>
               <a:t>Third level</a:t>
             </a:r>
           </a:p>
           <a:p>
             <a:pPr lvl="3"/>
             <a:r>
-              <a:rPr lang="en-US" smtClean="0"/>
+              <a:rPr lang="en-US"/>
               <a:t>Fourth level</a:t>
             </a:r>
           </a:p>
           <a:p>
             <a:pPr lvl="4"/>
             <a:r>
-              <a:rPr lang="en-US" smtClean="0"/>
+              <a:rPr lang="en-US"/>
               <a:t>Fifth level</a:t>
             </a:r>
-            <a:endParaRPr lang="en-US"/>
           </a:p>
         </p:txBody>
       </p:sp>
@@ -2335,7 +2688,7 @@
           </a:lstStyle>
           <a:p>
             <a:r>
-              <a:rPr lang="en-US" smtClean="0"/>
+              <a:rPr lang="en-US"/>
               <a:t>Click to edit Master title style</a:t>
             </a:r>
             <a:endParaRPr lang="en-US" dirty="0"/>
@@ -2400,7 +2753,7 @@
           </a:lstStyle>
           <a:p>
             <a:r>
-              <a:rPr lang="en-US" smtClean="0"/>
+              <a:rPr lang="en-US"/>
               <a:t>Click icon to add picture</a:t>
             </a:r>
             <a:endParaRPr lang="en-US" dirty="0"/>
@@ -2468,30 +2821,30 @@
           <a:p>
             <a:pPr lvl="0"/>
             <a:r>
+              <a:rPr lang="en-US"/>
+              <a:t>Click to edit Master text styles</a:t>
+            </a:r>
+          </a:p>
+        </p:txBody>
+      </p:sp>
+      <p:sp>
+        <p:nvSpPr>
+          <p:cNvPr id="8" name="Date Placeholder 7"/>
+          <p:cNvSpPr>
+            <a:spLocks noGrp="1"/>
+          </p:cNvSpPr>
+          <p:nvPr>
+            <p:ph type="dt" sz="half" idx="10"/>
+          </p:nvPr>
+        </p:nvSpPr>
+        <p:spPr/>
+        <p:txBody>
+          <a:bodyPr/>
+          <a:lstStyle/>
+          <a:p>
+            <a:fld id="{594A0CED-98C1-444C-B36E-0BE9B8B28197}" type="datetime1">
               <a:rPr lang="en-US" smtClean="0"/>
-              <a:t>Click to edit Master text styles</a:t>
-            </a:r>
-          </a:p>
-        </p:txBody>
-      </p:sp>
-      <p:sp>
-        <p:nvSpPr>
-          <p:cNvPr id="8" name="Date Placeholder 7"/>
-          <p:cNvSpPr>
-            <a:spLocks noGrp="1"/>
-          </p:cNvSpPr>
-          <p:nvPr>
-            <p:ph type="dt" sz="half" idx="10"/>
-          </p:nvPr>
-        </p:nvSpPr>
-        <p:spPr/>
-        <p:txBody>
-          <a:bodyPr/>
-          <a:lstStyle/>
-          <a:p>
-            <a:fld id="{3A51130B-5554-4741-8142-56D17AB8E1DF}" type="datetimeFigureOut">
-              <a:rPr lang="en-US" smtClean="0"/>
-              <a:t>6/11/2020</a:t>
+              <a:t>6/13/2020</a:t>
             </a:fld>
             <a:endParaRPr lang="en-US"/>
           </a:p>
@@ -2602,7 +2955,7 @@
           <a:lstStyle/>
           <a:p>
             <a:r>
-              <a:rPr lang="en-US" smtClean="0"/>
+              <a:rPr lang="en-US"/>
               <a:t>Click to edit Master title style</a:t>
             </a:r>
             <a:endParaRPr lang="en-US" dirty="0"/>
@@ -2636,35 +2989,35 @@
           <a:p>
             <a:pPr lvl="0"/>
             <a:r>
-              <a:rPr lang="en-US" smtClean="0"/>
+              <a:rPr lang="en-US"/>
               <a:t>Click to edit Master text styles</a:t>
             </a:r>
           </a:p>
           <a:p>
             <a:pPr lvl="1"/>
             <a:r>
-              <a:rPr lang="en-US" smtClean="0"/>
+              <a:rPr lang="en-US"/>
               <a:t>Second level</a:t>
             </a:r>
           </a:p>
           <a:p>
             <a:pPr lvl="2"/>
             <a:r>
-              <a:rPr lang="en-US" smtClean="0"/>
+              <a:rPr lang="en-US"/>
               <a:t>Third level</a:t>
             </a:r>
           </a:p>
           <a:p>
             <a:pPr lvl="3"/>
             <a:r>
-              <a:rPr lang="en-US" smtClean="0"/>
+              <a:rPr lang="en-US"/>
               <a:t>Fourth level</a:t>
             </a:r>
           </a:p>
           <a:p>
             <a:pPr lvl="4"/>
             <a:r>
-              <a:rPr lang="en-US" smtClean="0"/>
+              <a:rPr lang="en-US"/>
               <a:t>Fifth level</a:t>
             </a:r>
             <a:endParaRPr lang="en-US" dirty="0"/>
@@ -2875,9 +3228,9 @@
             </a:lvl1pPr>
           </a:lstStyle>
           <a:p>
-            <a:fld id="{3A51130B-5554-4741-8142-56D17AB8E1DF}" type="datetimeFigureOut">
+            <a:fld id="{2D964A93-42AD-46FD-AC9E-B333E61E5980}" type="datetime1">
               <a:rPr lang="en-US" smtClean="0"/>
-              <a:t>6/11/2020</a:t>
+              <a:t>6/13/2020</a:t>
             </a:fld>
             <a:endParaRPr lang="en-US"/>
           </a:p>
@@ -2899,6 +3252,7 @@
     <p:sldLayoutId id="2147483682" r:id="rId10"/>
     <p:sldLayoutId id="2147483683" r:id="rId11"/>
   </p:sldLayoutIdLst>
+  <p:hf hdr="0" ftr="0" dt="0"/>
   <p:txStyles>
     <p:titleStyle>
       <a:lvl1pPr algn="l" defTabSz="914400" rtl="0" eaLnBrk="1" latinLnBrk="0" hangingPunct="1">
@@ -3188,11 +3542,8 @@
   <p:cSld>
     <p:bg>
       <p:bgPr>
-        <a:blipFill dpi="0" rotWithShape="1">
-          <a:blip r:embed="rId2">
-            <a:lum/>
-          </a:blip>
-          <a:srcRect/>
+        <a:blipFill>
+          <a:blip r:embed="rId2"/>
           <a:tile tx="0" ty="0" sx="100000" sy="100000" flip="none" algn="tl"/>
         </a:blipFill>
         <a:effectLst/>
@@ -3217,7 +3568,7 @@
           <p:cNvPr id="2" name="Title 1">
             <a:extLst>
               <a:ext uri="{FF2B5EF4-FFF2-40B4-BE49-F238E27FC236}">
-                <a16:creationId xmlns:a16="http://schemas.microsoft.com/office/drawing/2014/main" xmlns="" id="{BC60F0FA-7D3E-489E-B4A8-3579C35DE747}"/>
+                <a16:creationId xmlns:a16="http://schemas.microsoft.com/office/drawing/2014/main" id="{BC60F0FA-7D3E-489E-B4A8-3579C35DE747}"/>
               </a:ext>
             </a:extLst>
           </p:cNvPr>
@@ -3240,7 +3591,10 @@
           <a:p>
             <a:pPr algn="ctr"/>
             <a:r>
-              <a:rPr lang="en-US" dirty="0"/>
+              <a:rPr lang="en-US" dirty="0">
+                <a:latin typeface="Times New Roman" panose="02020603050405020304" pitchFamily="18" charset="0"/>
+                <a:cs typeface="Times New Roman" panose="02020603050405020304" pitchFamily="18" charset="0"/>
+              </a:rPr>
               <a:t>Indian Trade Analysis and Forecasting</a:t>
             </a:r>
           </a:p>
@@ -3251,7 +3605,7 @@
           <p:cNvPr id="3" name="Subtitle 2">
             <a:extLst>
               <a:ext uri="{FF2B5EF4-FFF2-40B4-BE49-F238E27FC236}">
-                <a16:creationId xmlns:a16="http://schemas.microsoft.com/office/drawing/2014/main" xmlns="" id="{59138817-A4AB-42F6-9ED0-5D7A4A0C4583}"/>
+                <a16:creationId xmlns:a16="http://schemas.microsoft.com/office/drawing/2014/main" id="{59138817-A4AB-42F6-9ED0-5D7A4A0C4583}"/>
               </a:ext>
             </a:extLst>
           </p:cNvPr>
@@ -3264,7 +3618,7 @@
         </p:nvSpPr>
         <p:spPr>
           <a:xfrm>
-            <a:off x="1066999" y="3243764"/>
+            <a:off x="1065613" y="3888250"/>
             <a:ext cx="8616828" cy="2011282"/>
           </a:xfrm>
         </p:spPr>
@@ -3276,35 +3630,83 @@
           <a:p>
             <a:pPr algn="ctr"/>
             <a:r>
-              <a:rPr lang="en-IN" sz="2400" dirty="0"/>
+              <a:rPr lang="en-IN" sz="2400" dirty="0">
+                <a:solidFill>
+                  <a:schemeClr val="tx1"/>
+                </a:solidFill>
+                <a:latin typeface="Times New Roman" panose="02020603050405020304" pitchFamily="18" charset="0"/>
+                <a:cs typeface="Times New Roman" panose="02020603050405020304" pitchFamily="18" charset="0"/>
+              </a:rPr>
               <a:t>Project Instructor: Dr. Dalia Nandi, Dept. of ECE</a:t>
             </a:r>
           </a:p>
           <a:p>
             <a:pPr algn="ctr"/>
             <a:r>
-              <a:rPr lang="en-IN" sz="2400" dirty="0" smtClean="0"/>
-              <a:t>Prepared </a:t>
-            </a:r>
-            <a:r>
-              <a:rPr lang="en-IN" sz="2400" dirty="0"/>
-              <a:t>by </a:t>
+              <a:rPr lang="en-IN" sz="2400" dirty="0">
+                <a:solidFill>
+                  <a:schemeClr val="tx1"/>
+                </a:solidFill>
+                <a:latin typeface="Times New Roman" panose="02020603050405020304" pitchFamily="18" charset="0"/>
+                <a:cs typeface="Times New Roman" panose="02020603050405020304" pitchFamily="18" charset="0"/>
+              </a:rPr>
+              <a:t>Prepared by </a:t>
             </a:r>
           </a:p>
           <a:p>
             <a:pPr algn="ctr"/>
             <a:r>
-              <a:rPr lang="en-IN" sz="2400" dirty="0"/>
+              <a:rPr lang="en-IN" sz="2400" dirty="0">
+                <a:solidFill>
+                  <a:schemeClr val="tx1"/>
+                </a:solidFill>
+                <a:latin typeface="Times New Roman" panose="02020603050405020304" pitchFamily="18" charset="0"/>
+                <a:cs typeface="Times New Roman" panose="02020603050405020304" pitchFamily="18" charset="0"/>
+              </a:rPr>
               <a:t>Akarsh Somani(39/CSE/16005/0000162)</a:t>
             </a:r>
           </a:p>
           <a:p>
             <a:pPr algn="ctr"/>
             <a:r>
-              <a:rPr lang="en-IN" sz="2400" dirty="0"/>
+              <a:rPr lang="en-IN" sz="2400" dirty="0">
+                <a:solidFill>
+                  <a:schemeClr val="tx1"/>
+                </a:solidFill>
+                <a:latin typeface="Times New Roman" panose="02020603050405020304" pitchFamily="18" charset="0"/>
+                <a:cs typeface="Times New Roman" panose="02020603050405020304" pitchFamily="18" charset="0"/>
+              </a:rPr>
               <a:t>Gaurav Misra(39/CSE/16015/0000172)</a:t>
             </a:r>
-            <a:endParaRPr lang="en-IN" sz="2400" dirty="0"/>
+          </a:p>
+        </p:txBody>
+      </p:sp>
+      <p:sp>
+        <p:nvSpPr>
+          <p:cNvPr id="4" name="Slide Number Placeholder 3">
+            <a:extLst>
+              <a:ext uri="{FF2B5EF4-FFF2-40B4-BE49-F238E27FC236}">
+                <a16:creationId xmlns:a16="http://schemas.microsoft.com/office/drawing/2014/main" id="{0A86AE17-1A1B-4C63-A60B-07DD0275EB2B}"/>
+              </a:ext>
+            </a:extLst>
+          </p:cNvPr>
+          <p:cNvSpPr>
+            <a:spLocks noGrp="1"/>
+          </p:cNvSpPr>
+          <p:nvPr>
+            <p:ph type="sldNum" sz="quarter" idx="12"/>
+          </p:nvPr>
+        </p:nvSpPr>
+        <p:spPr/>
+        <p:txBody>
+          <a:bodyPr/>
+          <a:lstStyle/>
+          <a:p>
+            <a:fld id="{875942D6-B7AA-482E-A111-0A2C783F5CFF}" type="slidenum">
+              <a:rPr lang="en-US" smtClean="0"/>
+              <a:t>1</a:t>
+            </a:fld>
+            <a:endParaRPr lang="en-US"/>
           </a:p>
         </p:txBody>
       </p:sp>
@@ -3343,7 +3745,7 @@
           <p:cNvPr id="2" name="Title 1">
             <a:extLst>
               <a:ext uri="{FF2B5EF4-FFF2-40B4-BE49-F238E27FC236}">
-                <a16:creationId xmlns:a16="http://schemas.microsoft.com/office/drawing/2014/main" xmlns="" id="{459E159F-BDAE-4DB6-9B02-31C1E5F53E4D}"/>
+                <a16:creationId xmlns:a16="http://schemas.microsoft.com/office/drawing/2014/main" id="{459E159F-BDAE-4DB6-9B02-31C1E5F53E4D}"/>
               </a:ext>
             </a:extLst>
           </p:cNvPr>
@@ -3360,7 +3762,10 @@
           <a:lstStyle/>
           <a:p>
             <a:r>
-              <a:rPr lang="en-US" dirty="0"/>
+              <a:rPr lang="en-US" dirty="0">
+                <a:latin typeface="Times New Roman" panose="02020603050405020304" pitchFamily="18" charset="0"/>
+                <a:cs typeface="Times New Roman" panose="02020603050405020304" pitchFamily="18" charset="0"/>
+              </a:rPr>
               <a:t>Exponential Smoothing and Holt-Winters</a:t>
             </a:r>
           </a:p>
@@ -3371,7 +3776,7 @@
           <p:cNvPr id="3" name="Content Placeholder 2">
             <a:extLst>
               <a:ext uri="{FF2B5EF4-FFF2-40B4-BE49-F238E27FC236}">
-                <a16:creationId xmlns:a16="http://schemas.microsoft.com/office/drawing/2014/main" xmlns="" id="{87DBCE6D-BA6C-4D4B-B563-745E1C7B3536}"/>
+                <a16:creationId xmlns:a16="http://schemas.microsoft.com/office/drawing/2014/main" id="{87DBCE6D-BA6C-4D4B-B563-745E1C7B3536}"/>
               </a:ext>
             </a:extLst>
           </p:cNvPr>
@@ -3387,31 +3792,78 @@
           <a:bodyPr/>
           <a:lstStyle/>
           <a:p>
-            <a:endParaRPr lang="en-US" dirty="0"/>
-          </a:p>
-          <a:p>
-            <a:r>
-              <a:rPr lang="en-US" dirty="0"/>
+            <a:endParaRPr lang="en-US" dirty="0">
+              <a:latin typeface="Times New Roman" panose="02020603050405020304" pitchFamily="18" charset="0"/>
+              <a:cs typeface="Times New Roman" panose="02020603050405020304" pitchFamily="18" charset="0"/>
+            </a:endParaRPr>
+          </a:p>
+          <a:p>
+            <a:r>
+              <a:rPr lang="en-US" dirty="0">
+                <a:latin typeface="Times New Roman" panose="02020603050405020304" pitchFamily="18" charset="0"/>
+                <a:cs typeface="Times New Roman" panose="02020603050405020304" pitchFamily="18" charset="0"/>
+              </a:rPr>
               <a:t>In simple moving average the past observation are equally weighted where as in </a:t>
             </a:r>
             <a:r>
-              <a:rPr lang="en-US" b="1" dirty="0"/>
+              <a:rPr lang="en-US" b="1" dirty="0">
+                <a:latin typeface="Times New Roman" panose="02020603050405020304" pitchFamily="18" charset="0"/>
+                <a:cs typeface="Times New Roman" panose="02020603050405020304" pitchFamily="18" charset="0"/>
+              </a:rPr>
               <a:t>Exponential Smoothing</a:t>
             </a:r>
             <a:r>
-              <a:rPr lang="en-US" dirty="0"/>
+              <a:rPr lang="en-US" dirty="0">
+                <a:latin typeface="Times New Roman" panose="02020603050405020304" pitchFamily="18" charset="0"/>
+                <a:cs typeface="Times New Roman" panose="02020603050405020304" pitchFamily="18" charset="0"/>
+              </a:rPr>
               <a:t> it exponentially decreases over the time. It has only one smoothing factor.</a:t>
             </a:r>
           </a:p>
           <a:p>
             <a:r>
-              <a:rPr lang="en-US" b="1" dirty="0"/>
+              <a:rPr lang="en-US" b="1" dirty="0">
+                <a:latin typeface="Times New Roman" panose="02020603050405020304" pitchFamily="18" charset="0"/>
+                <a:cs typeface="Times New Roman" panose="02020603050405020304" pitchFamily="18" charset="0"/>
+              </a:rPr>
               <a:t>Holt-Winters</a:t>
             </a:r>
             <a:r>
-              <a:rPr lang="en-US" dirty="0"/>
+              <a:rPr lang="en-US" dirty="0">
+                <a:latin typeface="Times New Roman" panose="02020603050405020304" pitchFamily="18" charset="0"/>
+                <a:cs typeface="Times New Roman" panose="02020603050405020304" pitchFamily="18" charset="0"/>
+              </a:rPr>
               <a:t> is the extension over the simple exponential smoothing method. Here we use triple smoothing with the factor - seasonal period, trend type and seasonal type. </a:t>
             </a:r>
+          </a:p>
+        </p:txBody>
+      </p:sp>
+      <p:sp>
+        <p:nvSpPr>
+          <p:cNvPr id="4" name="Slide Number Placeholder 3">
+            <a:extLst>
+              <a:ext uri="{FF2B5EF4-FFF2-40B4-BE49-F238E27FC236}">
+                <a16:creationId xmlns:a16="http://schemas.microsoft.com/office/drawing/2014/main" id="{5B3E101C-24F8-4EA6-8DF9-4090DB1444FB}"/>
+              </a:ext>
+            </a:extLst>
+          </p:cNvPr>
+          <p:cNvSpPr>
+            <a:spLocks noGrp="1"/>
+          </p:cNvSpPr>
+          <p:nvPr>
+            <p:ph type="sldNum" sz="quarter" idx="12"/>
+          </p:nvPr>
+        </p:nvSpPr>
+        <p:spPr/>
+        <p:txBody>
+          <a:bodyPr/>
+          <a:lstStyle/>
+          <a:p>
+            <a:fld id="{875942D6-B7AA-482E-A111-0A2C783F5CFF}" type="slidenum">
+              <a:rPr lang="en-US" smtClean="0"/>
+              <a:t>10</a:t>
+            </a:fld>
+            <a:endParaRPr lang="en-US"/>
           </a:p>
         </p:txBody>
       </p:sp>
@@ -3450,7 +3902,7 @@
           <p:cNvPr id="2" name="Title 1">
             <a:extLst>
               <a:ext uri="{FF2B5EF4-FFF2-40B4-BE49-F238E27FC236}">
-                <a16:creationId xmlns:a16="http://schemas.microsoft.com/office/drawing/2014/main" xmlns="" id="{9D5A07A9-3CA7-4EB1-A906-558AA61068B0}"/>
+                <a16:creationId xmlns:a16="http://schemas.microsoft.com/office/drawing/2014/main" id="{9D5A07A9-3CA7-4EB1-A906-558AA61068B0}"/>
               </a:ext>
             </a:extLst>
           </p:cNvPr>
@@ -3467,7 +3919,10 @@
           <a:lstStyle/>
           <a:p>
             <a:r>
-              <a:rPr lang="en-US" dirty="0"/>
+              <a:rPr lang="en-US" dirty="0">
+                <a:latin typeface="Times New Roman" panose="02020603050405020304" pitchFamily="18" charset="0"/>
+                <a:cs typeface="Times New Roman" panose="02020603050405020304" pitchFamily="18" charset="0"/>
+              </a:rPr>
               <a:t>ARIMA – additional and multiplicative</a:t>
             </a:r>
           </a:p>
@@ -3478,7 +3933,7 @@
           <p:cNvPr id="3" name="Content Placeholder 2">
             <a:extLst>
               <a:ext uri="{FF2B5EF4-FFF2-40B4-BE49-F238E27FC236}">
-                <a16:creationId xmlns:a16="http://schemas.microsoft.com/office/drawing/2014/main" xmlns="" id="{466AA86D-DFED-4E3C-A03D-60FF211AEB75}"/>
+                <a16:creationId xmlns:a16="http://schemas.microsoft.com/office/drawing/2014/main" id="{466AA86D-DFED-4E3C-A03D-60FF211AEB75}"/>
               </a:ext>
             </a:extLst>
           </p:cNvPr>
@@ -3495,36 +3950,54 @@
           <a:lstStyle/>
           <a:p>
             <a:r>
-              <a:rPr lang="en-US" dirty="0"/>
+              <a:rPr lang="en-US" dirty="0">
+                <a:latin typeface="Times New Roman" panose="02020603050405020304" pitchFamily="18" charset="0"/>
+                <a:cs typeface="Times New Roman" panose="02020603050405020304" pitchFamily="18" charset="0"/>
+              </a:rPr>
               <a:t>ARIMA stands for </a:t>
             </a:r>
             <a:r>
-              <a:rPr lang="en-US" i="1" dirty="0"/>
+              <a:rPr lang="en-US" i="1" dirty="0">
+                <a:latin typeface="Times New Roman" panose="02020603050405020304" pitchFamily="18" charset="0"/>
+                <a:cs typeface="Times New Roman" panose="02020603050405020304" pitchFamily="18" charset="0"/>
+              </a:rPr>
               <a:t>Autoregressive Integrated Moving Average</a:t>
             </a:r>
             <a:r>
-              <a:rPr lang="en-US" dirty="0"/>
+              <a:rPr lang="en-US" dirty="0">
+                <a:latin typeface="Times New Roman" panose="02020603050405020304" pitchFamily="18" charset="0"/>
+                <a:cs typeface="Times New Roman" panose="02020603050405020304" pitchFamily="18" charset="0"/>
+              </a:rPr>
               <a:t> which is a combination of three terms – </a:t>
             </a:r>
           </a:p>
           <a:p>
             <a:pPr lvl="1"/>
             <a:r>
-              <a:rPr lang="en-US" dirty="0"/>
+              <a:rPr lang="en-US" dirty="0">
+                <a:latin typeface="Times New Roman" panose="02020603050405020304" pitchFamily="18" charset="0"/>
+                <a:cs typeface="Times New Roman" panose="02020603050405020304" pitchFamily="18" charset="0"/>
+              </a:rPr>
               <a:t>AR – Auto Regressive</a:t>
             </a:r>
           </a:p>
           <a:p>
             <a:pPr lvl="1"/>
             <a:r>
-              <a:rPr lang="en-US" dirty="0"/>
+              <a:rPr lang="en-US" dirty="0">
+                <a:latin typeface="Times New Roman" panose="02020603050405020304" pitchFamily="18" charset="0"/>
+                <a:cs typeface="Times New Roman" panose="02020603050405020304" pitchFamily="18" charset="0"/>
+              </a:rPr>
               <a:t>I – Integrated (difference between current values and the previous values)</a:t>
             </a:r>
           </a:p>
           <a:p>
             <a:pPr lvl="1"/>
             <a:r>
-              <a:rPr lang="en-US" dirty="0"/>
+              <a:rPr lang="en-US" dirty="0">
+                <a:latin typeface="Times New Roman" panose="02020603050405020304" pitchFamily="18" charset="0"/>
+                <a:cs typeface="Times New Roman" panose="02020603050405020304" pitchFamily="18" charset="0"/>
+              </a:rPr>
               <a:t>MA – Moving Average</a:t>
             </a:r>
           </a:p>
@@ -3532,14 +4005,20 @@
             <a:pPr marL="201168" lvl="1" indent="0">
               <a:buNone/>
             </a:pPr>
-            <a:endParaRPr lang="en-US" dirty="0"/>
+            <a:endParaRPr lang="en-US" dirty="0">
+              <a:latin typeface="Times New Roman" panose="02020603050405020304" pitchFamily="18" charset="0"/>
+              <a:cs typeface="Times New Roman" panose="02020603050405020304" pitchFamily="18" charset="0"/>
+            </a:endParaRPr>
           </a:p>
           <a:p>
             <a:pPr marL="201168" lvl="1" indent="0">
               <a:buNone/>
             </a:pPr>
             <a:r>
-              <a:rPr lang="en-US" dirty="0"/>
+              <a:rPr lang="en-US" dirty="0">
+                <a:latin typeface="Times New Roman" panose="02020603050405020304" pitchFamily="18" charset="0"/>
+                <a:cs typeface="Times New Roman" panose="02020603050405020304" pitchFamily="18" charset="0"/>
+              </a:rPr>
               <a:t>ARIMA additive – </a:t>
             </a:r>
           </a:p>
@@ -3548,7 +4027,10 @@
               <a:buNone/>
             </a:pPr>
             <a:r>
-              <a:rPr lang="en-US" dirty="0"/>
+              <a:rPr lang="en-US" dirty="0">
+                <a:latin typeface="Times New Roman" panose="02020603050405020304" pitchFamily="18" charset="0"/>
+                <a:cs typeface="Times New Roman" panose="02020603050405020304" pitchFamily="18" charset="0"/>
+              </a:rPr>
               <a:t>	Additive Time Series = Trend + Seasonality + Randomness</a:t>
             </a:r>
           </a:p>
@@ -3556,14 +4038,20 @@
             <a:pPr marL="201168" lvl="1" indent="0">
               <a:buNone/>
             </a:pPr>
-            <a:endParaRPr lang="en-US" dirty="0"/>
+            <a:endParaRPr lang="en-US" dirty="0">
+              <a:latin typeface="Times New Roman" panose="02020603050405020304" pitchFamily="18" charset="0"/>
+              <a:cs typeface="Times New Roman" panose="02020603050405020304" pitchFamily="18" charset="0"/>
+            </a:endParaRPr>
           </a:p>
           <a:p>
             <a:pPr marL="201168" lvl="1" indent="0">
               <a:buNone/>
             </a:pPr>
             <a:r>
-              <a:rPr lang="en-US" dirty="0"/>
+              <a:rPr lang="en-US" dirty="0">
+                <a:latin typeface="Times New Roman" panose="02020603050405020304" pitchFamily="18" charset="0"/>
+                <a:cs typeface="Times New Roman" panose="02020603050405020304" pitchFamily="18" charset="0"/>
+              </a:rPr>
               <a:t>ARIMA multiplicative – </a:t>
             </a:r>
           </a:p>
@@ -3572,7 +4060,10 @@
               <a:buNone/>
             </a:pPr>
             <a:r>
-              <a:rPr lang="en-US" dirty="0"/>
+              <a:rPr lang="en-US" dirty="0">
+                <a:latin typeface="Times New Roman" panose="02020603050405020304" pitchFamily="18" charset="0"/>
+                <a:cs typeface="Times New Roman" panose="02020603050405020304" pitchFamily="18" charset="0"/>
+              </a:rPr>
               <a:t>	Multiplicative Time Series = Trend * Seasonality * Randomness </a:t>
             </a:r>
           </a:p>
@@ -3580,7 +4071,39 @@
             <a:pPr marL="201168" lvl="1" indent="0">
               <a:buNone/>
             </a:pPr>
-            <a:endParaRPr lang="en-US" dirty="0"/>
+            <a:endParaRPr lang="en-US" dirty="0">
+              <a:latin typeface="Times New Roman" panose="02020603050405020304" pitchFamily="18" charset="0"/>
+              <a:cs typeface="Times New Roman" panose="02020603050405020304" pitchFamily="18" charset="0"/>
+            </a:endParaRPr>
+          </a:p>
+        </p:txBody>
+      </p:sp>
+      <p:sp>
+        <p:nvSpPr>
+          <p:cNvPr id="4" name="Slide Number Placeholder 3">
+            <a:extLst>
+              <a:ext uri="{FF2B5EF4-FFF2-40B4-BE49-F238E27FC236}">
+                <a16:creationId xmlns:a16="http://schemas.microsoft.com/office/drawing/2014/main" id="{E129BBB6-068B-4391-B822-EF585842D724}"/>
+              </a:ext>
+            </a:extLst>
+          </p:cNvPr>
+          <p:cNvSpPr>
+            <a:spLocks noGrp="1"/>
+          </p:cNvSpPr>
+          <p:nvPr>
+            <p:ph type="sldNum" sz="quarter" idx="12"/>
+          </p:nvPr>
+        </p:nvSpPr>
+        <p:spPr/>
+        <p:txBody>
+          <a:bodyPr/>
+          <a:lstStyle/>
+          <a:p>
+            <a:fld id="{875942D6-B7AA-482E-A111-0A2C783F5CFF}" type="slidenum">
+              <a:rPr lang="en-US" smtClean="0"/>
+              <a:t>11</a:t>
+            </a:fld>
+            <a:endParaRPr lang="en-US"/>
           </a:p>
         </p:txBody>
       </p:sp>
@@ -3619,7 +4142,7 @@
           <p:cNvPr id="2" name="Title 1">
             <a:extLst>
               <a:ext uri="{FF2B5EF4-FFF2-40B4-BE49-F238E27FC236}">
-                <a16:creationId xmlns:a16="http://schemas.microsoft.com/office/drawing/2014/main" xmlns="" id="{305F9FD6-CEE3-4E89-A3D2-9A94AF45028D}"/>
+                <a16:creationId xmlns:a16="http://schemas.microsoft.com/office/drawing/2014/main" id="{305F9FD6-CEE3-4E89-A3D2-9A94AF45028D}"/>
               </a:ext>
             </a:extLst>
           </p:cNvPr>
@@ -3636,7 +4159,10 @@
           <a:lstStyle/>
           <a:p>
             <a:r>
-              <a:rPr lang="en-US" dirty="0"/>
+              <a:rPr lang="en-US" dirty="0">
+                <a:latin typeface="Times New Roman" panose="02020603050405020304" pitchFamily="18" charset="0"/>
+                <a:cs typeface="Times New Roman" panose="02020603050405020304" pitchFamily="18" charset="0"/>
+              </a:rPr>
               <a:t>Seasonal ARIMA</a:t>
             </a:r>
           </a:p>
@@ -3647,7 +4173,7 @@
           <p:cNvPr id="3" name="Content Placeholder 2">
             <a:extLst>
               <a:ext uri="{FF2B5EF4-FFF2-40B4-BE49-F238E27FC236}">
-                <a16:creationId xmlns:a16="http://schemas.microsoft.com/office/drawing/2014/main" xmlns="" id="{F2256217-6441-4524-88F5-92A4181A19DD}"/>
+                <a16:creationId xmlns:a16="http://schemas.microsoft.com/office/drawing/2014/main" id="{F2256217-6441-4524-88F5-92A4181A19DD}"/>
               </a:ext>
             </a:extLst>
           </p:cNvPr>
@@ -3664,12 +4190,18 @@
           <a:lstStyle/>
           <a:p>
             <a:r>
-              <a:rPr lang="en-US" dirty="0"/>
+              <a:rPr lang="en-US" dirty="0">
+                <a:latin typeface="Times New Roman" panose="02020603050405020304" pitchFamily="18" charset="0"/>
+                <a:cs typeface="Times New Roman" panose="02020603050405020304" pitchFamily="18" charset="0"/>
+              </a:rPr>
               <a:t>Seasonal ARIMA here is ARIMA Multiplicative method with a seasonality factor m. Here we have chosen the multiplicative factor of 12 as ours is a monthly data.</a:t>
             </a:r>
           </a:p>
           <a:p>
-            <a:endParaRPr lang="en-US" dirty="0"/>
+            <a:endParaRPr lang="en-US" dirty="0">
+              <a:latin typeface="Times New Roman" panose="02020603050405020304" pitchFamily="18" charset="0"/>
+              <a:cs typeface="Times New Roman" panose="02020603050405020304" pitchFamily="18" charset="0"/>
+            </a:endParaRPr>
           </a:p>
         </p:txBody>
       </p:sp>
@@ -3678,7 +4210,7 @@
           <p:cNvPr id="4" name="Picture 3">
             <a:extLst>
               <a:ext uri="{FF2B5EF4-FFF2-40B4-BE49-F238E27FC236}">
-                <a16:creationId xmlns:a16="http://schemas.microsoft.com/office/drawing/2014/main" xmlns="" id="{1207F182-2C5B-4884-B493-5D3D39E3791B}"/>
+                <a16:creationId xmlns:a16="http://schemas.microsoft.com/office/drawing/2014/main" id="{1207F182-2C5B-4884-B493-5D3D39E3791B}"/>
               </a:ext>
             </a:extLst>
           </p:cNvPr>
@@ -3712,6 +4244,35 @@
           </a:ln>
         </p:spPr>
       </p:pic>
+      <p:sp>
+        <p:nvSpPr>
+          <p:cNvPr id="5" name="Slide Number Placeholder 4">
+            <a:extLst>
+              <a:ext uri="{FF2B5EF4-FFF2-40B4-BE49-F238E27FC236}">
+                <a16:creationId xmlns:a16="http://schemas.microsoft.com/office/drawing/2014/main" id="{41B51C23-AF9C-406D-A710-68EF2CF27265}"/>
+              </a:ext>
+            </a:extLst>
+          </p:cNvPr>
+          <p:cNvSpPr>
+            <a:spLocks noGrp="1"/>
+          </p:cNvSpPr>
+          <p:nvPr>
+            <p:ph type="sldNum" sz="quarter" idx="12"/>
+          </p:nvPr>
+        </p:nvSpPr>
+        <p:spPr/>
+        <p:txBody>
+          <a:bodyPr/>
+          <a:lstStyle/>
+          <a:p>
+            <a:fld id="{875942D6-B7AA-482E-A111-0A2C783F5CFF}" type="slidenum">
+              <a:rPr lang="en-US" smtClean="0"/>
+              <a:t>12</a:t>
+            </a:fld>
+            <a:endParaRPr lang="en-US"/>
+          </a:p>
+        </p:txBody>
+      </p:sp>
     </p:spTree>
     <p:extLst>
       <p:ext uri="{BB962C8B-B14F-4D97-AF65-F5344CB8AC3E}">
@@ -3747,7 +4308,7 @@
           <p:cNvPr id="2" name="Title 1">
             <a:extLst>
               <a:ext uri="{FF2B5EF4-FFF2-40B4-BE49-F238E27FC236}">
-                <a16:creationId xmlns:a16="http://schemas.microsoft.com/office/drawing/2014/main" xmlns="" id="{9848A2EE-C121-43C9-BA4B-A9B242509668}"/>
+                <a16:creationId xmlns:a16="http://schemas.microsoft.com/office/drawing/2014/main" id="{9848A2EE-C121-43C9-BA4B-A9B242509668}"/>
               </a:ext>
             </a:extLst>
           </p:cNvPr>
@@ -3764,10 +4325,12 @@
           <a:lstStyle/>
           <a:p>
             <a:r>
-              <a:rPr lang="en-US" dirty="0" smtClean="0"/>
+              <a:rPr lang="en-US" dirty="0">
+                <a:latin typeface="Times New Roman" panose="02020603050405020304" pitchFamily="18" charset="0"/>
+                <a:cs typeface="Times New Roman" panose="02020603050405020304" pitchFamily="18" charset="0"/>
+              </a:rPr>
               <a:t>Long Short Term Memory (LSTM)</a:t>
             </a:r>
-            <a:endParaRPr lang="en-US" dirty="0"/>
           </a:p>
         </p:txBody>
       </p:sp>
@@ -3776,7 +4339,7 @@
           <p:cNvPr id="3" name="Content Placeholder 2">
             <a:extLst>
               <a:ext uri="{FF2B5EF4-FFF2-40B4-BE49-F238E27FC236}">
-                <a16:creationId xmlns:a16="http://schemas.microsoft.com/office/drawing/2014/main" xmlns="" id="{3082308F-9D52-4858-BB10-F94701C2AC44}"/>
+                <a16:creationId xmlns:a16="http://schemas.microsoft.com/office/drawing/2014/main" id="{3082308F-9D52-4858-BB10-F94701C2AC44}"/>
               </a:ext>
             </a:extLst>
           </p:cNvPr>
@@ -3798,61 +4361,36 @@
           <a:lstStyle/>
           <a:p>
             <a:r>
-              <a:rPr lang="en-US" dirty="0"/>
-              <a:t>Recurrent </a:t>
-            </a:r>
-            <a:r>
-              <a:rPr lang="en-US" dirty="0" smtClean="0"/>
-              <a:t>neural networks are used for processing the sequential data, but Unfortunately</a:t>
-            </a:r>
-            <a:r>
-              <a:rPr lang="en-US" dirty="0"/>
-              <a:t>, as </a:t>
-            </a:r>
-            <a:r>
-              <a:rPr lang="en-US" dirty="0" smtClean="0"/>
-              <a:t>the dependency gets long, </a:t>
-            </a:r>
-            <a:r>
-              <a:rPr lang="en-US" dirty="0"/>
-              <a:t>RNNs become unable to learn to connect the information</a:t>
-            </a:r>
-            <a:r>
-              <a:rPr lang="en-US" dirty="0" smtClean="0"/>
-              <a:t>.</a:t>
-            </a:r>
-          </a:p>
-          <a:p>
-            <a:r>
-              <a:rPr lang="en-US" dirty="0" smtClean="0"/>
-              <a:t>In these cases, LSTMs come to rescue, which</a:t>
-            </a:r>
-            <a:r>
-              <a:rPr lang="en-US" dirty="0" smtClean="0"/>
-              <a:t> </a:t>
-            </a:r>
-            <a:r>
-              <a:rPr lang="en-US" dirty="0"/>
-              <a:t>are explicitly designed to avoid the long-term dependency problem. </a:t>
-            </a:r>
-            <a:endParaRPr lang="en-US" dirty="0" smtClean="0"/>
-          </a:p>
-          <a:p>
-            <a:r>
-              <a:rPr lang="en-US" dirty="0" smtClean="0"/>
-              <a:t>Remembering </a:t>
-            </a:r>
-            <a:r>
-              <a:rPr lang="en-US" dirty="0"/>
-              <a:t>information for long periods of time is practically their default </a:t>
-            </a:r>
-            <a:r>
-              <a:rPr lang="en-US" dirty="0" smtClean="0"/>
-              <a:t>behavior.</a:t>
-            </a:r>
-          </a:p>
-          <a:p>
-            <a:endParaRPr lang="en-US" dirty="0"/>
+              <a:rPr lang="en-US" dirty="0">
+                <a:latin typeface="Times New Roman" panose="02020603050405020304" pitchFamily="18" charset="0"/>
+                <a:cs typeface="Times New Roman" panose="02020603050405020304" pitchFamily="18" charset="0"/>
+              </a:rPr>
+              <a:t>Recurrent neural networks are used for processing the sequential data, but Unfortunately, as the dependency gets long, RNNs become unable to learn to connect the information.</a:t>
+            </a:r>
+          </a:p>
+          <a:p>
+            <a:r>
+              <a:rPr lang="en-US" dirty="0">
+                <a:latin typeface="Times New Roman" panose="02020603050405020304" pitchFamily="18" charset="0"/>
+                <a:cs typeface="Times New Roman" panose="02020603050405020304" pitchFamily="18" charset="0"/>
+              </a:rPr>
+              <a:t>In these cases, LSTMs come to rescue, which are explicitly designed to avoid the long-term dependency problem. </a:t>
+            </a:r>
+          </a:p>
+          <a:p>
+            <a:r>
+              <a:rPr lang="en-US" dirty="0">
+                <a:latin typeface="Times New Roman" panose="02020603050405020304" pitchFamily="18" charset="0"/>
+                <a:cs typeface="Times New Roman" panose="02020603050405020304" pitchFamily="18" charset="0"/>
+              </a:rPr>
+              <a:t>Remembering information for long periods of time is practically their default behavior.</a:t>
+            </a:r>
+          </a:p>
+          <a:p>
+            <a:endParaRPr lang="en-US" dirty="0">
+              <a:latin typeface="Times New Roman" panose="02020603050405020304" pitchFamily="18" charset="0"/>
+              <a:cs typeface="Times New Roman" panose="02020603050405020304" pitchFamily="18" charset="0"/>
+            </a:endParaRPr>
           </a:p>
         </p:txBody>
       </p:sp>
@@ -3886,6 +4424,35 @@
           </a:prstGeom>
         </p:spPr>
       </p:pic>
+      <p:sp>
+        <p:nvSpPr>
+          <p:cNvPr id="5" name="Slide Number Placeholder 4">
+            <a:extLst>
+              <a:ext uri="{FF2B5EF4-FFF2-40B4-BE49-F238E27FC236}">
+                <a16:creationId xmlns:a16="http://schemas.microsoft.com/office/drawing/2014/main" id="{D2609442-B16A-41A6-9580-3008C9639646}"/>
+              </a:ext>
+            </a:extLst>
+          </p:cNvPr>
+          <p:cNvSpPr>
+            <a:spLocks noGrp="1"/>
+          </p:cNvSpPr>
+          <p:nvPr>
+            <p:ph type="sldNum" sz="quarter" idx="12"/>
+          </p:nvPr>
+        </p:nvSpPr>
+        <p:spPr/>
+        <p:txBody>
+          <a:bodyPr/>
+          <a:lstStyle/>
+          <a:p>
+            <a:fld id="{875942D6-B7AA-482E-A111-0A2C783F5CFF}" type="slidenum">
+              <a:rPr lang="en-US" smtClean="0"/>
+              <a:t>13</a:t>
+            </a:fld>
+            <a:endParaRPr lang="en-US"/>
+          </a:p>
+        </p:txBody>
+      </p:sp>
     </p:spTree>
     <p:extLst>
       <p:ext uri="{BB962C8B-B14F-4D97-AF65-F5344CB8AC3E}">
@@ -3921,7 +4488,7 @@
           <p:cNvPr id="2" name="Title 1">
             <a:extLst>
               <a:ext uri="{FF2B5EF4-FFF2-40B4-BE49-F238E27FC236}">
-                <a16:creationId xmlns:a16="http://schemas.microsoft.com/office/drawing/2014/main" xmlns="" id="{02C04A12-9663-4F93-A4CF-C3FCE901FB72}"/>
+                <a16:creationId xmlns:a16="http://schemas.microsoft.com/office/drawing/2014/main" id="{02C04A12-9663-4F93-A4CF-C3FCE901FB72}"/>
               </a:ext>
             </a:extLst>
           </p:cNvPr>
@@ -3938,14 +4505,12 @@
           <a:lstStyle/>
           <a:p>
             <a:r>
-              <a:rPr lang="en-US" dirty="0" smtClean="0"/>
-              <a:t>Forecasting</a:t>
-            </a:r>
-            <a:r>
-              <a:rPr lang="en-US" dirty="0" smtClean="0"/>
-              <a:t> using LSTM</a:t>
-            </a:r>
-            <a:endParaRPr lang="en-US" dirty="0"/>
+              <a:rPr lang="en-US" dirty="0">
+                <a:latin typeface="Times New Roman" panose="02020603050405020304" pitchFamily="18" charset="0"/>
+                <a:cs typeface="Times New Roman" panose="02020603050405020304" pitchFamily="18" charset="0"/>
+              </a:rPr>
+              <a:t>Forecasting using LSTM</a:t>
+            </a:r>
           </a:p>
         </p:txBody>
       </p:sp>
@@ -4001,10 +4566,41 @@
           <a:lstStyle/>
           <a:p>
             <a:r>
-              <a:rPr lang="en-IN" sz="2200" dirty="0" smtClean="0"/>
+              <a:rPr lang="en-IN" sz="2200" dirty="0">
+                <a:latin typeface="Times New Roman" panose="02020603050405020304" pitchFamily="18" charset="0"/>
+                <a:cs typeface="Times New Roman" panose="02020603050405020304" pitchFamily="18" charset="0"/>
+              </a:rPr>
               <a:t>We took 12 previous months trade amount as input for our LSTM Model</a:t>
             </a:r>
-            <a:endParaRPr lang="en-IN" sz="2200" dirty="0"/>
+          </a:p>
+        </p:txBody>
+      </p:sp>
+      <p:sp>
+        <p:nvSpPr>
+          <p:cNvPr id="3" name="Slide Number Placeholder 2">
+            <a:extLst>
+              <a:ext uri="{FF2B5EF4-FFF2-40B4-BE49-F238E27FC236}">
+                <a16:creationId xmlns:a16="http://schemas.microsoft.com/office/drawing/2014/main" id="{0B71A8FC-BA34-47D9-8027-241899433F22}"/>
+              </a:ext>
+            </a:extLst>
+          </p:cNvPr>
+          <p:cNvSpPr>
+            <a:spLocks noGrp="1"/>
+          </p:cNvSpPr>
+          <p:nvPr>
+            <p:ph type="sldNum" sz="quarter" idx="12"/>
+          </p:nvPr>
+        </p:nvSpPr>
+        <p:spPr/>
+        <p:txBody>
+          <a:bodyPr/>
+          <a:lstStyle/>
+          <a:p>
+            <a:fld id="{875942D6-B7AA-482E-A111-0A2C783F5CFF}" type="slidenum">
+              <a:rPr lang="en-US" smtClean="0"/>
+              <a:t>14</a:t>
+            </a:fld>
+            <a:endParaRPr lang="en-US"/>
           </a:p>
         </p:txBody>
       </p:sp>
@@ -4054,10 +4650,12 @@
           <a:lstStyle/>
           <a:p>
             <a:r>
-              <a:rPr lang="en-IN" dirty="0" smtClean="0"/>
+              <a:rPr lang="en-IN" dirty="0">
+                <a:latin typeface="Times New Roman" panose="02020603050405020304" pitchFamily="18" charset="0"/>
+                <a:cs typeface="Times New Roman" panose="02020603050405020304" pitchFamily="18" charset="0"/>
+              </a:rPr>
               <a:t>Comparison of Models</a:t>
             </a:r>
-            <a:endParaRPr lang="en-IN" dirty="0"/>
           </a:p>
         </p:txBody>
       </p:sp>
@@ -4087,9 +4685,27 @@
                 <a:tableStyleId>{5C22544A-7EE6-4342-B048-85BDC9FD1C3A}</a:tableStyleId>
               </a:tblPr>
               <a:tblGrid>
-                <a:gridCol w="2505873"/>
-                <a:gridCol w="2125351"/>
-                <a:gridCol w="2043964"/>
+                <a:gridCol w="2505873">
+                  <a:extLst>
+                    <a:ext uri="{9D8B030D-6E8A-4147-A177-3AD203B41FA5}">
+                      <a16:colId xmlns:a16="http://schemas.microsoft.com/office/drawing/2014/main" val="20000"/>
+                    </a:ext>
+                  </a:extLst>
+                </a:gridCol>
+                <a:gridCol w="2125351">
+                  <a:extLst>
+                    <a:ext uri="{9D8B030D-6E8A-4147-A177-3AD203B41FA5}">
+                      <a16:colId xmlns:a16="http://schemas.microsoft.com/office/drawing/2014/main" val="20001"/>
+                    </a:ext>
+                  </a:extLst>
+                </a:gridCol>
+                <a:gridCol w="2043964">
+                  <a:extLst>
+                    <a:ext uri="{9D8B030D-6E8A-4147-A177-3AD203B41FA5}">
+                      <a16:colId xmlns:a16="http://schemas.microsoft.com/office/drawing/2014/main" val="20002"/>
+                    </a:ext>
+                  </a:extLst>
+                </a:gridCol>
               </a:tblGrid>
               <a:tr h="365258">
                 <a:tc>
@@ -4179,6 +4795,11 @@
                   </a:txBody>
                   <a:tcPr marL="68580" marR="68580" marT="0" marB="0"/>
                 </a:tc>
+                <a:extLst>
+                  <a:ext uri="{0D108BD9-81ED-4DB2-BD59-A6C34878D82A}">
+                    <a16:rowId xmlns:a16="http://schemas.microsoft.com/office/drawing/2014/main" val="10000"/>
+                  </a:ext>
+                </a:extLst>
               </a:tr>
               <a:tr h="313179">
                 <a:tc>
@@ -4268,6 +4889,11 @@
                   </a:txBody>
                   <a:tcPr marL="68580" marR="68580" marT="0" marB="0"/>
                 </a:tc>
+                <a:extLst>
+                  <a:ext uri="{0D108BD9-81ED-4DB2-BD59-A6C34878D82A}">
+                    <a16:rowId xmlns:a16="http://schemas.microsoft.com/office/drawing/2014/main" val="10001"/>
+                  </a:ext>
+                </a:extLst>
               </a:tr>
               <a:tr h="313179">
                 <a:tc>
@@ -4393,6 +5019,11 @@
                   </a:txBody>
                   <a:tcPr marL="68580" marR="68580" marT="0" marB="0"/>
                 </a:tc>
+                <a:extLst>
+                  <a:ext uri="{0D108BD9-81ED-4DB2-BD59-A6C34878D82A}">
+                    <a16:rowId xmlns:a16="http://schemas.microsoft.com/office/drawing/2014/main" val="10002"/>
+                  </a:ext>
+                </a:extLst>
               </a:tr>
               <a:tr h="313179">
                 <a:tc>
@@ -4518,6 +5149,11 @@
                   </a:txBody>
                   <a:tcPr marL="68580" marR="68580" marT="0" marB="0"/>
                 </a:tc>
+                <a:extLst>
+                  <a:ext uri="{0D108BD9-81ED-4DB2-BD59-A6C34878D82A}">
+                    <a16:rowId xmlns:a16="http://schemas.microsoft.com/office/drawing/2014/main" val="10003"/>
+                  </a:ext>
+                </a:extLst>
               </a:tr>
               <a:tr h="313179">
                 <a:tc>
@@ -4643,6 +5279,11 @@
                   </a:txBody>
                   <a:tcPr marL="68580" marR="68580" marT="0" marB="0"/>
                 </a:tc>
+                <a:extLst>
+                  <a:ext uri="{0D108BD9-81ED-4DB2-BD59-A6C34878D82A}">
+                    <a16:rowId xmlns:a16="http://schemas.microsoft.com/office/drawing/2014/main" val="10004"/>
+                  </a:ext>
+                </a:extLst>
               </a:tr>
               <a:tr h="313179">
                 <a:tc>
@@ -4768,6 +5409,11 @@
                   </a:txBody>
                   <a:tcPr marL="68580" marR="68580" marT="0" marB="0"/>
                 </a:tc>
+                <a:extLst>
+                  <a:ext uri="{0D108BD9-81ED-4DB2-BD59-A6C34878D82A}">
+                    <a16:rowId xmlns:a16="http://schemas.microsoft.com/office/drawing/2014/main" val="10005"/>
+                  </a:ext>
+                </a:extLst>
               </a:tr>
               <a:tr h="313179">
                 <a:tc>
@@ -4893,6 +5539,11 @@
                   </a:txBody>
                   <a:tcPr marL="68580" marR="68580" marT="0" marB="0"/>
                 </a:tc>
+                <a:extLst>
+                  <a:ext uri="{0D108BD9-81ED-4DB2-BD59-A6C34878D82A}">
+                    <a16:rowId xmlns:a16="http://schemas.microsoft.com/office/drawing/2014/main" val="10006"/>
+                  </a:ext>
+                </a:extLst>
               </a:tr>
               <a:tr h="313179">
                 <a:tc>
@@ -5018,6 +5669,11 @@
                   </a:txBody>
                   <a:tcPr marL="68580" marR="68580" marT="0" marB="0"/>
                 </a:tc>
+                <a:extLst>
+                  <a:ext uri="{0D108BD9-81ED-4DB2-BD59-A6C34878D82A}">
+                    <a16:rowId xmlns:a16="http://schemas.microsoft.com/office/drawing/2014/main" val="10007"/>
+                  </a:ext>
+                </a:extLst>
               </a:tr>
               <a:tr h="313179">
                 <a:tc>
@@ -5107,6 +5763,11 @@
                   </a:txBody>
                   <a:tcPr marL="68580" marR="68580" marT="0" marB="0"/>
                 </a:tc>
+                <a:extLst>
+                  <a:ext uri="{0D108BD9-81ED-4DB2-BD59-A6C34878D82A}">
+                    <a16:rowId xmlns:a16="http://schemas.microsoft.com/office/drawing/2014/main" val="10008"/>
+                  </a:ext>
+                </a:extLst>
               </a:tr>
             </a:tbl>
           </a:graphicData>
@@ -5139,7 +5800,10 @@
               <a:buChar char="•"/>
             </a:pPr>
             <a:r>
-              <a:rPr lang="en-IN" sz="2200" dirty="0" smtClean="0"/>
+              <a:rPr lang="en-IN" sz="2200" dirty="0">
+                <a:latin typeface="Times New Roman" panose="02020603050405020304" pitchFamily="18" charset="0"/>
+                <a:cs typeface="Times New Roman" panose="02020603050405020304" pitchFamily="18" charset="0"/>
+              </a:rPr>
               <a:t>For monthly Import’s data, LSTM stands up to expectations with minimum RMSE of 2637.71</a:t>
             </a:r>
           </a:p>
@@ -5149,10 +5813,41 @@
               <a:buChar char="•"/>
             </a:pPr>
             <a:r>
-              <a:rPr lang="en-IN" sz="2200" dirty="0" smtClean="0"/>
+              <a:rPr lang="en-IN" sz="2200" dirty="0">
+                <a:latin typeface="Times New Roman" panose="02020603050405020304" pitchFamily="18" charset="0"/>
+                <a:cs typeface="Times New Roman" panose="02020603050405020304" pitchFamily="18" charset="0"/>
+              </a:rPr>
               <a:t>For monthly Export’s data, Seasonal ARIMA outperforms other models with minimum RMSE of 1310.58</a:t>
             </a:r>
-            <a:endParaRPr lang="en-IN" sz="2200" dirty="0"/>
+          </a:p>
+        </p:txBody>
+      </p:sp>
+      <p:sp>
+        <p:nvSpPr>
+          <p:cNvPr id="3" name="Slide Number Placeholder 2">
+            <a:extLst>
+              <a:ext uri="{FF2B5EF4-FFF2-40B4-BE49-F238E27FC236}">
+                <a16:creationId xmlns:a16="http://schemas.microsoft.com/office/drawing/2014/main" id="{D637FC5F-1629-47D5-A3A0-3A0A73136ED2}"/>
+              </a:ext>
+            </a:extLst>
+          </p:cNvPr>
+          <p:cNvSpPr>
+            <a:spLocks noGrp="1"/>
+          </p:cNvSpPr>
+          <p:nvPr>
+            <p:ph type="sldNum" sz="quarter" idx="12"/>
+          </p:nvPr>
+        </p:nvSpPr>
+        <p:spPr/>
+        <p:txBody>
+          <a:bodyPr/>
+          <a:lstStyle/>
+          <a:p>
+            <a:fld id="{875942D6-B7AA-482E-A111-0A2C783F5CFF}" type="slidenum">
+              <a:rPr lang="en-US" smtClean="0"/>
+              <a:t>15</a:t>
+            </a:fld>
+            <a:endParaRPr lang="en-US"/>
           </a:p>
         </p:txBody>
       </p:sp>
@@ -5202,10 +5897,12 @@
           <a:lstStyle/>
           <a:p>
             <a:r>
-              <a:rPr lang="en-IN" dirty="0" smtClean="0"/>
+              <a:rPr lang="en-IN" dirty="0">
+                <a:latin typeface="Times New Roman" panose="02020603050405020304" pitchFamily="18" charset="0"/>
+                <a:cs typeface="Times New Roman" panose="02020603050405020304" pitchFamily="18" charset="0"/>
+              </a:rPr>
               <a:t>Conclusion</a:t>
             </a:r>
-            <a:endParaRPr lang="en-IN" dirty="0"/>
           </a:p>
         </p:txBody>
       </p:sp>
@@ -5225,114 +5922,81 @@
           <a:lstStyle/>
           <a:p>
             <a:r>
-              <a:rPr lang="en-US" dirty="0"/>
-              <a:t>T</a:t>
-            </a:r>
-            <a:r>
-              <a:rPr lang="en-US" dirty="0" smtClean="0"/>
-              <a:t>here </a:t>
-            </a:r>
-            <a:r>
-              <a:rPr lang="en-US" dirty="0"/>
-              <a:t>is an upwards trend in Import forecast and slightly upward trend in the Export forecast</a:t>
-            </a:r>
-            <a:r>
-              <a:rPr lang="en-US" dirty="0" smtClean="0"/>
-              <a:t>.</a:t>
-            </a:r>
-          </a:p>
-          <a:p>
-            <a:r>
-              <a:rPr lang="en-US" dirty="0"/>
-              <a:t>W</a:t>
-            </a:r>
-            <a:r>
-              <a:rPr lang="en-US" dirty="0" smtClean="0"/>
-              <a:t>e’re </a:t>
-            </a:r>
-            <a:r>
-              <a:rPr lang="en-US" dirty="0"/>
-              <a:t>in huge trade </a:t>
-            </a:r>
-            <a:r>
-              <a:rPr lang="en-US" dirty="0" smtClean="0"/>
-              <a:t>deficit (Export-Import) </a:t>
-            </a:r>
-            <a:r>
-              <a:rPr lang="en-US" dirty="0"/>
-              <a:t>with China in terms of </a:t>
-            </a:r>
-            <a:r>
-              <a:rPr lang="en-US" dirty="0" smtClean="0"/>
-              <a:t>trade. Hence we </a:t>
-            </a:r>
-            <a:r>
-              <a:rPr lang="en-US" dirty="0"/>
-              <a:t>need to make strict policies towards Chinese </a:t>
-            </a:r>
-            <a:r>
-              <a:rPr lang="en-US" dirty="0" smtClean="0"/>
-              <a:t>products as soon as possible.</a:t>
-            </a:r>
-          </a:p>
-          <a:p>
-            <a:r>
-              <a:rPr lang="en-US" dirty="0"/>
-              <a:t>S</a:t>
-            </a:r>
-            <a:r>
-              <a:rPr lang="en-US" dirty="0" smtClean="0"/>
-              <a:t>urprisingly </a:t>
-            </a:r>
-            <a:r>
-              <a:rPr lang="en-US" dirty="0"/>
-              <a:t>Seasonal ARIMA outperformed LSTM </a:t>
-            </a:r>
-            <a:r>
-              <a:rPr lang="en-US" dirty="0" smtClean="0"/>
-              <a:t>in Forecasting </a:t>
-            </a:r>
-            <a:r>
-              <a:rPr lang="en-US" dirty="0"/>
-              <a:t>Export Data, which </a:t>
-            </a:r>
-            <a:r>
-              <a:rPr lang="en-US" dirty="0" smtClean="0"/>
-              <a:t>shows that </a:t>
-            </a:r>
-            <a:r>
-              <a:rPr lang="en-US" dirty="0"/>
-              <a:t>ARIMA captures seasonality much better than any other model, even with </a:t>
-            </a:r>
-            <a:r>
-              <a:rPr lang="en-US" b="1" dirty="0"/>
-              <a:t>lesser data and randomness</a:t>
-            </a:r>
-            <a:r>
-              <a:rPr lang="en-US" b="1" dirty="0" smtClean="0"/>
-              <a:t>.</a:t>
-            </a:r>
-          </a:p>
-          <a:p>
-            <a:r>
-              <a:rPr lang="en-US" dirty="0"/>
-              <a:t>LSTM model performed better for Import Data as </a:t>
-            </a:r>
-            <a:r>
-              <a:rPr lang="en-US" dirty="0" smtClean="0"/>
-              <a:t>expected because of it’s capability of retaining information of long period of time.</a:t>
-            </a:r>
-          </a:p>
-          <a:p>
-            <a:r>
-              <a:rPr lang="en-US" dirty="0" smtClean="0"/>
-              <a:t>LSTM underperformed for Export data because of </a:t>
-            </a:r>
-            <a:r>
-              <a:rPr lang="en-US" b="1" dirty="0" smtClean="0"/>
-              <a:t>lesser data and first few unexpected high fluctuations.</a:t>
-            </a:r>
-            <a:endParaRPr lang="en-IN" dirty="0"/>
+              <a:rPr lang="en-US" dirty="0">
+                <a:latin typeface="Times New Roman" panose="02020603050405020304" pitchFamily="18" charset="0"/>
+                <a:cs typeface="Times New Roman" panose="02020603050405020304" pitchFamily="18" charset="0"/>
+              </a:rPr>
+              <a:t>There is an slightly upwards trend in Export forecast and slightly downward trend in the Export forecast.</a:t>
+            </a:r>
+          </a:p>
+          <a:p>
+            <a:r>
+              <a:rPr lang="en-US" dirty="0">
+                <a:latin typeface="Times New Roman" panose="02020603050405020304" pitchFamily="18" charset="0"/>
+                <a:cs typeface="Times New Roman" panose="02020603050405020304" pitchFamily="18" charset="0"/>
+              </a:rPr>
+              <a:t>Seasonal ARIMA Perform better for Forecasting Export Data, which shows that ARIMA captures seasonality much better than any other model, even with </a:t>
+            </a:r>
+            <a:r>
+              <a:rPr lang="en-US" b="1" dirty="0">
+                <a:latin typeface="Times New Roman" panose="02020603050405020304" pitchFamily="18" charset="0"/>
+                <a:cs typeface="Times New Roman" panose="02020603050405020304" pitchFamily="18" charset="0"/>
+              </a:rPr>
+              <a:t>lesser data and randomness.</a:t>
+            </a:r>
+          </a:p>
+          <a:p>
+            <a:r>
+              <a:rPr lang="en-US" dirty="0">
+                <a:latin typeface="Times New Roman" panose="02020603050405020304" pitchFamily="18" charset="0"/>
+                <a:cs typeface="Times New Roman" panose="02020603050405020304" pitchFamily="18" charset="0"/>
+              </a:rPr>
+              <a:t>LSTM model performed better for Import Data because of it’s capability of retaining information of long period of time.</a:t>
+            </a:r>
+          </a:p>
+          <a:p>
+            <a:r>
+              <a:rPr lang="en-US" dirty="0">
+                <a:latin typeface="Times New Roman" panose="02020603050405020304" pitchFamily="18" charset="0"/>
+                <a:cs typeface="Times New Roman" panose="02020603050405020304" pitchFamily="18" charset="0"/>
+              </a:rPr>
+              <a:t>We’re in huge trade deficit (Export-Import) with China in terms of trade. Hence we need to make strict policies towards Chinese products as soon as possible.</a:t>
+            </a:r>
+          </a:p>
+          <a:p>
+            <a:endParaRPr lang="en-IN" dirty="0">
+              <a:latin typeface="Times New Roman" panose="02020603050405020304" pitchFamily="18" charset="0"/>
+              <a:cs typeface="Times New Roman" panose="02020603050405020304" pitchFamily="18" charset="0"/>
+            </a:endParaRPr>
+          </a:p>
+        </p:txBody>
+      </p:sp>
+      <p:sp>
+        <p:nvSpPr>
+          <p:cNvPr id="4" name="Slide Number Placeholder 3">
+            <a:extLst>
+              <a:ext uri="{FF2B5EF4-FFF2-40B4-BE49-F238E27FC236}">
+                <a16:creationId xmlns:a16="http://schemas.microsoft.com/office/drawing/2014/main" id="{5EB171F2-7743-4C10-A1C3-5323B50613A5}"/>
+              </a:ext>
+            </a:extLst>
+          </p:cNvPr>
+          <p:cNvSpPr>
+            <a:spLocks noGrp="1"/>
+          </p:cNvSpPr>
+          <p:nvPr>
+            <p:ph type="sldNum" sz="quarter" idx="12"/>
+          </p:nvPr>
+        </p:nvSpPr>
+        <p:spPr/>
+        <p:txBody>
+          <a:bodyPr/>
+          <a:lstStyle/>
+          <a:p>
+            <a:fld id="{875942D6-B7AA-482E-A111-0A2C783F5CFF}" type="slidenum">
+              <a:rPr lang="en-US" smtClean="0"/>
+              <a:t>16</a:t>
+            </a:fld>
+            <a:endParaRPr lang="en-US"/>
           </a:p>
         </p:txBody>
       </p:sp>
@@ -5382,10 +6046,12 @@
           <a:lstStyle/>
           <a:p>
             <a:r>
-              <a:rPr lang="en-IN" dirty="0" smtClean="0"/>
+              <a:rPr lang="en-IN" dirty="0">
+                <a:latin typeface="Times New Roman" panose="02020603050405020304" pitchFamily="18" charset="0"/>
+                <a:cs typeface="Times New Roman" panose="02020603050405020304" pitchFamily="18" charset="0"/>
+              </a:rPr>
               <a:t>Future Prospects</a:t>
             </a:r>
-            <a:endParaRPr lang="en-IN" dirty="0"/>
           </a:p>
         </p:txBody>
       </p:sp>
@@ -5406,70 +6072,87 @@
           <a:p>
             <a:pPr lvl="0"/>
             <a:r>
-              <a:rPr lang="en-US" dirty="0"/>
-              <a:t>Making Existing Models more </a:t>
-            </a:r>
-            <a:r>
-              <a:rPr lang="en-US" dirty="0" smtClean="0"/>
-              <a:t>robust by tuning them even more.</a:t>
-            </a:r>
-            <a:endParaRPr lang="en-IN" dirty="0"/>
+              <a:rPr lang="en-US" dirty="0">
+                <a:latin typeface="Times New Roman" panose="02020603050405020304" pitchFamily="18" charset="0"/>
+                <a:cs typeface="Times New Roman" panose="02020603050405020304" pitchFamily="18" charset="0"/>
+              </a:rPr>
+              <a:t>Making Existing Models more robust by tuning them even more.</a:t>
+            </a:r>
+            <a:endParaRPr lang="en-IN" dirty="0">
+              <a:latin typeface="Times New Roman" panose="02020603050405020304" pitchFamily="18" charset="0"/>
+              <a:cs typeface="Times New Roman" panose="02020603050405020304" pitchFamily="18" charset="0"/>
+            </a:endParaRPr>
           </a:p>
           <a:p>
             <a:pPr lvl="0"/>
             <a:r>
-              <a:rPr lang="en-US" dirty="0"/>
-              <a:t>Using New models </a:t>
-            </a:r>
-            <a:r>
-              <a:rPr lang="en-US" dirty="0" smtClean="0"/>
-              <a:t>specially </a:t>
-            </a:r>
-            <a:r>
-              <a:rPr lang="en-US" dirty="0"/>
-              <a:t>Attention </a:t>
-            </a:r>
-            <a:r>
-              <a:rPr lang="en-US" dirty="0" smtClean="0"/>
-              <a:t>Models which can even store more information than LSTMs.</a:t>
-            </a:r>
-            <a:endParaRPr lang="en-IN" dirty="0"/>
+              <a:rPr lang="en-US" dirty="0">
+                <a:latin typeface="Times New Roman" panose="02020603050405020304" pitchFamily="18" charset="0"/>
+                <a:cs typeface="Times New Roman" panose="02020603050405020304" pitchFamily="18" charset="0"/>
+              </a:rPr>
+              <a:t>Using New models specially Attention Models which can even store more information than LSTMs.</a:t>
+            </a:r>
+            <a:endParaRPr lang="en-IN" dirty="0">
+              <a:latin typeface="Times New Roman" panose="02020603050405020304" pitchFamily="18" charset="0"/>
+              <a:cs typeface="Times New Roman" panose="02020603050405020304" pitchFamily="18" charset="0"/>
+            </a:endParaRPr>
           </a:p>
           <a:p>
             <a:pPr lvl="0"/>
             <a:r>
-              <a:rPr lang="en-US" dirty="0"/>
-              <a:t>Include some factor to encounter the randomness in </a:t>
-            </a:r>
-            <a:r>
-              <a:rPr lang="en-US" dirty="0" smtClean="0"/>
-              <a:t>data which causes high frequency fluctuations which in turn results in below expected performance of models.</a:t>
-            </a:r>
-            <a:endParaRPr lang="en-IN" dirty="0"/>
+              <a:rPr lang="en-US" dirty="0">
+                <a:latin typeface="Times New Roman" panose="02020603050405020304" pitchFamily="18" charset="0"/>
+                <a:cs typeface="Times New Roman" panose="02020603050405020304" pitchFamily="18" charset="0"/>
+              </a:rPr>
+              <a:t>Include some factor to encounter the randomness in data which causes high frequency fluctuations which in turn results in below expected performance of models.</a:t>
+            </a:r>
+            <a:endParaRPr lang="en-IN" dirty="0">
+              <a:latin typeface="Times New Roman" panose="02020603050405020304" pitchFamily="18" charset="0"/>
+              <a:cs typeface="Times New Roman" panose="02020603050405020304" pitchFamily="18" charset="0"/>
+            </a:endParaRPr>
           </a:p>
           <a:p>
             <a:pPr lvl="0"/>
             <a:r>
-              <a:rPr lang="en-US" dirty="0"/>
-              <a:t>Getting more data points for better </a:t>
-            </a:r>
-            <a:r>
-              <a:rPr lang="en-US" dirty="0" smtClean="0"/>
-              <a:t>forecasting specially for LSTM model since it operates on a neural network which needs more and more data for better predictions.</a:t>
-            </a:r>
-            <a:endParaRPr lang="en-IN" dirty="0"/>
-          </a:p>
-          <a:p>
-            <a:pPr lvl="0"/>
-            <a:r>
-              <a:rPr lang="en-US" dirty="0"/>
-              <a:t>Using this thesis for </a:t>
-            </a:r>
-            <a:r>
-              <a:rPr lang="en-US" dirty="0" smtClean="0"/>
-              <a:t>even more case studies similar to the one we discussed above.</a:t>
-            </a:r>
-            <a:endParaRPr lang="en-IN" dirty="0"/>
+              <a:rPr lang="en-US" dirty="0">
+                <a:latin typeface="Times New Roman" panose="02020603050405020304" pitchFamily="18" charset="0"/>
+                <a:cs typeface="Times New Roman" panose="02020603050405020304" pitchFamily="18" charset="0"/>
+              </a:rPr>
+              <a:t>Getting more data points for better forecasting specially for LSTM model since it operates on a neural network which needs more and more data for better predictions.</a:t>
+            </a:r>
+            <a:endParaRPr lang="en-IN" dirty="0">
+              <a:latin typeface="Times New Roman" panose="02020603050405020304" pitchFamily="18" charset="0"/>
+              <a:cs typeface="Times New Roman" panose="02020603050405020304" pitchFamily="18" charset="0"/>
+            </a:endParaRPr>
+          </a:p>
+        </p:txBody>
+      </p:sp>
+      <p:sp>
+        <p:nvSpPr>
+          <p:cNvPr id="4" name="Slide Number Placeholder 3">
+            <a:extLst>
+              <a:ext uri="{FF2B5EF4-FFF2-40B4-BE49-F238E27FC236}">
+                <a16:creationId xmlns:a16="http://schemas.microsoft.com/office/drawing/2014/main" id="{F4CAD629-4519-4FAA-BFF2-E80BBA664C96}"/>
+              </a:ext>
+            </a:extLst>
+          </p:cNvPr>
+          <p:cNvSpPr>
+            <a:spLocks noGrp="1"/>
+          </p:cNvSpPr>
+          <p:nvPr>
+            <p:ph type="sldNum" sz="quarter" idx="12"/>
+          </p:nvPr>
+        </p:nvSpPr>
+        <p:spPr/>
+        <p:txBody>
+          <a:bodyPr/>
+          <a:lstStyle/>
+          <a:p>
+            <a:fld id="{875942D6-B7AA-482E-A111-0A2C783F5CFF}" type="slidenum">
+              <a:rPr lang="en-US" smtClean="0"/>
+              <a:t>17</a:t>
+            </a:fld>
+            <a:endParaRPr lang="en-US"/>
           </a:p>
         </p:txBody>
       </p:sp>
@@ -5519,10 +6202,41 @@
           <a:lstStyle/>
           <a:p>
             <a:r>
-              <a:rPr lang="en-IN" dirty="0" smtClean="0"/>
+              <a:rPr lang="en-IN" dirty="0">
+                <a:latin typeface="Times New Roman" panose="02020603050405020304" pitchFamily="18" charset="0"/>
+                <a:cs typeface="Times New Roman" panose="02020603050405020304" pitchFamily="18" charset="0"/>
+              </a:rPr>
               <a:t>Thank You!</a:t>
             </a:r>
-            <a:endParaRPr lang="en-IN" dirty="0"/>
+          </a:p>
+        </p:txBody>
+      </p:sp>
+      <p:sp>
+        <p:nvSpPr>
+          <p:cNvPr id="3" name="Slide Number Placeholder 2">
+            <a:extLst>
+              <a:ext uri="{FF2B5EF4-FFF2-40B4-BE49-F238E27FC236}">
+                <a16:creationId xmlns:a16="http://schemas.microsoft.com/office/drawing/2014/main" id="{CF50768F-32BC-4171-85D7-92F5DC437E5E}"/>
+              </a:ext>
+            </a:extLst>
+          </p:cNvPr>
+          <p:cNvSpPr>
+            <a:spLocks noGrp="1"/>
+          </p:cNvSpPr>
+          <p:nvPr>
+            <p:ph type="sldNum" sz="quarter" idx="12"/>
+          </p:nvPr>
+        </p:nvSpPr>
+        <p:spPr/>
+        <p:txBody>
+          <a:bodyPr/>
+          <a:lstStyle/>
+          <a:p>
+            <a:fld id="{875942D6-B7AA-482E-A111-0A2C783F5CFF}" type="slidenum">
+              <a:rPr lang="en-US" smtClean="0"/>
+              <a:t>18</a:t>
+            </a:fld>
+            <a:endParaRPr lang="en-US"/>
           </a:p>
         </p:txBody>
       </p:sp>
@@ -5561,7 +6275,7 @@
           <p:cNvPr id="2" name="Title 1">
             <a:extLst>
               <a:ext uri="{FF2B5EF4-FFF2-40B4-BE49-F238E27FC236}">
-                <a16:creationId xmlns:a16="http://schemas.microsoft.com/office/drawing/2014/main" xmlns="" id="{AEADAB91-8980-4F53-9688-21BED7326DE7}"/>
+                <a16:creationId xmlns:a16="http://schemas.microsoft.com/office/drawing/2014/main" id="{AEADAB91-8980-4F53-9688-21BED7326DE7}"/>
               </a:ext>
             </a:extLst>
           </p:cNvPr>
@@ -5578,10 +6292,12 @@
           <a:lstStyle/>
           <a:p>
             <a:r>
-              <a:rPr lang="en-US" dirty="0" smtClean="0"/>
+              <a:rPr lang="en-US" dirty="0">
+                <a:latin typeface="Times New Roman" panose="02020603050405020304" pitchFamily="18" charset="0"/>
+                <a:cs typeface="Times New Roman" panose="02020603050405020304" pitchFamily="18" charset="0"/>
+              </a:rPr>
               <a:t>What is Trade?</a:t>
             </a:r>
-            <a:endParaRPr lang="en-US" dirty="0"/>
           </a:p>
         </p:txBody>
       </p:sp>
@@ -5590,7 +6306,7 @@
           <p:cNvPr id="3" name="Content Placeholder 2">
             <a:extLst>
               <a:ext uri="{FF2B5EF4-FFF2-40B4-BE49-F238E27FC236}">
-                <a16:creationId xmlns:a16="http://schemas.microsoft.com/office/drawing/2014/main" xmlns="" id="{A879210D-023D-4D55-84FD-4CB00233888D}"/>
+                <a16:creationId xmlns:a16="http://schemas.microsoft.com/office/drawing/2014/main" id="{A879210D-023D-4D55-84FD-4CB00233888D}"/>
               </a:ext>
             </a:extLst>
           </p:cNvPr>
@@ -5607,41 +6323,59 @@
           <a:lstStyle/>
           <a:p>
             <a:r>
-              <a:rPr lang="en-US" dirty="0"/>
+              <a:rPr lang="en-US" dirty="0">
+                <a:latin typeface="Times New Roman" panose="02020603050405020304" pitchFamily="18" charset="0"/>
+                <a:cs typeface="Times New Roman" panose="02020603050405020304" pitchFamily="18" charset="0"/>
+              </a:rPr>
               <a:t>Trade is an economic concept which involves Buying and Selling of the commodities, or exchanging goods and services between needy people. </a:t>
             </a:r>
-            <a:endParaRPr lang="en-US" dirty="0" smtClean="0"/>
-          </a:p>
-          <a:p>
-            <a:r>
-              <a:rPr lang="en-US" dirty="0" smtClean="0"/>
-              <a:t>Trade </a:t>
-            </a:r>
-            <a:r>
-              <a:rPr lang="en-US" dirty="0"/>
-              <a:t>is important in a way that it increases competition and decreases overall world wise cost of a product. </a:t>
-            </a:r>
-            <a:endParaRPr lang="en-US" dirty="0" smtClean="0"/>
-          </a:p>
-          <a:p>
-            <a:r>
-              <a:rPr lang="en-US" dirty="0" smtClean="0"/>
-              <a:t>Trade covers for the scarcity of some commodity which may be unavailable in the country in need, like India doesn’t produce petroleum products so we import it from Arab countries.</a:t>
-            </a:r>
-          </a:p>
-          <a:p>
-            <a:r>
-              <a:rPr lang="en-US" dirty="0" smtClean="0"/>
-              <a:t>In exchange, a country can offer to sell commodities which are rich in that country, like India exports metals, pearls, clothes and mineral oils which are scarce there.</a:t>
-            </a:r>
-            <a:endParaRPr lang="en-US" dirty="0"/>
-          </a:p>
-          <a:p>
-            <a:r>
-              <a:rPr lang="en-US" dirty="0" smtClean="0"/>
-              <a:t>So in this way countries help each other and also make some fortune out of resources available.</a:t>
-            </a:r>
-            <a:endParaRPr lang="en-US" dirty="0"/>
+          </a:p>
+          <a:p>
+            <a:r>
+              <a:rPr lang="en-US" dirty="0">
+                <a:latin typeface="Times New Roman" panose="02020603050405020304" pitchFamily="18" charset="0"/>
+                <a:cs typeface="Times New Roman" panose="02020603050405020304" pitchFamily="18" charset="0"/>
+              </a:rPr>
+              <a:t>Trade is important in a way that it increases competition and decreases overall world wise cost of a product. </a:t>
+            </a:r>
+          </a:p>
+          <a:p>
+            <a:r>
+              <a:rPr lang="en-US" dirty="0">
+                <a:latin typeface="Times New Roman" panose="02020603050405020304" pitchFamily="18" charset="0"/>
+                <a:cs typeface="Times New Roman" panose="02020603050405020304" pitchFamily="18" charset="0"/>
+              </a:rPr>
+              <a:t>India doesn’t produce petroleum products so we import it from Arab countries and sell commodities like metals, pearls, clothes and mineral oils, which are rich in the country.</a:t>
+            </a:r>
+          </a:p>
+        </p:txBody>
+      </p:sp>
+      <p:sp>
+        <p:nvSpPr>
+          <p:cNvPr id="4" name="Slide Number Placeholder 3">
+            <a:extLst>
+              <a:ext uri="{FF2B5EF4-FFF2-40B4-BE49-F238E27FC236}">
+                <a16:creationId xmlns:a16="http://schemas.microsoft.com/office/drawing/2014/main" id="{66E1CA14-90D6-43A5-9C6F-E30227221CD7}"/>
+              </a:ext>
+            </a:extLst>
+          </p:cNvPr>
+          <p:cNvSpPr>
+            <a:spLocks noGrp="1"/>
+          </p:cNvSpPr>
+          <p:nvPr>
+            <p:ph type="sldNum" sz="quarter" idx="12"/>
+          </p:nvPr>
+        </p:nvSpPr>
+        <p:spPr/>
+        <p:txBody>
+          <a:bodyPr/>
+          <a:lstStyle/>
+          <a:p>
+            <a:fld id="{875942D6-B7AA-482E-A111-0A2C783F5CFF}" type="slidenum">
+              <a:rPr lang="en-US" smtClean="0"/>
+              <a:t>2</a:t>
+            </a:fld>
+            <a:endParaRPr lang="en-US"/>
           </a:p>
         </p:txBody>
       </p:sp>
@@ -5680,7 +6414,7 @@
           <p:cNvPr id="2" name="Title 1">
             <a:extLst>
               <a:ext uri="{FF2B5EF4-FFF2-40B4-BE49-F238E27FC236}">
-                <a16:creationId xmlns:a16="http://schemas.microsoft.com/office/drawing/2014/main" xmlns="" id="{7B3B6C76-254B-4957-AFE9-EA111965FE94}"/>
+                <a16:creationId xmlns:a16="http://schemas.microsoft.com/office/drawing/2014/main" id="{7B3B6C76-254B-4957-AFE9-EA111965FE94}"/>
               </a:ext>
             </a:extLst>
           </p:cNvPr>
@@ -5697,10 +6431,12 @@
           <a:lstStyle/>
           <a:p>
             <a:r>
-              <a:rPr lang="en-US" dirty="0" smtClean="0"/>
+              <a:rPr lang="en-US" dirty="0">
+                <a:latin typeface="Times New Roman" panose="02020603050405020304" pitchFamily="18" charset="0"/>
+                <a:cs typeface="Times New Roman" panose="02020603050405020304" pitchFamily="18" charset="0"/>
+              </a:rPr>
               <a:t>Significance of Analysis and Forecasting</a:t>
             </a:r>
-            <a:endParaRPr lang="en-US" dirty="0"/>
           </a:p>
         </p:txBody>
       </p:sp>
@@ -5709,7 +6445,7 @@
           <p:cNvPr id="3" name="Content Placeholder 2">
             <a:extLst>
               <a:ext uri="{FF2B5EF4-FFF2-40B4-BE49-F238E27FC236}">
-                <a16:creationId xmlns:a16="http://schemas.microsoft.com/office/drawing/2014/main" xmlns="" id="{E344AEE5-F668-445D-8291-E46207E99A59}"/>
+                <a16:creationId xmlns:a16="http://schemas.microsoft.com/office/drawing/2014/main" id="{E344AEE5-F668-445D-8291-E46207E99A59}"/>
               </a:ext>
             </a:extLst>
           </p:cNvPr>
@@ -5727,45 +6463,71 @@
           <a:p>
             <a:pPr indent="-342900"/>
             <a:r>
-              <a:rPr lang="en-US" dirty="0" smtClean="0"/>
-              <a:t>Country Importing more becomes dependent on other countries thus letting others control their economy.</a:t>
+              <a:rPr lang="en-US" dirty="0">
+                <a:latin typeface="Times New Roman" panose="02020603050405020304" pitchFamily="18" charset="0"/>
+                <a:cs typeface="Times New Roman" panose="02020603050405020304" pitchFamily="18" charset="0"/>
+              </a:rPr>
+              <a:t>Country Importing more becomes dependent and Country Exporting more becomes economically Stronger.</a:t>
             </a:r>
           </a:p>
           <a:p>
             <a:pPr indent="-342900"/>
             <a:r>
-              <a:rPr lang="en-US" dirty="0" smtClean="0"/>
-              <a:t>Country Exporting more becomes stronger economy with the help of profits earned.</a:t>
+              <a:rPr lang="en-US" dirty="0">
+                <a:latin typeface="Times New Roman" panose="02020603050405020304" pitchFamily="18" charset="0"/>
+                <a:cs typeface="Times New Roman" panose="02020603050405020304" pitchFamily="18" charset="0"/>
+              </a:rPr>
+              <a:t>Trade Analysis provides a raw understanding of how our country’s economy depends on Imported products. So we can distribute our total import into many countries so that no country can control our economy.</a:t>
             </a:r>
           </a:p>
           <a:p>
             <a:pPr indent="-342900"/>
             <a:r>
-              <a:rPr lang="en-US" dirty="0" smtClean="0"/>
-              <a:t>Trade Analysis provides a raw understanding of how our country’s economy depends on Imported products. So we can distribute our total import into many countries so that no country can control our economy.</a:t>
+              <a:rPr lang="en-US" dirty="0">
+                <a:latin typeface="Times New Roman" panose="02020603050405020304" pitchFamily="18" charset="0"/>
+                <a:cs typeface="Times New Roman" panose="02020603050405020304" pitchFamily="18" charset="0"/>
+              </a:rPr>
+              <a:t>Inflation happens when Import increases and our productivity decreases for the particular product.</a:t>
             </a:r>
           </a:p>
           <a:p>
             <a:pPr indent="-342900"/>
             <a:r>
-              <a:rPr lang="en-US" dirty="0" smtClean="0"/>
-              <a:t>Inflation happens when Import increases and our productivity decreases for the particular product.</a:t>
-            </a:r>
-          </a:p>
-          <a:p>
-            <a:pPr indent="-342900"/>
-            <a:r>
-              <a:rPr lang="en-US" dirty="0" smtClean="0"/>
-              <a:t>Knowing next month’s import value’s increasing trend, we can encourage that commodity’s production to compensate the costs.</a:t>
-            </a:r>
-          </a:p>
-          <a:p>
-            <a:pPr indent="-342900"/>
-            <a:r>
-              <a:rPr lang="en-US" dirty="0" smtClean="0"/>
-              <a:t>Knowing next month’s export value’s increasing trend, we can increase our profits, sensing the more demand from the importing country.</a:t>
-            </a:r>
-            <a:endParaRPr lang="en-US" dirty="0"/>
+              <a:rPr lang="en-US" dirty="0">
+                <a:latin typeface="Times New Roman" panose="02020603050405020304" pitchFamily="18" charset="0"/>
+                <a:cs typeface="Times New Roman" panose="02020603050405020304" pitchFamily="18" charset="0"/>
+              </a:rPr>
+              <a:t>Knowing Future’s import/export value, we can take pre measures for the smooth trading.</a:t>
+            </a:r>
+          </a:p>
+        </p:txBody>
+      </p:sp>
+      <p:sp>
+        <p:nvSpPr>
+          <p:cNvPr id="4" name="Slide Number Placeholder 3">
+            <a:extLst>
+              <a:ext uri="{FF2B5EF4-FFF2-40B4-BE49-F238E27FC236}">
+                <a16:creationId xmlns:a16="http://schemas.microsoft.com/office/drawing/2014/main" id="{7BA8CF41-44B1-46C6-BCE6-5CA6D3465D06}"/>
+              </a:ext>
+            </a:extLst>
+          </p:cNvPr>
+          <p:cNvSpPr>
+            <a:spLocks noGrp="1"/>
+          </p:cNvSpPr>
+          <p:nvPr>
+            <p:ph type="sldNum" sz="quarter" idx="12"/>
+          </p:nvPr>
+        </p:nvSpPr>
+        <p:spPr/>
+        <p:txBody>
+          <a:bodyPr/>
+          <a:lstStyle/>
+          <a:p>
+            <a:fld id="{875942D6-B7AA-482E-A111-0A2C783F5CFF}" type="slidenum">
+              <a:rPr lang="en-US" smtClean="0"/>
+              <a:t>3</a:t>
+            </a:fld>
+            <a:endParaRPr lang="en-US"/>
           </a:p>
         </p:txBody>
       </p:sp>
@@ -5804,7 +6566,7 @@
           <p:cNvPr id="2" name="Title 1">
             <a:extLst>
               <a:ext uri="{FF2B5EF4-FFF2-40B4-BE49-F238E27FC236}">
-                <a16:creationId xmlns:a16="http://schemas.microsoft.com/office/drawing/2014/main" xmlns="" id="{DF397BB6-61D8-41C1-818D-83C8A4F7E683}"/>
+                <a16:creationId xmlns:a16="http://schemas.microsoft.com/office/drawing/2014/main" id="{DF397BB6-61D8-41C1-818D-83C8A4F7E683}"/>
               </a:ext>
             </a:extLst>
           </p:cNvPr>
@@ -5821,7 +6583,10 @@
           <a:lstStyle/>
           <a:p>
             <a:r>
-              <a:rPr lang="en-US" dirty="0"/>
+              <a:rPr lang="en-US" dirty="0">
+                <a:latin typeface="Times New Roman" panose="02020603050405020304" pitchFamily="18" charset="0"/>
+                <a:cs typeface="Times New Roman" panose="02020603050405020304" pitchFamily="18" charset="0"/>
+              </a:rPr>
               <a:t>About Data</a:t>
             </a:r>
           </a:p>
@@ -5832,7 +6597,7 @@
           <p:cNvPr id="3" name="Content Placeholder 2">
             <a:extLst>
               <a:ext uri="{FF2B5EF4-FFF2-40B4-BE49-F238E27FC236}">
-                <a16:creationId xmlns:a16="http://schemas.microsoft.com/office/drawing/2014/main" xmlns="" id="{8E5BF401-6CA6-4DF9-BEDA-266E07986AA8}"/>
+                <a16:creationId xmlns:a16="http://schemas.microsoft.com/office/drawing/2014/main" id="{8E5BF401-6CA6-4DF9-BEDA-266E07986AA8}"/>
               </a:ext>
             </a:extLst>
           </p:cNvPr>
@@ -5849,86 +6614,88 @@
           <a:lstStyle/>
           <a:p>
             <a:r>
-              <a:rPr lang="en-US" dirty="0"/>
-              <a:t>We </a:t>
-            </a:r>
-            <a:r>
-              <a:rPr lang="en-US" dirty="0" smtClean="0"/>
-              <a:t>scraped</a:t>
-            </a:r>
-            <a:r>
-              <a:rPr lang="en-US" dirty="0" smtClean="0"/>
-              <a:t> </a:t>
-            </a:r>
-            <a:r>
-              <a:rPr lang="en-US" dirty="0"/>
-              <a:t>the trade dataset from Department of Commerce, Govt. of India website. </a:t>
-            </a:r>
-          </a:p>
-          <a:p>
-            <a:r>
-              <a:rPr lang="en-US" dirty="0" smtClean="0"/>
-              <a:t>Monthly Trade </a:t>
-            </a:r>
-            <a:r>
-              <a:rPr lang="en-US" dirty="0"/>
-              <a:t>data is available from January, 2006 to January, 2020. </a:t>
-            </a:r>
-          </a:p>
-          <a:p>
-            <a:r>
-              <a:rPr lang="en-US" dirty="0"/>
-              <a:t>We have total trade amount (Import/Export) for each month which is expressed in million US dollars. </a:t>
-            </a:r>
-          </a:p>
-          <a:p>
-            <a:r>
-              <a:rPr lang="en-US" dirty="0" smtClean="0"/>
-              <a:t>HS Code - </a:t>
-            </a:r>
-            <a:r>
-              <a:rPr lang="en-US" dirty="0"/>
-              <a:t>Harmonized System (HS) of tariff nomenclature is an internationally standardized system of names and numbers to classify traded </a:t>
-            </a:r>
-            <a:r>
-              <a:rPr lang="en-US" dirty="0" smtClean="0"/>
-              <a:t>products, </a:t>
-            </a:r>
-            <a:r>
-              <a:rPr lang="en-US" sz="2200" dirty="0" smtClean="0"/>
-              <a:t>e.g.</a:t>
-            </a:r>
-            <a:r>
-              <a:rPr lang="en-US" sz="2200" dirty="0" smtClean="0"/>
-              <a:t> 1 </a:t>
-            </a:r>
-            <a:r>
-              <a:rPr lang="en-US" sz="2200" dirty="0"/>
-              <a:t>for Live </a:t>
-            </a:r>
-            <a:r>
-              <a:rPr lang="en-US" sz="2200" dirty="0" smtClean="0"/>
-              <a:t>Animal, 95 </a:t>
-            </a:r>
-            <a:r>
-              <a:rPr lang="en-US" sz="2200" dirty="0"/>
-              <a:t>for Toys, Games and Sports Requisites </a:t>
-            </a:r>
-            <a:r>
-              <a:rPr lang="en-US" sz="2200" dirty="0" smtClean="0"/>
-              <a:t>…</a:t>
-            </a:r>
-          </a:p>
-          <a:p>
-            <a:r>
-              <a:rPr lang="en-US" dirty="0" smtClean="0"/>
-              <a:t>Data can be viewed in terms of Country wise or HS code wise.</a:t>
-            </a:r>
-            <a:endParaRPr lang="en-US" sz="2200" dirty="0"/>
-          </a:p>
-          <a:p>
-            <a:pPr lvl="1"/>
-            <a:endParaRPr lang="en-US" dirty="0"/>
+              <a:rPr lang="en-US" dirty="0">
+                <a:latin typeface="Times New Roman" panose="02020603050405020304" pitchFamily="18" charset="0"/>
+                <a:cs typeface="Times New Roman" panose="02020603050405020304" pitchFamily="18" charset="0"/>
+              </a:rPr>
+              <a:t>We scraped the trade dataset from Department of Commerce, Govt. of India website. </a:t>
+            </a:r>
+          </a:p>
+          <a:p>
+            <a:r>
+              <a:rPr lang="en-US" dirty="0">
+                <a:latin typeface="Times New Roman" panose="02020603050405020304" pitchFamily="18" charset="0"/>
+                <a:cs typeface="Times New Roman" panose="02020603050405020304" pitchFamily="18" charset="0"/>
+              </a:rPr>
+              <a:t>Monthly Trade data is available from January, 2006 to January, 2020 - Country wise or HS code wise. </a:t>
+            </a:r>
+          </a:p>
+          <a:p>
+            <a:r>
+              <a:rPr lang="en-US" dirty="0">
+                <a:latin typeface="Times New Roman" panose="02020603050405020304" pitchFamily="18" charset="0"/>
+                <a:cs typeface="Times New Roman" panose="02020603050405020304" pitchFamily="18" charset="0"/>
+              </a:rPr>
+              <a:t>Trade amount (Import/Export) for each month which is expressed in million US dollars. </a:t>
+            </a:r>
+          </a:p>
+          <a:p>
+            <a:r>
+              <a:rPr lang="en-US" dirty="0">
+                <a:latin typeface="Times New Roman" panose="02020603050405020304" pitchFamily="18" charset="0"/>
+                <a:cs typeface="Times New Roman" panose="02020603050405020304" pitchFamily="18" charset="0"/>
+              </a:rPr>
+              <a:t>HS Code - Harmonized System (HS) of tariff nomenclature is an internationally standardized system of names and numbers to classify traded products, </a:t>
+            </a:r>
+            <a:r>
+              <a:rPr lang="en-US" sz="2200" dirty="0">
+                <a:latin typeface="Times New Roman" panose="02020603050405020304" pitchFamily="18" charset="0"/>
+                <a:cs typeface="Times New Roman" panose="02020603050405020304" pitchFamily="18" charset="0"/>
+              </a:rPr>
+              <a:t>e.g. 1 for Live Animal, 95 for Toys, Games and Sports Requisites …</a:t>
+            </a:r>
+          </a:p>
+          <a:p>
+            <a:r>
+              <a:rPr lang="en-US" dirty="0">
+                <a:latin typeface="Times New Roman" panose="02020603050405020304" pitchFamily="18" charset="0"/>
+                <a:cs typeface="Times New Roman" panose="02020603050405020304" pitchFamily="18" charset="0"/>
+              </a:rPr>
+              <a:t>Commodity – It is the description of the Harmonized System items.</a:t>
+            </a:r>
+            <a:endParaRPr lang="en-US" sz="2200" dirty="0">
+              <a:latin typeface="Times New Roman" panose="02020603050405020304" pitchFamily="18" charset="0"/>
+              <a:cs typeface="Times New Roman" panose="02020603050405020304" pitchFamily="18" charset="0"/>
+            </a:endParaRPr>
+          </a:p>
+        </p:txBody>
+      </p:sp>
+      <p:sp>
+        <p:nvSpPr>
+          <p:cNvPr id="4" name="Slide Number Placeholder 3">
+            <a:extLst>
+              <a:ext uri="{FF2B5EF4-FFF2-40B4-BE49-F238E27FC236}">
+                <a16:creationId xmlns:a16="http://schemas.microsoft.com/office/drawing/2014/main" id="{00CCD94F-6B9D-40B2-8BBA-DEFBF5BD2335}"/>
+              </a:ext>
+            </a:extLst>
+          </p:cNvPr>
+          <p:cNvSpPr>
+            <a:spLocks noGrp="1"/>
+          </p:cNvSpPr>
+          <p:nvPr>
+            <p:ph type="sldNum" sz="quarter" idx="12"/>
+          </p:nvPr>
+        </p:nvSpPr>
+        <p:spPr/>
+        <p:txBody>
+          <a:bodyPr/>
+          <a:lstStyle/>
+          <a:p>
+            <a:fld id="{875942D6-B7AA-482E-A111-0A2C783F5CFF}" type="slidenum">
+              <a:rPr lang="en-US" smtClean="0"/>
+              <a:t>4</a:t>
+            </a:fld>
+            <a:endParaRPr lang="en-US"/>
           </a:p>
         </p:txBody>
       </p:sp>
@@ -5967,7 +6734,7 @@
           <p:cNvPr id="2" name="Title 1">
             <a:extLst>
               <a:ext uri="{FF2B5EF4-FFF2-40B4-BE49-F238E27FC236}">
-                <a16:creationId xmlns:a16="http://schemas.microsoft.com/office/drawing/2014/main" xmlns="" id="{4C89A33E-AACB-49C0-819F-8920338CF076}"/>
+                <a16:creationId xmlns:a16="http://schemas.microsoft.com/office/drawing/2014/main" id="{4C89A33E-AACB-49C0-819F-8920338CF076}"/>
               </a:ext>
             </a:extLst>
           </p:cNvPr>
@@ -5984,7 +6751,10 @@
           <a:lstStyle/>
           <a:p>
             <a:r>
-              <a:rPr lang="en-US" dirty="0"/>
+              <a:rPr lang="en-US" dirty="0">
+                <a:latin typeface="Times New Roman" panose="02020603050405020304" pitchFamily="18" charset="0"/>
+                <a:cs typeface="Times New Roman" panose="02020603050405020304" pitchFamily="18" charset="0"/>
+              </a:rPr>
               <a:t>How the Trade Data Looks</a:t>
             </a:r>
           </a:p>
@@ -5995,7 +6765,7 @@
           <p:cNvPr id="4" name="Content Placeholder 3">
             <a:extLst>
               <a:ext uri="{FF2B5EF4-FFF2-40B4-BE49-F238E27FC236}">
-                <a16:creationId xmlns:a16="http://schemas.microsoft.com/office/drawing/2014/main" xmlns="" id="{DBAF1874-DCD5-42BA-B8F9-7F6F1308CD2A}"/>
+                <a16:creationId xmlns:a16="http://schemas.microsoft.com/office/drawing/2014/main" id="{DBAF1874-DCD5-42BA-B8F9-7F6F1308CD2A}"/>
               </a:ext>
             </a:extLst>
           </p:cNvPr>
@@ -6028,6 +6798,35 @@
           </a:prstGeom>
         </p:spPr>
       </p:pic>
+      <p:sp>
+        <p:nvSpPr>
+          <p:cNvPr id="3" name="Slide Number Placeholder 2">
+            <a:extLst>
+              <a:ext uri="{FF2B5EF4-FFF2-40B4-BE49-F238E27FC236}">
+                <a16:creationId xmlns:a16="http://schemas.microsoft.com/office/drawing/2014/main" id="{120FF20B-E954-4E5A-95AB-691E2CBBDDB2}"/>
+              </a:ext>
+            </a:extLst>
+          </p:cNvPr>
+          <p:cNvSpPr>
+            <a:spLocks noGrp="1"/>
+          </p:cNvSpPr>
+          <p:nvPr>
+            <p:ph type="sldNum" sz="quarter" idx="12"/>
+          </p:nvPr>
+        </p:nvSpPr>
+        <p:spPr/>
+        <p:txBody>
+          <a:bodyPr/>
+          <a:lstStyle/>
+          <a:p>
+            <a:fld id="{875942D6-B7AA-482E-A111-0A2C783F5CFF}" type="slidenum">
+              <a:rPr lang="en-US" smtClean="0"/>
+              <a:t>5</a:t>
+            </a:fld>
+            <a:endParaRPr lang="en-US"/>
+          </a:p>
+        </p:txBody>
+      </p:sp>
     </p:spTree>
     <p:extLst>
       <p:ext uri="{BB962C8B-B14F-4D97-AF65-F5344CB8AC3E}">
@@ -6063,7 +6862,7 @@
           <p:cNvPr id="2" name="Title 1">
             <a:extLst>
               <a:ext uri="{FF2B5EF4-FFF2-40B4-BE49-F238E27FC236}">
-                <a16:creationId xmlns:a16="http://schemas.microsoft.com/office/drawing/2014/main" xmlns="" id="{DF09CCE7-7DE4-4276-8546-CC34212408B6}"/>
+                <a16:creationId xmlns:a16="http://schemas.microsoft.com/office/drawing/2014/main" id="{DF09CCE7-7DE4-4276-8546-CC34212408B6}"/>
               </a:ext>
             </a:extLst>
           </p:cNvPr>
@@ -6080,10 +6879,12 @@
           <a:lstStyle/>
           <a:p>
             <a:r>
-              <a:rPr lang="en-US" dirty="0" smtClean="0"/>
+              <a:rPr lang="en-US" dirty="0">
+                <a:latin typeface="Times New Roman" panose="02020603050405020304" pitchFamily="18" charset="0"/>
+                <a:cs typeface="Times New Roman" panose="02020603050405020304" pitchFamily="18" charset="0"/>
+              </a:rPr>
               <a:t>Commodities which we traded the most</a:t>
             </a:r>
-            <a:endParaRPr lang="en-US" dirty="0"/>
           </a:p>
         </p:txBody>
       </p:sp>
@@ -6092,7 +6893,7 @@
           <p:cNvPr id="4" name="Content Placeholder 3">
             <a:extLst>
               <a:ext uri="{FF2B5EF4-FFF2-40B4-BE49-F238E27FC236}">
-                <a16:creationId xmlns:a16="http://schemas.microsoft.com/office/drawing/2014/main" xmlns="" id="{C7BEF372-F27F-4DDC-91E8-5D485CDD8622}"/>
+                <a16:creationId xmlns:a16="http://schemas.microsoft.com/office/drawing/2014/main" id="{C7BEF372-F27F-4DDC-91E8-5D485CDD8622}"/>
               </a:ext>
             </a:extLst>
           </p:cNvPr>
@@ -6130,7 +6931,7 @@
           <p:cNvPr id="5" name="TextBox 4">
             <a:extLst>
               <a:ext uri="{FF2B5EF4-FFF2-40B4-BE49-F238E27FC236}">
-                <a16:creationId xmlns:a16="http://schemas.microsoft.com/office/drawing/2014/main" xmlns="" id="{D99B2D6F-704A-4629-8F33-9A6A63627A46}"/>
+                <a16:creationId xmlns:a16="http://schemas.microsoft.com/office/drawing/2014/main" id="{D99B2D6F-704A-4629-8F33-9A6A63627A46}"/>
               </a:ext>
             </a:extLst>
           </p:cNvPr>
@@ -6139,8 +6940,8 @@
         </p:nvSpPr>
         <p:spPr>
           <a:xfrm>
-            <a:off x="8414239" y="2162907"/>
-            <a:ext cx="2963007" cy="2862322"/>
+            <a:off x="8414240" y="2162907"/>
+            <a:ext cx="2523392" cy="3416320"/>
           </a:xfrm>
           <a:prstGeom prst="rect">
             <a:avLst/>
@@ -6158,12 +6959,11 @@
               <a:buChar char="•"/>
             </a:pPr>
             <a:r>
-              <a:rPr lang="en-US" dirty="0"/>
-              <a:t>27 for Mineral Fuels and Mineral Oils and the product of there </a:t>
-            </a:r>
-            <a:r>
-              <a:rPr lang="en-US" dirty="0" smtClean="0"/>
-              <a:t>distillation.</a:t>
+              <a:rPr lang="en-US" dirty="0">
+                <a:latin typeface="Times New Roman" panose="02020603050405020304" pitchFamily="18" charset="0"/>
+                <a:cs typeface="Times New Roman" panose="02020603050405020304" pitchFamily="18" charset="0"/>
+              </a:rPr>
+              <a:t>27 for Mineral Fuels and Mineral Oils and the product of there distillation.</a:t>
             </a:r>
           </a:p>
           <a:p>
@@ -6172,16 +6972,11 @@
               <a:buChar char="•"/>
             </a:pPr>
             <a:r>
-              <a:rPr lang="en-US" dirty="0" smtClean="0"/>
-              <a:t>71 </a:t>
-            </a:r>
-            <a:r>
-              <a:rPr lang="en-US" dirty="0"/>
-              <a:t>for natural or cultured pearls, precious or semiprecious stones, Pre-Metals, </a:t>
-            </a:r>
-            <a:r>
-              <a:rPr lang="en-US" dirty="0" smtClean="0"/>
-              <a:t>Coins etc.</a:t>
+              <a:rPr lang="en-US" dirty="0">
+                <a:latin typeface="Times New Roman" panose="02020603050405020304" pitchFamily="18" charset="0"/>
+                <a:cs typeface="Times New Roman" panose="02020603050405020304" pitchFamily="18" charset="0"/>
+              </a:rPr>
+              <a:t>71 for natural or cultured pearls, precious or semiprecious stones, Pre-Metals, Coins etc.</a:t>
             </a:r>
           </a:p>
           <a:p>
@@ -6190,18 +6985,41 @@
               <a:buChar char="•"/>
             </a:pPr>
             <a:r>
-              <a:rPr lang="en-US" dirty="0" smtClean="0"/>
-              <a:t>85 </a:t>
-            </a:r>
-            <a:r>
-              <a:rPr lang="en-US" dirty="0"/>
-              <a:t>for Electrical Machinery and </a:t>
-            </a:r>
-            <a:r>
-              <a:rPr lang="en-US" dirty="0" smtClean="0"/>
-              <a:t>Equipment</a:t>
-            </a:r>
-            <a:endParaRPr lang="en-US" dirty="0"/>
+              <a:rPr lang="en-US" dirty="0">
+                <a:latin typeface="Times New Roman" panose="02020603050405020304" pitchFamily="18" charset="0"/>
+                <a:cs typeface="Times New Roman" panose="02020603050405020304" pitchFamily="18" charset="0"/>
+              </a:rPr>
+              <a:t>85 for Electrical Machinery and Equipment</a:t>
+            </a:r>
+          </a:p>
+        </p:txBody>
+      </p:sp>
+      <p:sp>
+        <p:nvSpPr>
+          <p:cNvPr id="3" name="Slide Number Placeholder 2">
+            <a:extLst>
+              <a:ext uri="{FF2B5EF4-FFF2-40B4-BE49-F238E27FC236}">
+                <a16:creationId xmlns:a16="http://schemas.microsoft.com/office/drawing/2014/main" id="{EFD55A3F-581D-486B-872C-90B0A238A33C}"/>
+              </a:ext>
+            </a:extLst>
+          </p:cNvPr>
+          <p:cNvSpPr>
+            <a:spLocks noGrp="1"/>
+          </p:cNvSpPr>
+          <p:nvPr>
+            <p:ph type="sldNum" sz="quarter" idx="12"/>
+          </p:nvPr>
+        </p:nvSpPr>
+        <p:spPr/>
+        <p:txBody>
+          <a:bodyPr/>
+          <a:lstStyle/>
+          <a:p>
+            <a:fld id="{875942D6-B7AA-482E-A111-0A2C783F5CFF}" type="slidenum">
+              <a:rPr lang="en-US" smtClean="0"/>
+              <a:t>6</a:t>
+            </a:fld>
+            <a:endParaRPr lang="en-US"/>
           </a:p>
         </p:txBody>
       </p:sp>
@@ -6240,7 +7058,7 @@
           <p:cNvPr id="2" name="Title 1">
             <a:extLst>
               <a:ext uri="{FF2B5EF4-FFF2-40B4-BE49-F238E27FC236}">
-                <a16:creationId xmlns:a16="http://schemas.microsoft.com/office/drawing/2014/main" xmlns="" id="{1A6B5522-BFDE-4C02-BE49-85BD361D3A50}"/>
+                <a16:creationId xmlns:a16="http://schemas.microsoft.com/office/drawing/2014/main" id="{1A6B5522-BFDE-4C02-BE49-85BD361D3A50}"/>
               </a:ext>
             </a:extLst>
           </p:cNvPr>
@@ -6257,10 +7075,12 @@
           <a:lstStyle/>
           <a:p>
             <a:r>
-              <a:rPr lang="en-US" dirty="0" smtClean="0"/>
+              <a:rPr lang="en-US" dirty="0">
+                <a:latin typeface="Times New Roman" panose="02020603050405020304" pitchFamily="18" charset="0"/>
+                <a:cs typeface="Times New Roman" panose="02020603050405020304" pitchFamily="18" charset="0"/>
+              </a:rPr>
               <a:t>Countries which we traded the most</a:t>
             </a:r>
-            <a:endParaRPr lang="en-US" dirty="0"/>
           </a:p>
         </p:txBody>
       </p:sp>
@@ -6269,7 +7089,7 @@
           <p:cNvPr id="4" name="Content Placeholder 3">
             <a:extLst>
               <a:ext uri="{FF2B5EF4-FFF2-40B4-BE49-F238E27FC236}">
-                <a16:creationId xmlns:a16="http://schemas.microsoft.com/office/drawing/2014/main" xmlns="" id="{BB5653EC-DCFD-4B94-B431-1BF773E6E561}"/>
+                <a16:creationId xmlns:a16="http://schemas.microsoft.com/office/drawing/2014/main" id="{BB5653EC-DCFD-4B94-B431-1BF773E6E561}"/>
               </a:ext>
             </a:extLst>
           </p:cNvPr>
@@ -6307,7 +7127,7 @@
           <p:cNvPr id="5" name="TextBox 4">
             <a:extLst>
               <a:ext uri="{FF2B5EF4-FFF2-40B4-BE49-F238E27FC236}">
-                <a16:creationId xmlns:a16="http://schemas.microsoft.com/office/drawing/2014/main" xmlns="" id="{4DCC699E-A326-430A-8F1B-29C397404BE0}"/>
+                <a16:creationId xmlns:a16="http://schemas.microsoft.com/office/drawing/2014/main" id="{4DCC699E-A326-430A-8F1B-29C397404BE0}"/>
               </a:ext>
             </a:extLst>
           </p:cNvPr>
@@ -6335,18 +7155,12 @@
               <a:buChar char="•"/>
             </a:pPr>
             <a:r>
-              <a:rPr lang="en-US" dirty="0"/>
-              <a:t>China tops the list with around $4379 </a:t>
-            </a:r>
-            <a:r>
-              <a:rPr lang="en-US" dirty="0" smtClean="0"/>
-              <a:t>million trade </a:t>
-            </a:r>
-            <a:r>
-              <a:rPr lang="en-US" dirty="0"/>
-              <a:t>Import followed by United Arab Emirates, Saudi Arab and USA. </a:t>
-            </a:r>
-            <a:endParaRPr lang="en-US" dirty="0" smtClean="0"/>
+              <a:rPr lang="en-US" dirty="0">
+                <a:latin typeface="Times New Roman" panose="02020603050405020304" pitchFamily="18" charset="0"/>
+                <a:cs typeface="Times New Roman" panose="02020603050405020304" pitchFamily="18" charset="0"/>
+              </a:rPr>
+              <a:t>China tops the list with around $4379 million trade Import followed by United Arab Emirates, Saudi Arab and USA. </a:t>
+            </a:r>
           </a:p>
           <a:p>
             <a:pPr marL="285750" indent="-285750">
@@ -6354,13 +7168,41 @@
               <a:buChar char="•"/>
             </a:pPr>
             <a:r>
-              <a:rPr lang="en-US" dirty="0" smtClean="0"/>
-              <a:t>While USA </a:t>
-            </a:r>
-            <a:r>
-              <a:rPr lang="en-US" dirty="0"/>
-              <a:t>is top most country to which India exports the most $3013 million followed by UAE, China, Hong Kong and Singapore.</a:t>
-            </a:r>
+              <a:rPr lang="en-US" dirty="0">
+                <a:latin typeface="Times New Roman" panose="02020603050405020304" pitchFamily="18" charset="0"/>
+                <a:cs typeface="Times New Roman" panose="02020603050405020304" pitchFamily="18" charset="0"/>
+              </a:rPr>
+              <a:t>While USA is top most country to which India exports the most $3013 million followed by UAE, China, Hong Kong and Singapore.</a:t>
+            </a:r>
+          </a:p>
+        </p:txBody>
+      </p:sp>
+      <p:sp>
+        <p:nvSpPr>
+          <p:cNvPr id="3" name="Slide Number Placeholder 2">
+            <a:extLst>
+              <a:ext uri="{FF2B5EF4-FFF2-40B4-BE49-F238E27FC236}">
+                <a16:creationId xmlns:a16="http://schemas.microsoft.com/office/drawing/2014/main" id="{C7C847A6-4A8E-4B65-A738-3703496D8216}"/>
+              </a:ext>
+            </a:extLst>
+          </p:cNvPr>
+          <p:cNvSpPr>
+            <a:spLocks noGrp="1"/>
+          </p:cNvSpPr>
+          <p:nvPr>
+            <p:ph type="sldNum" sz="quarter" idx="12"/>
+          </p:nvPr>
+        </p:nvSpPr>
+        <p:spPr/>
+        <p:txBody>
+          <a:bodyPr/>
+          <a:lstStyle/>
+          <a:p>
+            <a:fld id="{875942D6-B7AA-482E-A111-0A2C783F5CFF}" type="slidenum">
+              <a:rPr lang="en-US" smtClean="0"/>
+              <a:t>7</a:t>
+            </a:fld>
+            <a:endParaRPr lang="en-US"/>
           </a:p>
         </p:txBody>
       </p:sp>
@@ -6399,7 +7241,7 @@
           <p:cNvPr id="2" name="Title 1">
             <a:extLst>
               <a:ext uri="{FF2B5EF4-FFF2-40B4-BE49-F238E27FC236}">
-                <a16:creationId xmlns:a16="http://schemas.microsoft.com/office/drawing/2014/main" xmlns="" id="{FA0B0F23-AA5A-482B-9292-21909CD3D244}"/>
+                <a16:creationId xmlns:a16="http://schemas.microsoft.com/office/drawing/2014/main" id="{FA0B0F23-AA5A-482B-9292-21909CD3D244}"/>
               </a:ext>
             </a:extLst>
           </p:cNvPr>
@@ -6416,7 +7258,10 @@
           <a:lstStyle/>
           <a:p>
             <a:r>
-              <a:rPr lang="en-US" dirty="0"/>
+              <a:rPr lang="en-US" dirty="0">
+                <a:latin typeface="Times New Roman" panose="02020603050405020304" pitchFamily="18" charset="0"/>
+                <a:cs typeface="Times New Roman" panose="02020603050405020304" pitchFamily="18" charset="0"/>
+              </a:rPr>
               <a:t>Models we Used for Forecasting</a:t>
             </a:r>
           </a:p>
@@ -6427,7 +7272,7 @@
           <p:cNvPr id="3" name="Content Placeholder 2">
             <a:extLst>
               <a:ext uri="{FF2B5EF4-FFF2-40B4-BE49-F238E27FC236}">
-                <a16:creationId xmlns:a16="http://schemas.microsoft.com/office/drawing/2014/main" xmlns="" id="{5891B381-2B71-49EA-A683-A3160B6C07B2}"/>
+                <a16:creationId xmlns:a16="http://schemas.microsoft.com/office/drawing/2014/main" id="{5891B381-2B71-49EA-A683-A3160B6C07B2}"/>
               </a:ext>
             </a:extLst>
           </p:cNvPr>
@@ -6444,58 +7289,116 @@
           <a:lstStyle/>
           <a:p>
             <a:r>
-              <a:rPr lang="en-US" dirty="0"/>
+              <a:rPr lang="en-US" dirty="0">
+                <a:latin typeface="Times New Roman" panose="02020603050405020304" pitchFamily="18" charset="0"/>
+                <a:cs typeface="Times New Roman" panose="02020603050405020304" pitchFamily="18" charset="0"/>
+              </a:rPr>
               <a:t>Exponential Smoothing</a:t>
             </a:r>
           </a:p>
           <a:p>
             <a:r>
-              <a:rPr lang="en-US" dirty="0"/>
+              <a:rPr lang="en-US" dirty="0">
+                <a:latin typeface="Times New Roman" panose="02020603050405020304" pitchFamily="18" charset="0"/>
+                <a:cs typeface="Times New Roman" panose="02020603050405020304" pitchFamily="18" charset="0"/>
+              </a:rPr>
               <a:t>Auto Regressive Model</a:t>
             </a:r>
           </a:p>
           <a:p>
             <a:r>
-              <a:rPr lang="en-US" dirty="0"/>
+              <a:rPr lang="en-US" dirty="0">
+                <a:latin typeface="Times New Roman" panose="02020603050405020304" pitchFamily="18" charset="0"/>
+                <a:cs typeface="Times New Roman" panose="02020603050405020304" pitchFamily="18" charset="0"/>
+              </a:rPr>
               <a:t>Moving Average Model</a:t>
             </a:r>
           </a:p>
           <a:p>
             <a:r>
-              <a:rPr lang="en-US" dirty="0"/>
+              <a:rPr lang="en-US" dirty="0">
+                <a:latin typeface="Times New Roman" panose="02020603050405020304" pitchFamily="18" charset="0"/>
+                <a:cs typeface="Times New Roman" panose="02020603050405020304" pitchFamily="18" charset="0"/>
+              </a:rPr>
               <a:t>Holt-Winters Model</a:t>
             </a:r>
           </a:p>
           <a:p>
             <a:r>
-              <a:rPr lang="en-US" dirty="0"/>
+              <a:rPr lang="en-US" dirty="0">
+                <a:latin typeface="Times New Roman" panose="02020603050405020304" pitchFamily="18" charset="0"/>
+                <a:cs typeface="Times New Roman" panose="02020603050405020304" pitchFamily="18" charset="0"/>
+              </a:rPr>
               <a:t>ARIMA Additive</a:t>
             </a:r>
           </a:p>
           <a:p>
             <a:r>
-              <a:rPr lang="en-US" dirty="0"/>
+              <a:rPr lang="en-US" dirty="0">
+                <a:latin typeface="Times New Roman" panose="02020603050405020304" pitchFamily="18" charset="0"/>
+                <a:cs typeface="Times New Roman" panose="02020603050405020304" pitchFamily="18" charset="0"/>
+              </a:rPr>
               <a:t>ARIMA Multiplicative</a:t>
             </a:r>
           </a:p>
           <a:p>
             <a:r>
-              <a:rPr lang="en-US" dirty="0"/>
+              <a:rPr lang="en-US" dirty="0">
+                <a:latin typeface="Times New Roman" panose="02020603050405020304" pitchFamily="18" charset="0"/>
+                <a:cs typeface="Times New Roman" panose="02020603050405020304" pitchFamily="18" charset="0"/>
+              </a:rPr>
               <a:t>ARIMA Seasonal</a:t>
             </a:r>
           </a:p>
           <a:p>
             <a:r>
-              <a:rPr lang="en-US" dirty="0"/>
+              <a:rPr lang="en-US" dirty="0">
+                <a:latin typeface="Times New Roman" panose="02020603050405020304" pitchFamily="18" charset="0"/>
+                <a:cs typeface="Times New Roman" panose="02020603050405020304" pitchFamily="18" charset="0"/>
+              </a:rPr>
               <a:t>RNN </a:t>
             </a:r>
             <a:r>
               <a:rPr lang="en-US" dirty="0">
+                <a:latin typeface="Times New Roman" panose="02020603050405020304" pitchFamily="18" charset="0"/>
+                <a:cs typeface="Times New Roman" panose="02020603050405020304" pitchFamily="18" charset="0"/>
                 <a:sym typeface="Wingdings" panose="05000000000000000000" pitchFamily="2" charset="2"/>
               </a:rPr>
               <a:t> LSTM (Long Short Term Memory)</a:t>
             </a:r>
-            <a:endParaRPr lang="en-US" dirty="0"/>
+            <a:endParaRPr lang="en-US" dirty="0">
+              <a:latin typeface="Times New Roman" panose="02020603050405020304" pitchFamily="18" charset="0"/>
+              <a:cs typeface="Times New Roman" panose="02020603050405020304" pitchFamily="18" charset="0"/>
+            </a:endParaRPr>
+          </a:p>
+        </p:txBody>
+      </p:sp>
+      <p:sp>
+        <p:nvSpPr>
+          <p:cNvPr id="4" name="Slide Number Placeholder 3">
+            <a:extLst>
+              <a:ext uri="{FF2B5EF4-FFF2-40B4-BE49-F238E27FC236}">
+                <a16:creationId xmlns:a16="http://schemas.microsoft.com/office/drawing/2014/main" id="{0B22DF0D-8D91-4829-A4D1-ADB83A2BA515}"/>
+              </a:ext>
+            </a:extLst>
+          </p:cNvPr>
+          <p:cNvSpPr>
+            <a:spLocks noGrp="1"/>
+          </p:cNvSpPr>
+          <p:nvPr>
+            <p:ph type="sldNum" sz="quarter" idx="12"/>
+          </p:nvPr>
+        </p:nvSpPr>
+        <p:spPr/>
+        <p:txBody>
+          <a:bodyPr/>
+          <a:lstStyle/>
+          <a:p>
+            <a:fld id="{875942D6-B7AA-482E-A111-0A2C783F5CFF}" type="slidenum">
+              <a:rPr lang="en-US" smtClean="0"/>
+              <a:t>8</a:t>
+            </a:fld>
+            <a:endParaRPr lang="en-US"/>
           </a:p>
         </p:txBody>
       </p:sp>
@@ -6534,7 +7437,7 @@
           <p:cNvPr id="2" name="Title 1">
             <a:extLst>
               <a:ext uri="{FF2B5EF4-FFF2-40B4-BE49-F238E27FC236}">
-                <a16:creationId xmlns:a16="http://schemas.microsoft.com/office/drawing/2014/main" xmlns="" id="{79732034-DF0D-4F26-84D8-CD1B8D30179B}"/>
+                <a16:creationId xmlns:a16="http://schemas.microsoft.com/office/drawing/2014/main" id="{79732034-DF0D-4F26-84D8-CD1B8D30179B}"/>
               </a:ext>
             </a:extLst>
           </p:cNvPr>
@@ -6551,7 +7454,10 @@
           <a:lstStyle/>
           <a:p>
             <a:r>
-              <a:rPr lang="en-US" dirty="0"/>
+              <a:rPr lang="en-US" dirty="0">
+                <a:latin typeface="Times New Roman" panose="02020603050405020304" pitchFamily="18" charset="0"/>
+                <a:cs typeface="Times New Roman" panose="02020603050405020304" pitchFamily="18" charset="0"/>
+              </a:rPr>
               <a:t>Auto Regressive and Moving Average</a:t>
             </a:r>
           </a:p>
@@ -6562,7 +7468,7 @@
           <p:cNvPr id="3" name="Content Placeholder 2">
             <a:extLst>
               <a:ext uri="{FF2B5EF4-FFF2-40B4-BE49-F238E27FC236}">
-                <a16:creationId xmlns:a16="http://schemas.microsoft.com/office/drawing/2014/main" xmlns="" id="{3C057F40-40A7-4CAE-B87C-F65A17102C19}"/>
+                <a16:creationId xmlns:a16="http://schemas.microsoft.com/office/drawing/2014/main" id="{3C057F40-40A7-4CAE-B87C-F65A17102C19}"/>
               </a:ext>
             </a:extLst>
           </p:cNvPr>
@@ -6579,85 +7485,145 @@
           <a:lstStyle/>
           <a:p>
             <a:r>
-              <a:rPr lang="en-US" dirty="0"/>
+              <a:rPr lang="en-US" dirty="0">
+                <a:latin typeface="Times New Roman" panose="02020603050405020304" pitchFamily="18" charset="0"/>
+                <a:cs typeface="Times New Roman" panose="02020603050405020304" pitchFamily="18" charset="0"/>
+              </a:rPr>
               <a:t>AR (</a:t>
             </a:r>
             <a:r>
-              <a:rPr lang="en-US" b="1" dirty="0"/>
+              <a:rPr lang="en-US" b="1" dirty="0">
+                <a:latin typeface="Times New Roman" panose="02020603050405020304" pitchFamily="18" charset="0"/>
+                <a:cs typeface="Times New Roman" panose="02020603050405020304" pitchFamily="18" charset="0"/>
+              </a:rPr>
               <a:t>Auto Regressive</a:t>
             </a:r>
             <a:r>
-              <a:rPr lang="en-US" dirty="0"/>
+              <a:rPr lang="en-US" dirty="0">
+                <a:latin typeface="Times New Roman" panose="02020603050405020304" pitchFamily="18" charset="0"/>
+                <a:cs typeface="Times New Roman" panose="02020603050405020304" pitchFamily="18" charset="0"/>
+              </a:rPr>
               <a:t>) is used when a value from the time series has dependency on previous values e.g. </a:t>
             </a:r>
             <a:r>
-              <a:rPr lang="en-US" dirty="0" err="1"/>
+              <a:rPr lang="en-US" dirty="0" err="1">
+                <a:latin typeface="Times New Roman" panose="02020603050405020304" pitchFamily="18" charset="0"/>
+                <a:cs typeface="Times New Roman" panose="02020603050405020304" pitchFamily="18" charset="0"/>
+              </a:rPr>
               <a:t>X</a:t>
             </a:r>
             <a:r>
-              <a:rPr lang="en-US" baseline="-25000" dirty="0" err="1"/>
+              <a:rPr lang="en-US" baseline="-25000" dirty="0" err="1">
+                <a:latin typeface="Times New Roman" panose="02020603050405020304" pitchFamily="18" charset="0"/>
+                <a:cs typeface="Times New Roman" panose="02020603050405020304" pitchFamily="18" charset="0"/>
+              </a:rPr>
               <a:t>t</a:t>
             </a:r>
             <a:r>
-              <a:rPr lang="en-US" dirty="0"/>
+              <a:rPr lang="en-US" dirty="0">
+                <a:latin typeface="Times New Roman" panose="02020603050405020304" pitchFamily="18" charset="0"/>
+                <a:cs typeface="Times New Roman" panose="02020603050405020304" pitchFamily="18" charset="0"/>
+              </a:rPr>
               <a:t> = f(X</a:t>
             </a:r>
             <a:r>
-              <a:rPr lang="en-US" baseline="-25000" dirty="0"/>
+              <a:rPr lang="en-US" baseline="-25000" dirty="0">
+                <a:latin typeface="Times New Roman" panose="02020603050405020304" pitchFamily="18" charset="0"/>
+                <a:cs typeface="Times New Roman" panose="02020603050405020304" pitchFamily="18" charset="0"/>
+              </a:rPr>
               <a:t>t-1</a:t>
             </a:r>
             <a:r>
-              <a:rPr lang="en-US" dirty="0"/>
+              <a:rPr lang="en-US" dirty="0">
+                <a:latin typeface="Times New Roman" panose="02020603050405020304" pitchFamily="18" charset="0"/>
+                <a:cs typeface="Times New Roman" panose="02020603050405020304" pitchFamily="18" charset="0"/>
+              </a:rPr>
               <a:t>). The order of an auto-regression is the number of immediately preceding values in the series that are used to forecast the current value e.g. order of 2 denotes that the value </a:t>
             </a:r>
             <a:r>
-              <a:rPr lang="en-US" dirty="0" err="1"/>
+              <a:rPr lang="en-US" dirty="0" err="1">
+                <a:latin typeface="Times New Roman" panose="02020603050405020304" pitchFamily="18" charset="0"/>
+                <a:cs typeface="Times New Roman" panose="02020603050405020304" pitchFamily="18" charset="0"/>
+              </a:rPr>
               <a:t>X</a:t>
             </a:r>
             <a:r>
-              <a:rPr lang="en-US" baseline="-25000" dirty="0" err="1"/>
+              <a:rPr lang="en-US" baseline="-25000" dirty="0" err="1">
+                <a:latin typeface="Times New Roman" panose="02020603050405020304" pitchFamily="18" charset="0"/>
+                <a:cs typeface="Times New Roman" panose="02020603050405020304" pitchFamily="18" charset="0"/>
+              </a:rPr>
               <a:t>t</a:t>
             </a:r>
             <a:r>
-              <a:rPr lang="en-US" dirty="0"/>
+              <a:rPr lang="en-US" dirty="0">
+                <a:latin typeface="Times New Roman" panose="02020603050405020304" pitchFamily="18" charset="0"/>
+                <a:cs typeface="Times New Roman" panose="02020603050405020304" pitchFamily="18" charset="0"/>
+              </a:rPr>
               <a:t> is dependent on X</a:t>
             </a:r>
             <a:r>
-              <a:rPr lang="en-US" baseline="-25000" dirty="0"/>
+              <a:rPr lang="en-US" baseline="-25000" dirty="0">
+                <a:latin typeface="Times New Roman" panose="02020603050405020304" pitchFamily="18" charset="0"/>
+                <a:cs typeface="Times New Roman" panose="02020603050405020304" pitchFamily="18" charset="0"/>
+              </a:rPr>
               <a:t>t-1</a:t>
             </a:r>
             <a:r>
-              <a:rPr lang="en-US" dirty="0"/>
+              <a:rPr lang="en-US" dirty="0">
+                <a:latin typeface="Times New Roman" panose="02020603050405020304" pitchFamily="18" charset="0"/>
+                <a:cs typeface="Times New Roman" panose="02020603050405020304" pitchFamily="18" charset="0"/>
+              </a:rPr>
               <a:t> and X</a:t>
             </a:r>
             <a:r>
-              <a:rPr lang="en-US" baseline="-25000" dirty="0"/>
+              <a:rPr lang="en-US" baseline="-25000" dirty="0">
+                <a:latin typeface="Times New Roman" panose="02020603050405020304" pitchFamily="18" charset="0"/>
+                <a:cs typeface="Times New Roman" panose="02020603050405020304" pitchFamily="18" charset="0"/>
+              </a:rPr>
               <a:t>t-2</a:t>
             </a:r>
             <a:r>
-              <a:rPr lang="en-US" dirty="0"/>
+              <a:rPr lang="en-US" dirty="0">
+                <a:latin typeface="Times New Roman" panose="02020603050405020304" pitchFamily="18" charset="0"/>
+                <a:cs typeface="Times New Roman" panose="02020603050405020304" pitchFamily="18" charset="0"/>
+              </a:rPr>
               <a:t>.</a:t>
             </a:r>
           </a:p>
           <a:p>
             <a:r>
-              <a:rPr lang="en-US" dirty="0"/>
+              <a:rPr lang="en-US" dirty="0">
+                <a:latin typeface="Times New Roman" panose="02020603050405020304" pitchFamily="18" charset="0"/>
+                <a:cs typeface="Times New Roman" panose="02020603050405020304" pitchFamily="18" charset="0"/>
+              </a:rPr>
               <a:t>MA (</a:t>
             </a:r>
             <a:r>
-              <a:rPr lang="en-US" b="1" dirty="0"/>
+              <a:rPr lang="en-US" b="1" dirty="0">
+                <a:latin typeface="Times New Roman" panose="02020603050405020304" pitchFamily="18" charset="0"/>
+                <a:cs typeface="Times New Roman" panose="02020603050405020304" pitchFamily="18" charset="0"/>
+              </a:rPr>
               <a:t>Moving Average)</a:t>
             </a:r>
             <a:r>
-              <a:rPr lang="en-US" dirty="0"/>
+              <a:rPr lang="en-US" dirty="0">
+                <a:latin typeface="Times New Roman" panose="02020603050405020304" pitchFamily="18" charset="0"/>
+                <a:cs typeface="Times New Roman" panose="02020603050405020304" pitchFamily="18" charset="0"/>
+              </a:rPr>
               <a:t> is a technique that calculates the overall trend in the dataset. As the name suggest that we go by taking the Average over a fixed rolling size window. </a:t>
             </a:r>
           </a:p>
           <a:p>
-            <a:endParaRPr lang="en-US" dirty="0"/>
-          </a:p>
-          <a:p>
-            <a:endParaRPr lang="en-US" dirty="0"/>
+            <a:endParaRPr lang="en-US" dirty="0">
+              <a:latin typeface="Times New Roman" panose="02020603050405020304" pitchFamily="18" charset="0"/>
+              <a:cs typeface="Times New Roman" panose="02020603050405020304" pitchFamily="18" charset="0"/>
+            </a:endParaRPr>
+          </a:p>
+          <a:p>
+            <a:endParaRPr lang="en-US" dirty="0">
+              <a:latin typeface="Times New Roman" panose="02020603050405020304" pitchFamily="18" charset="0"/>
+              <a:cs typeface="Times New Roman" panose="02020603050405020304" pitchFamily="18" charset="0"/>
+            </a:endParaRPr>
           </a:p>
         </p:txBody>
       </p:sp>
@@ -6666,7 +7632,7 @@
           <p:cNvPr id="4" name="Picture 3">
             <a:extLst>
               <a:ext uri="{FF2B5EF4-FFF2-40B4-BE49-F238E27FC236}">
-                <a16:creationId xmlns:a16="http://schemas.microsoft.com/office/drawing/2014/main" xmlns="" id="{AD170295-B5A2-4CA5-B861-2B95FC69247C}"/>
+                <a16:creationId xmlns:a16="http://schemas.microsoft.com/office/drawing/2014/main" id="{AD170295-B5A2-4CA5-B861-2B95FC69247C}"/>
               </a:ext>
             </a:extLst>
           </p:cNvPr>
@@ -6681,14 +7647,43 @@
         </p:blipFill>
         <p:spPr>
           <a:xfrm>
-            <a:off x="4008120" y="3857414"/>
-            <a:ext cx="3465342" cy="1469195"/>
+            <a:off x="3113455" y="4237892"/>
+            <a:ext cx="5152290" cy="2039816"/>
           </a:xfrm>
           <a:prstGeom prst="rect">
             <a:avLst/>
           </a:prstGeom>
         </p:spPr>
       </p:pic>
+      <p:sp>
+        <p:nvSpPr>
+          <p:cNvPr id="5" name="Slide Number Placeholder 4">
+            <a:extLst>
+              <a:ext uri="{FF2B5EF4-FFF2-40B4-BE49-F238E27FC236}">
+                <a16:creationId xmlns:a16="http://schemas.microsoft.com/office/drawing/2014/main" id="{E95D4AFB-E8FA-4E9E-BD5E-873DED22E275}"/>
+              </a:ext>
+            </a:extLst>
+          </p:cNvPr>
+          <p:cNvSpPr>
+            <a:spLocks noGrp="1"/>
+          </p:cNvSpPr>
+          <p:nvPr>
+            <p:ph type="sldNum" sz="quarter" idx="12"/>
+          </p:nvPr>
+        </p:nvSpPr>
+        <p:spPr/>
+        <p:txBody>
+          <a:bodyPr/>
+          <a:lstStyle/>
+          <a:p>
+            <a:fld id="{875942D6-B7AA-482E-A111-0A2C783F5CFF}" type="slidenum">
+              <a:rPr lang="en-US" smtClean="0"/>
+              <a:t>9</a:t>
+            </a:fld>
+            <a:endParaRPr lang="en-US"/>
+          </a:p>
+        </p:txBody>
+      </p:sp>
     </p:spTree>
     <p:extLst>
       <p:ext uri="{BB962C8B-B14F-4D97-AF65-F5344CB8AC3E}">
@@ -6933,4 +7928,299 @@
   <a:objectDefaults/>
   <a:extraClrSchemeLst/>
 </a:theme>
+</file>
+
+<file path=ppt/theme/theme2.xml><?xml version="1.0" encoding="utf-8"?>
+<a:theme xmlns:a="http://schemas.openxmlformats.org/drawingml/2006/main" name="Office Theme">
+  <a:themeElements>
+    <a:clrScheme name="Office">
+      <a:dk1>
+        <a:sysClr val="windowText" lastClr="000000"/>
+      </a:dk1>
+      <a:lt1>
+        <a:sysClr val="window" lastClr="FFFFFF"/>
+      </a:lt1>
+      <a:dk2>
+        <a:srgbClr val="44546A"/>
+      </a:dk2>
+      <a:lt2>
+        <a:srgbClr val="E7E6E6"/>
+      </a:lt2>
+      <a:accent1>
+        <a:srgbClr val="4472C4"/>
+      </a:accent1>
+      <a:accent2>
+        <a:srgbClr val="ED7D31"/>
+      </a:accent2>
+      <a:accent3>
+        <a:srgbClr val="A5A5A5"/>
+      </a:accent3>
+      <a:accent4>
+        <a:srgbClr val="FFC000"/>
+      </a:accent4>
+      <a:accent5>
+        <a:srgbClr val="5B9BD5"/>
+      </a:accent5>
+      <a:accent6>
+        <a:srgbClr val="70AD47"/>
+      </a:accent6>
+      <a:hlink>
+        <a:srgbClr val="0563C1"/>
+      </a:hlink>
+      <a:folHlink>
+        <a:srgbClr val="954F72"/>
+      </a:folHlink>
+    </a:clrScheme>
+    <a:fontScheme name="Office">
+      <a:majorFont>
+        <a:latin typeface="Calibri Light" panose="020F0302020204030204"/>
+        <a:ea typeface=""/>
+        <a:cs typeface=""/>
+        <a:font script="Jpan" typeface="游ゴシック Light"/>
+        <a:font script="Hang" typeface="맑은 고딕"/>
+        <a:font script="Hans" typeface="等线 Light"/>
+        <a:font script="Hant" typeface="新細明體"/>
+        <a:font script="Arab" typeface="Times New Roman"/>
+        <a:font script="Hebr" typeface="Times New Roman"/>
+        <a:font script="Thai" typeface="Angsana New"/>
+        <a:font script="Ethi" typeface="Nyala"/>
+        <a:font script="Beng" typeface="Vrinda"/>
+        <a:font script="Gujr" typeface="Shruti"/>
+        <a:font script="Khmr" typeface="MoolBoran"/>
+        <a:font script="Knda" typeface="Tunga"/>
+        <a:font script="Guru" typeface="Raavi"/>
+        <a:font script="Cans" typeface="Euphemia"/>
+        <a:font script="Cher" typeface="Plantagenet Cherokee"/>
+        <a:font script="Yiii" typeface="Microsoft Yi Baiti"/>
+        <a:font script="Tibt" typeface="Microsoft Himalaya"/>
+        <a:font script="Thaa" typeface="MV Boli"/>
+        <a:font script="Deva" typeface="Mangal"/>
+        <a:font script="Telu" typeface="Gautami"/>
+        <a:font script="Taml" typeface="Latha"/>
+        <a:font script="Syrc" typeface="Estrangelo Edessa"/>
+        <a:font script="Orya" typeface="Kalinga"/>
+        <a:font script="Mlym" typeface="Kartika"/>
+        <a:font script="Laoo" typeface="DokChampa"/>
+        <a:font script="Sinh" typeface="Iskoola Pota"/>
+        <a:font script="Mong" typeface="Mongolian Baiti"/>
+        <a:font script="Viet" typeface="Times New Roman"/>
+        <a:font script="Uigh" typeface="Microsoft Uighur"/>
+        <a:font script="Geor" typeface="Sylfaen"/>
+        <a:font script="Armn" typeface="Arial"/>
+        <a:font script="Bugi" typeface="Leelawadee UI"/>
+        <a:font script="Bopo" typeface="Microsoft JhengHei"/>
+        <a:font script="Java" typeface="Javanese Text"/>
+        <a:font script="Lisu" typeface="Segoe UI"/>
+        <a:font script="Mymr" typeface="Myanmar Text"/>
+        <a:font script="Nkoo" typeface="Ebrima"/>
+        <a:font script="Olck" typeface="Nirmala UI"/>
+        <a:font script="Osma" typeface="Ebrima"/>
+        <a:font script="Phag" typeface="Phagspa"/>
+        <a:font script="Syrn" typeface="Estrangelo Edessa"/>
+        <a:font script="Syrj" typeface="Estrangelo Edessa"/>
+        <a:font script="Syre" typeface="Estrangelo Edessa"/>
+        <a:font script="Sora" typeface="Nirmala UI"/>
+        <a:font script="Tale" typeface="Microsoft Tai Le"/>
+        <a:font script="Talu" typeface="Microsoft New Tai Lue"/>
+        <a:font script="Tfng" typeface="Ebrima"/>
+      </a:majorFont>
+      <a:minorFont>
+        <a:latin typeface="Calibri" panose="020F0502020204030204"/>
+        <a:ea typeface=""/>
+        <a:cs typeface=""/>
+        <a:font script="Jpan" typeface="游ゴシック"/>
+        <a:font script="Hang" typeface="맑은 고딕"/>
+        <a:font script="Hans" typeface="等线"/>
+        <a:font script="Hant" typeface="新細明體"/>
+        <a:font script="Arab" typeface="Arial"/>
+        <a:font script="Hebr" typeface="Arial"/>
+        <a:font script="Thai" typeface="Cordia New"/>
+        <a:font script="Ethi" typeface="Nyala"/>
+        <a:font script="Beng" typeface="Vrinda"/>
+        <a:font script="Gujr" typeface="Shruti"/>
+        <a:font script="Khmr" typeface="DaunPenh"/>
+        <a:font script="Knda" typeface="Tunga"/>
+        <a:font script="Guru" typeface="Raavi"/>
+        <a:font script="Cans" typeface="Euphemia"/>
+        <a:font script="Cher" typeface="Plantagenet Cherokee"/>
+        <a:font script="Yiii" typeface="Microsoft Yi Baiti"/>
+        <a:font script="Tibt" typeface="Microsoft Himalaya"/>
+        <a:font script="Thaa" typeface="MV Boli"/>
+        <a:font script="Deva" typeface="Mangal"/>
+        <a:font script="Telu" typeface="Gautami"/>
+        <a:font script="Taml" typeface="Latha"/>
+        <a:font script="Syrc" typeface="Estrangelo Edessa"/>
+        <a:font script="Orya" typeface="Kalinga"/>
+        <a:font script="Mlym" typeface="Kartika"/>
+        <a:font script="Laoo" typeface="DokChampa"/>
+        <a:font script="Sinh" typeface="Iskoola Pota"/>
+        <a:font script="Mong" typeface="Mongolian Baiti"/>
+        <a:font script="Viet" typeface="Arial"/>
+        <a:font script="Uigh" typeface="Microsoft Uighur"/>
+        <a:font script="Geor" typeface="Sylfaen"/>
+        <a:font script="Armn" typeface="Arial"/>
+        <a:font script="Bugi" typeface="Leelawadee UI"/>
+        <a:font script="Bopo" typeface="Microsoft JhengHei"/>
+        <a:font script="Java" typeface="Javanese Text"/>
+        <a:font script="Lisu" typeface="Segoe UI"/>
+        <a:font script="Mymr" typeface="Myanmar Text"/>
+        <a:font script="Nkoo" typeface="Ebrima"/>
+        <a:font script="Olck" typeface="Nirmala UI"/>
+        <a:font script="Osma" typeface="Ebrima"/>
+        <a:font script="Phag" typeface="Phagspa"/>
+        <a:font script="Syrn" typeface="Estrangelo Edessa"/>
+        <a:font script="Syrj" typeface="Estrangelo Edessa"/>
+        <a:font script="Syre" typeface="Estrangelo Edessa"/>
+        <a:font script="Sora" typeface="Nirmala UI"/>
+        <a:font script="Tale" typeface="Microsoft Tai Le"/>
+        <a:font script="Talu" typeface="Microsoft New Tai Lue"/>
+        <a:font script="Tfng" typeface="Ebrima"/>
+      </a:minorFont>
+    </a:fontScheme>
+    <a:fmtScheme name="Office">
+      <a:fillStyleLst>
+        <a:solidFill>
+          <a:schemeClr val="phClr"/>
+        </a:solidFill>
+        <a:gradFill rotWithShape="1">
+          <a:gsLst>
+            <a:gs pos="0">
+              <a:schemeClr val="phClr">
+                <a:lumMod val="110000"/>
+                <a:satMod val="105000"/>
+                <a:tint val="67000"/>
+              </a:schemeClr>
+            </a:gs>
+            <a:gs pos="50000">
+              <a:schemeClr val="phClr">
+                <a:lumMod val="105000"/>
+                <a:satMod val="103000"/>
+                <a:tint val="73000"/>
+              </a:schemeClr>
+            </a:gs>
+            <a:gs pos="100000">
+              <a:schemeClr val="phClr">
+                <a:lumMod val="105000"/>
+                <a:satMod val="109000"/>
+                <a:tint val="81000"/>
+              </a:schemeClr>
+            </a:gs>
+          </a:gsLst>
+          <a:lin ang="5400000" scaled="0"/>
+        </a:gradFill>
+        <a:gradFill rotWithShape="1">
+          <a:gsLst>
+            <a:gs pos="0">
+              <a:schemeClr val="phClr">
+                <a:satMod val="103000"/>
+                <a:lumMod val="102000"/>
+                <a:tint val="94000"/>
+              </a:schemeClr>
+            </a:gs>
+            <a:gs pos="50000">
+              <a:schemeClr val="phClr">
+                <a:satMod val="110000"/>
+                <a:lumMod val="100000"/>
+                <a:shade val="100000"/>
+              </a:schemeClr>
+            </a:gs>
+            <a:gs pos="100000">
+              <a:schemeClr val="phClr">
+                <a:lumMod val="99000"/>
+                <a:satMod val="120000"/>
+                <a:shade val="78000"/>
+              </a:schemeClr>
+            </a:gs>
+          </a:gsLst>
+          <a:lin ang="5400000" scaled="0"/>
+        </a:gradFill>
+      </a:fillStyleLst>
+      <a:lnStyleLst>
+        <a:ln w="6350" cap="flat" cmpd="sng" algn="ctr">
+          <a:solidFill>
+            <a:schemeClr val="phClr"/>
+          </a:solidFill>
+          <a:prstDash val="solid"/>
+          <a:miter lim="800000"/>
+        </a:ln>
+        <a:ln w="12700" cap="flat" cmpd="sng" algn="ctr">
+          <a:solidFill>
+            <a:schemeClr val="phClr"/>
+          </a:solidFill>
+          <a:prstDash val="solid"/>
+          <a:miter lim="800000"/>
+        </a:ln>
+        <a:ln w="19050" cap="flat" cmpd="sng" algn="ctr">
+          <a:solidFill>
+            <a:schemeClr val="phClr"/>
+          </a:solidFill>
+          <a:prstDash val="solid"/>
+          <a:miter lim="800000"/>
+        </a:ln>
+      </a:lnStyleLst>
+      <a:effectStyleLst>
+        <a:effectStyle>
+          <a:effectLst/>
+        </a:effectStyle>
+        <a:effectStyle>
+          <a:effectLst/>
+        </a:effectStyle>
+        <a:effectStyle>
+          <a:effectLst>
+            <a:outerShdw blurRad="57150" dist="19050" dir="5400000" algn="ctr" rotWithShape="0">
+              <a:srgbClr val="000000">
+                <a:alpha val="63000"/>
+              </a:srgbClr>
+            </a:outerShdw>
+          </a:effectLst>
+        </a:effectStyle>
+      </a:effectStyleLst>
+      <a:bgFillStyleLst>
+        <a:solidFill>
+          <a:schemeClr val="phClr"/>
+        </a:solidFill>
+        <a:solidFill>
+          <a:schemeClr val="phClr">
+            <a:tint val="95000"/>
+            <a:satMod val="170000"/>
+          </a:schemeClr>
+        </a:solidFill>
+        <a:gradFill rotWithShape="1">
+          <a:gsLst>
+            <a:gs pos="0">
+              <a:schemeClr val="phClr">
+                <a:tint val="93000"/>
+                <a:satMod val="150000"/>
+                <a:shade val="98000"/>
+                <a:lumMod val="102000"/>
+              </a:schemeClr>
+            </a:gs>
+            <a:gs pos="50000">
+              <a:schemeClr val="phClr">
+                <a:tint val="98000"/>
+                <a:satMod val="130000"/>
+                <a:shade val="90000"/>
+                <a:lumMod val="103000"/>
+              </a:schemeClr>
+            </a:gs>
+            <a:gs pos="100000">
+              <a:schemeClr val="phClr">
+                <a:shade val="63000"/>
+                <a:satMod val="120000"/>
+              </a:schemeClr>
+            </a:gs>
+          </a:gsLst>
+          <a:lin ang="5400000" scaled="0"/>
+        </a:gradFill>
+      </a:bgFillStyleLst>
+    </a:fmtScheme>
+  </a:themeElements>
+  <a:objectDefaults/>
+  <a:extraClrSchemeLst/>
+  <a:extLst>
+    <a:ext uri="{05A4C25C-085E-4340-85A3-A5531E510DB2}">
+      <thm15:themeFamily xmlns:thm15="http://schemas.microsoft.com/office/thememl/2012/main" name="Office Theme" id="{62F939B6-93AF-4DB8-9C6B-D6C7DFDC589F}" vid="{4A3C46E8-61CC-4603-A589-7422A47A8E4A}"/>
+    </a:ext>
+  </a:extLst>
+</a:theme>
 </file>
</xml_diff>

<commit_message>
grammar check, references, tech used, corrections
</commit_message>
<xml_diff>
--- a/Documents/Thesis/Indian Trade Analysis and Forecasting.pptx
+++ b/Documents/Thesis/Indian Trade Analysis and Forecasting.pptx
@@ -5,7 +5,7 @@
     <p:sldMasterId id="2147483672" r:id="rId1"/>
   </p:sldMasterIdLst>
   <p:notesMasterIdLst>
-    <p:notesMasterId r:id="rId20"/>
+    <p:notesMasterId r:id="rId22"/>
   </p:notesMasterIdLst>
   <p:sldIdLst>
     <p:sldId id="256" r:id="rId2"/>
@@ -16,16 +16,18 @@
     <p:sldId id="261" r:id="rId7"/>
     <p:sldId id="262" r:id="rId8"/>
     <p:sldId id="263" r:id="rId9"/>
-    <p:sldId id="265" r:id="rId10"/>
-    <p:sldId id="264" r:id="rId11"/>
-    <p:sldId id="266" r:id="rId12"/>
-    <p:sldId id="267" r:id="rId13"/>
-    <p:sldId id="268" r:id="rId14"/>
-    <p:sldId id="269" r:id="rId15"/>
-    <p:sldId id="270" r:id="rId16"/>
-    <p:sldId id="271" r:id="rId17"/>
-    <p:sldId id="272" r:id="rId18"/>
-    <p:sldId id="273" r:id="rId19"/>
+    <p:sldId id="274" r:id="rId10"/>
+    <p:sldId id="265" r:id="rId11"/>
+    <p:sldId id="264" r:id="rId12"/>
+    <p:sldId id="266" r:id="rId13"/>
+    <p:sldId id="267" r:id="rId14"/>
+    <p:sldId id="268" r:id="rId15"/>
+    <p:sldId id="269" r:id="rId16"/>
+    <p:sldId id="270" r:id="rId17"/>
+    <p:sldId id="271" r:id="rId18"/>
+    <p:sldId id="272" r:id="rId19"/>
+    <p:sldId id="275" r:id="rId20"/>
+    <p:sldId id="273" r:id="rId21"/>
   </p:sldIdLst>
   <p:sldSz cx="12192000" cy="6858000"/>
   <p:notesSz cx="6858000" cy="9144000"/>
@@ -126,7 +128,7 @@
   </p:defaultTextStyle>
   <p:extLst>
     <p:ext uri="{EFAFB233-063F-42B5-8137-9DF3F51BA10A}">
-      <p15:sldGuideLst xmlns:p15="http://schemas.microsoft.com/office/powerpoint/2012/main">
+      <p15:sldGuideLst xmlns:p15="http://schemas.microsoft.com/office/powerpoint/2012/main" xmlns="">
         <p15:guide id="1" orient="horz" pos="2160">
           <p15:clr>
             <a:srgbClr val="A4A3A4"/>
@@ -3540,15 +3542,6 @@
 <file path=ppt/slides/slide1.xml><?xml version="1.0" encoding="utf-8"?>
 <p:sld xmlns:a="http://schemas.openxmlformats.org/drawingml/2006/main" xmlns:r="http://schemas.openxmlformats.org/officeDocument/2006/relationships" xmlns:p="http://schemas.openxmlformats.org/presentationml/2006/main">
   <p:cSld>
-    <p:bg>
-      <p:bgPr>
-        <a:blipFill>
-          <a:blip r:embed="rId2"/>
-          <a:tile tx="0" ty="0" sx="100000" sy="100000" flip="none" algn="tl"/>
-        </a:blipFill>
-        <a:effectLst/>
-      </p:bgPr>
-    </p:bg>
     <p:spTree>
       <p:nvGrpSpPr>
         <p:cNvPr id="1" name=""/>
@@ -3568,7 +3561,7 @@
           <p:cNvPr id="2" name="Title 1">
             <a:extLst>
               <a:ext uri="{FF2B5EF4-FFF2-40B4-BE49-F238E27FC236}">
-                <a16:creationId xmlns:a16="http://schemas.microsoft.com/office/drawing/2014/main" id="{BC60F0FA-7D3E-489E-B4A8-3579C35DE747}"/>
+                <a16:creationId xmlns:a16="http://schemas.microsoft.com/office/drawing/2014/main" xmlns="" id="{BC60F0FA-7D3E-489E-B4A8-3579C35DE747}"/>
               </a:ext>
             </a:extLst>
           </p:cNvPr>
@@ -3605,7 +3598,7 @@
           <p:cNvPr id="3" name="Subtitle 2">
             <a:extLst>
               <a:ext uri="{FF2B5EF4-FFF2-40B4-BE49-F238E27FC236}">
-                <a16:creationId xmlns:a16="http://schemas.microsoft.com/office/drawing/2014/main" id="{59138817-A4AB-42F6-9ED0-5D7A4A0C4583}"/>
+                <a16:creationId xmlns:a16="http://schemas.microsoft.com/office/drawing/2014/main" xmlns="" id="{59138817-A4AB-42F6-9ED0-5D7A4A0C4583}"/>
               </a:ext>
             </a:extLst>
           </p:cNvPr>
@@ -3686,7 +3679,7 @@
           <p:cNvPr id="4" name="Slide Number Placeholder 3">
             <a:extLst>
               <a:ext uri="{FF2B5EF4-FFF2-40B4-BE49-F238E27FC236}">
-                <a16:creationId xmlns:a16="http://schemas.microsoft.com/office/drawing/2014/main" id="{0A86AE17-1A1B-4C63-A60B-07DD0275EB2B}"/>
+                <a16:creationId xmlns:a16="http://schemas.microsoft.com/office/drawing/2014/main" xmlns="" id="{0A86AE17-1A1B-4C63-A60B-07DD0275EB2B}"/>
               </a:ext>
             </a:extLst>
           </p:cNvPr>
@@ -3745,7 +3738,7 @@
           <p:cNvPr id="2" name="Title 1">
             <a:extLst>
               <a:ext uri="{FF2B5EF4-FFF2-40B4-BE49-F238E27FC236}">
-                <a16:creationId xmlns:a16="http://schemas.microsoft.com/office/drawing/2014/main" id="{459E159F-BDAE-4DB6-9B02-31C1E5F53E4D}"/>
+                <a16:creationId xmlns:a16="http://schemas.microsoft.com/office/drawing/2014/main" xmlns="" id="{79732034-DF0D-4F26-84D8-CD1B8D30179B}"/>
               </a:ext>
             </a:extLst>
           </p:cNvPr>
@@ -3766,7 +3759,7 @@
                 <a:latin typeface="Times New Roman" panose="02020603050405020304" pitchFamily="18" charset="0"/>
                 <a:cs typeface="Times New Roman" panose="02020603050405020304" pitchFamily="18" charset="0"/>
               </a:rPr>
-              <a:t>Exponential Smoothing and Holt-Winters</a:t>
+              <a:t>Auto Regressive and Moving Average</a:t>
             </a:r>
           </a:p>
         </p:txBody>
@@ -3776,7 +3769,7 @@
           <p:cNvPr id="3" name="Content Placeholder 2">
             <a:extLst>
               <a:ext uri="{FF2B5EF4-FFF2-40B4-BE49-F238E27FC236}">
-                <a16:creationId xmlns:a16="http://schemas.microsoft.com/office/drawing/2014/main" id="{87DBCE6D-BA6C-4D4B-B563-745E1C7B3536}"/>
+                <a16:creationId xmlns:a16="http://schemas.microsoft.com/office/drawing/2014/main" xmlns="" id="{3C057F40-40A7-4CAE-B87C-F65A17102C19}"/>
               </a:ext>
             </a:extLst>
           </p:cNvPr>
@@ -3791,6 +3784,227 @@
         <p:txBody>
           <a:bodyPr/>
           <a:lstStyle/>
+          <a:p>
+            <a:r>
+              <a:rPr lang="en-US" dirty="0">
+                <a:latin typeface="Times New Roman" panose="02020603050405020304" pitchFamily="18" charset="0"/>
+                <a:cs typeface="Times New Roman" panose="02020603050405020304" pitchFamily="18" charset="0"/>
+              </a:rPr>
+              <a:t>AR (</a:t>
+            </a:r>
+            <a:r>
+              <a:rPr lang="en-US" b="1" dirty="0">
+                <a:latin typeface="Times New Roman" panose="02020603050405020304" pitchFamily="18" charset="0"/>
+                <a:cs typeface="Times New Roman" panose="02020603050405020304" pitchFamily="18" charset="0"/>
+              </a:rPr>
+              <a:t>Auto Regressive</a:t>
+            </a:r>
+            <a:r>
+              <a:rPr lang="en-US" dirty="0" smtClean="0">
+                <a:latin typeface="Times New Roman" panose="02020603050405020304" pitchFamily="18" charset="0"/>
+                <a:cs typeface="Times New Roman" panose="02020603050405020304" pitchFamily="18" charset="0"/>
+              </a:rPr>
+              <a:t>) model </a:t>
+            </a:r>
+            <a:r>
+              <a:rPr lang="en-US" dirty="0">
+                <a:latin typeface="Times New Roman" panose="02020603050405020304" pitchFamily="18" charset="0"/>
+                <a:cs typeface="Times New Roman" panose="02020603050405020304" pitchFamily="18" charset="0"/>
+              </a:rPr>
+              <a:t>is used when a value from the time series has dependency on previous values e.g. </a:t>
+            </a:r>
+            <a:r>
+              <a:rPr lang="en-US" dirty="0" err="1">
+                <a:latin typeface="Times New Roman" panose="02020603050405020304" pitchFamily="18" charset="0"/>
+                <a:cs typeface="Times New Roman" panose="02020603050405020304" pitchFamily="18" charset="0"/>
+              </a:rPr>
+              <a:t>X</a:t>
+            </a:r>
+            <a:r>
+              <a:rPr lang="en-US" baseline="-25000" dirty="0" err="1">
+                <a:latin typeface="Times New Roman" panose="02020603050405020304" pitchFamily="18" charset="0"/>
+                <a:cs typeface="Times New Roman" panose="02020603050405020304" pitchFamily="18" charset="0"/>
+              </a:rPr>
+              <a:t>t</a:t>
+            </a:r>
+            <a:r>
+              <a:rPr lang="en-US" dirty="0">
+                <a:latin typeface="Times New Roman" panose="02020603050405020304" pitchFamily="18" charset="0"/>
+                <a:cs typeface="Times New Roman" panose="02020603050405020304" pitchFamily="18" charset="0"/>
+              </a:rPr>
+              <a:t> = f(X</a:t>
+            </a:r>
+            <a:r>
+              <a:rPr lang="en-US" baseline="-25000" dirty="0">
+                <a:latin typeface="Times New Roman" panose="02020603050405020304" pitchFamily="18" charset="0"/>
+                <a:cs typeface="Times New Roman" panose="02020603050405020304" pitchFamily="18" charset="0"/>
+              </a:rPr>
+              <a:t>t-1</a:t>
+            </a:r>
+            <a:r>
+              <a:rPr lang="en-US" dirty="0">
+                <a:latin typeface="Times New Roman" panose="02020603050405020304" pitchFamily="18" charset="0"/>
+                <a:cs typeface="Times New Roman" panose="02020603050405020304" pitchFamily="18" charset="0"/>
+              </a:rPr>
+              <a:t>). </a:t>
+            </a:r>
+            <a:r>
+              <a:rPr lang="en-US" dirty="0">
+                <a:latin typeface="Times New Roman" panose="02020603050405020304" pitchFamily="18" charset="0"/>
+                <a:cs typeface="Times New Roman" panose="02020603050405020304" pitchFamily="18" charset="0"/>
+              </a:rPr>
+              <a:t>O</a:t>
+            </a:r>
+            <a:r>
+              <a:rPr lang="en-US" dirty="0" smtClean="0">
+                <a:latin typeface="Times New Roman" panose="02020603050405020304" pitchFamily="18" charset="0"/>
+                <a:cs typeface="Times New Roman" panose="02020603050405020304" pitchFamily="18" charset="0"/>
+              </a:rPr>
+              <a:t>rder </a:t>
+            </a:r>
+            <a:r>
+              <a:rPr lang="en-US" dirty="0">
+                <a:latin typeface="Times New Roman" panose="02020603050405020304" pitchFamily="18" charset="0"/>
+                <a:cs typeface="Times New Roman" panose="02020603050405020304" pitchFamily="18" charset="0"/>
+              </a:rPr>
+              <a:t>of an </a:t>
+            </a:r>
+            <a:r>
+              <a:rPr lang="en-US" dirty="0" smtClean="0">
+                <a:latin typeface="Times New Roman" panose="02020603050405020304" pitchFamily="18" charset="0"/>
+                <a:cs typeface="Times New Roman" panose="02020603050405020304" pitchFamily="18" charset="0"/>
+              </a:rPr>
+              <a:t>AR model is </a:t>
+            </a:r>
+            <a:r>
+              <a:rPr lang="en-US" dirty="0">
+                <a:latin typeface="Times New Roman" panose="02020603050405020304" pitchFamily="18" charset="0"/>
+                <a:cs typeface="Times New Roman" panose="02020603050405020304" pitchFamily="18" charset="0"/>
+              </a:rPr>
+              <a:t>the number of immediately preceding values in the series </a:t>
+            </a:r>
+            <a:r>
+              <a:rPr lang="en-US" dirty="0" smtClean="0">
+                <a:latin typeface="Times New Roman" panose="02020603050405020304" pitchFamily="18" charset="0"/>
+                <a:cs typeface="Times New Roman" panose="02020603050405020304" pitchFamily="18" charset="0"/>
+              </a:rPr>
+              <a:t>that are used </a:t>
+            </a:r>
+            <a:r>
+              <a:rPr lang="en-US" dirty="0">
+                <a:latin typeface="Times New Roman" panose="02020603050405020304" pitchFamily="18" charset="0"/>
+                <a:cs typeface="Times New Roman" panose="02020603050405020304" pitchFamily="18" charset="0"/>
+              </a:rPr>
+              <a:t>to forecast the current value e.g. order </a:t>
+            </a:r>
+            <a:r>
+              <a:rPr lang="en-US" dirty="0" smtClean="0">
+                <a:latin typeface="Times New Roman" panose="02020603050405020304" pitchFamily="18" charset="0"/>
+                <a:cs typeface="Times New Roman" panose="02020603050405020304" pitchFamily="18" charset="0"/>
+              </a:rPr>
+              <a:t>= </a:t>
+            </a:r>
+            <a:r>
+              <a:rPr lang="en-US" dirty="0">
+                <a:latin typeface="Times New Roman" panose="02020603050405020304" pitchFamily="18" charset="0"/>
+                <a:cs typeface="Times New Roman" panose="02020603050405020304" pitchFamily="18" charset="0"/>
+              </a:rPr>
+              <a:t>2 denotes </a:t>
+            </a:r>
+            <a:r>
+              <a:rPr lang="en-US" dirty="0" smtClean="0">
+                <a:latin typeface="Times New Roman" panose="02020603050405020304" pitchFamily="18" charset="0"/>
+                <a:cs typeface="Times New Roman" panose="02020603050405020304" pitchFamily="18" charset="0"/>
+              </a:rPr>
+              <a:t>that </a:t>
+            </a:r>
+            <a:r>
+              <a:rPr lang="en-US" dirty="0" err="1">
+                <a:latin typeface="Times New Roman" panose="02020603050405020304" pitchFamily="18" charset="0"/>
+                <a:cs typeface="Times New Roman" panose="02020603050405020304" pitchFamily="18" charset="0"/>
+              </a:rPr>
+              <a:t>X</a:t>
+            </a:r>
+            <a:r>
+              <a:rPr lang="en-US" baseline="-25000" dirty="0" err="1">
+                <a:latin typeface="Times New Roman" panose="02020603050405020304" pitchFamily="18" charset="0"/>
+                <a:cs typeface="Times New Roman" panose="02020603050405020304" pitchFamily="18" charset="0"/>
+              </a:rPr>
+              <a:t>t</a:t>
+            </a:r>
+            <a:r>
+              <a:rPr lang="en-US" dirty="0">
+                <a:latin typeface="Times New Roman" panose="02020603050405020304" pitchFamily="18" charset="0"/>
+                <a:cs typeface="Times New Roman" panose="02020603050405020304" pitchFamily="18" charset="0"/>
+              </a:rPr>
+              <a:t> is dependent on X</a:t>
+            </a:r>
+            <a:r>
+              <a:rPr lang="en-US" baseline="-25000" dirty="0">
+                <a:latin typeface="Times New Roman" panose="02020603050405020304" pitchFamily="18" charset="0"/>
+                <a:cs typeface="Times New Roman" panose="02020603050405020304" pitchFamily="18" charset="0"/>
+              </a:rPr>
+              <a:t>t-1</a:t>
+            </a:r>
+            <a:r>
+              <a:rPr lang="en-US" dirty="0">
+                <a:latin typeface="Times New Roman" panose="02020603050405020304" pitchFamily="18" charset="0"/>
+                <a:cs typeface="Times New Roman" panose="02020603050405020304" pitchFamily="18" charset="0"/>
+              </a:rPr>
+              <a:t> and X</a:t>
+            </a:r>
+            <a:r>
+              <a:rPr lang="en-US" baseline="-25000" dirty="0">
+                <a:latin typeface="Times New Roman" panose="02020603050405020304" pitchFamily="18" charset="0"/>
+                <a:cs typeface="Times New Roman" panose="02020603050405020304" pitchFamily="18" charset="0"/>
+              </a:rPr>
+              <a:t>t-2</a:t>
+            </a:r>
+            <a:r>
+              <a:rPr lang="en-US" dirty="0">
+                <a:latin typeface="Times New Roman" panose="02020603050405020304" pitchFamily="18" charset="0"/>
+                <a:cs typeface="Times New Roman" panose="02020603050405020304" pitchFamily="18" charset="0"/>
+              </a:rPr>
+              <a:t>.</a:t>
+            </a:r>
+          </a:p>
+          <a:p>
+            <a:r>
+              <a:rPr lang="en-US" dirty="0">
+                <a:latin typeface="Times New Roman" panose="02020603050405020304" pitchFamily="18" charset="0"/>
+                <a:cs typeface="Times New Roman" panose="02020603050405020304" pitchFamily="18" charset="0"/>
+              </a:rPr>
+              <a:t>MA (</a:t>
+            </a:r>
+            <a:r>
+              <a:rPr lang="en-US" b="1" dirty="0">
+                <a:latin typeface="Times New Roman" panose="02020603050405020304" pitchFamily="18" charset="0"/>
+                <a:cs typeface="Times New Roman" panose="02020603050405020304" pitchFamily="18" charset="0"/>
+              </a:rPr>
+              <a:t>Moving Average)</a:t>
+            </a:r>
+            <a:r>
+              <a:rPr lang="en-US" dirty="0">
+                <a:latin typeface="Times New Roman" panose="02020603050405020304" pitchFamily="18" charset="0"/>
+                <a:cs typeface="Times New Roman" panose="02020603050405020304" pitchFamily="18" charset="0"/>
+              </a:rPr>
+              <a:t> is a technique that calculates the overall trend in the dataset. As the name suggest that </a:t>
+            </a:r>
+            <a:r>
+              <a:rPr lang="en-US" dirty="0" smtClean="0">
+                <a:latin typeface="Times New Roman" panose="02020603050405020304" pitchFamily="18" charset="0"/>
+                <a:cs typeface="Times New Roman" panose="02020603050405020304" pitchFamily="18" charset="0"/>
+              </a:rPr>
+              <a:t>we take </a:t>
+            </a:r>
+            <a:r>
+              <a:rPr lang="en-US" dirty="0">
+                <a:latin typeface="Times New Roman" panose="02020603050405020304" pitchFamily="18" charset="0"/>
+                <a:cs typeface="Times New Roman" panose="02020603050405020304" pitchFamily="18" charset="0"/>
+              </a:rPr>
+              <a:t>the Average over a fixed rolling size window. </a:t>
+            </a:r>
+          </a:p>
           <a:p>
             <a:endParaRPr lang="en-US" dirty="0">
               <a:latin typeface="Times New Roman" panose="02020603050405020304" pitchFamily="18" charset="0"/>
@@ -3798,52 +4012,47 @@
             </a:endParaRPr>
           </a:p>
           <a:p>
-            <a:r>
-              <a:rPr lang="en-US" dirty="0">
-                <a:latin typeface="Times New Roman" panose="02020603050405020304" pitchFamily="18" charset="0"/>
-                <a:cs typeface="Times New Roman" panose="02020603050405020304" pitchFamily="18" charset="0"/>
-              </a:rPr>
-              <a:t>In simple moving average the past observation are equally weighted where as in </a:t>
-            </a:r>
-            <a:r>
-              <a:rPr lang="en-US" b="1" dirty="0">
-                <a:latin typeface="Times New Roman" panose="02020603050405020304" pitchFamily="18" charset="0"/>
-                <a:cs typeface="Times New Roman" panose="02020603050405020304" pitchFamily="18" charset="0"/>
-              </a:rPr>
-              <a:t>Exponential Smoothing</a:t>
-            </a:r>
-            <a:r>
-              <a:rPr lang="en-US" dirty="0">
-                <a:latin typeface="Times New Roman" panose="02020603050405020304" pitchFamily="18" charset="0"/>
-                <a:cs typeface="Times New Roman" panose="02020603050405020304" pitchFamily="18" charset="0"/>
-              </a:rPr>
-              <a:t> it exponentially decreases over the time. It has only one smoothing factor.</a:t>
-            </a:r>
-          </a:p>
-          <a:p>
-            <a:r>
-              <a:rPr lang="en-US" b="1" dirty="0">
-                <a:latin typeface="Times New Roman" panose="02020603050405020304" pitchFamily="18" charset="0"/>
-                <a:cs typeface="Times New Roman" panose="02020603050405020304" pitchFamily="18" charset="0"/>
-              </a:rPr>
-              <a:t>Holt-Winters</a:t>
-            </a:r>
-            <a:r>
-              <a:rPr lang="en-US" dirty="0">
-                <a:latin typeface="Times New Roman" panose="02020603050405020304" pitchFamily="18" charset="0"/>
-                <a:cs typeface="Times New Roman" panose="02020603050405020304" pitchFamily="18" charset="0"/>
-              </a:rPr>
-              <a:t> is the extension over the simple exponential smoothing method. Here we use triple smoothing with the factor - seasonal period, trend type and seasonal type. </a:t>
-            </a:r>
-          </a:p>
-        </p:txBody>
-      </p:sp>
-      <p:sp>
-        <p:nvSpPr>
-          <p:cNvPr id="4" name="Slide Number Placeholder 3">
+            <a:endParaRPr lang="en-US" dirty="0">
+              <a:latin typeface="Times New Roman" panose="02020603050405020304" pitchFamily="18" charset="0"/>
+              <a:cs typeface="Times New Roman" panose="02020603050405020304" pitchFamily="18" charset="0"/>
+            </a:endParaRPr>
+          </a:p>
+        </p:txBody>
+      </p:sp>
+      <p:pic>
+        <p:nvPicPr>
+          <p:cNvPr id="4" name="Picture 3">
             <a:extLst>
               <a:ext uri="{FF2B5EF4-FFF2-40B4-BE49-F238E27FC236}">
-                <a16:creationId xmlns:a16="http://schemas.microsoft.com/office/drawing/2014/main" id="{5B3E101C-24F8-4EA6-8DF9-4090DB1444FB}"/>
+                <a16:creationId xmlns:a16="http://schemas.microsoft.com/office/drawing/2014/main" xmlns="" id="{AD170295-B5A2-4CA5-B861-2B95FC69247C}"/>
+              </a:ext>
+            </a:extLst>
+          </p:cNvPr>
+          <p:cNvPicPr/>
+          <p:nvPr/>
+        </p:nvPicPr>
+        <p:blipFill>
+          <a:blip r:embed="rId2"/>
+          <a:stretch>
+            <a:fillRect/>
+          </a:stretch>
+        </p:blipFill>
+        <p:spPr>
+          <a:xfrm>
+            <a:off x="3113455" y="4237892"/>
+            <a:ext cx="5152290" cy="2039816"/>
+          </a:xfrm>
+          <a:prstGeom prst="rect">
+            <a:avLst/>
+          </a:prstGeom>
+        </p:spPr>
+      </p:pic>
+      <p:sp>
+        <p:nvSpPr>
+          <p:cNvPr id="5" name="Slide Number Placeholder 4">
+            <a:extLst>
+              <a:ext uri="{FF2B5EF4-FFF2-40B4-BE49-F238E27FC236}">
+                <a16:creationId xmlns:a16="http://schemas.microsoft.com/office/drawing/2014/main" xmlns="" id="{E95D4AFB-E8FA-4E9E-BD5E-873DED22E275}"/>
               </a:ext>
             </a:extLst>
           </p:cNvPr>
@@ -3870,7 +4079,7 @@
     </p:spTree>
     <p:extLst>
       <p:ext uri="{BB962C8B-B14F-4D97-AF65-F5344CB8AC3E}">
-        <p14:creationId xmlns:p14="http://schemas.microsoft.com/office/powerpoint/2010/main" val="2986968886"/>
+        <p14:creationId xmlns:p14="http://schemas.microsoft.com/office/powerpoint/2010/main" val="2711411751"/>
       </p:ext>
     </p:extLst>
   </p:cSld>
@@ -3902,7 +4111,7 @@
           <p:cNvPr id="2" name="Title 1">
             <a:extLst>
               <a:ext uri="{FF2B5EF4-FFF2-40B4-BE49-F238E27FC236}">
-                <a16:creationId xmlns:a16="http://schemas.microsoft.com/office/drawing/2014/main" id="{9D5A07A9-3CA7-4EB1-A906-558AA61068B0}"/>
+                <a16:creationId xmlns:a16="http://schemas.microsoft.com/office/drawing/2014/main" xmlns="" id="{459E159F-BDAE-4DB6-9B02-31C1E5F53E4D}"/>
               </a:ext>
             </a:extLst>
           </p:cNvPr>
@@ -3923,7 +4132,7 @@
                 <a:latin typeface="Times New Roman" panose="02020603050405020304" pitchFamily="18" charset="0"/>
                 <a:cs typeface="Times New Roman" panose="02020603050405020304" pitchFamily="18" charset="0"/>
               </a:rPr>
-              <a:t>ARIMA – additional and multiplicative</a:t>
+              <a:t>Exponential Smoothing and Holt-Winters</a:t>
             </a:r>
           </a:p>
         </p:txBody>
@@ -3933,7 +4142,7 @@
           <p:cNvPr id="3" name="Content Placeholder 2">
             <a:extLst>
               <a:ext uri="{FF2B5EF4-FFF2-40B4-BE49-F238E27FC236}">
-                <a16:creationId xmlns:a16="http://schemas.microsoft.com/office/drawing/2014/main" id="{466AA86D-DFED-4E3C-A03D-60FF211AEB75}"/>
+                <a16:creationId xmlns:a16="http://schemas.microsoft.com/office/drawing/2014/main" xmlns="" id="{87DBCE6D-BA6C-4D4B-B563-745E1C7B3536}"/>
               </a:ext>
             </a:extLst>
           </p:cNvPr>
@@ -3949,132 +4158,49 @@
           <a:bodyPr/>
           <a:lstStyle/>
           <a:p>
-            <a:r>
-              <a:rPr lang="en-US" dirty="0">
-                <a:latin typeface="Times New Roman" panose="02020603050405020304" pitchFamily="18" charset="0"/>
-                <a:cs typeface="Times New Roman" panose="02020603050405020304" pitchFamily="18" charset="0"/>
-              </a:rPr>
-              <a:t>ARIMA stands for </a:t>
-            </a:r>
-            <a:r>
-              <a:rPr lang="en-US" i="1" dirty="0">
-                <a:latin typeface="Times New Roman" panose="02020603050405020304" pitchFamily="18" charset="0"/>
-                <a:cs typeface="Times New Roman" panose="02020603050405020304" pitchFamily="18" charset="0"/>
-              </a:rPr>
-              <a:t>Autoregressive Integrated Moving Average</a:t>
-            </a:r>
-            <a:r>
-              <a:rPr lang="en-US" dirty="0">
-                <a:latin typeface="Times New Roman" panose="02020603050405020304" pitchFamily="18" charset="0"/>
-                <a:cs typeface="Times New Roman" panose="02020603050405020304" pitchFamily="18" charset="0"/>
-              </a:rPr>
-              <a:t> which is a combination of three terms – </a:t>
-            </a:r>
-          </a:p>
-          <a:p>
-            <a:pPr lvl="1"/>
-            <a:r>
-              <a:rPr lang="en-US" dirty="0">
-                <a:latin typeface="Times New Roman" panose="02020603050405020304" pitchFamily="18" charset="0"/>
-                <a:cs typeface="Times New Roman" panose="02020603050405020304" pitchFamily="18" charset="0"/>
-              </a:rPr>
-              <a:t>AR – Auto Regressive</a:t>
-            </a:r>
-          </a:p>
-          <a:p>
-            <a:pPr lvl="1"/>
-            <a:r>
-              <a:rPr lang="en-US" dirty="0">
-                <a:latin typeface="Times New Roman" panose="02020603050405020304" pitchFamily="18" charset="0"/>
-                <a:cs typeface="Times New Roman" panose="02020603050405020304" pitchFamily="18" charset="0"/>
-              </a:rPr>
-              <a:t>I – Integrated (difference between current values and the previous values)</a:t>
-            </a:r>
-          </a:p>
-          <a:p>
-            <a:pPr lvl="1"/>
-            <a:r>
-              <a:rPr lang="en-US" dirty="0">
-                <a:latin typeface="Times New Roman" panose="02020603050405020304" pitchFamily="18" charset="0"/>
-                <a:cs typeface="Times New Roman" panose="02020603050405020304" pitchFamily="18" charset="0"/>
-              </a:rPr>
-              <a:t>MA – Moving Average</a:t>
-            </a:r>
-          </a:p>
-          <a:p>
-            <a:pPr marL="201168" lvl="1" indent="0">
-              <a:buNone/>
-            </a:pPr>
             <a:endParaRPr lang="en-US" dirty="0">
               <a:latin typeface="Times New Roman" panose="02020603050405020304" pitchFamily="18" charset="0"/>
               <a:cs typeface="Times New Roman" panose="02020603050405020304" pitchFamily="18" charset="0"/>
             </a:endParaRPr>
           </a:p>
           <a:p>
-            <a:pPr marL="201168" lvl="1" indent="0">
-              <a:buNone/>
-            </a:pPr>
-            <a:r>
-              <a:rPr lang="en-US" dirty="0">
-                <a:latin typeface="Times New Roman" panose="02020603050405020304" pitchFamily="18" charset="0"/>
-                <a:cs typeface="Times New Roman" panose="02020603050405020304" pitchFamily="18" charset="0"/>
-              </a:rPr>
-              <a:t>ARIMA additive – </a:t>
-            </a:r>
-          </a:p>
-          <a:p>
-            <a:pPr marL="201168" lvl="1" indent="0">
-              <a:buNone/>
-            </a:pPr>
-            <a:r>
-              <a:rPr lang="en-US" dirty="0">
-                <a:latin typeface="Times New Roman" panose="02020603050405020304" pitchFamily="18" charset="0"/>
-                <a:cs typeface="Times New Roman" panose="02020603050405020304" pitchFamily="18" charset="0"/>
-              </a:rPr>
-              <a:t>	Additive Time Series = Trend + Seasonality + Randomness</a:t>
-            </a:r>
-          </a:p>
-          <a:p>
-            <a:pPr marL="201168" lvl="1" indent="0">
-              <a:buNone/>
-            </a:pPr>
-            <a:endParaRPr lang="en-US" dirty="0">
-              <a:latin typeface="Times New Roman" panose="02020603050405020304" pitchFamily="18" charset="0"/>
-              <a:cs typeface="Times New Roman" panose="02020603050405020304" pitchFamily="18" charset="0"/>
-            </a:endParaRPr>
-          </a:p>
-          <a:p>
-            <a:pPr marL="201168" lvl="1" indent="0">
-              <a:buNone/>
-            </a:pPr>
-            <a:r>
-              <a:rPr lang="en-US" dirty="0">
-                <a:latin typeface="Times New Roman" panose="02020603050405020304" pitchFamily="18" charset="0"/>
-                <a:cs typeface="Times New Roman" panose="02020603050405020304" pitchFamily="18" charset="0"/>
-              </a:rPr>
-              <a:t>ARIMA multiplicative – </a:t>
-            </a:r>
-          </a:p>
-          <a:p>
-            <a:pPr marL="201168" lvl="1" indent="0">
-              <a:buNone/>
-            </a:pPr>
-            <a:r>
-              <a:rPr lang="en-US" dirty="0">
-                <a:latin typeface="Times New Roman" panose="02020603050405020304" pitchFamily="18" charset="0"/>
-                <a:cs typeface="Times New Roman" panose="02020603050405020304" pitchFamily="18" charset="0"/>
-              </a:rPr>
-              <a:t>	Multiplicative Time Series = Trend * Seasonality * Randomness </a:t>
-            </a:r>
-          </a:p>
-          <a:p>
-            <a:pPr marL="201168" lvl="1" indent="0">
-              <a:buNone/>
-            </a:pPr>
-            <a:endParaRPr lang="en-US" dirty="0">
-              <a:latin typeface="Times New Roman" panose="02020603050405020304" pitchFamily="18" charset="0"/>
-              <a:cs typeface="Times New Roman" panose="02020603050405020304" pitchFamily="18" charset="0"/>
-            </a:endParaRPr>
+            <a:r>
+              <a:rPr lang="en-US" dirty="0">
+                <a:latin typeface="Times New Roman" panose="02020603050405020304" pitchFamily="18" charset="0"/>
+                <a:cs typeface="Times New Roman" panose="02020603050405020304" pitchFamily="18" charset="0"/>
+              </a:rPr>
+              <a:t>In simple moving average the past observation are equally weighted where as in </a:t>
+            </a:r>
+            <a:r>
+              <a:rPr lang="en-US" b="1" dirty="0">
+                <a:latin typeface="Times New Roman" panose="02020603050405020304" pitchFamily="18" charset="0"/>
+                <a:cs typeface="Times New Roman" panose="02020603050405020304" pitchFamily="18" charset="0"/>
+              </a:rPr>
+              <a:t>Exponential Smoothing</a:t>
+            </a:r>
+            <a:r>
+              <a:rPr lang="en-US" dirty="0">
+                <a:latin typeface="Times New Roman" panose="02020603050405020304" pitchFamily="18" charset="0"/>
+                <a:cs typeface="Times New Roman" panose="02020603050405020304" pitchFamily="18" charset="0"/>
+              </a:rPr>
+              <a:t> it exponentially decreases over the time. It has only one smoothing factor.</a:t>
+            </a:r>
+          </a:p>
+          <a:p>
+            <a:r>
+              <a:rPr lang="en-US" b="1" dirty="0">
+                <a:latin typeface="Times New Roman" panose="02020603050405020304" pitchFamily="18" charset="0"/>
+                <a:cs typeface="Times New Roman" panose="02020603050405020304" pitchFamily="18" charset="0"/>
+              </a:rPr>
+              <a:t>Holt-Winters</a:t>
+            </a:r>
+            <a:r>
+              <a:rPr lang="en-US" dirty="0">
+                <a:latin typeface="Times New Roman" panose="02020603050405020304" pitchFamily="18" charset="0"/>
+                <a:cs typeface="Times New Roman" panose="02020603050405020304" pitchFamily="18" charset="0"/>
+              </a:rPr>
+              <a:t> is the extension over the simple exponential smoothing method. Here we use triple smoothing with the factor - seasonal period, trend type and seasonal type. </a:t>
+            </a:r>
           </a:p>
         </p:txBody>
       </p:sp>
@@ -4083,7 +4209,7 @@
           <p:cNvPr id="4" name="Slide Number Placeholder 3">
             <a:extLst>
               <a:ext uri="{FF2B5EF4-FFF2-40B4-BE49-F238E27FC236}">
-                <a16:creationId xmlns:a16="http://schemas.microsoft.com/office/drawing/2014/main" id="{E129BBB6-068B-4391-B822-EF585842D724}"/>
+                <a16:creationId xmlns:a16="http://schemas.microsoft.com/office/drawing/2014/main" xmlns="" id="{5B3E101C-24F8-4EA6-8DF9-4090DB1444FB}"/>
               </a:ext>
             </a:extLst>
           </p:cNvPr>
@@ -4110,7 +4236,7 @@
     </p:spTree>
     <p:extLst>
       <p:ext uri="{BB962C8B-B14F-4D97-AF65-F5344CB8AC3E}">
-        <p14:creationId xmlns:p14="http://schemas.microsoft.com/office/powerpoint/2010/main" val="3146938878"/>
+        <p14:creationId xmlns:p14="http://schemas.microsoft.com/office/powerpoint/2010/main" val="2986968886"/>
       </p:ext>
     </p:extLst>
   </p:cSld>
@@ -4142,7 +4268,7 @@
           <p:cNvPr id="2" name="Title 1">
             <a:extLst>
               <a:ext uri="{FF2B5EF4-FFF2-40B4-BE49-F238E27FC236}">
-                <a16:creationId xmlns:a16="http://schemas.microsoft.com/office/drawing/2014/main" id="{305F9FD6-CEE3-4E89-A3D2-9A94AF45028D}"/>
+                <a16:creationId xmlns:a16="http://schemas.microsoft.com/office/drawing/2014/main" xmlns="" id="{9D5A07A9-3CA7-4EB1-A906-558AA61068B0}"/>
               </a:ext>
             </a:extLst>
           </p:cNvPr>
@@ -4163,7 +4289,7 @@
                 <a:latin typeface="Times New Roman" panose="02020603050405020304" pitchFamily="18" charset="0"/>
                 <a:cs typeface="Times New Roman" panose="02020603050405020304" pitchFamily="18" charset="0"/>
               </a:rPr>
-              <a:t>Seasonal ARIMA</a:t>
+              <a:t>ARIMA – additional and multiplicative</a:t>
             </a:r>
           </a:p>
         </p:txBody>
@@ -4173,7 +4299,7 @@
           <p:cNvPr id="3" name="Content Placeholder 2">
             <a:extLst>
               <a:ext uri="{FF2B5EF4-FFF2-40B4-BE49-F238E27FC236}">
-                <a16:creationId xmlns:a16="http://schemas.microsoft.com/office/drawing/2014/main" id="{F2256217-6441-4524-88F5-92A4181A19DD}"/>
+                <a16:creationId xmlns:a16="http://schemas.microsoft.com/office/drawing/2014/main" xmlns="" id="{466AA86D-DFED-4E3C-A03D-60FF211AEB75}"/>
               </a:ext>
             </a:extLst>
           </p:cNvPr>
@@ -4194,7 +4320,289 @@
                 <a:latin typeface="Times New Roman" panose="02020603050405020304" pitchFamily="18" charset="0"/>
                 <a:cs typeface="Times New Roman" panose="02020603050405020304" pitchFamily="18" charset="0"/>
               </a:rPr>
-              <a:t>Seasonal ARIMA here is ARIMA Multiplicative method with a seasonality factor m. Here we have chosen the multiplicative factor of 12 as ours is a monthly data.</a:t>
+              <a:t>ARIMA stands for </a:t>
+            </a:r>
+            <a:r>
+              <a:rPr lang="en-US" i="1" dirty="0">
+                <a:latin typeface="Times New Roman" panose="02020603050405020304" pitchFamily="18" charset="0"/>
+                <a:cs typeface="Times New Roman" panose="02020603050405020304" pitchFamily="18" charset="0"/>
+              </a:rPr>
+              <a:t>Autoregressive Integrated Moving Average</a:t>
+            </a:r>
+            <a:r>
+              <a:rPr lang="en-US" dirty="0">
+                <a:latin typeface="Times New Roman" panose="02020603050405020304" pitchFamily="18" charset="0"/>
+                <a:cs typeface="Times New Roman" panose="02020603050405020304" pitchFamily="18" charset="0"/>
+              </a:rPr>
+              <a:t> which is a combination of three terms – </a:t>
+            </a:r>
+          </a:p>
+          <a:p>
+            <a:pPr lvl="1"/>
+            <a:r>
+              <a:rPr lang="en-US" dirty="0">
+                <a:latin typeface="Times New Roman" panose="02020603050405020304" pitchFamily="18" charset="0"/>
+                <a:cs typeface="Times New Roman" panose="02020603050405020304" pitchFamily="18" charset="0"/>
+              </a:rPr>
+              <a:t>AR – Auto Regressive</a:t>
+            </a:r>
+          </a:p>
+          <a:p>
+            <a:pPr lvl="1"/>
+            <a:r>
+              <a:rPr lang="en-US" dirty="0">
+                <a:latin typeface="Times New Roman" panose="02020603050405020304" pitchFamily="18" charset="0"/>
+                <a:cs typeface="Times New Roman" panose="02020603050405020304" pitchFamily="18" charset="0"/>
+              </a:rPr>
+              <a:t>I – Integrated (difference between current values and the previous values)</a:t>
+            </a:r>
+          </a:p>
+          <a:p>
+            <a:pPr lvl="1"/>
+            <a:r>
+              <a:rPr lang="en-US" dirty="0">
+                <a:latin typeface="Times New Roman" panose="02020603050405020304" pitchFamily="18" charset="0"/>
+                <a:cs typeface="Times New Roman" panose="02020603050405020304" pitchFamily="18" charset="0"/>
+              </a:rPr>
+              <a:t>MA – Moving Average</a:t>
+            </a:r>
+          </a:p>
+          <a:p>
+            <a:pPr marL="201168" lvl="1" indent="0">
+              <a:buNone/>
+            </a:pPr>
+            <a:endParaRPr lang="en-US" dirty="0">
+              <a:latin typeface="Times New Roman" panose="02020603050405020304" pitchFamily="18" charset="0"/>
+              <a:cs typeface="Times New Roman" panose="02020603050405020304" pitchFamily="18" charset="0"/>
+            </a:endParaRPr>
+          </a:p>
+          <a:p>
+            <a:pPr marL="201168" lvl="1" indent="0">
+              <a:buNone/>
+            </a:pPr>
+            <a:r>
+              <a:rPr lang="en-US" dirty="0">
+                <a:latin typeface="Times New Roman" panose="02020603050405020304" pitchFamily="18" charset="0"/>
+                <a:cs typeface="Times New Roman" panose="02020603050405020304" pitchFamily="18" charset="0"/>
+              </a:rPr>
+              <a:t>ARIMA additive – </a:t>
+            </a:r>
+          </a:p>
+          <a:p>
+            <a:pPr marL="201168" lvl="1" indent="0">
+              <a:buNone/>
+            </a:pPr>
+            <a:r>
+              <a:rPr lang="en-US" dirty="0">
+                <a:latin typeface="Times New Roman" panose="02020603050405020304" pitchFamily="18" charset="0"/>
+                <a:cs typeface="Times New Roman" panose="02020603050405020304" pitchFamily="18" charset="0"/>
+              </a:rPr>
+              <a:t>	Additive Time Series = Trend + Seasonality + Randomness</a:t>
+            </a:r>
+          </a:p>
+          <a:p>
+            <a:pPr marL="201168" lvl="1" indent="0">
+              <a:buNone/>
+            </a:pPr>
+            <a:endParaRPr lang="en-US" dirty="0">
+              <a:latin typeface="Times New Roman" panose="02020603050405020304" pitchFamily="18" charset="0"/>
+              <a:cs typeface="Times New Roman" panose="02020603050405020304" pitchFamily="18" charset="0"/>
+            </a:endParaRPr>
+          </a:p>
+          <a:p>
+            <a:pPr marL="201168" lvl="1" indent="0">
+              <a:buNone/>
+            </a:pPr>
+            <a:r>
+              <a:rPr lang="en-US" dirty="0">
+                <a:latin typeface="Times New Roman" panose="02020603050405020304" pitchFamily="18" charset="0"/>
+                <a:cs typeface="Times New Roman" panose="02020603050405020304" pitchFamily="18" charset="0"/>
+              </a:rPr>
+              <a:t>ARIMA multiplicative – </a:t>
+            </a:r>
+          </a:p>
+          <a:p>
+            <a:pPr marL="201168" lvl="1" indent="0">
+              <a:buNone/>
+            </a:pPr>
+            <a:r>
+              <a:rPr lang="en-US" dirty="0">
+                <a:latin typeface="Times New Roman" panose="02020603050405020304" pitchFamily="18" charset="0"/>
+                <a:cs typeface="Times New Roman" panose="02020603050405020304" pitchFamily="18" charset="0"/>
+              </a:rPr>
+              <a:t>	Multiplicative Time Series = Trend * Seasonality * Randomness </a:t>
+            </a:r>
+          </a:p>
+          <a:p>
+            <a:pPr marL="201168" lvl="1" indent="0">
+              <a:buNone/>
+            </a:pPr>
+            <a:endParaRPr lang="en-US" dirty="0">
+              <a:latin typeface="Times New Roman" panose="02020603050405020304" pitchFamily="18" charset="0"/>
+              <a:cs typeface="Times New Roman" panose="02020603050405020304" pitchFamily="18" charset="0"/>
+            </a:endParaRPr>
+          </a:p>
+        </p:txBody>
+      </p:sp>
+      <p:sp>
+        <p:nvSpPr>
+          <p:cNvPr id="4" name="Slide Number Placeholder 3">
+            <a:extLst>
+              <a:ext uri="{FF2B5EF4-FFF2-40B4-BE49-F238E27FC236}">
+                <a16:creationId xmlns:a16="http://schemas.microsoft.com/office/drawing/2014/main" xmlns="" id="{E129BBB6-068B-4391-B822-EF585842D724}"/>
+              </a:ext>
+            </a:extLst>
+          </p:cNvPr>
+          <p:cNvSpPr>
+            <a:spLocks noGrp="1"/>
+          </p:cNvSpPr>
+          <p:nvPr>
+            <p:ph type="sldNum" sz="quarter" idx="12"/>
+          </p:nvPr>
+        </p:nvSpPr>
+        <p:spPr/>
+        <p:txBody>
+          <a:bodyPr/>
+          <a:lstStyle/>
+          <a:p>
+            <a:fld id="{875942D6-B7AA-482E-A111-0A2C783F5CFF}" type="slidenum">
+              <a:rPr lang="en-US" smtClean="0"/>
+              <a:t>12</a:t>
+            </a:fld>
+            <a:endParaRPr lang="en-US"/>
+          </a:p>
+        </p:txBody>
+      </p:sp>
+    </p:spTree>
+    <p:extLst>
+      <p:ext uri="{BB962C8B-B14F-4D97-AF65-F5344CB8AC3E}">
+        <p14:creationId xmlns:p14="http://schemas.microsoft.com/office/powerpoint/2010/main" val="3146938878"/>
+      </p:ext>
+    </p:extLst>
+  </p:cSld>
+  <p:clrMapOvr>
+    <a:masterClrMapping/>
+  </p:clrMapOvr>
+</p:sld>
+</file>
+
+<file path=ppt/slides/slide13.xml><?xml version="1.0" encoding="utf-8"?>
+<p:sld xmlns:a="http://schemas.openxmlformats.org/drawingml/2006/main" xmlns:r="http://schemas.openxmlformats.org/officeDocument/2006/relationships" xmlns:p="http://schemas.openxmlformats.org/presentationml/2006/main">
+  <p:cSld>
+    <p:spTree>
+      <p:nvGrpSpPr>
+        <p:cNvPr id="1" name=""/>
+        <p:cNvGrpSpPr/>
+        <p:nvPr/>
+      </p:nvGrpSpPr>
+      <p:grpSpPr>
+        <a:xfrm>
+          <a:off x="0" y="0"/>
+          <a:ext cx="0" cy="0"/>
+          <a:chOff x="0" y="0"/>
+          <a:chExt cx="0" cy="0"/>
+        </a:xfrm>
+      </p:grpSpPr>
+      <p:sp>
+        <p:nvSpPr>
+          <p:cNvPr id="2" name="Title 1">
+            <a:extLst>
+              <a:ext uri="{FF2B5EF4-FFF2-40B4-BE49-F238E27FC236}">
+                <a16:creationId xmlns:a16="http://schemas.microsoft.com/office/drawing/2014/main" xmlns="" id="{305F9FD6-CEE3-4E89-A3D2-9A94AF45028D}"/>
+              </a:ext>
+            </a:extLst>
+          </p:cNvPr>
+          <p:cNvSpPr>
+            <a:spLocks noGrp="1"/>
+          </p:cNvSpPr>
+          <p:nvPr>
+            <p:ph type="title"/>
+          </p:nvPr>
+        </p:nvSpPr>
+        <p:spPr/>
+        <p:txBody>
+          <a:bodyPr/>
+          <a:lstStyle/>
+          <a:p>
+            <a:r>
+              <a:rPr lang="en-US" dirty="0">
+                <a:latin typeface="Times New Roman" panose="02020603050405020304" pitchFamily="18" charset="0"/>
+                <a:cs typeface="Times New Roman" panose="02020603050405020304" pitchFamily="18" charset="0"/>
+              </a:rPr>
+              <a:t>Seasonal ARIMA</a:t>
+            </a:r>
+          </a:p>
+        </p:txBody>
+      </p:sp>
+      <p:sp>
+        <p:nvSpPr>
+          <p:cNvPr id="3" name="Content Placeholder 2">
+            <a:extLst>
+              <a:ext uri="{FF2B5EF4-FFF2-40B4-BE49-F238E27FC236}">
+                <a16:creationId xmlns:a16="http://schemas.microsoft.com/office/drawing/2014/main" xmlns="" id="{F2256217-6441-4524-88F5-92A4181A19DD}"/>
+              </a:ext>
+            </a:extLst>
+          </p:cNvPr>
+          <p:cNvSpPr>
+            <a:spLocks noGrp="1"/>
+          </p:cNvSpPr>
+          <p:nvPr>
+            <p:ph idx="1"/>
+          </p:nvPr>
+        </p:nvSpPr>
+        <p:spPr/>
+        <p:txBody>
+          <a:bodyPr/>
+          <a:lstStyle/>
+          <a:p>
+            <a:r>
+              <a:rPr lang="en-US" dirty="0">
+                <a:latin typeface="Times New Roman" panose="02020603050405020304" pitchFamily="18" charset="0"/>
+                <a:cs typeface="Times New Roman" panose="02020603050405020304" pitchFamily="18" charset="0"/>
+              </a:rPr>
+              <a:t>Seasonal ARIMA </a:t>
+            </a:r>
+            <a:r>
+              <a:rPr lang="en-US" dirty="0" smtClean="0">
+                <a:latin typeface="Times New Roman" panose="02020603050405020304" pitchFamily="18" charset="0"/>
+                <a:cs typeface="Times New Roman" panose="02020603050405020304" pitchFamily="18" charset="0"/>
+              </a:rPr>
+              <a:t>is an </a:t>
+            </a:r>
+            <a:r>
+              <a:rPr lang="en-US" dirty="0">
+                <a:latin typeface="Times New Roman" panose="02020603050405020304" pitchFamily="18" charset="0"/>
+                <a:cs typeface="Times New Roman" panose="02020603050405020304" pitchFamily="18" charset="0"/>
+              </a:rPr>
+              <a:t>ARIMA Multiplicative method </a:t>
+            </a:r>
+            <a:r>
+              <a:rPr lang="en-US" dirty="0" smtClean="0">
+                <a:latin typeface="Times New Roman" panose="02020603050405020304" pitchFamily="18" charset="0"/>
+                <a:cs typeface="Times New Roman" panose="02020603050405020304" pitchFamily="18" charset="0"/>
+              </a:rPr>
+              <a:t>with </a:t>
+            </a:r>
+            <a:r>
+              <a:rPr lang="en-US" dirty="0">
+                <a:latin typeface="Times New Roman" panose="02020603050405020304" pitchFamily="18" charset="0"/>
+                <a:cs typeface="Times New Roman" panose="02020603050405020304" pitchFamily="18" charset="0"/>
+              </a:rPr>
+              <a:t>seasonality factor </a:t>
+            </a:r>
+            <a:r>
+              <a:rPr lang="en-US" dirty="0" smtClean="0">
+                <a:latin typeface="Times New Roman" panose="02020603050405020304" pitchFamily="18" charset="0"/>
+                <a:cs typeface="Times New Roman" panose="02020603050405020304" pitchFamily="18" charset="0"/>
+              </a:rPr>
+              <a:t>(m). </a:t>
+            </a:r>
+            <a:r>
+              <a:rPr lang="en-US" dirty="0">
+                <a:latin typeface="Times New Roman" panose="02020603050405020304" pitchFamily="18" charset="0"/>
+                <a:cs typeface="Times New Roman" panose="02020603050405020304" pitchFamily="18" charset="0"/>
+              </a:rPr>
+              <a:t>Here we have chosen the multiplicative factor of 12 as ours is a monthly data.</a:t>
             </a:r>
           </a:p>
           <a:p>
@@ -4210,7 +4618,7 @@
           <p:cNvPr id="4" name="Picture 3">
             <a:extLst>
               <a:ext uri="{FF2B5EF4-FFF2-40B4-BE49-F238E27FC236}">
-                <a16:creationId xmlns:a16="http://schemas.microsoft.com/office/drawing/2014/main" id="{1207F182-2C5B-4884-B493-5D3D39E3791B}"/>
+                <a16:creationId xmlns:a16="http://schemas.microsoft.com/office/drawing/2014/main" xmlns="" id="{1207F182-2C5B-4884-B493-5D3D39E3791B}"/>
               </a:ext>
             </a:extLst>
           </p:cNvPr>
@@ -4249,187 +4657,7 @@
           <p:cNvPr id="5" name="Slide Number Placeholder 4">
             <a:extLst>
               <a:ext uri="{FF2B5EF4-FFF2-40B4-BE49-F238E27FC236}">
-                <a16:creationId xmlns:a16="http://schemas.microsoft.com/office/drawing/2014/main" id="{41B51C23-AF9C-406D-A710-68EF2CF27265}"/>
-              </a:ext>
-            </a:extLst>
-          </p:cNvPr>
-          <p:cNvSpPr>
-            <a:spLocks noGrp="1"/>
-          </p:cNvSpPr>
-          <p:nvPr>
-            <p:ph type="sldNum" sz="quarter" idx="12"/>
-          </p:nvPr>
-        </p:nvSpPr>
-        <p:spPr/>
-        <p:txBody>
-          <a:bodyPr/>
-          <a:lstStyle/>
-          <a:p>
-            <a:fld id="{875942D6-B7AA-482E-A111-0A2C783F5CFF}" type="slidenum">
-              <a:rPr lang="en-US" smtClean="0"/>
-              <a:t>12</a:t>
-            </a:fld>
-            <a:endParaRPr lang="en-US"/>
-          </a:p>
-        </p:txBody>
-      </p:sp>
-    </p:spTree>
-    <p:extLst>
-      <p:ext uri="{BB962C8B-B14F-4D97-AF65-F5344CB8AC3E}">
-        <p14:creationId xmlns:p14="http://schemas.microsoft.com/office/powerpoint/2010/main" val="2026238970"/>
-      </p:ext>
-    </p:extLst>
-  </p:cSld>
-  <p:clrMapOvr>
-    <a:masterClrMapping/>
-  </p:clrMapOvr>
-</p:sld>
-</file>
-
-<file path=ppt/slides/slide13.xml><?xml version="1.0" encoding="utf-8"?>
-<p:sld xmlns:a="http://schemas.openxmlformats.org/drawingml/2006/main" xmlns:r="http://schemas.openxmlformats.org/officeDocument/2006/relationships" xmlns:p="http://schemas.openxmlformats.org/presentationml/2006/main">
-  <p:cSld>
-    <p:spTree>
-      <p:nvGrpSpPr>
-        <p:cNvPr id="1" name=""/>
-        <p:cNvGrpSpPr/>
-        <p:nvPr/>
-      </p:nvGrpSpPr>
-      <p:grpSpPr>
-        <a:xfrm>
-          <a:off x="0" y="0"/>
-          <a:ext cx="0" cy="0"/>
-          <a:chOff x="0" y="0"/>
-          <a:chExt cx="0" cy="0"/>
-        </a:xfrm>
-      </p:grpSpPr>
-      <p:sp>
-        <p:nvSpPr>
-          <p:cNvPr id="2" name="Title 1">
-            <a:extLst>
-              <a:ext uri="{FF2B5EF4-FFF2-40B4-BE49-F238E27FC236}">
-                <a16:creationId xmlns:a16="http://schemas.microsoft.com/office/drawing/2014/main" id="{9848A2EE-C121-43C9-BA4B-A9B242509668}"/>
-              </a:ext>
-            </a:extLst>
-          </p:cNvPr>
-          <p:cNvSpPr>
-            <a:spLocks noGrp="1"/>
-          </p:cNvSpPr>
-          <p:nvPr>
-            <p:ph type="title"/>
-          </p:nvPr>
-        </p:nvSpPr>
-        <p:spPr/>
-        <p:txBody>
-          <a:bodyPr/>
-          <a:lstStyle/>
-          <a:p>
-            <a:r>
-              <a:rPr lang="en-US" dirty="0">
-                <a:latin typeface="Times New Roman" panose="02020603050405020304" pitchFamily="18" charset="0"/>
-                <a:cs typeface="Times New Roman" panose="02020603050405020304" pitchFamily="18" charset="0"/>
-              </a:rPr>
-              <a:t>Long Short Term Memory (LSTM)</a:t>
-            </a:r>
-          </a:p>
-        </p:txBody>
-      </p:sp>
-      <p:sp>
-        <p:nvSpPr>
-          <p:cNvPr id="3" name="Content Placeholder 2">
-            <a:extLst>
-              <a:ext uri="{FF2B5EF4-FFF2-40B4-BE49-F238E27FC236}">
-                <a16:creationId xmlns:a16="http://schemas.microsoft.com/office/drawing/2014/main" id="{3082308F-9D52-4858-BB10-F94701C2AC44}"/>
-              </a:ext>
-            </a:extLst>
-          </p:cNvPr>
-          <p:cNvSpPr>
-            <a:spLocks noGrp="1"/>
-          </p:cNvSpPr>
-          <p:nvPr>
-            <p:ph idx="1"/>
-          </p:nvPr>
-        </p:nvSpPr>
-        <p:spPr>
-          <a:xfrm>
-            <a:off x="587566" y="1390880"/>
-            <a:ext cx="10160000" cy="4800600"/>
-          </a:xfrm>
-        </p:spPr>
-        <p:txBody>
-          <a:bodyPr/>
-          <a:lstStyle/>
-          <a:p>
-            <a:r>
-              <a:rPr lang="en-US" dirty="0">
-                <a:latin typeface="Times New Roman" panose="02020603050405020304" pitchFamily="18" charset="0"/>
-                <a:cs typeface="Times New Roman" panose="02020603050405020304" pitchFamily="18" charset="0"/>
-              </a:rPr>
-              <a:t>Recurrent neural networks are used for processing the sequential data, but Unfortunately, as the dependency gets long, RNNs become unable to learn to connect the information.</a:t>
-            </a:r>
-          </a:p>
-          <a:p>
-            <a:r>
-              <a:rPr lang="en-US" dirty="0">
-                <a:latin typeface="Times New Roman" panose="02020603050405020304" pitchFamily="18" charset="0"/>
-                <a:cs typeface="Times New Roman" panose="02020603050405020304" pitchFamily="18" charset="0"/>
-              </a:rPr>
-              <a:t>In these cases, LSTMs come to rescue, which are explicitly designed to avoid the long-term dependency problem. </a:t>
-            </a:r>
-          </a:p>
-          <a:p>
-            <a:r>
-              <a:rPr lang="en-US" dirty="0">
-                <a:latin typeface="Times New Roman" panose="02020603050405020304" pitchFamily="18" charset="0"/>
-                <a:cs typeface="Times New Roman" panose="02020603050405020304" pitchFamily="18" charset="0"/>
-              </a:rPr>
-              <a:t>Remembering information for long periods of time is practically their default behavior.</a:t>
-            </a:r>
-          </a:p>
-          <a:p>
-            <a:endParaRPr lang="en-US" dirty="0">
-              <a:latin typeface="Times New Roman" panose="02020603050405020304" pitchFamily="18" charset="0"/>
-              <a:cs typeface="Times New Roman" panose="02020603050405020304" pitchFamily="18" charset="0"/>
-            </a:endParaRPr>
-          </a:p>
-        </p:txBody>
-      </p:sp>
-      <p:pic>
-        <p:nvPicPr>
-          <p:cNvPr id="4" name="Picture 3"/>
-          <p:cNvPicPr>
-            <a:picLocks noChangeAspect="1"/>
-          </p:cNvPicPr>
-          <p:nvPr/>
-        </p:nvPicPr>
-        <p:blipFill>
-          <a:blip r:embed="rId2" cstate="print">
-            <a:extLst>
-              <a:ext uri="{28A0092B-C50C-407E-A947-70E740481C1C}">
-                <a14:useLocalDpi xmlns:a14="http://schemas.microsoft.com/office/drawing/2010/main" val="0"/>
-              </a:ext>
-            </a:extLst>
-          </a:blip>
-          <a:stretch>
-            <a:fillRect/>
-          </a:stretch>
-        </p:blipFill>
-        <p:spPr>
-          <a:xfrm>
-            <a:off x="1872867" y="3731942"/>
-            <a:ext cx="6874360" cy="2582888"/>
-          </a:xfrm>
-          <a:prstGeom prst="rect">
-            <a:avLst/>
-          </a:prstGeom>
-        </p:spPr>
-      </p:pic>
-      <p:sp>
-        <p:nvSpPr>
-          <p:cNvPr id="5" name="Slide Number Placeholder 4">
-            <a:extLst>
-              <a:ext uri="{FF2B5EF4-FFF2-40B4-BE49-F238E27FC236}">
-                <a16:creationId xmlns:a16="http://schemas.microsoft.com/office/drawing/2014/main" id="{D2609442-B16A-41A6-9580-3008C9639646}"/>
+                <a16:creationId xmlns:a16="http://schemas.microsoft.com/office/drawing/2014/main" xmlns="" id="{41B51C23-AF9C-406D-A710-68EF2CF27265}"/>
               </a:ext>
             </a:extLst>
           </p:cNvPr>
@@ -4456,7 +4684,7 @@
     </p:spTree>
     <p:extLst>
       <p:ext uri="{BB962C8B-B14F-4D97-AF65-F5344CB8AC3E}">
-        <p14:creationId xmlns:p14="http://schemas.microsoft.com/office/powerpoint/2010/main" val="2256144047"/>
+        <p14:creationId xmlns:p14="http://schemas.microsoft.com/office/powerpoint/2010/main" val="2026238970"/>
       </p:ext>
     </p:extLst>
   </p:cSld>
@@ -4488,7 +4716,7 @@
           <p:cNvPr id="2" name="Title 1">
             <a:extLst>
               <a:ext uri="{FF2B5EF4-FFF2-40B4-BE49-F238E27FC236}">
-                <a16:creationId xmlns:a16="http://schemas.microsoft.com/office/drawing/2014/main" id="{02C04A12-9663-4F93-A4CF-C3FCE901FB72}"/>
+                <a16:creationId xmlns:a16="http://schemas.microsoft.com/office/drawing/2014/main" xmlns="" id="{9848A2EE-C121-43C9-BA4B-A9B242509668}"/>
               </a:ext>
             </a:extLst>
           </p:cNvPr>
@@ -4509,23 +4737,66 @@
                 <a:latin typeface="Times New Roman" panose="02020603050405020304" pitchFamily="18" charset="0"/>
                 <a:cs typeface="Times New Roman" panose="02020603050405020304" pitchFamily="18" charset="0"/>
               </a:rPr>
-              <a:t>Forecasting using LSTM</a:t>
+              <a:t>Long Short Term Memory (LSTM)</a:t>
+            </a:r>
+          </a:p>
+        </p:txBody>
+      </p:sp>
+      <p:sp>
+        <p:nvSpPr>
+          <p:cNvPr id="3" name="Content Placeholder 2">
+            <a:extLst>
+              <a:ext uri="{FF2B5EF4-FFF2-40B4-BE49-F238E27FC236}">
+                <a16:creationId xmlns:a16="http://schemas.microsoft.com/office/drawing/2014/main" xmlns="" id="{3082308F-9D52-4858-BB10-F94701C2AC44}"/>
+              </a:ext>
+            </a:extLst>
+          </p:cNvPr>
+          <p:cNvSpPr>
+            <a:spLocks noGrp="1"/>
+          </p:cNvSpPr>
+          <p:nvPr>
+            <p:ph idx="1"/>
+          </p:nvPr>
+        </p:nvSpPr>
+        <p:spPr>
+          <a:xfrm>
+            <a:off x="587566" y="1390880"/>
+            <a:ext cx="10160000" cy="4800600"/>
+          </a:xfrm>
+        </p:spPr>
+        <p:txBody>
+          <a:bodyPr/>
+          <a:lstStyle/>
+          <a:p>
+            <a:r>
+              <a:rPr lang="en-US" dirty="0">
+                <a:latin typeface="Times New Roman" panose="02020603050405020304" pitchFamily="18" charset="0"/>
+                <a:cs typeface="Times New Roman" panose="02020603050405020304" pitchFamily="18" charset="0"/>
+              </a:rPr>
+              <a:t>Recurrent neural networks are used for processing the sequential data, but Unfortunately, as the dependency gets long, RNNs become unable to learn to connect the information.</a:t>
+            </a:r>
+          </a:p>
+          <a:p>
+            <a:r>
+              <a:rPr lang="en-US" dirty="0">
+                <a:latin typeface="Times New Roman" panose="02020603050405020304" pitchFamily="18" charset="0"/>
+                <a:cs typeface="Times New Roman" panose="02020603050405020304" pitchFamily="18" charset="0"/>
+              </a:rPr>
+              <a:t>In these cases, LSTMs come to rescue, which are explicitly designed to avoid the long-term dependency problem. </a:t>
             </a:r>
           </a:p>
         </p:txBody>
       </p:sp>
       <p:pic>
         <p:nvPicPr>
-          <p:cNvPr id="4" name="Content Placeholder 3"/>
+          <p:cNvPr id="4" name="Picture 3"/>
           <p:cNvPicPr>
-            <a:picLocks noGrp="1" noChangeAspect="1"/>
+            <a:picLocks noChangeAspect="1"/>
           </p:cNvPicPr>
-          <p:nvPr>
-            <p:ph idx="1"/>
-          </p:nvPr>
+          <p:nvPr/>
         </p:nvPicPr>
         <p:blipFill>
-          <a:blip r:embed="rId2">
+          <a:blip r:embed="rId2" cstate="print">
             <a:extLst>
               <a:ext uri="{28A0092B-C50C-407E-A947-70E740481C1C}">
                 <a14:useLocalDpi xmlns:a14="http://schemas.microsoft.com/office/drawing/2010/main" val="0"/>
@@ -4538,49 +4809,20 @@
         </p:blipFill>
         <p:spPr>
           <a:xfrm>
-            <a:off x="1806766" y="1964518"/>
-            <a:ext cx="8013372" cy="4358624"/>
-          </a:xfrm>
-        </p:spPr>
-      </p:pic>
-      <p:sp>
-        <p:nvSpPr>
-          <p:cNvPr id="5" name="TextBox 4"/>
-          <p:cNvSpPr txBox="1"/>
-          <p:nvPr/>
-        </p:nvSpPr>
-        <p:spPr>
-          <a:xfrm>
-            <a:off x="782198" y="1366092"/>
-            <a:ext cx="9805012" cy="430887"/>
+            <a:off x="1872867" y="3383027"/>
+            <a:ext cx="6874360" cy="2582888"/>
           </a:xfrm>
           <a:prstGeom prst="rect">
             <a:avLst/>
           </a:prstGeom>
-          <a:noFill/>
         </p:spPr>
-        <p:txBody>
-          <a:bodyPr wrap="square" rtlCol="0">
-            <a:spAutoFit/>
-          </a:bodyPr>
-          <a:lstStyle/>
-          <a:p>
-            <a:r>
-              <a:rPr lang="en-IN" sz="2200" dirty="0">
-                <a:latin typeface="Times New Roman" panose="02020603050405020304" pitchFamily="18" charset="0"/>
-                <a:cs typeface="Times New Roman" panose="02020603050405020304" pitchFamily="18" charset="0"/>
-              </a:rPr>
-              <a:t>We took 12 previous months trade amount as input for our LSTM Model</a:t>
-            </a:r>
-          </a:p>
-        </p:txBody>
-      </p:sp>
-      <p:sp>
-        <p:nvSpPr>
-          <p:cNvPr id="3" name="Slide Number Placeholder 2">
+      </p:pic>
+      <p:sp>
+        <p:nvSpPr>
+          <p:cNvPr id="5" name="Slide Number Placeholder 4">
             <a:extLst>
               <a:ext uri="{FF2B5EF4-FFF2-40B4-BE49-F238E27FC236}">
-                <a16:creationId xmlns:a16="http://schemas.microsoft.com/office/drawing/2014/main" id="{0B71A8FC-BA34-47D9-8027-241899433F22}"/>
+                <a16:creationId xmlns:a16="http://schemas.microsoft.com/office/drawing/2014/main" xmlns="" id="{D2609442-B16A-41A6-9580-3008C9639646}"/>
               </a:ext>
             </a:extLst>
           </p:cNvPr>
@@ -4607,7 +4849,7 @@
     </p:spTree>
     <p:extLst>
       <p:ext uri="{BB962C8B-B14F-4D97-AF65-F5344CB8AC3E}">
-        <p14:creationId xmlns:p14="http://schemas.microsoft.com/office/powerpoint/2010/main" val="1293063419"/>
+        <p14:creationId xmlns:p14="http://schemas.microsoft.com/office/powerpoint/2010/main" val="2256144047"/>
       </p:ext>
     </p:extLst>
   </p:cSld>
@@ -4636,6 +4878,157 @@
       </p:grpSpPr>
       <p:sp>
         <p:nvSpPr>
+          <p:cNvPr id="2" name="Title 1">
+            <a:extLst>
+              <a:ext uri="{FF2B5EF4-FFF2-40B4-BE49-F238E27FC236}">
+                <a16:creationId xmlns:a16="http://schemas.microsoft.com/office/drawing/2014/main" xmlns="" id="{02C04A12-9663-4F93-A4CF-C3FCE901FB72}"/>
+              </a:ext>
+            </a:extLst>
+          </p:cNvPr>
+          <p:cNvSpPr>
+            <a:spLocks noGrp="1"/>
+          </p:cNvSpPr>
+          <p:nvPr>
+            <p:ph type="title"/>
+          </p:nvPr>
+        </p:nvSpPr>
+        <p:spPr/>
+        <p:txBody>
+          <a:bodyPr/>
+          <a:lstStyle/>
+          <a:p>
+            <a:r>
+              <a:rPr lang="en-US" dirty="0">
+                <a:latin typeface="Times New Roman" panose="02020603050405020304" pitchFamily="18" charset="0"/>
+                <a:cs typeface="Times New Roman" panose="02020603050405020304" pitchFamily="18" charset="0"/>
+              </a:rPr>
+              <a:t>Forecasting using LSTM</a:t>
+            </a:r>
+          </a:p>
+        </p:txBody>
+      </p:sp>
+      <p:pic>
+        <p:nvPicPr>
+          <p:cNvPr id="4" name="Content Placeholder 3"/>
+          <p:cNvPicPr>
+            <a:picLocks noGrp="1" noChangeAspect="1"/>
+          </p:cNvPicPr>
+          <p:nvPr>
+            <p:ph idx="1"/>
+          </p:nvPr>
+        </p:nvPicPr>
+        <p:blipFill>
+          <a:blip r:embed="rId2">
+            <a:extLst>
+              <a:ext uri="{28A0092B-C50C-407E-A947-70E740481C1C}">
+                <a14:useLocalDpi xmlns:a14="http://schemas.microsoft.com/office/drawing/2010/main" val="0"/>
+              </a:ext>
+            </a:extLst>
+          </a:blip>
+          <a:stretch>
+            <a:fillRect/>
+          </a:stretch>
+        </p:blipFill>
+        <p:spPr>
+          <a:xfrm>
+            <a:off x="1806766" y="1964518"/>
+            <a:ext cx="8013372" cy="4358624"/>
+          </a:xfrm>
+        </p:spPr>
+      </p:pic>
+      <p:sp>
+        <p:nvSpPr>
+          <p:cNvPr id="5" name="TextBox 4"/>
+          <p:cNvSpPr txBox="1"/>
+          <p:nvPr/>
+        </p:nvSpPr>
+        <p:spPr>
+          <a:xfrm>
+            <a:off x="782198" y="1366092"/>
+            <a:ext cx="9805012" cy="430887"/>
+          </a:xfrm>
+          <a:prstGeom prst="rect">
+            <a:avLst/>
+          </a:prstGeom>
+          <a:noFill/>
+        </p:spPr>
+        <p:txBody>
+          <a:bodyPr wrap="square" rtlCol="0">
+            <a:spAutoFit/>
+          </a:bodyPr>
+          <a:lstStyle/>
+          <a:p>
+            <a:r>
+              <a:rPr lang="en-IN" sz="2200" dirty="0">
+                <a:latin typeface="Times New Roman" panose="02020603050405020304" pitchFamily="18" charset="0"/>
+                <a:cs typeface="Times New Roman" panose="02020603050405020304" pitchFamily="18" charset="0"/>
+              </a:rPr>
+              <a:t>We took 12 previous months trade amount as input for our LSTM Model</a:t>
+            </a:r>
+          </a:p>
+        </p:txBody>
+      </p:sp>
+      <p:sp>
+        <p:nvSpPr>
+          <p:cNvPr id="3" name="Slide Number Placeholder 2">
+            <a:extLst>
+              <a:ext uri="{FF2B5EF4-FFF2-40B4-BE49-F238E27FC236}">
+                <a16:creationId xmlns:a16="http://schemas.microsoft.com/office/drawing/2014/main" xmlns="" id="{0B71A8FC-BA34-47D9-8027-241899433F22}"/>
+              </a:ext>
+            </a:extLst>
+          </p:cNvPr>
+          <p:cNvSpPr>
+            <a:spLocks noGrp="1"/>
+          </p:cNvSpPr>
+          <p:nvPr>
+            <p:ph type="sldNum" sz="quarter" idx="12"/>
+          </p:nvPr>
+        </p:nvSpPr>
+        <p:spPr/>
+        <p:txBody>
+          <a:bodyPr/>
+          <a:lstStyle/>
+          <a:p>
+            <a:fld id="{875942D6-B7AA-482E-A111-0A2C783F5CFF}" type="slidenum">
+              <a:rPr lang="en-US" smtClean="0"/>
+              <a:t>15</a:t>
+            </a:fld>
+            <a:endParaRPr lang="en-US"/>
+          </a:p>
+        </p:txBody>
+      </p:sp>
+    </p:spTree>
+    <p:extLst>
+      <p:ext uri="{BB962C8B-B14F-4D97-AF65-F5344CB8AC3E}">
+        <p14:creationId xmlns:p14="http://schemas.microsoft.com/office/powerpoint/2010/main" val="1293063419"/>
+      </p:ext>
+    </p:extLst>
+  </p:cSld>
+  <p:clrMapOvr>
+    <a:masterClrMapping/>
+  </p:clrMapOvr>
+</p:sld>
+</file>
+
+<file path=ppt/slides/slide16.xml><?xml version="1.0" encoding="utf-8"?>
+<p:sld xmlns:a="http://schemas.openxmlformats.org/drawingml/2006/main" xmlns:r="http://schemas.openxmlformats.org/officeDocument/2006/relationships" xmlns:p="http://schemas.openxmlformats.org/presentationml/2006/main">
+  <p:cSld>
+    <p:spTree>
+      <p:nvGrpSpPr>
+        <p:cNvPr id="1" name=""/>
+        <p:cNvGrpSpPr/>
+        <p:nvPr/>
+      </p:nvGrpSpPr>
+      <p:grpSpPr>
+        <a:xfrm>
+          <a:off x="0" y="0"/>
+          <a:ext cx="0" cy="0"/>
+          <a:chOff x="0" y="0"/>
+          <a:chExt cx="0" cy="0"/>
+        </a:xfrm>
+      </p:grpSpPr>
+      <p:sp>
+        <p:nvSpPr>
           <p:cNvPr id="2" name="Title 1"/>
           <p:cNvSpPr>
             <a:spLocks noGrp="1"/>
@@ -4688,21 +5081,21 @@
                 <a:gridCol w="2505873">
                   <a:extLst>
                     <a:ext uri="{9D8B030D-6E8A-4147-A177-3AD203B41FA5}">
-                      <a16:colId xmlns:a16="http://schemas.microsoft.com/office/drawing/2014/main" val="20000"/>
+                      <a16:colId xmlns:a16="http://schemas.microsoft.com/office/drawing/2014/main" xmlns="" val="20000"/>
                     </a:ext>
                   </a:extLst>
                 </a:gridCol>
                 <a:gridCol w="2125351">
                   <a:extLst>
                     <a:ext uri="{9D8B030D-6E8A-4147-A177-3AD203B41FA5}">
-                      <a16:colId xmlns:a16="http://schemas.microsoft.com/office/drawing/2014/main" val="20001"/>
+                      <a16:colId xmlns:a16="http://schemas.microsoft.com/office/drawing/2014/main" xmlns="" val="20001"/>
                     </a:ext>
                   </a:extLst>
                 </a:gridCol>
                 <a:gridCol w="2043964">
                   <a:extLst>
                     <a:ext uri="{9D8B030D-6E8A-4147-A177-3AD203B41FA5}">
-                      <a16:colId xmlns:a16="http://schemas.microsoft.com/office/drawing/2014/main" val="20002"/>
+                      <a16:colId xmlns:a16="http://schemas.microsoft.com/office/drawing/2014/main" xmlns="" val="20002"/>
                     </a:ext>
                   </a:extLst>
                 </a:gridCol>
@@ -4797,7 +5190,7 @@
                 </a:tc>
                 <a:extLst>
                   <a:ext uri="{0D108BD9-81ED-4DB2-BD59-A6C34878D82A}">
-                    <a16:rowId xmlns:a16="http://schemas.microsoft.com/office/drawing/2014/main" val="10000"/>
+                    <a16:rowId xmlns:a16="http://schemas.microsoft.com/office/drawing/2014/main" xmlns="" val="10000"/>
                   </a:ext>
                 </a:extLst>
               </a:tr>
@@ -4891,7 +5284,7 @@
                 </a:tc>
                 <a:extLst>
                   <a:ext uri="{0D108BD9-81ED-4DB2-BD59-A6C34878D82A}">
-                    <a16:rowId xmlns:a16="http://schemas.microsoft.com/office/drawing/2014/main" val="10001"/>
+                    <a16:rowId xmlns:a16="http://schemas.microsoft.com/office/drawing/2014/main" xmlns="" val="10001"/>
                   </a:ext>
                 </a:extLst>
               </a:tr>
@@ -5021,7 +5414,7 @@
                 </a:tc>
                 <a:extLst>
                   <a:ext uri="{0D108BD9-81ED-4DB2-BD59-A6C34878D82A}">
-                    <a16:rowId xmlns:a16="http://schemas.microsoft.com/office/drawing/2014/main" val="10002"/>
+                    <a16:rowId xmlns:a16="http://schemas.microsoft.com/office/drawing/2014/main" xmlns="" val="10002"/>
                   </a:ext>
                 </a:extLst>
               </a:tr>
@@ -5151,7 +5544,7 @@
                 </a:tc>
                 <a:extLst>
                   <a:ext uri="{0D108BD9-81ED-4DB2-BD59-A6C34878D82A}">
-                    <a16:rowId xmlns:a16="http://schemas.microsoft.com/office/drawing/2014/main" val="10003"/>
+                    <a16:rowId xmlns:a16="http://schemas.microsoft.com/office/drawing/2014/main" xmlns="" val="10003"/>
                   </a:ext>
                 </a:extLst>
               </a:tr>
@@ -5281,7 +5674,7 @@
                 </a:tc>
                 <a:extLst>
                   <a:ext uri="{0D108BD9-81ED-4DB2-BD59-A6C34878D82A}">
-                    <a16:rowId xmlns:a16="http://schemas.microsoft.com/office/drawing/2014/main" val="10004"/>
+                    <a16:rowId xmlns:a16="http://schemas.microsoft.com/office/drawing/2014/main" xmlns="" val="10004"/>
                   </a:ext>
                 </a:extLst>
               </a:tr>
@@ -5411,7 +5804,7 @@
                 </a:tc>
                 <a:extLst>
                   <a:ext uri="{0D108BD9-81ED-4DB2-BD59-A6C34878D82A}">
-                    <a16:rowId xmlns:a16="http://schemas.microsoft.com/office/drawing/2014/main" val="10005"/>
+                    <a16:rowId xmlns:a16="http://schemas.microsoft.com/office/drawing/2014/main" xmlns="" val="10005"/>
                   </a:ext>
                 </a:extLst>
               </a:tr>
@@ -5541,7 +5934,7 @@
                 </a:tc>
                 <a:extLst>
                   <a:ext uri="{0D108BD9-81ED-4DB2-BD59-A6C34878D82A}">
-                    <a16:rowId xmlns:a16="http://schemas.microsoft.com/office/drawing/2014/main" val="10006"/>
+                    <a16:rowId xmlns:a16="http://schemas.microsoft.com/office/drawing/2014/main" xmlns="" val="10006"/>
                   </a:ext>
                 </a:extLst>
               </a:tr>
@@ -5671,7 +6064,7 @@
                 </a:tc>
                 <a:extLst>
                   <a:ext uri="{0D108BD9-81ED-4DB2-BD59-A6C34878D82A}">
-                    <a16:rowId xmlns:a16="http://schemas.microsoft.com/office/drawing/2014/main" val="10007"/>
+                    <a16:rowId xmlns:a16="http://schemas.microsoft.com/office/drawing/2014/main" xmlns="" val="10007"/>
                   </a:ext>
                 </a:extLst>
               </a:tr>
@@ -5765,7 +6158,7 @@
                 </a:tc>
                 <a:extLst>
                   <a:ext uri="{0D108BD9-81ED-4DB2-BD59-A6C34878D82A}">
-                    <a16:rowId xmlns:a16="http://schemas.microsoft.com/office/drawing/2014/main" val="10008"/>
+                    <a16:rowId xmlns:a16="http://schemas.microsoft.com/office/drawing/2014/main" xmlns="" val="10008"/>
                   </a:ext>
                 </a:extLst>
               </a:tr>
@@ -5827,156 +6220,7 @@
           <p:cNvPr id="3" name="Slide Number Placeholder 2">
             <a:extLst>
               <a:ext uri="{FF2B5EF4-FFF2-40B4-BE49-F238E27FC236}">
-                <a16:creationId xmlns:a16="http://schemas.microsoft.com/office/drawing/2014/main" id="{D637FC5F-1629-47D5-A3A0-3A0A73136ED2}"/>
-              </a:ext>
-            </a:extLst>
-          </p:cNvPr>
-          <p:cNvSpPr>
-            <a:spLocks noGrp="1"/>
-          </p:cNvSpPr>
-          <p:nvPr>
-            <p:ph type="sldNum" sz="quarter" idx="12"/>
-          </p:nvPr>
-        </p:nvSpPr>
-        <p:spPr/>
-        <p:txBody>
-          <a:bodyPr/>
-          <a:lstStyle/>
-          <a:p>
-            <a:fld id="{875942D6-B7AA-482E-A111-0A2C783F5CFF}" type="slidenum">
-              <a:rPr lang="en-US" smtClean="0"/>
-              <a:t>15</a:t>
-            </a:fld>
-            <a:endParaRPr lang="en-US"/>
-          </a:p>
-        </p:txBody>
-      </p:sp>
-    </p:spTree>
-    <p:extLst>
-      <p:ext uri="{BB962C8B-B14F-4D97-AF65-F5344CB8AC3E}">
-        <p14:creationId xmlns:p14="http://schemas.microsoft.com/office/powerpoint/2010/main" val="3791623421"/>
-      </p:ext>
-    </p:extLst>
-  </p:cSld>
-  <p:clrMapOvr>
-    <a:masterClrMapping/>
-  </p:clrMapOvr>
-</p:sld>
-</file>
-
-<file path=ppt/slides/slide16.xml><?xml version="1.0" encoding="utf-8"?>
-<p:sld xmlns:a="http://schemas.openxmlformats.org/drawingml/2006/main" xmlns:r="http://schemas.openxmlformats.org/officeDocument/2006/relationships" xmlns:p="http://schemas.openxmlformats.org/presentationml/2006/main">
-  <p:cSld>
-    <p:spTree>
-      <p:nvGrpSpPr>
-        <p:cNvPr id="1" name=""/>
-        <p:cNvGrpSpPr/>
-        <p:nvPr/>
-      </p:nvGrpSpPr>
-      <p:grpSpPr>
-        <a:xfrm>
-          <a:off x="0" y="0"/>
-          <a:ext cx="0" cy="0"/>
-          <a:chOff x="0" y="0"/>
-          <a:chExt cx="0" cy="0"/>
-        </a:xfrm>
-      </p:grpSpPr>
-      <p:sp>
-        <p:nvSpPr>
-          <p:cNvPr id="2" name="Title 1"/>
-          <p:cNvSpPr>
-            <a:spLocks noGrp="1"/>
-          </p:cNvSpPr>
-          <p:nvPr>
-            <p:ph type="title"/>
-          </p:nvPr>
-        </p:nvSpPr>
-        <p:spPr/>
-        <p:txBody>
-          <a:bodyPr/>
-          <a:lstStyle/>
-          <a:p>
-            <a:r>
-              <a:rPr lang="en-IN" dirty="0">
-                <a:latin typeface="Times New Roman" panose="02020603050405020304" pitchFamily="18" charset="0"/>
-                <a:cs typeface="Times New Roman" panose="02020603050405020304" pitchFamily="18" charset="0"/>
-              </a:rPr>
-              <a:t>Conclusion</a:t>
-            </a:r>
-          </a:p>
-        </p:txBody>
-      </p:sp>
-      <p:sp>
-        <p:nvSpPr>
-          <p:cNvPr id="3" name="Content Placeholder 2"/>
-          <p:cNvSpPr>
-            <a:spLocks noGrp="1"/>
-          </p:cNvSpPr>
-          <p:nvPr>
-            <p:ph idx="1"/>
-          </p:nvPr>
-        </p:nvSpPr>
-        <p:spPr/>
-        <p:txBody>
-          <a:bodyPr/>
-          <a:lstStyle/>
-          <a:p>
-            <a:r>
-              <a:rPr lang="en-US" dirty="0">
-                <a:latin typeface="Times New Roman" panose="02020603050405020304" pitchFamily="18" charset="0"/>
-                <a:cs typeface="Times New Roman" panose="02020603050405020304" pitchFamily="18" charset="0"/>
-              </a:rPr>
-              <a:t>There is an slightly upwards trend in Export forecast and slightly downward trend in the Export forecast.</a:t>
-            </a:r>
-          </a:p>
-          <a:p>
-            <a:r>
-              <a:rPr lang="en-US" dirty="0">
-                <a:latin typeface="Times New Roman" panose="02020603050405020304" pitchFamily="18" charset="0"/>
-                <a:cs typeface="Times New Roman" panose="02020603050405020304" pitchFamily="18" charset="0"/>
-              </a:rPr>
-              <a:t>Seasonal ARIMA Perform better for Forecasting Export Data, which shows that ARIMA captures seasonality much better than any other model, even with </a:t>
-            </a:r>
-            <a:r>
-              <a:rPr lang="en-US" b="1" dirty="0">
-                <a:latin typeface="Times New Roman" panose="02020603050405020304" pitchFamily="18" charset="0"/>
-                <a:cs typeface="Times New Roman" panose="02020603050405020304" pitchFamily="18" charset="0"/>
-              </a:rPr>
-              <a:t>lesser data and randomness.</a:t>
-            </a:r>
-          </a:p>
-          <a:p>
-            <a:r>
-              <a:rPr lang="en-US" dirty="0">
-                <a:latin typeface="Times New Roman" panose="02020603050405020304" pitchFamily="18" charset="0"/>
-                <a:cs typeface="Times New Roman" panose="02020603050405020304" pitchFamily="18" charset="0"/>
-              </a:rPr>
-              <a:t>LSTM model performed better for Import Data because of it’s capability of retaining information of long period of time.</a:t>
-            </a:r>
-          </a:p>
-          <a:p>
-            <a:r>
-              <a:rPr lang="en-US" dirty="0">
-                <a:latin typeface="Times New Roman" panose="02020603050405020304" pitchFamily="18" charset="0"/>
-                <a:cs typeface="Times New Roman" panose="02020603050405020304" pitchFamily="18" charset="0"/>
-              </a:rPr>
-              <a:t>We’re in huge trade deficit (Export-Import) with China in terms of trade. Hence we need to make strict policies towards Chinese products as soon as possible.</a:t>
-            </a:r>
-          </a:p>
-          <a:p>
-            <a:endParaRPr lang="en-IN" dirty="0">
-              <a:latin typeface="Times New Roman" panose="02020603050405020304" pitchFamily="18" charset="0"/>
-              <a:cs typeface="Times New Roman" panose="02020603050405020304" pitchFamily="18" charset="0"/>
-            </a:endParaRPr>
-          </a:p>
-        </p:txBody>
-      </p:sp>
-      <p:sp>
-        <p:nvSpPr>
-          <p:cNvPr id="4" name="Slide Number Placeholder 3">
-            <a:extLst>
-              <a:ext uri="{FF2B5EF4-FFF2-40B4-BE49-F238E27FC236}">
-                <a16:creationId xmlns:a16="http://schemas.microsoft.com/office/drawing/2014/main" id="{5EB171F2-7743-4C10-A1C3-5323B50613A5}"/>
+                <a16:creationId xmlns:a16="http://schemas.microsoft.com/office/drawing/2014/main" xmlns="" id="{D637FC5F-1629-47D5-A3A0-3A0A73136ED2}"/>
               </a:ext>
             </a:extLst>
           </p:cNvPr>
@@ -6003,7 +6247,7 @@
     </p:spTree>
     <p:extLst>
       <p:ext uri="{BB962C8B-B14F-4D97-AF65-F5344CB8AC3E}">
-        <p14:creationId xmlns:p14="http://schemas.microsoft.com/office/powerpoint/2010/main" val="3961139742"/>
+        <p14:creationId xmlns:p14="http://schemas.microsoft.com/office/powerpoint/2010/main" val="3791623421"/>
       </p:ext>
     </p:extLst>
   </p:cSld>
@@ -6050,7 +6294,7 @@
                 <a:latin typeface="Times New Roman" panose="02020603050405020304" pitchFamily="18" charset="0"/>
                 <a:cs typeface="Times New Roman" panose="02020603050405020304" pitchFamily="18" charset="0"/>
               </a:rPr>
-              <a:t>Future Prospects</a:t>
+              <a:t>Conclusion</a:t>
             </a:r>
           </a:p>
         </p:txBody>
@@ -6070,61 +6314,87 @@
           <a:bodyPr/>
           <a:lstStyle/>
           <a:p>
-            <a:pPr lvl="0"/>
-            <a:r>
-              <a:rPr lang="en-US" dirty="0">
-                <a:latin typeface="Times New Roman" panose="02020603050405020304" pitchFamily="18" charset="0"/>
-                <a:cs typeface="Times New Roman" panose="02020603050405020304" pitchFamily="18" charset="0"/>
-              </a:rPr>
-              <a:t>Making Existing Models more robust by tuning them even more.</a:t>
-            </a:r>
-            <a:endParaRPr lang="en-IN" dirty="0">
+            <a:r>
+              <a:rPr lang="en-US" dirty="0">
+                <a:latin typeface="Times New Roman" panose="02020603050405020304" pitchFamily="18" charset="0"/>
+                <a:cs typeface="Times New Roman" panose="02020603050405020304" pitchFamily="18" charset="0"/>
+              </a:rPr>
+              <a:t>There is an slightly upwards trend in Export forecast and slightly downward trend in the Export forecast.</a:t>
+            </a:r>
+          </a:p>
+          <a:p>
+            <a:r>
+              <a:rPr lang="en-US" dirty="0">
+                <a:latin typeface="Times New Roman" panose="02020603050405020304" pitchFamily="18" charset="0"/>
+                <a:cs typeface="Times New Roman" panose="02020603050405020304" pitchFamily="18" charset="0"/>
+              </a:rPr>
+              <a:t>Seasonal ARIMA Perform better for Forecasting Export Data, which shows that ARIMA captures seasonality much better than any other model, even with </a:t>
+            </a:r>
+            <a:r>
+              <a:rPr lang="en-US" b="1" dirty="0">
+                <a:latin typeface="Times New Roman" panose="02020603050405020304" pitchFamily="18" charset="0"/>
+                <a:cs typeface="Times New Roman" panose="02020603050405020304" pitchFamily="18" charset="0"/>
+              </a:rPr>
+              <a:t>lesser data and randomness.</a:t>
+            </a:r>
+          </a:p>
+          <a:p>
+            <a:r>
+              <a:rPr lang="en-US" dirty="0">
+                <a:latin typeface="Times New Roman" panose="02020603050405020304" pitchFamily="18" charset="0"/>
+                <a:cs typeface="Times New Roman" panose="02020603050405020304" pitchFamily="18" charset="0"/>
+              </a:rPr>
+              <a:t>LSTM model performed better for Import Data because of it’s capability of retaining information </a:t>
+            </a:r>
+            <a:r>
+              <a:rPr lang="en-US" dirty="0" smtClean="0">
+                <a:latin typeface="Times New Roman" panose="02020603050405020304" pitchFamily="18" charset="0"/>
+                <a:cs typeface="Times New Roman" panose="02020603050405020304" pitchFamily="18" charset="0"/>
+              </a:rPr>
+              <a:t>for </a:t>
+            </a:r>
+            <a:r>
+              <a:rPr lang="en-US" dirty="0">
+                <a:latin typeface="Times New Roman" panose="02020603050405020304" pitchFamily="18" charset="0"/>
+                <a:cs typeface="Times New Roman" panose="02020603050405020304" pitchFamily="18" charset="0"/>
+              </a:rPr>
+              <a:t>long </a:t>
+            </a:r>
+            <a:r>
+              <a:rPr lang="en-US" dirty="0" smtClean="0">
+                <a:latin typeface="Times New Roman" panose="02020603050405020304" pitchFamily="18" charset="0"/>
+                <a:cs typeface="Times New Roman" panose="02020603050405020304" pitchFamily="18" charset="0"/>
+              </a:rPr>
+              <a:t>periods </a:t>
+            </a:r>
+            <a:r>
+              <a:rPr lang="en-US" dirty="0">
+                <a:latin typeface="Times New Roman" panose="02020603050405020304" pitchFamily="18" charset="0"/>
+                <a:cs typeface="Times New Roman" panose="02020603050405020304" pitchFamily="18" charset="0"/>
+              </a:rPr>
+              <a:t>of time.</a:t>
+            </a:r>
+          </a:p>
+          <a:p>
+            <a:r>
+              <a:rPr lang="en-US" dirty="0">
+                <a:latin typeface="Times New Roman" panose="02020603050405020304" pitchFamily="18" charset="0"/>
+                <a:cs typeface="Times New Roman" panose="02020603050405020304" pitchFamily="18" charset="0"/>
+              </a:rPr>
+              <a:t>We’re in huge trade deficit (Export-Import) with China in terms of trade. Hence we need to make strict policies towards Chinese products as soon as possible</a:t>
+            </a:r>
+            <a:r>
+              <a:rPr lang="en-US" dirty="0" smtClean="0">
+                <a:latin typeface="Times New Roman" panose="02020603050405020304" pitchFamily="18" charset="0"/>
+                <a:cs typeface="Times New Roman" panose="02020603050405020304" pitchFamily="18" charset="0"/>
+              </a:rPr>
+              <a:t>.</a:t>
+            </a:r>
+            <a:endParaRPr lang="en-US" dirty="0">
               <a:latin typeface="Times New Roman" panose="02020603050405020304" pitchFamily="18" charset="0"/>
               <a:cs typeface="Times New Roman" panose="02020603050405020304" pitchFamily="18" charset="0"/>
             </a:endParaRPr>
           </a:p>
-          <a:p>
-            <a:pPr lvl="0"/>
-            <a:r>
-              <a:rPr lang="en-US" dirty="0">
-                <a:latin typeface="Times New Roman" panose="02020603050405020304" pitchFamily="18" charset="0"/>
-                <a:cs typeface="Times New Roman" panose="02020603050405020304" pitchFamily="18" charset="0"/>
-              </a:rPr>
-              <a:t>Using New models specially Attention Models which can even store more information than LSTMs.</a:t>
-            </a:r>
-            <a:endParaRPr lang="en-IN" dirty="0">
-              <a:latin typeface="Times New Roman" panose="02020603050405020304" pitchFamily="18" charset="0"/>
-              <a:cs typeface="Times New Roman" panose="02020603050405020304" pitchFamily="18" charset="0"/>
-            </a:endParaRPr>
-          </a:p>
-          <a:p>
-            <a:pPr lvl="0"/>
-            <a:r>
-              <a:rPr lang="en-US" dirty="0">
-                <a:latin typeface="Times New Roman" panose="02020603050405020304" pitchFamily="18" charset="0"/>
-                <a:cs typeface="Times New Roman" panose="02020603050405020304" pitchFamily="18" charset="0"/>
-              </a:rPr>
-              <a:t>Include some factor to encounter the randomness in data which causes high frequency fluctuations which in turn results in below expected performance of models.</a:t>
-            </a:r>
-            <a:endParaRPr lang="en-IN" dirty="0">
-              <a:latin typeface="Times New Roman" panose="02020603050405020304" pitchFamily="18" charset="0"/>
-              <a:cs typeface="Times New Roman" panose="02020603050405020304" pitchFamily="18" charset="0"/>
-            </a:endParaRPr>
-          </a:p>
-          <a:p>
-            <a:pPr lvl="0"/>
-            <a:r>
-              <a:rPr lang="en-US" dirty="0">
-                <a:latin typeface="Times New Roman" panose="02020603050405020304" pitchFamily="18" charset="0"/>
-                <a:cs typeface="Times New Roman" panose="02020603050405020304" pitchFamily="18" charset="0"/>
-              </a:rPr>
-              <a:t>Getting more data points for better forecasting specially for LSTM model since it operates on a neural network which needs more and more data for better predictions.</a:t>
-            </a:r>
-            <a:endParaRPr lang="en-IN" dirty="0">
-              <a:latin typeface="Times New Roman" panose="02020603050405020304" pitchFamily="18" charset="0"/>
-              <a:cs typeface="Times New Roman" panose="02020603050405020304" pitchFamily="18" charset="0"/>
-            </a:endParaRPr>
-          </a:p>
         </p:txBody>
       </p:sp>
       <p:sp>
@@ -6132,7 +6402,7 @@
           <p:cNvPr id="4" name="Slide Number Placeholder 3">
             <a:extLst>
               <a:ext uri="{FF2B5EF4-FFF2-40B4-BE49-F238E27FC236}">
-                <a16:creationId xmlns:a16="http://schemas.microsoft.com/office/drawing/2014/main" id="{F4CAD629-4519-4FAA-BFF2-E80BBA664C96}"/>
+                <a16:creationId xmlns:a16="http://schemas.microsoft.com/office/drawing/2014/main" xmlns="" id="{5EB171F2-7743-4C10-A1C3-5323B50613A5}"/>
               </a:ext>
             </a:extLst>
           </p:cNvPr>
@@ -6159,7 +6429,7 @@
     </p:spTree>
     <p:extLst>
       <p:ext uri="{BB962C8B-B14F-4D97-AF65-F5344CB8AC3E}">
-        <p14:creationId xmlns:p14="http://schemas.microsoft.com/office/powerpoint/2010/main" val="1758375041"/>
+        <p14:creationId xmlns:p14="http://schemas.microsoft.com/office/powerpoint/2010/main" val="3961139742"/>
       </p:ext>
     </p:extLst>
   </p:cSld>
@@ -6193,7 +6463,7 @@
             <a:spLocks noGrp="1"/>
           </p:cNvSpPr>
           <p:nvPr>
-            <p:ph type="ctrTitle"/>
+            <p:ph type="title"/>
           </p:nvPr>
         </p:nvSpPr>
         <p:spPr/>
@@ -6206,17 +6476,145 @@
                 <a:latin typeface="Times New Roman" panose="02020603050405020304" pitchFamily="18" charset="0"/>
                 <a:cs typeface="Times New Roman" panose="02020603050405020304" pitchFamily="18" charset="0"/>
               </a:rPr>
-              <a:t>Thank You!</a:t>
-            </a:r>
-          </a:p>
-        </p:txBody>
-      </p:sp>
-      <p:sp>
-        <p:nvSpPr>
-          <p:cNvPr id="3" name="Slide Number Placeholder 2">
+              <a:t>Future Prospects</a:t>
+            </a:r>
+          </a:p>
+        </p:txBody>
+      </p:sp>
+      <p:sp>
+        <p:nvSpPr>
+          <p:cNvPr id="3" name="Content Placeholder 2"/>
+          <p:cNvSpPr>
+            <a:spLocks noGrp="1"/>
+          </p:cNvSpPr>
+          <p:nvPr>
+            <p:ph idx="1"/>
+          </p:nvPr>
+        </p:nvSpPr>
+        <p:spPr/>
+        <p:txBody>
+          <a:bodyPr/>
+          <a:lstStyle/>
+          <a:p>
+            <a:pPr lvl="0"/>
+            <a:r>
+              <a:rPr lang="en-US" dirty="0">
+                <a:latin typeface="Times New Roman" panose="02020603050405020304" pitchFamily="18" charset="0"/>
+                <a:cs typeface="Times New Roman" panose="02020603050405020304" pitchFamily="18" charset="0"/>
+              </a:rPr>
+              <a:t>Making Existing Models more robust by tuning them even more.</a:t>
+            </a:r>
+            <a:endParaRPr lang="en-IN" dirty="0">
+              <a:latin typeface="Times New Roman" panose="02020603050405020304" pitchFamily="18" charset="0"/>
+              <a:cs typeface="Times New Roman" panose="02020603050405020304" pitchFamily="18" charset="0"/>
+            </a:endParaRPr>
+          </a:p>
+          <a:p>
+            <a:pPr lvl="0"/>
+            <a:r>
+              <a:rPr lang="en-US" dirty="0">
+                <a:latin typeface="Times New Roman" panose="02020603050405020304" pitchFamily="18" charset="0"/>
+                <a:cs typeface="Times New Roman" panose="02020603050405020304" pitchFamily="18" charset="0"/>
+              </a:rPr>
+              <a:t>Using New models specially Attention Models which can even store more information than LSTMs.</a:t>
+            </a:r>
+            <a:endParaRPr lang="en-IN" dirty="0">
+              <a:latin typeface="Times New Roman" panose="02020603050405020304" pitchFamily="18" charset="0"/>
+              <a:cs typeface="Times New Roman" panose="02020603050405020304" pitchFamily="18" charset="0"/>
+            </a:endParaRPr>
+          </a:p>
+          <a:p>
+            <a:pPr lvl="0"/>
+            <a:r>
+              <a:rPr lang="en-US" dirty="0">
+                <a:latin typeface="Times New Roman" panose="02020603050405020304" pitchFamily="18" charset="0"/>
+                <a:cs typeface="Times New Roman" panose="02020603050405020304" pitchFamily="18" charset="0"/>
+              </a:rPr>
+              <a:t>Include some factor to encounter the randomness in data which causes high frequency fluctuations which </a:t>
+            </a:r>
+            <a:r>
+              <a:rPr lang="en-US" dirty="0" smtClean="0">
+                <a:latin typeface="Times New Roman" panose="02020603050405020304" pitchFamily="18" charset="0"/>
+                <a:cs typeface="Times New Roman" panose="02020603050405020304" pitchFamily="18" charset="0"/>
+              </a:rPr>
+              <a:t>results </a:t>
+            </a:r>
+            <a:r>
+              <a:rPr lang="en-US" dirty="0">
+                <a:latin typeface="Times New Roman" panose="02020603050405020304" pitchFamily="18" charset="0"/>
+                <a:cs typeface="Times New Roman" panose="02020603050405020304" pitchFamily="18" charset="0"/>
+              </a:rPr>
+              <a:t>in </a:t>
+            </a:r>
+            <a:r>
+              <a:rPr lang="en-US" dirty="0" smtClean="0">
+                <a:latin typeface="Times New Roman" panose="02020603050405020304" pitchFamily="18" charset="0"/>
+                <a:cs typeface="Times New Roman" panose="02020603050405020304" pitchFamily="18" charset="0"/>
+              </a:rPr>
+              <a:t>under-performance </a:t>
+            </a:r>
+            <a:r>
+              <a:rPr lang="en-US" dirty="0">
+                <a:latin typeface="Times New Roman" panose="02020603050405020304" pitchFamily="18" charset="0"/>
+                <a:cs typeface="Times New Roman" panose="02020603050405020304" pitchFamily="18" charset="0"/>
+              </a:rPr>
+              <a:t>of models.</a:t>
+            </a:r>
+            <a:endParaRPr lang="en-IN" dirty="0">
+              <a:latin typeface="Times New Roman" panose="02020603050405020304" pitchFamily="18" charset="0"/>
+              <a:cs typeface="Times New Roman" panose="02020603050405020304" pitchFamily="18" charset="0"/>
+            </a:endParaRPr>
+          </a:p>
+          <a:p>
+            <a:pPr lvl="0"/>
+            <a:r>
+              <a:rPr lang="en-US" dirty="0">
+                <a:latin typeface="Times New Roman" panose="02020603050405020304" pitchFamily="18" charset="0"/>
+                <a:cs typeface="Times New Roman" panose="02020603050405020304" pitchFamily="18" charset="0"/>
+              </a:rPr>
+              <a:t>Getting more data points for better forecasting specially for LSTM model </a:t>
+            </a:r>
+            <a:r>
+              <a:rPr lang="en-US" dirty="0" smtClean="0">
+                <a:latin typeface="Times New Roman" panose="02020603050405020304" pitchFamily="18" charset="0"/>
+                <a:cs typeface="Times New Roman" panose="02020603050405020304" pitchFamily="18" charset="0"/>
+              </a:rPr>
+              <a:t>since </a:t>
+            </a:r>
+            <a:r>
+              <a:rPr lang="en-US" dirty="0">
+                <a:latin typeface="Times New Roman" panose="02020603050405020304" pitchFamily="18" charset="0"/>
+                <a:cs typeface="Times New Roman" panose="02020603050405020304" pitchFamily="18" charset="0"/>
+              </a:rPr>
+              <a:t>a neural </a:t>
+            </a:r>
+            <a:r>
+              <a:rPr lang="en-US" dirty="0" smtClean="0">
+                <a:latin typeface="Times New Roman" panose="02020603050405020304" pitchFamily="18" charset="0"/>
+                <a:cs typeface="Times New Roman" panose="02020603050405020304" pitchFamily="18" charset="0"/>
+              </a:rPr>
+              <a:t>network </a:t>
+            </a:r>
+            <a:r>
+              <a:rPr lang="en-US" dirty="0">
+                <a:latin typeface="Times New Roman" panose="02020603050405020304" pitchFamily="18" charset="0"/>
+                <a:cs typeface="Times New Roman" panose="02020603050405020304" pitchFamily="18" charset="0"/>
+              </a:rPr>
+              <a:t>needs more and more data for better predictions.</a:t>
+            </a:r>
+            <a:endParaRPr lang="en-IN" dirty="0">
+              <a:latin typeface="Times New Roman" panose="02020603050405020304" pitchFamily="18" charset="0"/>
+              <a:cs typeface="Times New Roman" panose="02020603050405020304" pitchFamily="18" charset="0"/>
+            </a:endParaRPr>
+          </a:p>
+        </p:txBody>
+      </p:sp>
+      <p:sp>
+        <p:nvSpPr>
+          <p:cNvPr id="4" name="Slide Number Placeholder 3">
             <a:extLst>
               <a:ext uri="{FF2B5EF4-FFF2-40B4-BE49-F238E27FC236}">
-                <a16:creationId xmlns:a16="http://schemas.microsoft.com/office/drawing/2014/main" id="{CF50768F-32BC-4171-85D7-92F5DC437E5E}"/>
+                <a16:creationId xmlns:a16="http://schemas.microsoft.com/office/drawing/2014/main" xmlns="" id="{F4CAD629-4519-4FAA-BFF2-E80BBA664C96}"/>
               </a:ext>
             </a:extLst>
           </p:cNvPr>
@@ -6243,7 +6641,324 @@
     </p:spTree>
     <p:extLst>
       <p:ext uri="{BB962C8B-B14F-4D97-AF65-F5344CB8AC3E}">
-        <p14:creationId xmlns:p14="http://schemas.microsoft.com/office/powerpoint/2010/main" val="2706848313"/>
+        <p14:creationId xmlns:p14="http://schemas.microsoft.com/office/powerpoint/2010/main" val="1758375041"/>
+      </p:ext>
+    </p:extLst>
+  </p:cSld>
+  <p:clrMapOvr>
+    <a:masterClrMapping/>
+  </p:clrMapOvr>
+</p:sld>
+</file>
+
+<file path=ppt/slides/slide19.xml><?xml version="1.0" encoding="utf-8"?>
+<p:sld xmlns:a="http://schemas.openxmlformats.org/drawingml/2006/main" xmlns:r="http://schemas.openxmlformats.org/officeDocument/2006/relationships" xmlns:p="http://schemas.openxmlformats.org/presentationml/2006/main">
+  <p:cSld>
+    <p:spTree>
+      <p:nvGrpSpPr>
+        <p:cNvPr id="1" name=""/>
+        <p:cNvGrpSpPr/>
+        <p:nvPr/>
+      </p:nvGrpSpPr>
+      <p:grpSpPr>
+        <a:xfrm>
+          <a:off x="0" y="0"/>
+          <a:ext cx="0" cy="0"/>
+          <a:chOff x="0" y="0"/>
+          <a:chExt cx="0" cy="0"/>
+        </a:xfrm>
+      </p:grpSpPr>
+      <p:sp>
+        <p:nvSpPr>
+          <p:cNvPr id="2" name="Title 1"/>
+          <p:cNvSpPr>
+            <a:spLocks noGrp="1"/>
+          </p:cNvSpPr>
+          <p:nvPr>
+            <p:ph type="title"/>
+          </p:nvPr>
+        </p:nvSpPr>
+        <p:spPr/>
+        <p:txBody>
+          <a:bodyPr/>
+          <a:lstStyle/>
+          <a:p>
+            <a:r>
+              <a:rPr lang="en-IN" dirty="0" smtClean="0"/>
+              <a:t>References</a:t>
+            </a:r>
+            <a:endParaRPr lang="en-IN" dirty="0"/>
+          </a:p>
+        </p:txBody>
+      </p:sp>
+      <p:sp>
+        <p:nvSpPr>
+          <p:cNvPr id="3" name="Content Placeholder 2"/>
+          <p:cNvSpPr>
+            <a:spLocks noGrp="1"/>
+          </p:cNvSpPr>
+          <p:nvPr>
+            <p:ph idx="1"/>
+          </p:nvPr>
+        </p:nvSpPr>
+        <p:spPr/>
+        <p:txBody>
+          <a:bodyPr/>
+          <a:lstStyle/>
+          <a:p>
+            <a:r>
+              <a:rPr lang="en-IN" dirty="0"/>
+              <a:t>Chatfield, C. "The Holt-Winters Forecasting Procedure." </a:t>
+            </a:r>
+            <a:r>
+              <a:rPr lang="en-IN" dirty="0" err="1"/>
+              <a:t>ResearchGate</a:t>
+            </a:r>
+            <a:r>
+              <a:rPr lang="en-IN" dirty="0"/>
+              <a:t>, 1978</a:t>
+            </a:r>
+            <a:r>
+              <a:rPr lang="en-IN" dirty="0" smtClean="0"/>
+              <a:t>.</a:t>
+            </a:r>
+          </a:p>
+          <a:p>
+            <a:r>
+              <a:rPr lang="en-IN" dirty="0" err="1" smtClean="0"/>
+              <a:t>Lyashenko</a:t>
+            </a:r>
+            <a:r>
+              <a:rPr lang="en-IN" dirty="0"/>
+              <a:t>, Oksana. "The Application of the ARIMA-models for forecasting the Dynamics of Foreign Trade of Ukraine." </a:t>
+            </a:r>
+            <a:r>
+              <a:rPr lang="en-IN" dirty="0" err="1"/>
+              <a:t>ResearchGate</a:t>
+            </a:r>
+            <a:r>
+              <a:rPr lang="en-IN" dirty="0"/>
+              <a:t>, 2020</a:t>
+            </a:r>
+            <a:r>
+              <a:rPr lang="en-IN" dirty="0" smtClean="0"/>
+              <a:t>.</a:t>
+            </a:r>
+          </a:p>
+          <a:p>
+            <a:r>
+              <a:rPr lang="en-IN" dirty="0" err="1" smtClean="0"/>
+              <a:t>Nimisha</a:t>
+            </a:r>
+            <a:r>
+              <a:rPr lang="en-IN" dirty="0" smtClean="0"/>
+              <a:t> </a:t>
+            </a:r>
+            <a:r>
+              <a:rPr lang="en-IN" dirty="0" err="1"/>
+              <a:t>Tomar</a:t>
+            </a:r>
+            <a:r>
+              <a:rPr lang="en-IN" dirty="0"/>
+              <a:t>, </a:t>
+            </a:r>
+            <a:r>
+              <a:rPr lang="en-IN" dirty="0" err="1"/>
+              <a:t>Durga</a:t>
+            </a:r>
+            <a:r>
+              <a:rPr lang="en-IN" dirty="0"/>
+              <a:t> Patel, </a:t>
+            </a:r>
+            <a:r>
+              <a:rPr lang="en-IN" dirty="0" err="1"/>
+              <a:t>Akshat</a:t>
+            </a:r>
+            <a:r>
+              <a:rPr lang="en-IN" dirty="0"/>
+              <a:t> Jain. "Air Quality Index Forecasting using Auto-regression Models." </a:t>
+            </a:r>
+            <a:r>
+              <a:rPr lang="en-IN" dirty="0" err="1"/>
+              <a:t>ResearchGate</a:t>
+            </a:r>
+            <a:r>
+              <a:rPr lang="en-IN" dirty="0"/>
+              <a:t>, 2020</a:t>
+            </a:r>
+            <a:r>
+              <a:rPr lang="en-IN" dirty="0" smtClean="0"/>
+              <a:t>.</a:t>
+            </a:r>
+          </a:p>
+          <a:p>
+            <a:r>
+              <a:rPr lang="en-IN" dirty="0" smtClean="0"/>
+              <a:t>S</a:t>
+            </a:r>
+            <a:r>
+              <a:rPr lang="en-IN" dirty="0"/>
+              <a:t>. </a:t>
+            </a:r>
+            <a:r>
+              <a:rPr lang="en-IN" dirty="0" err="1"/>
+              <a:t>Vemuri,R</a:t>
+            </a:r>
+            <a:r>
+              <a:rPr lang="en-IN" dirty="0"/>
+              <a:t>. </a:t>
+            </a:r>
+            <a:r>
+              <a:rPr lang="en-IN" dirty="0" err="1"/>
+              <a:t>Balasubramanian</a:t>
+            </a:r>
+            <a:r>
+              <a:rPr lang="en-IN" dirty="0"/>
+              <a:t>, E.F. Hill. "Load Forecasting using Moving Average Stochastic Models." </a:t>
+            </a:r>
+            <a:r>
+              <a:rPr lang="en-IN" dirty="0" err="1"/>
+              <a:t>ResearchGate</a:t>
+            </a:r>
+            <a:r>
+              <a:rPr lang="en-IN" dirty="0"/>
+              <a:t>, 1974</a:t>
+            </a:r>
+            <a:r>
+              <a:rPr lang="en-IN" dirty="0" smtClean="0"/>
+              <a:t>.</a:t>
+            </a:r>
+          </a:p>
+          <a:p>
+            <a:r>
+              <a:rPr lang="en-IN" dirty="0" err="1" smtClean="0"/>
+              <a:t>Sandip</a:t>
+            </a:r>
+            <a:r>
+              <a:rPr lang="en-IN" dirty="0" smtClean="0"/>
+              <a:t> </a:t>
+            </a:r>
+            <a:r>
+              <a:rPr lang="en-IN" dirty="0"/>
+              <a:t>Roy, </a:t>
+            </a:r>
+            <a:r>
+              <a:rPr lang="en-IN" dirty="0" err="1"/>
+              <a:t>Sankar</a:t>
+            </a:r>
+            <a:r>
+              <a:rPr lang="en-IN" dirty="0"/>
+              <a:t> Prasad </a:t>
+            </a:r>
+            <a:r>
+              <a:rPr lang="en-IN" dirty="0" err="1"/>
+              <a:t>Biswas</a:t>
+            </a:r>
+            <a:r>
+              <a:rPr lang="en-IN" dirty="0"/>
+              <a:t>, </a:t>
+            </a:r>
+            <a:r>
+              <a:rPr lang="en-IN" dirty="0" err="1"/>
+              <a:t>Subhajyoti</a:t>
+            </a:r>
+            <a:r>
+              <a:rPr lang="en-IN" dirty="0"/>
+              <a:t> </a:t>
+            </a:r>
+            <a:r>
+              <a:rPr lang="en-IN" dirty="0" err="1"/>
+              <a:t>Mahata</a:t>
+            </a:r>
+            <a:r>
+              <a:rPr lang="en-IN" dirty="0"/>
+              <a:t>, Rajesh Bose. "Time Series Forecasting using Exponential Smoothing to Predict the Major Atmospheric Pollutants." </a:t>
+            </a:r>
+            <a:r>
+              <a:rPr lang="en-IN" dirty="0" err="1"/>
+              <a:t>ResearchGate</a:t>
+            </a:r>
+            <a:r>
+              <a:rPr lang="en-IN" dirty="0"/>
+              <a:t>, 2018</a:t>
+            </a:r>
+            <a:r>
+              <a:rPr lang="en-IN" dirty="0" smtClean="0"/>
+              <a:t>.</a:t>
+            </a:r>
+          </a:p>
+          <a:p>
+            <a:r>
+              <a:rPr lang="en-IN" dirty="0" smtClean="0"/>
+              <a:t>Yi-Ting </a:t>
+            </a:r>
+            <a:r>
+              <a:rPr lang="en-IN" dirty="0"/>
+              <a:t>Tsai, Yu-</a:t>
+            </a:r>
+            <a:r>
+              <a:rPr lang="en-IN" dirty="0" err="1"/>
+              <a:t>Ren</a:t>
+            </a:r>
+            <a:r>
+              <a:rPr lang="en-IN" dirty="0"/>
+              <a:t> </a:t>
+            </a:r>
+            <a:r>
+              <a:rPr lang="en-IN" dirty="0" err="1"/>
+              <a:t>Zeng</a:t>
+            </a:r>
+            <a:r>
+              <a:rPr lang="en-IN" dirty="0"/>
+              <a:t>, </a:t>
+            </a:r>
+            <a:r>
+              <a:rPr lang="en-IN" dirty="0" err="1"/>
+              <a:t>Yue</a:t>
+            </a:r>
+            <a:r>
+              <a:rPr lang="en-IN" dirty="0"/>
+              <a:t>-Shan Chang. "Air Pollution Forecasting Using RNN with LSTM." </a:t>
+            </a:r>
+            <a:r>
+              <a:rPr lang="en-IN" dirty="0" err="1"/>
+              <a:t>ReasearchGate</a:t>
+            </a:r>
+            <a:r>
+              <a:rPr lang="en-IN" dirty="0"/>
+              <a:t>, 2018</a:t>
+            </a:r>
+            <a:endParaRPr lang="en-IN" dirty="0"/>
+          </a:p>
+        </p:txBody>
+      </p:sp>
+      <p:sp>
+        <p:nvSpPr>
+          <p:cNvPr id="4" name="Slide Number Placeholder 3"/>
+          <p:cNvSpPr>
+            <a:spLocks noGrp="1"/>
+          </p:cNvSpPr>
+          <p:nvPr>
+            <p:ph type="sldNum" sz="quarter" idx="12"/>
+          </p:nvPr>
+        </p:nvSpPr>
+        <p:spPr/>
+        <p:txBody>
+          <a:bodyPr/>
+          <a:lstStyle/>
+          <a:p>
+            <a:fld id="{875942D6-B7AA-482E-A111-0A2C783F5CFF}" type="slidenum">
+              <a:rPr lang="en-US" smtClean="0"/>
+              <a:t>19</a:t>
+            </a:fld>
+            <a:endParaRPr lang="en-US"/>
+          </a:p>
+        </p:txBody>
+      </p:sp>
+    </p:spTree>
+    <p:extLst>
+      <p:ext uri="{BB962C8B-B14F-4D97-AF65-F5344CB8AC3E}">
+        <p14:creationId xmlns:p14="http://schemas.microsoft.com/office/powerpoint/2010/main" val="1370063205"/>
       </p:ext>
     </p:extLst>
   </p:cSld>
@@ -6275,7 +6990,7 @@
           <p:cNvPr id="2" name="Title 1">
             <a:extLst>
               <a:ext uri="{FF2B5EF4-FFF2-40B4-BE49-F238E27FC236}">
-                <a16:creationId xmlns:a16="http://schemas.microsoft.com/office/drawing/2014/main" id="{AEADAB91-8980-4F53-9688-21BED7326DE7}"/>
+                <a16:creationId xmlns:a16="http://schemas.microsoft.com/office/drawing/2014/main" xmlns="" id="{AEADAB91-8980-4F53-9688-21BED7326DE7}"/>
               </a:ext>
             </a:extLst>
           </p:cNvPr>
@@ -6306,7 +7021,7 @@
           <p:cNvPr id="3" name="Content Placeholder 2">
             <a:extLst>
               <a:ext uri="{FF2B5EF4-FFF2-40B4-BE49-F238E27FC236}">
-                <a16:creationId xmlns:a16="http://schemas.microsoft.com/office/drawing/2014/main" id="{A879210D-023D-4D55-84FD-4CB00233888D}"/>
+                <a16:creationId xmlns:a16="http://schemas.microsoft.com/office/drawing/2014/main" xmlns="" id="{A879210D-023D-4D55-84FD-4CB00233888D}"/>
               </a:ext>
             </a:extLst>
           </p:cNvPr>
@@ -6345,8 +7060,49 @@
                 <a:latin typeface="Times New Roman" panose="02020603050405020304" pitchFamily="18" charset="0"/>
                 <a:cs typeface="Times New Roman" panose="02020603050405020304" pitchFamily="18" charset="0"/>
               </a:rPr>
-              <a:t>India doesn’t produce petroleum products so we import it from Arab countries and sell commodities like metals, pearls, clothes and mineral oils, which are rich in the country.</a:t>
-            </a:r>
+              <a:t>India doesn’t produce petroleum products so we import it from Arab countries and </a:t>
+            </a:r>
+            <a:r>
+              <a:rPr lang="en-US" dirty="0" smtClean="0">
+                <a:latin typeface="Times New Roman" panose="02020603050405020304" pitchFamily="18" charset="0"/>
+                <a:cs typeface="Times New Roman" panose="02020603050405020304" pitchFamily="18" charset="0"/>
+              </a:rPr>
+              <a:t>export</a:t>
+            </a:r>
+            <a:r>
+              <a:rPr lang="en-US" dirty="0" smtClean="0">
+                <a:latin typeface="Times New Roman" panose="02020603050405020304" pitchFamily="18" charset="0"/>
+                <a:cs typeface="Times New Roman" panose="02020603050405020304" pitchFamily="18" charset="0"/>
+              </a:rPr>
+              <a:t> </a:t>
+            </a:r>
+            <a:r>
+              <a:rPr lang="en-US" dirty="0">
+                <a:latin typeface="Times New Roman" panose="02020603050405020304" pitchFamily="18" charset="0"/>
+                <a:cs typeface="Times New Roman" panose="02020603050405020304" pitchFamily="18" charset="0"/>
+              </a:rPr>
+              <a:t>commodities like metals, pearls, clothes and mineral </a:t>
+            </a:r>
+            <a:r>
+              <a:rPr lang="en-US" dirty="0" smtClean="0">
+                <a:latin typeface="Times New Roman" panose="02020603050405020304" pitchFamily="18" charset="0"/>
+                <a:cs typeface="Times New Roman" panose="02020603050405020304" pitchFamily="18" charset="0"/>
+              </a:rPr>
+              <a:t>oils to them.</a:t>
+            </a:r>
+          </a:p>
+          <a:p>
+            <a:r>
+              <a:rPr lang="en-US" dirty="0" smtClean="0">
+                <a:latin typeface="Times New Roman" panose="02020603050405020304" pitchFamily="18" charset="0"/>
+                <a:cs typeface="Times New Roman" panose="02020603050405020304" pitchFamily="18" charset="0"/>
+              </a:rPr>
+              <a:t>This way countries help each other using trade.</a:t>
+            </a:r>
+            <a:endParaRPr lang="en-US" dirty="0">
+              <a:latin typeface="Times New Roman" panose="02020603050405020304" pitchFamily="18" charset="0"/>
+              <a:cs typeface="Times New Roman" panose="02020603050405020304" pitchFamily="18" charset="0"/>
+            </a:endParaRPr>
           </a:p>
         </p:txBody>
       </p:sp>
@@ -6355,7 +7111,7 @@
           <p:cNvPr id="4" name="Slide Number Placeholder 3">
             <a:extLst>
               <a:ext uri="{FF2B5EF4-FFF2-40B4-BE49-F238E27FC236}">
-                <a16:creationId xmlns:a16="http://schemas.microsoft.com/office/drawing/2014/main" id="{66E1CA14-90D6-43A5-9C6F-E30227221CD7}"/>
+                <a16:creationId xmlns:a16="http://schemas.microsoft.com/office/drawing/2014/main" xmlns="" id="{66E1CA14-90D6-43A5-9C6F-E30227221CD7}"/>
               </a:ext>
             </a:extLst>
           </p:cNvPr>
@@ -6383,6 +7139,90 @@
     <p:extLst>
       <p:ext uri="{BB962C8B-B14F-4D97-AF65-F5344CB8AC3E}">
         <p14:creationId xmlns:p14="http://schemas.microsoft.com/office/powerpoint/2010/main" val="2327078328"/>
+      </p:ext>
+    </p:extLst>
+  </p:cSld>
+  <p:clrMapOvr>
+    <a:masterClrMapping/>
+  </p:clrMapOvr>
+</p:sld>
+</file>
+
+<file path=ppt/slides/slide20.xml><?xml version="1.0" encoding="utf-8"?>
+<p:sld xmlns:a="http://schemas.openxmlformats.org/drawingml/2006/main" xmlns:r="http://schemas.openxmlformats.org/officeDocument/2006/relationships" xmlns:p="http://schemas.openxmlformats.org/presentationml/2006/main">
+  <p:cSld>
+    <p:spTree>
+      <p:nvGrpSpPr>
+        <p:cNvPr id="1" name=""/>
+        <p:cNvGrpSpPr/>
+        <p:nvPr/>
+      </p:nvGrpSpPr>
+      <p:grpSpPr>
+        <a:xfrm>
+          <a:off x="0" y="0"/>
+          <a:ext cx="0" cy="0"/>
+          <a:chOff x="0" y="0"/>
+          <a:chExt cx="0" cy="0"/>
+        </a:xfrm>
+      </p:grpSpPr>
+      <p:sp>
+        <p:nvSpPr>
+          <p:cNvPr id="2" name="Title 1"/>
+          <p:cNvSpPr>
+            <a:spLocks noGrp="1"/>
+          </p:cNvSpPr>
+          <p:nvPr>
+            <p:ph type="ctrTitle"/>
+          </p:nvPr>
+        </p:nvSpPr>
+        <p:spPr/>
+        <p:txBody>
+          <a:bodyPr/>
+          <a:lstStyle/>
+          <a:p>
+            <a:r>
+              <a:rPr lang="en-IN" dirty="0">
+                <a:latin typeface="Times New Roman" panose="02020603050405020304" pitchFamily="18" charset="0"/>
+                <a:cs typeface="Times New Roman" panose="02020603050405020304" pitchFamily="18" charset="0"/>
+              </a:rPr>
+              <a:t>Thank You!</a:t>
+            </a:r>
+          </a:p>
+        </p:txBody>
+      </p:sp>
+      <p:sp>
+        <p:nvSpPr>
+          <p:cNvPr id="3" name="Slide Number Placeholder 2">
+            <a:extLst>
+              <a:ext uri="{FF2B5EF4-FFF2-40B4-BE49-F238E27FC236}">
+                <a16:creationId xmlns:a16="http://schemas.microsoft.com/office/drawing/2014/main" xmlns="" id="{CF50768F-32BC-4171-85D7-92F5DC437E5E}"/>
+              </a:ext>
+            </a:extLst>
+          </p:cNvPr>
+          <p:cNvSpPr>
+            <a:spLocks noGrp="1"/>
+          </p:cNvSpPr>
+          <p:nvPr>
+            <p:ph type="sldNum" sz="quarter" idx="12"/>
+          </p:nvPr>
+        </p:nvSpPr>
+        <p:spPr/>
+        <p:txBody>
+          <a:bodyPr/>
+          <a:lstStyle/>
+          <a:p>
+            <a:fld id="{875942D6-B7AA-482E-A111-0A2C783F5CFF}" type="slidenum">
+              <a:rPr lang="en-US" smtClean="0"/>
+              <a:t>20</a:t>
+            </a:fld>
+            <a:endParaRPr lang="en-US"/>
+          </a:p>
+        </p:txBody>
+      </p:sp>
+    </p:spTree>
+    <p:extLst>
+      <p:ext uri="{BB962C8B-B14F-4D97-AF65-F5344CB8AC3E}">
+        <p14:creationId xmlns:p14="http://schemas.microsoft.com/office/powerpoint/2010/main" val="2706848313"/>
       </p:ext>
     </p:extLst>
   </p:cSld>
@@ -6414,7 +7254,7 @@
           <p:cNvPr id="2" name="Title 1">
             <a:extLst>
               <a:ext uri="{FF2B5EF4-FFF2-40B4-BE49-F238E27FC236}">
-                <a16:creationId xmlns:a16="http://schemas.microsoft.com/office/drawing/2014/main" id="{7B3B6C76-254B-4957-AFE9-EA111965FE94}"/>
+                <a16:creationId xmlns:a16="http://schemas.microsoft.com/office/drawing/2014/main" xmlns="" id="{7B3B6C76-254B-4957-AFE9-EA111965FE94}"/>
               </a:ext>
             </a:extLst>
           </p:cNvPr>
@@ -6445,7 +7285,7 @@
           <p:cNvPr id="3" name="Content Placeholder 2">
             <a:extLst>
               <a:ext uri="{FF2B5EF4-FFF2-40B4-BE49-F238E27FC236}">
-                <a16:creationId xmlns:a16="http://schemas.microsoft.com/office/drawing/2014/main" id="{E344AEE5-F668-445D-8291-E46207E99A59}"/>
+                <a16:creationId xmlns:a16="http://schemas.microsoft.com/office/drawing/2014/main" xmlns="" id="{E344AEE5-F668-445D-8291-E46207E99A59}"/>
               </a:ext>
             </a:extLst>
           </p:cNvPr>
@@ -6497,7 +7337,21 @@
                 <a:latin typeface="Times New Roman" panose="02020603050405020304" pitchFamily="18" charset="0"/>
                 <a:cs typeface="Times New Roman" panose="02020603050405020304" pitchFamily="18" charset="0"/>
               </a:rPr>
-              <a:t>Knowing Future’s import/export value, we can take pre measures for the smooth trading.</a:t>
+              <a:t>Knowing Future’s import/export value, we can take </a:t>
+            </a:r>
+            <a:r>
+              <a:rPr lang="en-US" dirty="0" smtClean="0">
+                <a:latin typeface="Times New Roman" panose="02020603050405020304" pitchFamily="18" charset="0"/>
+                <a:cs typeface="Times New Roman" panose="02020603050405020304" pitchFamily="18" charset="0"/>
+              </a:rPr>
+              <a:t>precautionary </a:t>
+            </a:r>
+            <a:r>
+              <a:rPr lang="en-US" dirty="0">
+                <a:latin typeface="Times New Roman" panose="02020603050405020304" pitchFamily="18" charset="0"/>
+                <a:cs typeface="Times New Roman" panose="02020603050405020304" pitchFamily="18" charset="0"/>
+              </a:rPr>
+              <a:t>measures for the smooth trading.</a:t>
             </a:r>
           </a:p>
         </p:txBody>
@@ -6507,7 +7361,7 @@
           <p:cNvPr id="4" name="Slide Number Placeholder 3">
             <a:extLst>
               <a:ext uri="{FF2B5EF4-FFF2-40B4-BE49-F238E27FC236}">
-                <a16:creationId xmlns:a16="http://schemas.microsoft.com/office/drawing/2014/main" id="{7BA8CF41-44B1-46C6-BCE6-5CA6D3465D06}"/>
+                <a16:creationId xmlns:a16="http://schemas.microsoft.com/office/drawing/2014/main" xmlns="" id="{7BA8CF41-44B1-46C6-BCE6-5CA6D3465D06}"/>
               </a:ext>
             </a:extLst>
           </p:cNvPr>
@@ -6566,7 +7420,7 @@
           <p:cNvPr id="2" name="Title 1">
             <a:extLst>
               <a:ext uri="{FF2B5EF4-FFF2-40B4-BE49-F238E27FC236}">
-                <a16:creationId xmlns:a16="http://schemas.microsoft.com/office/drawing/2014/main" id="{DF397BB6-61D8-41C1-818D-83C8A4F7E683}"/>
+                <a16:creationId xmlns:a16="http://schemas.microsoft.com/office/drawing/2014/main" xmlns="" id="{DF397BB6-61D8-41C1-818D-83C8A4F7E683}"/>
               </a:ext>
             </a:extLst>
           </p:cNvPr>
@@ -6597,7 +7451,7 @@
           <p:cNvPr id="3" name="Content Placeholder 2">
             <a:extLst>
               <a:ext uri="{FF2B5EF4-FFF2-40B4-BE49-F238E27FC236}">
-                <a16:creationId xmlns:a16="http://schemas.microsoft.com/office/drawing/2014/main" id="{8E5BF401-6CA6-4DF9-BEDA-266E07986AA8}"/>
+                <a16:creationId xmlns:a16="http://schemas.microsoft.com/office/drawing/2014/main" xmlns="" id="{8E5BF401-6CA6-4DF9-BEDA-266E07986AA8}"/>
               </a:ext>
             </a:extLst>
           </p:cNvPr>
@@ -6627,47 +7481,121 @@
                 <a:latin typeface="Times New Roman" panose="02020603050405020304" pitchFamily="18" charset="0"/>
                 <a:cs typeface="Times New Roman" panose="02020603050405020304" pitchFamily="18" charset="0"/>
               </a:rPr>
-              <a:t>Monthly Trade data is available from January, 2006 to January, 2020 - Country wise or HS code wise. </a:t>
-            </a:r>
-          </a:p>
-          <a:p>
-            <a:r>
-              <a:rPr lang="en-US" dirty="0">
-                <a:latin typeface="Times New Roman" panose="02020603050405020304" pitchFamily="18" charset="0"/>
-                <a:cs typeface="Times New Roman" panose="02020603050405020304" pitchFamily="18" charset="0"/>
-              </a:rPr>
-              <a:t>Trade amount (Import/Export) for each month which is expressed in million US dollars. </a:t>
-            </a:r>
-          </a:p>
-          <a:p>
-            <a:r>
-              <a:rPr lang="en-US" dirty="0">
-                <a:latin typeface="Times New Roman" panose="02020603050405020304" pitchFamily="18" charset="0"/>
-                <a:cs typeface="Times New Roman" panose="02020603050405020304" pitchFamily="18" charset="0"/>
-              </a:rPr>
-              <a:t>HS Code - Harmonized System (HS) of tariff nomenclature is an internationally standardized system of names and numbers to classify traded products, </a:t>
+              <a:t>Monthly Trade data is available from January, 2006 to January, 2020 - Country wise </a:t>
+            </a:r>
+            <a:r>
+              <a:rPr lang="en-US" dirty="0" smtClean="0">
+                <a:latin typeface="Times New Roman" panose="02020603050405020304" pitchFamily="18" charset="0"/>
+                <a:cs typeface="Times New Roman" panose="02020603050405020304" pitchFamily="18" charset="0"/>
+              </a:rPr>
+              <a:t>and</a:t>
+            </a:r>
+            <a:r>
+              <a:rPr lang="en-US" dirty="0" smtClean="0">
+                <a:latin typeface="Times New Roman" panose="02020603050405020304" pitchFamily="18" charset="0"/>
+                <a:cs typeface="Times New Roman" panose="02020603050405020304" pitchFamily="18" charset="0"/>
+              </a:rPr>
+              <a:t> </a:t>
+            </a:r>
+            <a:r>
+              <a:rPr lang="en-US" dirty="0">
+                <a:latin typeface="Times New Roman" panose="02020603050405020304" pitchFamily="18" charset="0"/>
+                <a:cs typeface="Times New Roman" panose="02020603050405020304" pitchFamily="18" charset="0"/>
+              </a:rPr>
+              <a:t>HS code wise. </a:t>
+            </a:r>
+          </a:p>
+          <a:p>
+            <a:r>
+              <a:rPr lang="en-US" dirty="0">
+                <a:latin typeface="Times New Roman" panose="02020603050405020304" pitchFamily="18" charset="0"/>
+                <a:cs typeface="Times New Roman" panose="02020603050405020304" pitchFamily="18" charset="0"/>
+              </a:rPr>
+              <a:t>Trade amount (Import/Export) for each month </a:t>
+            </a:r>
+            <a:r>
+              <a:rPr lang="en-US" dirty="0" smtClean="0">
+                <a:latin typeface="Times New Roman" panose="02020603050405020304" pitchFamily="18" charset="0"/>
+                <a:cs typeface="Times New Roman" panose="02020603050405020304" pitchFamily="18" charset="0"/>
+              </a:rPr>
+              <a:t>is </a:t>
+            </a:r>
+            <a:r>
+              <a:rPr lang="en-US" dirty="0">
+                <a:latin typeface="Times New Roman" panose="02020603050405020304" pitchFamily="18" charset="0"/>
+                <a:cs typeface="Times New Roman" panose="02020603050405020304" pitchFamily="18" charset="0"/>
+              </a:rPr>
+              <a:t>expressed in million US dollars. </a:t>
+            </a:r>
+          </a:p>
+          <a:p>
+            <a:r>
+              <a:rPr lang="en-US" dirty="0" smtClean="0">
+                <a:latin typeface="Times New Roman" panose="02020603050405020304" pitchFamily="18" charset="0"/>
+                <a:cs typeface="Times New Roman" panose="02020603050405020304" pitchFamily="18" charset="0"/>
+              </a:rPr>
+              <a:t>Harmonized </a:t>
+            </a:r>
+            <a:r>
+              <a:rPr lang="en-US" dirty="0">
+                <a:latin typeface="Times New Roman" panose="02020603050405020304" pitchFamily="18" charset="0"/>
+                <a:cs typeface="Times New Roman" panose="02020603050405020304" pitchFamily="18" charset="0"/>
+              </a:rPr>
+              <a:t>System (</a:t>
+            </a:r>
+            <a:r>
+              <a:rPr lang="en-US" dirty="0" smtClean="0">
+                <a:latin typeface="Times New Roman" panose="02020603050405020304" pitchFamily="18" charset="0"/>
+                <a:cs typeface="Times New Roman" panose="02020603050405020304" pitchFamily="18" charset="0"/>
+              </a:rPr>
+              <a:t>HS code) </a:t>
+            </a:r>
+            <a:r>
+              <a:rPr lang="en-US" dirty="0">
+                <a:latin typeface="Times New Roman" panose="02020603050405020304" pitchFamily="18" charset="0"/>
+                <a:cs typeface="Times New Roman" panose="02020603050405020304" pitchFamily="18" charset="0"/>
+              </a:rPr>
+              <a:t>of tariff nomenclature is an internationally standardized system of names and numbers to classify traded products, </a:t>
             </a:r>
             <a:r>
               <a:rPr lang="en-US" sz="2200" dirty="0">
                 <a:latin typeface="Times New Roman" panose="02020603050405020304" pitchFamily="18" charset="0"/>
                 <a:cs typeface="Times New Roman" panose="02020603050405020304" pitchFamily="18" charset="0"/>
               </a:rPr>
-              <a:t>e.g. 1 for Live Animal, 95 for Toys, Games and Sports Requisites …</a:t>
-            </a:r>
-          </a:p>
-          <a:p>
-            <a:r>
-              <a:rPr lang="en-US" dirty="0">
-                <a:latin typeface="Times New Roman" panose="02020603050405020304" pitchFamily="18" charset="0"/>
-                <a:cs typeface="Times New Roman" panose="02020603050405020304" pitchFamily="18" charset="0"/>
-              </a:rPr>
-              <a:t>Commodity – It is the description of the Harmonized System items.</a:t>
+              <a:t>e.g. 1 for Live Animal, 95 for Toys, Games and Sports </a:t>
+            </a:r>
+            <a:r>
+              <a:rPr lang="en-US" sz="2200" dirty="0" smtClean="0">
+                <a:latin typeface="Times New Roman" panose="02020603050405020304" pitchFamily="18" charset="0"/>
+                <a:cs typeface="Times New Roman" panose="02020603050405020304" pitchFamily="18" charset="0"/>
+              </a:rPr>
+              <a:t>Requisites etc.</a:t>
             </a:r>
             <a:endParaRPr lang="en-US" sz="2200" dirty="0">
               <a:latin typeface="Times New Roman" panose="02020603050405020304" pitchFamily="18" charset="0"/>
               <a:cs typeface="Times New Roman" panose="02020603050405020304" pitchFamily="18" charset="0"/>
             </a:endParaRPr>
           </a:p>
+          <a:p>
+            <a:r>
+              <a:rPr lang="en-US" dirty="0" smtClean="0">
+                <a:latin typeface="Times New Roman" panose="02020603050405020304" pitchFamily="18" charset="0"/>
+                <a:cs typeface="Times New Roman" panose="02020603050405020304" pitchFamily="18" charset="0"/>
+              </a:rPr>
+              <a:t>Commodity </a:t>
+            </a:r>
+            <a:r>
+              <a:rPr lang="en-US" dirty="0">
+                <a:latin typeface="Times New Roman" panose="02020603050405020304" pitchFamily="18" charset="0"/>
+                <a:cs typeface="Times New Roman" panose="02020603050405020304" pitchFamily="18" charset="0"/>
+              </a:rPr>
+              <a:t>is the description of the Harmonized System items.</a:t>
+            </a:r>
+            <a:endParaRPr lang="en-US" sz="2200" dirty="0">
+              <a:latin typeface="Times New Roman" panose="02020603050405020304" pitchFamily="18" charset="0"/>
+              <a:cs typeface="Times New Roman" panose="02020603050405020304" pitchFamily="18" charset="0"/>
+            </a:endParaRPr>
+          </a:p>
         </p:txBody>
       </p:sp>
       <p:sp>
@@ -6675,7 +7603,7 @@
           <p:cNvPr id="4" name="Slide Number Placeholder 3">
             <a:extLst>
               <a:ext uri="{FF2B5EF4-FFF2-40B4-BE49-F238E27FC236}">
-                <a16:creationId xmlns:a16="http://schemas.microsoft.com/office/drawing/2014/main" id="{00CCD94F-6B9D-40B2-8BBA-DEFBF5BD2335}"/>
+                <a16:creationId xmlns:a16="http://schemas.microsoft.com/office/drawing/2014/main" xmlns="" id="{00CCD94F-6B9D-40B2-8BBA-DEFBF5BD2335}"/>
               </a:ext>
             </a:extLst>
           </p:cNvPr>
@@ -6734,7 +7662,7 @@
           <p:cNvPr id="2" name="Title 1">
             <a:extLst>
               <a:ext uri="{FF2B5EF4-FFF2-40B4-BE49-F238E27FC236}">
-                <a16:creationId xmlns:a16="http://schemas.microsoft.com/office/drawing/2014/main" id="{4C89A33E-AACB-49C0-819F-8920338CF076}"/>
+                <a16:creationId xmlns:a16="http://schemas.microsoft.com/office/drawing/2014/main" xmlns="" id="{4C89A33E-AACB-49C0-819F-8920338CF076}"/>
               </a:ext>
             </a:extLst>
           </p:cNvPr>
@@ -6765,7 +7693,7 @@
           <p:cNvPr id="4" name="Content Placeholder 3">
             <a:extLst>
               <a:ext uri="{FF2B5EF4-FFF2-40B4-BE49-F238E27FC236}">
-                <a16:creationId xmlns:a16="http://schemas.microsoft.com/office/drawing/2014/main" id="{DBAF1874-DCD5-42BA-B8F9-7F6F1308CD2A}"/>
+                <a16:creationId xmlns:a16="http://schemas.microsoft.com/office/drawing/2014/main" xmlns="" id="{DBAF1874-DCD5-42BA-B8F9-7F6F1308CD2A}"/>
               </a:ext>
             </a:extLst>
           </p:cNvPr>
@@ -6803,7 +7731,7 @@
           <p:cNvPr id="3" name="Slide Number Placeholder 2">
             <a:extLst>
               <a:ext uri="{FF2B5EF4-FFF2-40B4-BE49-F238E27FC236}">
-                <a16:creationId xmlns:a16="http://schemas.microsoft.com/office/drawing/2014/main" id="{120FF20B-E954-4E5A-95AB-691E2CBBDDB2}"/>
+                <a16:creationId xmlns:a16="http://schemas.microsoft.com/office/drawing/2014/main" xmlns="" id="{120FF20B-E954-4E5A-95AB-691E2CBBDDB2}"/>
               </a:ext>
             </a:extLst>
           </p:cNvPr>
@@ -6862,7 +7790,7 @@
           <p:cNvPr id="2" name="Title 1">
             <a:extLst>
               <a:ext uri="{FF2B5EF4-FFF2-40B4-BE49-F238E27FC236}">
-                <a16:creationId xmlns:a16="http://schemas.microsoft.com/office/drawing/2014/main" id="{DF09CCE7-7DE4-4276-8546-CC34212408B6}"/>
+                <a16:creationId xmlns:a16="http://schemas.microsoft.com/office/drawing/2014/main" xmlns="" id="{DF09CCE7-7DE4-4276-8546-CC34212408B6}"/>
               </a:ext>
             </a:extLst>
           </p:cNvPr>
@@ -6893,7 +7821,7 @@
           <p:cNvPr id="4" name="Content Placeholder 3">
             <a:extLst>
               <a:ext uri="{FF2B5EF4-FFF2-40B4-BE49-F238E27FC236}">
-                <a16:creationId xmlns:a16="http://schemas.microsoft.com/office/drawing/2014/main" id="{C7BEF372-F27F-4DDC-91E8-5D485CDD8622}"/>
+                <a16:creationId xmlns:a16="http://schemas.microsoft.com/office/drawing/2014/main" xmlns="" id="{C7BEF372-F27F-4DDC-91E8-5D485CDD8622}"/>
               </a:ext>
             </a:extLst>
           </p:cNvPr>
@@ -6931,7 +7859,7 @@
           <p:cNvPr id="5" name="TextBox 4">
             <a:extLst>
               <a:ext uri="{FF2B5EF4-FFF2-40B4-BE49-F238E27FC236}">
-                <a16:creationId xmlns:a16="http://schemas.microsoft.com/office/drawing/2014/main" id="{D99B2D6F-704A-4629-8F33-9A6A63627A46}"/>
+                <a16:creationId xmlns:a16="http://schemas.microsoft.com/office/drawing/2014/main" xmlns="" id="{D99B2D6F-704A-4629-8F33-9A6A63627A46}"/>
               </a:ext>
             </a:extLst>
           </p:cNvPr>
@@ -6999,7 +7927,7 @@
           <p:cNvPr id="3" name="Slide Number Placeholder 2">
             <a:extLst>
               <a:ext uri="{FF2B5EF4-FFF2-40B4-BE49-F238E27FC236}">
-                <a16:creationId xmlns:a16="http://schemas.microsoft.com/office/drawing/2014/main" id="{EFD55A3F-581D-486B-872C-90B0A238A33C}"/>
+                <a16:creationId xmlns:a16="http://schemas.microsoft.com/office/drawing/2014/main" xmlns="" id="{EFD55A3F-581D-486B-872C-90B0A238A33C}"/>
               </a:ext>
             </a:extLst>
           </p:cNvPr>
@@ -7058,7 +7986,7 @@
           <p:cNvPr id="2" name="Title 1">
             <a:extLst>
               <a:ext uri="{FF2B5EF4-FFF2-40B4-BE49-F238E27FC236}">
-                <a16:creationId xmlns:a16="http://schemas.microsoft.com/office/drawing/2014/main" id="{1A6B5522-BFDE-4C02-BE49-85BD361D3A50}"/>
+                <a16:creationId xmlns:a16="http://schemas.microsoft.com/office/drawing/2014/main" xmlns="" id="{1A6B5522-BFDE-4C02-BE49-85BD361D3A50}"/>
               </a:ext>
             </a:extLst>
           </p:cNvPr>
@@ -7089,7 +8017,7 @@
           <p:cNvPr id="4" name="Content Placeholder 3">
             <a:extLst>
               <a:ext uri="{FF2B5EF4-FFF2-40B4-BE49-F238E27FC236}">
-                <a16:creationId xmlns:a16="http://schemas.microsoft.com/office/drawing/2014/main" id="{BB5653EC-DCFD-4B94-B431-1BF773E6E561}"/>
+                <a16:creationId xmlns:a16="http://schemas.microsoft.com/office/drawing/2014/main" xmlns="" id="{BB5653EC-DCFD-4B94-B431-1BF773E6E561}"/>
               </a:ext>
             </a:extLst>
           </p:cNvPr>
@@ -7127,7 +8055,7 @@
           <p:cNvPr id="5" name="TextBox 4">
             <a:extLst>
               <a:ext uri="{FF2B5EF4-FFF2-40B4-BE49-F238E27FC236}">
-                <a16:creationId xmlns:a16="http://schemas.microsoft.com/office/drawing/2014/main" id="{4DCC699E-A326-430A-8F1B-29C397404BE0}"/>
+                <a16:creationId xmlns:a16="http://schemas.microsoft.com/office/drawing/2014/main" xmlns="" id="{4DCC699E-A326-430A-8F1B-29C397404BE0}"/>
               </a:ext>
             </a:extLst>
           </p:cNvPr>
@@ -7172,7 +8100,35 @@
                 <a:latin typeface="Times New Roman" panose="02020603050405020304" pitchFamily="18" charset="0"/>
                 <a:cs typeface="Times New Roman" panose="02020603050405020304" pitchFamily="18" charset="0"/>
               </a:rPr>
-              <a:t>While USA is top most country to which India exports the most $3013 million followed by UAE, China, Hong Kong and Singapore.</a:t>
+              <a:t>While USA </a:t>
+            </a:r>
+            <a:r>
+              <a:rPr lang="en-US" dirty="0" smtClean="0">
+                <a:latin typeface="Times New Roman" panose="02020603050405020304" pitchFamily="18" charset="0"/>
+                <a:cs typeface="Times New Roman" panose="02020603050405020304" pitchFamily="18" charset="0"/>
+              </a:rPr>
+              <a:t>is the </a:t>
+            </a:r>
+            <a:r>
+              <a:rPr lang="en-US" dirty="0">
+                <a:latin typeface="Times New Roman" panose="02020603050405020304" pitchFamily="18" charset="0"/>
+                <a:cs typeface="Times New Roman" panose="02020603050405020304" pitchFamily="18" charset="0"/>
+              </a:rPr>
+              <a:t>top </a:t>
+            </a:r>
+            <a:r>
+              <a:rPr lang="en-US" dirty="0" smtClean="0">
+                <a:latin typeface="Times New Roman" panose="02020603050405020304" pitchFamily="18" charset="0"/>
+                <a:cs typeface="Times New Roman" panose="02020603050405020304" pitchFamily="18" charset="0"/>
+              </a:rPr>
+              <a:t>country </a:t>
+            </a:r>
+            <a:r>
+              <a:rPr lang="en-US" dirty="0">
+                <a:latin typeface="Times New Roman" panose="02020603050405020304" pitchFamily="18" charset="0"/>
+                <a:cs typeface="Times New Roman" panose="02020603050405020304" pitchFamily="18" charset="0"/>
+              </a:rPr>
+              <a:t>to which India exports the most $3013 million followed by UAE, China, Hong Kong and Singapore.</a:t>
             </a:r>
           </a:p>
         </p:txBody>
@@ -7182,7 +8138,7 @@
           <p:cNvPr id="3" name="Slide Number Placeholder 2">
             <a:extLst>
               <a:ext uri="{FF2B5EF4-FFF2-40B4-BE49-F238E27FC236}">
-                <a16:creationId xmlns:a16="http://schemas.microsoft.com/office/drawing/2014/main" id="{C7C847A6-4A8E-4B65-A738-3703496D8216}"/>
+                <a16:creationId xmlns:a16="http://schemas.microsoft.com/office/drawing/2014/main" xmlns="" id="{C7C847A6-4A8E-4B65-A738-3703496D8216}"/>
               </a:ext>
             </a:extLst>
           </p:cNvPr>
@@ -7241,7 +8197,7 @@
           <p:cNvPr id="2" name="Title 1">
             <a:extLst>
               <a:ext uri="{FF2B5EF4-FFF2-40B4-BE49-F238E27FC236}">
-                <a16:creationId xmlns:a16="http://schemas.microsoft.com/office/drawing/2014/main" id="{FA0B0F23-AA5A-482B-9292-21909CD3D244}"/>
+                <a16:creationId xmlns:a16="http://schemas.microsoft.com/office/drawing/2014/main" xmlns="" id="{FA0B0F23-AA5A-482B-9292-21909CD3D244}"/>
               </a:ext>
             </a:extLst>
           </p:cNvPr>
@@ -7272,7 +8228,7 @@
           <p:cNvPr id="3" name="Content Placeholder 2">
             <a:extLst>
               <a:ext uri="{FF2B5EF4-FFF2-40B4-BE49-F238E27FC236}">
-                <a16:creationId xmlns:a16="http://schemas.microsoft.com/office/drawing/2014/main" id="{5891B381-2B71-49EA-A683-A3160B6C07B2}"/>
+                <a16:creationId xmlns:a16="http://schemas.microsoft.com/office/drawing/2014/main" xmlns="" id="{5891B381-2B71-49EA-A683-A3160B6C07B2}"/>
               </a:ext>
             </a:extLst>
           </p:cNvPr>
@@ -7378,7 +8334,7 @@
           <p:cNvPr id="4" name="Slide Number Placeholder 3">
             <a:extLst>
               <a:ext uri="{FF2B5EF4-FFF2-40B4-BE49-F238E27FC236}">
-                <a16:creationId xmlns:a16="http://schemas.microsoft.com/office/drawing/2014/main" id="{0B22DF0D-8D91-4829-A4D1-ADB83A2BA515}"/>
+                <a16:creationId xmlns:a16="http://schemas.microsoft.com/office/drawing/2014/main" xmlns="" id="{0B22DF0D-8D91-4829-A4D1-ADB83A2BA515}"/>
               </a:ext>
             </a:extLst>
           </p:cNvPr>
@@ -7434,13 +8390,7 @@
       </p:grpSpPr>
       <p:sp>
         <p:nvSpPr>
-          <p:cNvPr id="2" name="Title 1">
-            <a:extLst>
-              <a:ext uri="{FF2B5EF4-FFF2-40B4-BE49-F238E27FC236}">
-                <a16:creationId xmlns:a16="http://schemas.microsoft.com/office/drawing/2014/main" id="{79732034-DF0D-4F26-84D8-CD1B8D30179B}"/>
-              </a:ext>
-            </a:extLst>
-          </p:cNvPr>
+          <p:cNvPr id="2" name="Title 1"/>
           <p:cNvSpPr>
             <a:spLocks noGrp="1"/>
           </p:cNvSpPr>
@@ -7454,24 +8404,16 @@
           <a:lstStyle/>
           <a:p>
             <a:r>
-              <a:rPr lang="en-US" dirty="0">
-                <a:latin typeface="Times New Roman" panose="02020603050405020304" pitchFamily="18" charset="0"/>
-                <a:cs typeface="Times New Roman" panose="02020603050405020304" pitchFamily="18" charset="0"/>
-              </a:rPr>
-              <a:t>Auto Regressive and Moving Average</a:t>
-            </a:r>
-          </a:p>
-        </p:txBody>
-      </p:sp>
-      <p:sp>
-        <p:nvSpPr>
-          <p:cNvPr id="3" name="Content Placeholder 2">
-            <a:extLst>
-              <a:ext uri="{FF2B5EF4-FFF2-40B4-BE49-F238E27FC236}">
-                <a16:creationId xmlns:a16="http://schemas.microsoft.com/office/drawing/2014/main" id="{3C057F40-40A7-4CAE-B87C-F65A17102C19}"/>
-              </a:ext>
-            </a:extLst>
-          </p:cNvPr>
+              <a:rPr lang="en-IN" dirty="0" smtClean="0"/>
+              <a:t>Technologies Used</a:t>
+            </a:r>
+            <a:endParaRPr lang="en-IN" dirty="0"/>
+          </a:p>
+        </p:txBody>
+      </p:sp>
+      <p:sp>
+        <p:nvSpPr>
+          <p:cNvPr id="3" name="Content Placeholder 2"/>
           <p:cNvSpPr>
             <a:spLocks noGrp="1"/>
           </p:cNvSpPr>
@@ -7479,191 +8421,102 @@
             <p:ph idx="1"/>
           </p:nvPr>
         </p:nvSpPr>
-        <p:spPr/>
-        <p:txBody>
-          <a:bodyPr/>
-          <a:lstStyle/>
-          <a:p>
-            <a:r>
-              <a:rPr lang="en-US" dirty="0">
-                <a:latin typeface="Times New Roman" panose="02020603050405020304" pitchFamily="18" charset="0"/>
-                <a:cs typeface="Times New Roman" panose="02020603050405020304" pitchFamily="18" charset="0"/>
-              </a:rPr>
-              <a:t>AR (</a:t>
-            </a:r>
-            <a:r>
-              <a:rPr lang="en-US" b="1" dirty="0">
-                <a:latin typeface="Times New Roman" panose="02020603050405020304" pitchFamily="18" charset="0"/>
-                <a:cs typeface="Times New Roman" panose="02020603050405020304" pitchFamily="18" charset="0"/>
-              </a:rPr>
-              <a:t>Auto Regressive</a:t>
-            </a:r>
-            <a:r>
-              <a:rPr lang="en-US" dirty="0">
-                <a:latin typeface="Times New Roman" panose="02020603050405020304" pitchFamily="18" charset="0"/>
-                <a:cs typeface="Times New Roman" panose="02020603050405020304" pitchFamily="18" charset="0"/>
-              </a:rPr>
-              <a:t>) is used when a value from the time series has dependency on previous values e.g. </a:t>
-            </a:r>
-            <a:r>
-              <a:rPr lang="en-US" dirty="0" err="1">
-                <a:latin typeface="Times New Roman" panose="02020603050405020304" pitchFamily="18" charset="0"/>
-                <a:cs typeface="Times New Roman" panose="02020603050405020304" pitchFamily="18" charset="0"/>
-              </a:rPr>
-              <a:t>X</a:t>
-            </a:r>
-            <a:r>
-              <a:rPr lang="en-US" baseline="-25000" dirty="0" err="1">
-                <a:latin typeface="Times New Roman" panose="02020603050405020304" pitchFamily="18" charset="0"/>
-                <a:cs typeface="Times New Roman" panose="02020603050405020304" pitchFamily="18" charset="0"/>
-              </a:rPr>
-              <a:t>t</a:t>
-            </a:r>
-            <a:r>
-              <a:rPr lang="en-US" dirty="0">
-                <a:latin typeface="Times New Roman" panose="02020603050405020304" pitchFamily="18" charset="0"/>
-                <a:cs typeface="Times New Roman" panose="02020603050405020304" pitchFamily="18" charset="0"/>
-              </a:rPr>
-              <a:t> = f(X</a:t>
-            </a:r>
-            <a:r>
-              <a:rPr lang="en-US" baseline="-25000" dirty="0">
-                <a:latin typeface="Times New Roman" panose="02020603050405020304" pitchFamily="18" charset="0"/>
-                <a:cs typeface="Times New Roman" panose="02020603050405020304" pitchFamily="18" charset="0"/>
-              </a:rPr>
-              <a:t>t-1</a:t>
-            </a:r>
-            <a:r>
-              <a:rPr lang="en-US" dirty="0">
-                <a:latin typeface="Times New Roman" panose="02020603050405020304" pitchFamily="18" charset="0"/>
-                <a:cs typeface="Times New Roman" panose="02020603050405020304" pitchFamily="18" charset="0"/>
-              </a:rPr>
-              <a:t>). The order of an auto-regression is the number of immediately preceding values in the series that are used to forecast the current value e.g. order of 2 denotes that the value </a:t>
-            </a:r>
-            <a:r>
-              <a:rPr lang="en-US" dirty="0" err="1">
-                <a:latin typeface="Times New Roman" panose="02020603050405020304" pitchFamily="18" charset="0"/>
-                <a:cs typeface="Times New Roman" panose="02020603050405020304" pitchFamily="18" charset="0"/>
-              </a:rPr>
-              <a:t>X</a:t>
-            </a:r>
-            <a:r>
-              <a:rPr lang="en-US" baseline="-25000" dirty="0" err="1">
-                <a:latin typeface="Times New Roman" panose="02020603050405020304" pitchFamily="18" charset="0"/>
-                <a:cs typeface="Times New Roman" panose="02020603050405020304" pitchFamily="18" charset="0"/>
-              </a:rPr>
-              <a:t>t</a:t>
-            </a:r>
-            <a:r>
-              <a:rPr lang="en-US" dirty="0">
-                <a:latin typeface="Times New Roman" panose="02020603050405020304" pitchFamily="18" charset="0"/>
-                <a:cs typeface="Times New Roman" panose="02020603050405020304" pitchFamily="18" charset="0"/>
-              </a:rPr>
-              <a:t> is dependent on X</a:t>
-            </a:r>
-            <a:r>
-              <a:rPr lang="en-US" baseline="-25000" dirty="0">
-                <a:latin typeface="Times New Roman" panose="02020603050405020304" pitchFamily="18" charset="0"/>
-                <a:cs typeface="Times New Roman" panose="02020603050405020304" pitchFamily="18" charset="0"/>
-              </a:rPr>
-              <a:t>t-1</a:t>
-            </a:r>
-            <a:r>
-              <a:rPr lang="en-US" dirty="0">
-                <a:latin typeface="Times New Roman" panose="02020603050405020304" pitchFamily="18" charset="0"/>
-                <a:cs typeface="Times New Roman" panose="02020603050405020304" pitchFamily="18" charset="0"/>
-              </a:rPr>
-              <a:t> and X</a:t>
-            </a:r>
-            <a:r>
-              <a:rPr lang="en-US" baseline="-25000" dirty="0">
-                <a:latin typeface="Times New Roman" panose="02020603050405020304" pitchFamily="18" charset="0"/>
-                <a:cs typeface="Times New Roman" panose="02020603050405020304" pitchFamily="18" charset="0"/>
-              </a:rPr>
-              <a:t>t-2</a:t>
-            </a:r>
-            <a:r>
-              <a:rPr lang="en-US" dirty="0">
-                <a:latin typeface="Times New Roman" panose="02020603050405020304" pitchFamily="18" charset="0"/>
-                <a:cs typeface="Times New Roman" panose="02020603050405020304" pitchFamily="18" charset="0"/>
-              </a:rPr>
-              <a:t>.</a:t>
-            </a:r>
-          </a:p>
-          <a:p>
-            <a:r>
-              <a:rPr lang="en-US" dirty="0">
-                <a:latin typeface="Times New Roman" panose="02020603050405020304" pitchFamily="18" charset="0"/>
-                <a:cs typeface="Times New Roman" panose="02020603050405020304" pitchFamily="18" charset="0"/>
-              </a:rPr>
-              <a:t>MA (</a:t>
-            </a:r>
-            <a:r>
-              <a:rPr lang="en-US" b="1" dirty="0">
-                <a:latin typeface="Times New Roman" panose="02020603050405020304" pitchFamily="18" charset="0"/>
-                <a:cs typeface="Times New Roman" panose="02020603050405020304" pitchFamily="18" charset="0"/>
-              </a:rPr>
-              <a:t>Moving Average)</a:t>
-            </a:r>
-            <a:r>
-              <a:rPr lang="en-US" dirty="0">
-                <a:latin typeface="Times New Roman" panose="02020603050405020304" pitchFamily="18" charset="0"/>
-                <a:cs typeface="Times New Roman" panose="02020603050405020304" pitchFamily="18" charset="0"/>
-              </a:rPr>
-              <a:t> is a technique that calculates the overall trend in the dataset. As the name suggest that we go by taking the Average over a fixed rolling size window. </a:t>
-            </a:r>
-          </a:p>
-          <a:p>
-            <a:endParaRPr lang="en-US" dirty="0">
-              <a:latin typeface="Times New Roman" panose="02020603050405020304" pitchFamily="18" charset="0"/>
-              <a:cs typeface="Times New Roman" panose="02020603050405020304" pitchFamily="18" charset="0"/>
-            </a:endParaRPr>
-          </a:p>
-          <a:p>
-            <a:endParaRPr lang="en-US" dirty="0">
-              <a:latin typeface="Times New Roman" panose="02020603050405020304" pitchFamily="18" charset="0"/>
-              <a:cs typeface="Times New Roman" panose="02020603050405020304" pitchFamily="18" charset="0"/>
-            </a:endParaRPr>
-          </a:p>
-        </p:txBody>
-      </p:sp>
-      <p:pic>
-        <p:nvPicPr>
-          <p:cNvPr id="4" name="Picture 3">
-            <a:extLst>
-              <a:ext uri="{FF2B5EF4-FFF2-40B4-BE49-F238E27FC236}">
-                <a16:creationId xmlns:a16="http://schemas.microsoft.com/office/drawing/2014/main" id="{AD170295-B5A2-4CA5-B861-2B95FC69247C}"/>
-              </a:ext>
-            </a:extLst>
-          </p:cNvPr>
-          <p:cNvPicPr/>
-          <p:nvPr/>
-        </p:nvPicPr>
-        <p:blipFill>
-          <a:blip r:embed="rId2"/>
-          <a:stretch>
-            <a:fillRect/>
-          </a:stretch>
-        </p:blipFill>
         <p:spPr>
           <a:xfrm>
-            <a:off x="3113455" y="4237892"/>
-            <a:ext cx="5152290" cy="2039816"/>
+            <a:off x="609600" y="1612232"/>
+            <a:ext cx="10160000" cy="4800600"/>
           </a:xfrm>
-          <a:prstGeom prst="rect">
-            <a:avLst/>
-          </a:prstGeom>
         </p:spPr>
-      </p:pic>
-      <p:sp>
-        <p:nvSpPr>
-          <p:cNvPr id="5" name="Slide Number Placeholder 4">
-            <a:extLst>
-              <a:ext uri="{FF2B5EF4-FFF2-40B4-BE49-F238E27FC236}">
-                <a16:creationId xmlns:a16="http://schemas.microsoft.com/office/drawing/2014/main" id="{E95D4AFB-E8FA-4E9E-BD5E-873DED22E275}"/>
-              </a:ext>
-            </a:extLst>
-          </p:cNvPr>
+        <p:txBody>
+          <a:bodyPr/>
+          <a:lstStyle/>
+          <a:p>
+            <a:r>
+              <a:rPr lang="en-IN" dirty="0" err="1" smtClean="0"/>
+              <a:t>Jupyter</a:t>
+            </a:r>
+            <a:r>
+              <a:rPr lang="en-IN" dirty="0" smtClean="0"/>
+              <a:t> Notebook</a:t>
+            </a:r>
+          </a:p>
+          <a:p>
+            <a:r>
+              <a:rPr lang="en-IN" dirty="0" smtClean="0"/>
+              <a:t>Python3</a:t>
+            </a:r>
+          </a:p>
+          <a:p>
+            <a:r>
+              <a:rPr lang="en-IN" dirty="0" smtClean="0"/>
+              <a:t>Libraries used for trade analysis – Numpy, Matplotlib, </a:t>
+            </a:r>
+            <a:r>
+              <a:rPr lang="en-IN" dirty="0" err="1" smtClean="0"/>
+              <a:t>Seaborn</a:t>
+            </a:r>
+            <a:r>
+              <a:rPr lang="en-IN" dirty="0" smtClean="0"/>
+              <a:t>, Pandas, Random, Math, </a:t>
+            </a:r>
+            <a:r>
+              <a:rPr lang="en-IN" dirty="0" err="1" smtClean="0"/>
+              <a:t>Datetime</a:t>
+            </a:r>
+            <a:r>
+              <a:rPr lang="en-IN" dirty="0" smtClean="0"/>
+              <a:t>, Warnings</a:t>
+            </a:r>
+          </a:p>
+          <a:p>
+            <a:r>
+              <a:rPr lang="en-IN" dirty="0" err="1" smtClean="0"/>
+              <a:t>Tensorflow</a:t>
+            </a:r>
+            <a:r>
+              <a:rPr lang="en-IN" dirty="0" smtClean="0"/>
+              <a:t>, </a:t>
+            </a:r>
+            <a:r>
+              <a:rPr lang="en-IN" dirty="0" err="1" smtClean="0"/>
+              <a:t>Keras</a:t>
+            </a:r>
+            <a:r>
+              <a:rPr lang="en-IN" dirty="0" smtClean="0"/>
+              <a:t> and </a:t>
+            </a:r>
+            <a:r>
+              <a:rPr lang="en-IN" dirty="0" err="1" smtClean="0"/>
+              <a:t>Scikit</a:t>
+            </a:r>
+            <a:r>
+              <a:rPr lang="en-IN" dirty="0" smtClean="0"/>
+              <a:t>-learn for LSTM Implementation </a:t>
+            </a:r>
+          </a:p>
+          <a:p>
+            <a:r>
+              <a:rPr lang="en-IN" dirty="0" err="1" smtClean="0"/>
+              <a:t>Scikit</a:t>
+            </a:r>
+            <a:r>
+              <a:rPr lang="en-IN" dirty="0" smtClean="0"/>
+              <a:t>-learn and </a:t>
+            </a:r>
+            <a:r>
+              <a:rPr lang="en-IN" dirty="0" err="1" smtClean="0"/>
+              <a:t>Statmodels</a:t>
+            </a:r>
+            <a:r>
+              <a:rPr lang="en-IN" dirty="0" smtClean="0"/>
+              <a:t> for other statistical models implementation e.g. ARIMA and Holt winters method.</a:t>
+            </a:r>
+          </a:p>
+        </p:txBody>
+      </p:sp>
+      <p:sp>
+        <p:nvSpPr>
+          <p:cNvPr id="4" name="Slide Number Placeholder 3"/>
           <p:cNvSpPr>
             <a:spLocks noGrp="1"/>
           </p:cNvSpPr>
@@ -7687,7 +8540,7 @@
     </p:spTree>
     <p:extLst>
       <p:ext uri="{BB962C8B-B14F-4D97-AF65-F5344CB8AC3E}">
-        <p14:creationId xmlns:p14="http://schemas.microsoft.com/office/powerpoint/2010/main" val="2711411751"/>
+        <p14:creationId xmlns:p14="http://schemas.microsoft.com/office/powerpoint/2010/main" val="618403057"/>
       </p:ext>
     </p:extLst>
   </p:cSld>
@@ -7973,7 +8826,7 @@
     </a:clrScheme>
     <a:fontScheme name="Office">
       <a:majorFont>
-        <a:latin typeface="Calibri Light" panose="020F0302020204030204"/>
+        <a:latin typeface="Calibri Light"/>
         <a:ea typeface=""/>
         <a:cs typeface=""/>
         <a:font script="Jpan" typeface="游ゴシック Light"/>
@@ -8025,7 +8878,7 @@
         <a:font script="Tfng" typeface="Ebrima"/>
       </a:majorFont>
       <a:minorFont>
-        <a:latin typeface="Calibri" panose="020F0502020204030204"/>
+        <a:latin typeface="Calibri"/>
         <a:ea typeface=""/>
         <a:cs typeface=""/>
         <a:font script="Jpan" typeface="游ゴシック"/>
@@ -8219,7 +9072,7 @@
   <a:extraClrSchemeLst/>
   <a:extLst>
     <a:ext uri="{05A4C25C-085E-4340-85A3-A5531E510DB2}">
-      <thm15:themeFamily xmlns:thm15="http://schemas.microsoft.com/office/thememl/2012/main" name="Office Theme" id="{62F939B6-93AF-4DB8-9C6B-D6C7DFDC589F}" vid="{4A3C46E8-61CC-4603-A589-7422A47A8E4A}"/>
+      <thm15:themeFamily xmlns:thm15="http://schemas.microsoft.com/office/thememl/2012/main" xmlns="" name="Office Theme" id="{62F939B6-93AF-4DB8-9C6B-D6C7DFDC589F}" vid="{4A3C46E8-61CC-4603-A589-7422A47A8E4A}"/>
     </a:ext>
   </a:extLst>
 </a:theme>

</xml_diff>

<commit_message>
Rearranged Tech used after data part
</commit_message>
<xml_diff>
--- a/Documents/Thesis/Indian Trade Analysis and Forecasting.pptx
+++ b/Documents/Thesis/Indian Trade Analysis and Forecasting.pptx
@@ -13,10 +13,10 @@
     <p:sldId id="258" r:id="rId4"/>
     <p:sldId id="259" r:id="rId5"/>
     <p:sldId id="260" r:id="rId6"/>
-    <p:sldId id="261" r:id="rId7"/>
-    <p:sldId id="262" r:id="rId8"/>
-    <p:sldId id="263" r:id="rId9"/>
-    <p:sldId id="274" r:id="rId10"/>
+    <p:sldId id="274" r:id="rId7"/>
+    <p:sldId id="261" r:id="rId8"/>
+    <p:sldId id="262" r:id="rId9"/>
+    <p:sldId id="263" r:id="rId10"/>
     <p:sldId id="265" r:id="rId11"/>
     <p:sldId id="264" r:id="rId12"/>
     <p:sldId id="266" r:id="rId13"/>
@@ -128,7 +128,7 @@
   </p:defaultTextStyle>
   <p:extLst>
     <p:ext uri="{EFAFB233-063F-42B5-8137-9DF3F51BA10A}">
-      <p15:sldGuideLst xmlns:p15="http://schemas.microsoft.com/office/powerpoint/2012/main" xmlns="">
+      <p15:sldGuideLst xmlns="" xmlns:p15="http://schemas.microsoft.com/office/powerpoint/2012/main">
         <p15:guide id="1" orient="horz" pos="2160">
           <p15:clr>
             <a:srgbClr val="A4A3A4"/>
@@ -3561,7 +3561,7 @@
           <p:cNvPr id="2" name="Title 1">
             <a:extLst>
               <a:ext uri="{FF2B5EF4-FFF2-40B4-BE49-F238E27FC236}">
-                <a16:creationId xmlns:a16="http://schemas.microsoft.com/office/drawing/2014/main" xmlns="" id="{BC60F0FA-7D3E-489E-B4A8-3579C35DE747}"/>
+                <a16:creationId xmlns="" xmlns:a16="http://schemas.microsoft.com/office/drawing/2014/main" id="{BC60F0FA-7D3E-489E-B4A8-3579C35DE747}"/>
               </a:ext>
             </a:extLst>
           </p:cNvPr>
@@ -3598,7 +3598,7 @@
           <p:cNvPr id="3" name="Subtitle 2">
             <a:extLst>
               <a:ext uri="{FF2B5EF4-FFF2-40B4-BE49-F238E27FC236}">
-                <a16:creationId xmlns:a16="http://schemas.microsoft.com/office/drawing/2014/main" xmlns="" id="{59138817-A4AB-42F6-9ED0-5D7A4A0C4583}"/>
+                <a16:creationId xmlns="" xmlns:a16="http://schemas.microsoft.com/office/drawing/2014/main" id="{59138817-A4AB-42F6-9ED0-5D7A4A0C4583}"/>
               </a:ext>
             </a:extLst>
           </p:cNvPr>
@@ -3679,7 +3679,7 @@
           <p:cNvPr id="4" name="Slide Number Placeholder 3">
             <a:extLst>
               <a:ext uri="{FF2B5EF4-FFF2-40B4-BE49-F238E27FC236}">
-                <a16:creationId xmlns:a16="http://schemas.microsoft.com/office/drawing/2014/main" xmlns="" id="{0A86AE17-1A1B-4C63-A60B-07DD0275EB2B}"/>
+                <a16:creationId xmlns="" xmlns:a16="http://schemas.microsoft.com/office/drawing/2014/main" id="{0A86AE17-1A1B-4C63-A60B-07DD0275EB2B}"/>
               </a:ext>
             </a:extLst>
           </p:cNvPr>
@@ -3738,7 +3738,7 @@
           <p:cNvPr id="2" name="Title 1">
             <a:extLst>
               <a:ext uri="{FF2B5EF4-FFF2-40B4-BE49-F238E27FC236}">
-                <a16:creationId xmlns:a16="http://schemas.microsoft.com/office/drawing/2014/main" xmlns="" id="{79732034-DF0D-4F26-84D8-CD1B8D30179B}"/>
+                <a16:creationId xmlns="" xmlns:a16="http://schemas.microsoft.com/office/drawing/2014/main" id="{79732034-DF0D-4F26-84D8-CD1B8D30179B}"/>
               </a:ext>
             </a:extLst>
           </p:cNvPr>
@@ -3769,7 +3769,7 @@
           <p:cNvPr id="3" name="Content Placeholder 2">
             <a:extLst>
               <a:ext uri="{FF2B5EF4-FFF2-40B4-BE49-F238E27FC236}">
-                <a16:creationId xmlns:a16="http://schemas.microsoft.com/office/drawing/2014/main" xmlns="" id="{3C057F40-40A7-4CAE-B87C-F65A17102C19}"/>
+                <a16:creationId xmlns="" xmlns:a16="http://schemas.microsoft.com/office/drawing/2014/main" id="{3C057F40-40A7-4CAE-B87C-F65A17102C19}"/>
               </a:ext>
             </a:extLst>
           </p:cNvPr>
@@ -3846,14 +3846,7 @@
                 <a:latin typeface="Times New Roman" panose="02020603050405020304" pitchFamily="18" charset="0"/>
                 <a:cs typeface="Times New Roman" panose="02020603050405020304" pitchFamily="18" charset="0"/>
               </a:rPr>
-              <a:t>). </a:t>
-            </a:r>
-            <a:r>
-              <a:rPr lang="en-US" dirty="0">
-                <a:latin typeface="Times New Roman" panose="02020603050405020304" pitchFamily="18" charset="0"/>
-                <a:cs typeface="Times New Roman" panose="02020603050405020304" pitchFamily="18" charset="0"/>
-              </a:rPr>
-              <a:t>O</a:t>
+              <a:t>). O</a:t>
             </a:r>
             <a:r>
               <a:rPr lang="en-US" dirty="0" smtClean="0">
@@ -4024,7 +4017,7 @@
           <p:cNvPr id="4" name="Picture 3">
             <a:extLst>
               <a:ext uri="{FF2B5EF4-FFF2-40B4-BE49-F238E27FC236}">
-                <a16:creationId xmlns:a16="http://schemas.microsoft.com/office/drawing/2014/main" xmlns="" id="{AD170295-B5A2-4CA5-B861-2B95FC69247C}"/>
+                <a16:creationId xmlns="" xmlns:a16="http://schemas.microsoft.com/office/drawing/2014/main" id="{AD170295-B5A2-4CA5-B861-2B95FC69247C}"/>
               </a:ext>
             </a:extLst>
           </p:cNvPr>
@@ -4052,7 +4045,7 @@
           <p:cNvPr id="5" name="Slide Number Placeholder 4">
             <a:extLst>
               <a:ext uri="{FF2B5EF4-FFF2-40B4-BE49-F238E27FC236}">
-                <a16:creationId xmlns:a16="http://schemas.microsoft.com/office/drawing/2014/main" xmlns="" id="{E95D4AFB-E8FA-4E9E-BD5E-873DED22E275}"/>
+                <a16:creationId xmlns="" xmlns:a16="http://schemas.microsoft.com/office/drawing/2014/main" id="{E95D4AFB-E8FA-4E9E-BD5E-873DED22E275}"/>
               </a:ext>
             </a:extLst>
           </p:cNvPr>
@@ -4111,7 +4104,7 @@
           <p:cNvPr id="2" name="Title 1">
             <a:extLst>
               <a:ext uri="{FF2B5EF4-FFF2-40B4-BE49-F238E27FC236}">
-                <a16:creationId xmlns:a16="http://schemas.microsoft.com/office/drawing/2014/main" xmlns="" id="{459E159F-BDAE-4DB6-9B02-31C1E5F53E4D}"/>
+                <a16:creationId xmlns="" xmlns:a16="http://schemas.microsoft.com/office/drawing/2014/main" id="{459E159F-BDAE-4DB6-9B02-31C1E5F53E4D}"/>
               </a:ext>
             </a:extLst>
           </p:cNvPr>
@@ -4142,7 +4135,7 @@
           <p:cNvPr id="3" name="Content Placeholder 2">
             <a:extLst>
               <a:ext uri="{FF2B5EF4-FFF2-40B4-BE49-F238E27FC236}">
-                <a16:creationId xmlns:a16="http://schemas.microsoft.com/office/drawing/2014/main" xmlns="" id="{87DBCE6D-BA6C-4D4B-B563-745E1C7B3536}"/>
+                <a16:creationId xmlns="" xmlns:a16="http://schemas.microsoft.com/office/drawing/2014/main" id="{87DBCE6D-BA6C-4D4B-B563-745E1C7B3536}"/>
               </a:ext>
             </a:extLst>
           </p:cNvPr>
@@ -4209,7 +4202,7 @@
           <p:cNvPr id="4" name="Slide Number Placeholder 3">
             <a:extLst>
               <a:ext uri="{FF2B5EF4-FFF2-40B4-BE49-F238E27FC236}">
-                <a16:creationId xmlns:a16="http://schemas.microsoft.com/office/drawing/2014/main" xmlns="" id="{5B3E101C-24F8-4EA6-8DF9-4090DB1444FB}"/>
+                <a16:creationId xmlns="" xmlns:a16="http://schemas.microsoft.com/office/drawing/2014/main" id="{5B3E101C-24F8-4EA6-8DF9-4090DB1444FB}"/>
               </a:ext>
             </a:extLst>
           </p:cNvPr>
@@ -4268,7 +4261,7 @@
           <p:cNvPr id="2" name="Title 1">
             <a:extLst>
               <a:ext uri="{FF2B5EF4-FFF2-40B4-BE49-F238E27FC236}">
-                <a16:creationId xmlns:a16="http://schemas.microsoft.com/office/drawing/2014/main" xmlns="" id="{9D5A07A9-3CA7-4EB1-A906-558AA61068B0}"/>
+                <a16:creationId xmlns="" xmlns:a16="http://schemas.microsoft.com/office/drawing/2014/main" id="{9D5A07A9-3CA7-4EB1-A906-558AA61068B0}"/>
               </a:ext>
             </a:extLst>
           </p:cNvPr>
@@ -4299,7 +4292,7 @@
           <p:cNvPr id="3" name="Content Placeholder 2">
             <a:extLst>
               <a:ext uri="{FF2B5EF4-FFF2-40B4-BE49-F238E27FC236}">
-                <a16:creationId xmlns:a16="http://schemas.microsoft.com/office/drawing/2014/main" xmlns="" id="{466AA86D-DFED-4E3C-A03D-60FF211AEB75}"/>
+                <a16:creationId xmlns="" xmlns:a16="http://schemas.microsoft.com/office/drawing/2014/main" id="{466AA86D-DFED-4E3C-A03D-60FF211AEB75}"/>
               </a:ext>
             </a:extLst>
           </p:cNvPr>
@@ -4449,7 +4442,7 @@
           <p:cNvPr id="4" name="Slide Number Placeholder 3">
             <a:extLst>
               <a:ext uri="{FF2B5EF4-FFF2-40B4-BE49-F238E27FC236}">
-                <a16:creationId xmlns:a16="http://schemas.microsoft.com/office/drawing/2014/main" xmlns="" id="{E129BBB6-068B-4391-B822-EF585842D724}"/>
+                <a16:creationId xmlns="" xmlns:a16="http://schemas.microsoft.com/office/drawing/2014/main" id="{E129BBB6-068B-4391-B822-EF585842D724}"/>
               </a:ext>
             </a:extLst>
           </p:cNvPr>
@@ -4508,7 +4501,7 @@
           <p:cNvPr id="2" name="Title 1">
             <a:extLst>
               <a:ext uri="{FF2B5EF4-FFF2-40B4-BE49-F238E27FC236}">
-                <a16:creationId xmlns:a16="http://schemas.microsoft.com/office/drawing/2014/main" xmlns="" id="{305F9FD6-CEE3-4E89-A3D2-9A94AF45028D}"/>
+                <a16:creationId xmlns="" xmlns:a16="http://schemas.microsoft.com/office/drawing/2014/main" id="{305F9FD6-CEE3-4E89-A3D2-9A94AF45028D}"/>
               </a:ext>
             </a:extLst>
           </p:cNvPr>
@@ -4539,7 +4532,7 @@
           <p:cNvPr id="3" name="Content Placeholder 2">
             <a:extLst>
               <a:ext uri="{FF2B5EF4-FFF2-40B4-BE49-F238E27FC236}">
-                <a16:creationId xmlns:a16="http://schemas.microsoft.com/office/drawing/2014/main" xmlns="" id="{F2256217-6441-4524-88F5-92A4181A19DD}"/>
+                <a16:creationId xmlns="" xmlns:a16="http://schemas.microsoft.com/office/drawing/2014/main" id="{F2256217-6441-4524-88F5-92A4181A19DD}"/>
               </a:ext>
             </a:extLst>
           </p:cNvPr>
@@ -4618,7 +4611,7 @@
           <p:cNvPr id="4" name="Picture 3">
             <a:extLst>
               <a:ext uri="{FF2B5EF4-FFF2-40B4-BE49-F238E27FC236}">
-                <a16:creationId xmlns:a16="http://schemas.microsoft.com/office/drawing/2014/main" xmlns="" id="{1207F182-2C5B-4884-B493-5D3D39E3791B}"/>
+                <a16:creationId xmlns="" xmlns:a16="http://schemas.microsoft.com/office/drawing/2014/main" id="{1207F182-2C5B-4884-B493-5D3D39E3791B}"/>
               </a:ext>
             </a:extLst>
           </p:cNvPr>
@@ -4657,7 +4650,7 @@
           <p:cNvPr id="5" name="Slide Number Placeholder 4">
             <a:extLst>
               <a:ext uri="{FF2B5EF4-FFF2-40B4-BE49-F238E27FC236}">
-                <a16:creationId xmlns:a16="http://schemas.microsoft.com/office/drawing/2014/main" xmlns="" id="{41B51C23-AF9C-406D-A710-68EF2CF27265}"/>
+                <a16:creationId xmlns="" xmlns:a16="http://schemas.microsoft.com/office/drawing/2014/main" id="{41B51C23-AF9C-406D-A710-68EF2CF27265}"/>
               </a:ext>
             </a:extLst>
           </p:cNvPr>
@@ -4716,7 +4709,7 @@
           <p:cNvPr id="2" name="Title 1">
             <a:extLst>
               <a:ext uri="{FF2B5EF4-FFF2-40B4-BE49-F238E27FC236}">
-                <a16:creationId xmlns:a16="http://schemas.microsoft.com/office/drawing/2014/main" xmlns="" id="{9848A2EE-C121-43C9-BA4B-A9B242509668}"/>
+                <a16:creationId xmlns="" xmlns:a16="http://schemas.microsoft.com/office/drawing/2014/main" id="{9848A2EE-C121-43C9-BA4B-A9B242509668}"/>
               </a:ext>
             </a:extLst>
           </p:cNvPr>
@@ -4747,7 +4740,7 @@
           <p:cNvPr id="3" name="Content Placeholder 2">
             <a:extLst>
               <a:ext uri="{FF2B5EF4-FFF2-40B4-BE49-F238E27FC236}">
-                <a16:creationId xmlns:a16="http://schemas.microsoft.com/office/drawing/2014/main" xmlns="" id="{3082308F-9D52-4858-BB10-F94701C2AC44}"/>
+                <a16:creationId xmlns="" xmlns:a16="http://schemas.microsoft.com/office/drawing/2014/main" id="{3082308F-9D52-4858-BB10-F94701C2AC44}"/>
               </a:ext>
             </a:extLst>
           </p:cNvPr>
@@ -4822,7 +4815,7 @@
           <p:cNvPr id="5" name="Slide Number Placeholder 4">
             <a:extLst>
               <a:ext uri="{FF2B5EF4-FFF2-40B4-BE49-F238E27FC236}">
-                <a16:creationId xmlns:a16="http://schemas.microsoft.com/office/drawing/2014/main" xmlns="" id="{D2609442-B16A-41A6-9580-3008C9639646}"/>
+                <a16:creationId xmlns="" xmlns:a16="http://schemas.microsoft.com/office/drawing/2014/main" id="{D2609442-B16A-41A6-9580-3008C9639646}"/>
               </a:ext>
             </a:extLst>
           </p:cNvPr>
@@ -4881,7 +4874,7 @@
           <p:cNvPr id="2" name="Title 1">
             <a:extLst>
               <a:ext uri="{FF2B5EF4-FFF2-40B4-BE49-F238E27FC236}">
-                <a16:creationId xmlns:a16="http://schemas.microsoft.com/office/drawing/2014/main" xmlns="" id="{02C04A12-9663-4F93-A4CF-C3FCE901FB72}"/>
+                <a16:creationId xmlns="" xmlns:a16="http://schemas.microsoft.com/office/drawing/2014/main" id="{02C04A12-9663-4F93-A4CF-C3FCE901FB72}"/>
               </a:ext>
             </a:extLst>
           </p:cNvPr>
@@ -4973,7 +4966,7 @@
           <p:cNvPr id="3" name="Slide Number Placeholder 2">
             <a:extLst>
               <a:ext uri="{FF2B5EF4-FFF2-40B4-BE49-F238E27FC236}">
-                <a16:creationId xmlns:a16="http://schemas.microsoft.com/office/drawing/2014/main" xmlns="" id="{0B71A8FC-BA34-47D9-8027-241899433F22}"/>
+                <a16:creationId xmlns="" xmlns:a16="http://schemas.microsoft.com/office/drawing/2014/main" id="{0B71A8FC-BA34-47D9-8027-241899433F22}"/>
               </a:ext>
             </a:extLst>
           </p:cNvPr>
@@ -5081,21 +5074,21 @@
                 <a:gridCol w="2505873">
                   <a:extLst>
                     <a:ext uri="{9D8B030D-6E8A-4147-A177-3AD203B41FA5}">
-                      <a16:colId xmlns:a16="http://schemas.microsoft.com/office/drawing/2014/main" xmlns="" val="20000"/>
+                      <a16:colId xmlns="" xmlns:a16="http://schemas.microsoft.com/office/drawing/2014/main" val="20000"/>
                     </a:ext>
                   </a:extLst>
                 </a:gridCol>
                 <a:gridCol w="2125351">
                   <a:extLst>
                     <a:ext uri="{9D8B030D-6E8A-4147-A177-3AD203B41FA5}">
-                      <a16:colId xmlns:a16="http://schemas.microsoft.com/office/drawing/2014/main" xmlns="" val="20001"/>
+                      <a16:colId xmlns="" xmlns:a16="http://schemas.microsoft.com/office/drawing/2014/main" val="20001"/>
                     </a:ext>
                   </a:extLst>
                 </a:gridCol>
                 <a:gridCol w="2043964">
                   <a:extLst>
                     <a:ext uri="{9D8B030D-6E8A-4147-A177-3AD203B41FA5}">
-                      <a16:colId xmlns:a16="http://schemas.microsoft.com/office/drawing/2014/main" xmlns="" val="20002"/>
+                      <a16:colId xmlns="" xmlns:a16="http://schemas.microsoft.com/office/drawing/2014/main" val="20002"/>
                     </a:ext>
                   </a:extLst>
                 </a:gridCol>
@@ -5190,7 +5183,7 @@
                 </a:tc>
                 <a:extLst>
                   <a:ext uri="{0D108BD9-81ED-4DB2-BD59-A6C34878D82A}">
-                    <a16:rowId xmlns:a16="http://schemas.microsoft.com/office/drawing/2014/main" xmlns="" val="10000"/>
+                    <a16:rowId xmlns="" xmlns:a16="http://schemas.microsoft.com/office/drawing/2014/main" val="10000"/>
                   </a:ext>
                 </a:extLst>
               </a:tr>
@@ -5284,7 +5277,7 @@
                 </a:tc>
                 <a:extLst>
                   <a:ext uri="{0D108BD9-81ED-4DB2-BD59-A6C34878D82A}">
-                    <a16:rowId xmlns:a16="http://schemas.microsoft.com/office/drawing/2014/main" xmlns="" val="10001"/>
+                    <a16:rowId xmlns="" xmlns:a16="http://schemas.microsoft.com/office/drawing/2014/main" val="10001"/>
                   </a:ext>
                 </a:extLst>
               </a:tr>
@@ -5414,7 +5407,7 @@
                 </a:tc>
                 <a:extLst>
                   <a:ext uri="{0D108BD9-81ED-4DB2-BD59-A6C34878D82A}">
-                    <a16:rowId xmlns:a16="http://schemas.microsoft.com/office/drawing/2014/main" xmlns="" val="10002"/>
+                    <a16:rowId xmlns="" xmlns:a16="http://schemas.microsoft.com/office/drawing/2014/main" val="10002"/>
                   </a:ext>
                 </a:extLst>
               </a:tr>
@@ -5544,7 +5537,7 @@
                 </a:tc>
                 <a:extLst>
                   <a:ext uri="{0D108BD9-81ED-4DB2-BD59-A6C34878D82A}">
-                    <a16:rowId xmlns:a16="http://schemas.microsoft.com/office/drawing/2014/main" xmlns="" val="10003"/>
+                    <a16:rowId xmlns="" xmlns:a16="http://schemas.microsoft.com/office/drawing/2014/main" val="10003"/>
                   </a:ext>
                 </a:extLst>
               </a:tr>
@@ -5674,7 +5667,7 @@
                 </a:tc>
                 <a:extLst>
                   <a:ext uri="{0D108BD9-81ED-4DB2-BD59-A6C34878D82A}">
-                    <a16:rowId xmlns:a16="http://schemas.microsoft.com/office/drawing/2014/main" xmlns="" val="10004"/>
+                    <a16:rowId xmlns="" xmlns:a16="http://schemas.microsoft.com/office/drawing/2014/main" val="10004"/>
                   </a:ext>
                 </a:extLst>
               </a:tr>
@@ -5804,7 +5797,7 @@
                 </a:tc>
                 <a:extLst>
                   <a:ext uri="{0D108BD9-81ED-4DB2-BD59-A6C34878D82A}">
-                    <a16:rowId xmlns:a16="http://schemas.microsoft.com/office/drawing/2014/main" xmlns="" val="10005"/>
+                    <a16:rowId xmlns="" xmlns:a16="http://schemas.microsoft.com/office/drawing/2014/main" val="10005"/>
                   </a:ext>
                 </a:extLst>
               </a:tr>
@@ -5934,7 +5927,7 @@
                 </a:tc>
                 <a:extLst>
                   <a:ext uri="{0D108BD9-81ED-4DB2-BD59-A6C34878D82A}">
-                    <a16:rowId xmlns:a16="http://schemas.microsoft.com/office/drawing/2014/main" xmlns="" val="10006"/>
+                    <a16:rowId xmlns="" xmlns:a16="http://schemas.microsoft.com/office/drawing/2014/main" val="10006"/>
                   </a:ext>
                 </a:extLst>
               </a:tr>
@@ -6064,7 +6057,7 @@
                 </a:tc>
                 <a:extLst>
                   <a:ext uri="{0D108BD9-81ED-4DB2-BD59-A6C34878D82A}">
-                    <a16:rowId xmlns:a16="http://schemas.microsoft.com/office/drawing/2014/main" xmlns="" val="10007"/>
+                    <a16:rowId xmlns="" xmlns:a16="http://schemas.microsoft.com/office/drawing/2014/main" val="10007"/>
                   </a:ext>
                 </a:extLst>
               </a:tr>
@@ -6158,7 +6151,7 @@
                 </a:tc>
                 <a:extLst>
                   <a:ext uri="{0D108BD9-81ED-4DB2-BD59-A6C34878D82A}">
-                    <a16:rowId xmlns:a16="http://schemas.microsoft.com/office/drawing/2014/main" xmlns="" val="10008"/>
+                    <a16:rowId xmlns="" xmlns:a16="http://schemas.microsoft.com/office/drawing/2014/main" val="10008"/>
                   </a:ext>
                 </a:extLst>
               </a:tr>
@@ -6220,7 +6213,7 @@
           <p:cNvPr id="3" name="Slide Number Placeholder 2">
             <a:extLst>
               <a:ext uri="{FF2B5EF4-FFF2-40B4-BE49-F238E27FC236}">
-                <a16:creationId xmlns:a16="http://schemas.microsoft.com/office/drawing/2014/main" xmlns="" id="{D637FC5F-1629-47D5-A3A0-3A0A73136ED2}"/>
+                <a16:creationId xmlns="" xmlns:a16="http://schemas.microsoft.com/office/drawing/2014/main" id="{D637FC5F-1629-47D5-A3A0-3A0A73136ED2}"/>
               </a:ext>
             </a:extLst>
           </p:cNvPr>
@@ -6402,7 +6395,7 @@
           <p:cNvPr id="4" name="Slide Number Placeholder 3">
             <a:extLst>
               <a:ext uri="{FF2B5EF4-FFF2-40B4-BE49-F238E27FC236}">
-                <a16:creationId xmlns:a16="http://schemas.microsoft.com/office/drawing/2014/main" xmlns="" id="{5EB171F2-7743-4C10-A1C3-5323B50613A5}"/>
+                <a16:creationId xmlns="" xmlns:a16="http://schemas.microsoft.com/office/drawing/2014/main" id="{5EB171F2-7743-4C10-A1C3-5323B50613A5}"/>
               </a:ext>
             </a:extLst>
           </p:cNvPr>
@@ -6614,7 +6607,7 @@
           <p:cNvPr id="4" name="Slide Number Placeholder 3">
             <a:extLst>
               <a:ext uri="{FF2B5EF4-FFF2-40B4-BE49-F238E27FC236}">
-                <a16:creationId xmlns:a16="http://schemas.microsoft.com/office/drawing/2014/main" xmlns="" id="{F4CAD629-4519-4FAA-BFF2-E80BBA664C96}"/>
+                <a16:creationId xmlns="" xmlns:a16="http://schemas.microsoft.com/office/drawing/2014/main" id="{F4CAD629-4519-4FAA-BFF2-E80BBA664C96}"/>
               </a:ext>
             </a:extLst>
           </p:cNvPr>
@@ -6928,7 +6921,6 @@
               <a:rPr lang="en-IN" dirty="0"/>
               <a:t>, 2018</a:t>
             </a:r>
-            <a:endParaRPr lang="en-IN" dirty="0"/>
           </a:p>
         </p:txBody>
       </p:sp>
@@ -6990,7 +6982,7 @@
           <p:cNvPr id="2" name="Title 1">
             <a:extLst>
               <a:ext uri="{FF2B5EF4-FFF2-40B4-BE49-F238E27FC236}">
-                <a16:creationId xmlns:a16="http://schemas.microsoft.com/office/drawing/2014/main" xmlns="" id="{AEADAB91-8980-4F53-9688-21BED7326DE7}"/>
+                <a16:creationId xmlns="" xmlns:a16="http://schemas.microsoft.com/office/drawing/2014/main" id="{AEADAB91-8980-4F53-9688-21BED7326DE7}"/>
               </a:ext>
             </a:extLst>
           </p:cNvPr>
@@ -7021,7 +7013,7 @@
           <p:cNvPr id="3" name="Content Placeholder 2">
             <a:extLst>
               <a:ext uri="{FF2B5EF4-FFF2-40B4-BE49-F238E27FC236}">
-                <a16:creationId xmlns:a16="http://schemas.microsoft.com/office/drawing/2014/main" xmlns="" id="{A879210D-023D-4D55-84FD-4CB00233888D}"/>
+                <a16:creationId xmlns="" xmlns:a16="http://schemas.microsoft.com/office/drawing/2014/main" id="{A879210D-023D-4D55-84FD-4CB00233888D}"/>
               </a:ext>
             </a:extLst>
           </p:cNvPr>
@@ -7067,14 +7059,7 @@
                 <a:latin typeface="Times New Roman" panose="02020603050405020304" pitchFamily="18" charset="0"/>
                 <a:cs typeface="Times New Roman" panose="02020603050405020304" pitchFamily="18" charset="0"/>
               </a:rPr>
-              <a:t>export</a:t>
-            </a:r>
-            <a:r>
-              <a:rPr lang="en-US" dirty="0" smtClean="0">
-                <a:latin typeface="Times New Roman" panose="02020603050405020304" pitchFamily="18" charset="0"/>
-                <a:cs typeface="Times New Roman" panose="02020603050405020304" pitchFamily="18" charset="0"/>
-              </a:rPr>
-              <a:t> </a:t>
+              <a:t>export </a:t>
             </a:r>
             <a:r>
               <a:rPr lang="en-US" dirty="0">
@@ -7111,7 +7096,7 @@
           <p:cNvPr id="4" name="Slide Number Placeholder 3">
             <a:extLst>
               <a:ext uri="{FF2B5EF4-FFF2-40B4-BE49-F238E27FC236}">
-                <a16:creationId xmlns:a16="http://schemas.microsoft.com/office/drawing/2014/main" xmlns="" id="{66E1CA14-90D6-43A5-9C6F-E30227221CD7}"/>
+                <a16:creationId xmlns="" xmlns:a16="http://schemas.microsoft.com/office/drawing/2014/main" id="{66E1CA14-90D6-43A5-9C6F-E30227221CD7}"/>
               </a:ext>
             </a:extLst>
           </p:cNvPr>
@@ -7195,7 +7180,7 @@
           <p:cNvPr id="3" name="Slide Number Placeholder 2">
             <a:extLst>
               <a:ext uri="{FF2B5EF4-FFF2-40B4-BE49-F238E27FC236}">
-                <a16:creationId xmlns:a16="http://schemas.microsoft.com/office/drawing/2014/main" xmlns="" id="{CF50768F-32BC-4171-85D7-92F5DC437E5E}"/>
+                <a16:creationId xmlns="" xmlns:a16="http://schemas.microsoft.com/office/drawing/2014/main" id="{CF50768F-32BC-4171-85D7-92F5DC437E5E}"/>
               </a:ext>
             </a:extLst>
           </p:cNvPr>
@@ -7254,7 +7239,7 @@
           <p:cNvPr id="2" name="Title 1">
             <a:extLst>
               <a:ext uri="{FF2B5EF4-FFF2-40B4-BE49-F238E27FC236}">
-                <a16:creationId xmlns:a16="http://schemas.microsoft.com/office/drawing/2014/main" xmlns="" id="{7B3B6C76-254B-4957-AFE9-EA111965FE94}"/>
+                <a16:creationId xmlns="" xmlns:a16="http://schemas.microsoft.com/office/drawing/2014/main" id="{7B3B6C76-254B-4957-AFE9-EA111965FE94}"/>
               </a:ext>
             </a:extLst>
           </p:cNvPr>
@@ -7285,7 +7270,7 @@
           <p:cNvPr id="3" name="Content Placeholder 2">
             <a:extLst>
               <a:ext uri="{FF2B5EF4-FFF2-40B4-BE49-F238E27FC236}">
-                <a16:creationId xmlns:a16="http://schemas.microsoft.com/office/drawing/2014/main" xmlns="" id="{E344AEE5-F668-445D-8291-E46207E99A59}"/>
+                <a16:creationId xmlns="" xmlns:a16="http://schemas.microsoft.com/office/drawing/2014/main" id="{E344AEE5-F668-445D-8291-E46207E99A59}"/>
               </a:ext>
             </a:extLst>
           </p:cNvPr>
@@ -7361,7 +7346,7 @@
           <p:cNvPr id="4" name="Slide Number Placeholder 3">
             <a:extLst>
               <a:ext uri="{FF2B5EF4-FFF2-40B4-BE49-F238E27FC236}">
-                <a16:creationId xmlns:a16="http://schemas.microsoft.com/office/drawing/2014/main" xmlns="" id="{7BA8CF41-44B1-46C6-BCE6-5CA6D3465D06}"/>
+                <a16:creationId xmlns="" xmlns:a16="http://schemas.microsoft.com/office/drawing/2014/main" id="{7BA8CF41-44B1-46C6-BCE6-5CA6D3465D06}"/>
               </a:ext>
             </a:extLst>
           </p:cNvPr>
@@ -7420,7 +7405,7 @@
           <p:cNvPr id="2" name="Title 1">
             <a:extLst>
               <a:ext uri="{FF2B5EF4-FFF2-40B4-BE49-F238E27FC236}">
-                <a16:creationId xmlns:a16="http://schemas.microsoft.com/office/drawing/2014/main" xmlns="" id="{DF397BB6-61D8-41C1-818D-83C8A4F7E683}"/>
+                <a16:creationId xmlns="" xmlns:a16="http://schemas.microsoft.com/office/drawing/2014/main" id="{DF397BB6-61D8-41C1-818D-83C8A4F7E683}"/>
               </a:ext>
             </a:extLst>
           </p:cNvPr>
@@ -7451,7 +7436,7 @@
           <p:cNvPr id="3" name="Content Placeholder 2">
             <a:extLst>
               <a:ext uri="{FF2B5EF4-FFF2-40B4-BE49-F238E27FC236}">
-                <a16:creationId xmlns:a16="http://schemas.microsoft.com/office/drawing/2014/main" xmlns="" id="{8E5BF401-6CA6-4DF9-BEDA-266E07986AA8}"/>
+                <a16:creationId xmlns="" xmlns:a16="http://schemas.microsoft.com/office/drawing/2014/main" id="{8E5BF401-6CA6-4DF9-BEDA-266E07986AA8}"/>
               </a:ext>
             </a:extLst>
           </p:cNvPr>
@@ -7488,14 +7473,7 @@
                 <a:latin typeface="Times New Roman" panose="02020603050405020304" pitchFamily="18" charset="0"/>
                 <a:cs typeface="Times New Roman" panose="02020603050405020304" pitchFamily="18" charset="0"/>
               </a:rPr>
-              <a:t>and</a:t>
-            </a:r>
-            <a:r>
-              <a:rPr lang="en-US" dirty="0" smtClean="0">
-                <a:latin typeface="Times New Roman" panose="02020603050405020304" pitchFamily="18" charset="0"/>
-                <a:cs typeface="Times New Roman" panose="02020603050405020304" pitchFamily="18" charset="0"/>
-              </a:rPr>
-              <a:t> </a:t>
+              <a:t>and </a:t>
             </a:r>
             <a:r>
               <a:rPr lang="en-US" dirty="0">
@@ -7603,7 +7581,7 @@
           <p:cNvPr id="4" name="Slide Number Placeholder 3">
             <a:extLst>
               <a:ext uri="{FF2B5EF4-FFF2-40B4-BE49-F238E27FC236}">
-                <a16:creationId xmlns:a16="http://schemas.microsoft.com/office/drawing/2014/main" xmlns="" id="{00CCD94F-6B9D-40B2-8BBA-DEFBF5BD2335}"/>
+                <a16:creationId xmlns="" xmlns:a16="http://schemas.microsoft.com/office/drawing/2014/main" id="{00CCD94F-6B9D-40B2-8BBA-DEFBF5BD2335}"/>
               </a:ext>
             </a:extLst>
           </p:cNvPr>
@@ -7662,7 +7640,7 @@
           <p:cNvPr id="2" name="Title 1">
             <a:extLst>
               <a:ext uri="{FF2B5EF4-FFF2-40B4-BE49-F238E27FC236}">
-                <a16:creationId xmlns:a16="http://schemas.microsoft.com/office/drawing/2014/main" xmlns="" id="{4C89A33E-AACB-49C0-819F-8920338CF076}"/>
+                <a16:creationId xmlns="" xmlns:a16="http://schemas.microsoft.com/office/drawing/2014/main" id="{4C89A33E-AACB-49C0-819F-8920338CF076}"/>
               </a:ext>
             </a:extLst>
           </p:cNvPr>
@@ -7693,7 +7671,7 @@
           <p:cNvPr id="4" name="Content Placeholder 3">
             <a:extLst>
               <a:ext uri="{FF2B5EF4-FFF2-40B4-BE49-F238E27FC236}">
-                <a16:creationId xmlns:a16="http://schemas.microsoft.com/office/drawing/2014/main" xmlns="" id="{DBAF1874-DCD5-42BA-B8F9-7F6F1308CD2A}"/>
+                <a16:creationId xmlns="" xmlns:a16="http://schemas.microsoft.com/office/drawing/2014/main" id="{DBAF1874-DCD5-42BA-B8F9-7F6F1308CD2A}"/>
               </a:ext>
             </a:extLst>
           </p:cNvPr>
@@ -7731,7 +7709,7 @@
           <p:cNvPr id="3" name="Slide Number Placeholder 2">
             <a:extLst>
               <a:ext uri="{FF2B5EF4-FFF2-40B4-BE49-F238E27FC236}">
-                <a16:creationId xmlns:a16="http://schemas.microsoft.com/office/drawing/2014/main" xmlns="" id="{120FF20B-E954-4E5A-95AB-691E2CBBDDB2}"/>
+                <a16:creationId xmlns="" xmlns:a16="http://schemas.microsoft.com/office/drawing/2014/main" id="{120FF20B-E954-4E5A-95AB-691E2CBBDDB2}"/>
               </a:ext>
             </a:extLst>
           </p:cNvPr>
@@ -7787,13 +7765,7 @@
       </p:grpSpPr>
       <p:sp>
         <p:nvSpPr>
-          <p:cNvPr id="2" name="Title 1">
-            <a:extLst>
-              <a:ext uri="{FF2B5EF4-FFF2-40B4-BE49-F238E27FC236}">
-                <a16:creationId xmlns:a16="http://schemas.microsoft.com/office/drawing/2014/main" xmlns="" id="{DF09CCE7-7DE4-4276-8546-CC34212408B6}"/>
-              </a:ext>
-            </a:extLst>
-          </p:cNvPr>
+          <p:cNvPr id="2" name="Title 1"/>
           <p:cNvSpPr>
             <a:spLocks noGrp="1"/>
           </p:cNvSpPr>
@@ -7807,130 +7779,119 @@
           <a:lstStyle/>
           <a:p>
             <a:r>
-              <a:rPr lang="en-US" dirty="0">
-                <a:latin typeface="Times New Roman" panose="02020603050405020304" pitchFamily="18" charset="0"/>
-                <a:cs typeface="Times New Roman" panose="02020603050405020304" pitchFamily="18" charset="0"/>
-              </a:rPr>
-              <a:t>Commodities which we traded the most</a:t>
-            </a:r>
-          </a:p>
-        </p:txBody>
-      </p:sp>
-      <p:pic>
-        <p:nvPicPr>
-          <p:cNvPr id="4" name="Content Placeholder 3">
-            <a:extLst>
-              <a:ext uri="{FF2B5EF4-FFF2-40B4-BE49-F238E27FC236}">
-                <a16:creationId xmlns:a16="http://schemas.microsoft.com/office/drawing/2014/main" xmlns="" id="{C7BEF372-F27F-4DDC-91E8-5D485CDD8622}"/>
-              </a:ext>
-            </a:extLst>
-          </p:cNvPr>
-          <p:cNvPicPr>
-            <a:picLocks noGrp="1"/>
-          </p:cNvPicPr>
+              <a:rPr lang="en-IN" dirty="0" smtClean="0"/>
+              <a:t>Technologies Used</a:t>
+            </a:r>
+            <a:endParaRPr lang="en-IN" dirty="0"/>
+          </a:p>
+        </p:txBody>
+      </p:sp>
+      <p:sp>
+        <p:nvSpPr>
+          <p:cNvPr id="3" name="Content Placeholder 2"/>
+          <p:cNvSpPr>
+            <a:spLocks noGrp="1"/>
+          </p:cNvSpPr>
           <p:nvPr>
             <p:ph idx="1"/>
           </p:nvPr>
-        </p:nvPicPr>
-        <p:blipFill>
-          <a:blip r:embed="rId2">
-            <a:extLst>
-              <a:ext uri="{28A0092B-C50C-407E-A947-70E740481C1C}">
-                <a14:useLocalDpi xmlns:a14="http://schemas.microsoft.com/office/drawing/2010/main" val="0"/>
-              </a:ext>
-            </a:extLst>
-          </a:blip>
-          <a:stretch>
-            <a:fillRect/>
-          </a:stretch>
-        </p:blipFill>
+        </p:nvSpPr>
         <p:spPr>
           <a:xfrm>
-            <a:off x="561860" y="1872640"/>
-            <a:ext cx="7690550" cy="4054435"/>
+            <a:off x="609600" y="1612232"/>
+            <a:ext cx="10160000" cy="4800600"/>
           </a:xfrm>
-          <a:prstGeom prst="rect">
-            <a:avLst/>
-          </a:prstGeom>
         </p:spPr>
-      </p:pic>
-      <p:sp>
-        <p:nvSpPr>
-          <p:cNvPr id="5" name="TextBox 4">
-            <a:extLst>
-              <a:ext uri="{FF2B5EF4-FFF2-40B4-BE49-F238E27FC236}">
-                <a16:creationId xmlns:a16="http://schemas.microsoft.com/office/drawing/2014/main" xmlns="" id="{D99B2D6F-704A-4629-8F33-9A6A63627A46}"/>
-              </a:ext>
-            </a:extLst>
-          </p:cNvPr>
-          <p:cNvSpPr txBox="1"/>
-          <p:nvPr/>
-        </p:nvSpPr>
-        <p:spPr>
-          <a:xfrm>
-            <a:off x="8414240" y="2162907"/>
-            <a:ext cx="2523392" cy="3416320"/>
-          </a:xfrm>
-          <a:prstGeom prst="rect">
-            <a:avLst/>
-          </a:prstGeom>
-          <a:noFill/>
-        </p:spPr>
-        <p:txBody>
-          <a:bodyPr wrap="square" rtlCol="0">
-            <a:spAutoFit/>
-          </a:bodyPr>
-          <a:lstStyle/>
-          <a:p>
-            <a:pPr marL="285750" indent="-285750">
-              <a:buFont typeface="Arial" pitchFamily="34" charset="0"/>
-              <a:buChar char="•"/>
-            </a:pPr>
-            <a:r>
-              <a:rPr lang="en-US" dirty="0">
-                <a:latin typeface="Times New Roman" panose="02020603050405020304" pitchFamily="18" charset="0"/>
-                <a:cs typeface="Times New Roman" panose="02020603050405020304" pitchFamily="18" charset="0"/>
-              </a:rPr>
-              <a:t>27 for Mineral Fuels and Mineral Oils and the product of there distillation.</a:t>
-            </a:r>
-          </a:p>
-          <a:p>
-            <a:pPr marL="285750" indent="-285750">
-              <a:buFont typeface="Arial" pitchFamily="34" charset="0"/>
-              <a:buChar char="•"/>
-            </a:pPr>
-            <a:r>
-              <a:rPr lang="en-US" dirty="0">
-                <a:latin typeface="Times New Roman" panose="02020603050405020304" pitchFamily="18" charset="0"/>
-                <a:cs typeface="Times New Roman" panose="02020603050405020304" pitchFamily="18" charset="0"/>
-              </a:rPr>
-              <a:t>71 for natural or cultured pearls, precious or semiprecious stones, Pre-Metals, Coins etc.</a:t>
-            </a:r>
-          </a:p>
-          <a:p>
-            <a:pPr marL="285750" indent="-285750">
-              <a:buFont typeface="Arial" pitchFamily="34" charset="0"/>
-              <a:buChar char="•"/>
-            </a:pPr>
-            <a:r>
-              <a:rPr lang="en-US" dirty="0">
-                <a:latin typeface="Times New Roman" panose="02020603050405020304" pitchFamily="18" charset="0"/>
-                <a:cs typeface="Times New Roman" panose="02020603050405020304" pitchFamily="18" charset="0"/>
-              </a:rPr>
-              <a:t>85 for Electrical Machinery and Equipment</a:t>
-            </a:r>
-          </a:p>
-        </p:txBody>
-      </p:sp>
-      <p:sp>
-        <p:nvSpPr>
-          <p:cNvPr id="3" name="Slide Number Placeholder 2">
-            <a:extLst>
-              <a:ext uri="{FF2B5EF4-FFF2-40B4-BE49-F238E27FC236}">
-                <a16:creationId xmlns:a16="http://schemas.microsoft.com/office/drawing/2014/main" xmlns="" id="{EFD55A3F-581D-486B-872C-90B0A238A33C}"/>
-              </a:ext>
-            </a:extLst>
-          </p:cNvPr>
+        <p:txBody>
+          <a:bodyPr/>
+          <a:lstStyle/>
+          <a:p>
+            <a:r>
+              <a:rPr lang="en-IN" dirty="0" err="1" smtClean="0"/>
+              <a:t>Jupyter</a:t>
+            </a:r>
+            <a:r>
+              <a:rPr lang="en-IN" dirty="0" smtClean="0"/>
+              <a:t> Notebook</a:t>
+            </a:r>
+          </a:p>
+          <a:p>
+            <a:r>
+              <a:rPr lang="en-IN" dirty="0" smtClean="0"/>
+              <a:t>Python3</a:t>
+            </a:r>
+          </a:p>
+          <a:p>
+            <a:r>
+              <a:rPr lang="en-IN" dirty="0" smtClean="0"/>
+              <a:t>Libraries used for trade analysis – Numpy, Matplotlib, </a:t>
+            </a:r>
+            <a:r>
+              <a:rPr lang="en-IN" dirty="0" err="1" smtClean="0"/>
+              <a:t>Seaborn</a:t>
+            </a:r>
+            <a:r>
+              <a:rPr lang="en-IN" dirty="0" smtClean="0"/>
+              <a:t>, Pandas, Random, Math, </a:t>
+            </a:r>
+            <a:r>
+              <a:rPr lang="en-IN" dirty="0" err="1" smtClean="0"/>
+              <a:t>Datetime</a:t>
+            </a:r>
+            <a:r>
+              <a:rPr lang="en-IN" dirty="0" smtClean="0"/>
+              <a:t>, Warnings</a:t>
+            </a:r>
+          </a:p>
+          <a:p>
+            <a:r>
+              <a:rPr lang="en-IN" dirty="0" err="1" smtClean="0"/>
+              <a:t>Tensorflow</a:t>
+            </a:r>
+            <a:r>
+              <a:rPr lang="en-IN" dirty="0" smtClean="0"/>
+              <a:t>, </a:t>
+            </a:r>
+            <a:r>
+              <a:rPr lang="en-IN" dirty="0" err="1" smtClean="0"/>
+              <a:t>Keras</a:t>
+            </a:r>
+            <a:r>
+              <a:rPr lang="en-IN" dirty="0" smtClean="0"/>
+              <a:t> and </a:t>
+            </a:r>
+            <a:r>
+              <a:rPr lang="en-IN" dirty="0" err="1" smtClean="0"/>
+              <a:t>Scikit</a:t>
+            </a:r>
+            <a:r>
+              <a:rPr lang="en-IN" dirty="0" smtClean="0"/>
+              <a:t>-learn for LSTM Implementation </a:t>
+            </a:r>
+          </a:p>
+          <a:p>
+            <a:r>
+              <a:rPr lang="en-IN" dirty="0" err="1" smtClean="0"/>
+              <a:t>Scikit</a:t>
+            </a:r>
+            <a:r>
+              <a:rPr lang="en-IN" dirty="0" smtClean="0"/>
+              <a:t>-learn and </a:t>
+            </a:r>
+            <a:r>
+              <a:rPr lang="en-IN" dirty="0" err="1" smtClean="0"/>
+              <a:t>Statmodels</a:t>
+            </a:r>
+            <a:r>
+              <a:rPr lang="en-IN" dirty="0" smtClean="0"/>
+              <a:t> for other statistical models implementation e.g. ARIMA and Holt winters method.</a:t>
+            </a:r>
+          </a:p>
+        </p:txBody>
+      </p:sp>
+      <p:sp>
+        <p:nvSpPr>
+          <p:cNvPr id="4" name="Slide Number Placeholder 3"/>
           <p:cNvSpPr>
             <a:spLocks noGrp="1"/>
           </p:cNvSpPr>
@@ -7954,7 +7915,7 @@
     </p:spTree>
     <p:extLst>
       <p:ext uri="{BB962C8B-B14F-4D97-AF65-F5344CB8AC3E}">
-        <p14:creationId xmlns:p14="http://schemas.microsoft.com/office/powerpoint/2010/main" val="355253069"/>
+        <p14:creationId xmlns:p14="http://schemas.microsoft.com/office/powerpoint/2010/main" val="618403057"/>
       </p:ext>
     </p:extLst>
   </p:cSld>
@@ -7986,7 +7947,7 @@
           <p:cNvPr id="2" name="Title 1">
             <a:extLst>
               <a:ext uri="{FF2B5EF4-FFF2-40B4-BE49-F238E27FC236}">
-                <a16:creationId xmlns:a16="http://schemas.microsoft.com/office/drawing/2014/main" xmlns="" id="{1A6B5522-BFDE-4C02-BE49-85BD361D3A50}"/>
+                <a16:creationId xmlns="" xmlns:a16="http://schemas.microsoft.com/office/drawing/2014/main" id="{DF09CCE7-7DE4-4276-8546-CC34212408B6}"/>
               </a:ext>
             </a:extLst>
           </p:cNvPr>
@@ -8007,7 +7968,7 @@
                 <a:latin typeface="Times New Roman" panose="02020603050405020304" pitchFamily="18" charset="0"/>
                 <a:cs typeface="Times New Roman" panose="02020603050405020304" pitchFamily="18" charset="0"/>
               </a:rPr>
-              <a:t>Countries which we traded the most</a:t>
+              <a:t>Commodities which we traded the most</a:t>
             </a:r>
           </a:p>
         </p:txBody>
@@ -8017,7 +7978,7 @@
           <p:cNvPr id="4" name="Content Placeholder 3">
             <a:extLst>
               <a:ext uri="{FF2B5EF4-FFF2-40B4-BE49-F238E27FC236}">
-                <a16:creationId xmlns:a16="http://schemas.microsoft.com/office/drawing/2014/main" xmlns="" id="{BB5653EC-DCFD-4B94-B431-1BF773E6E561}"/>
+                <a16:creationId xmlns="" xmlns:a16="http://schemas.microsoft.com/office/drawing/2014/main" id="{C7BEF372-F27F-4DDC-91E8-5D485CDD8622}"/>
               </a:ext>
             </a:extLst>
           </p:cNvPr>
@@ -8042,8 +8003,8 @@
         </p:blipFill>
         <p:spPr>
           <a:xfrm>
-            <a:off x="517793" y="1890225"/>
-            <a:ext cx="7724973" cy="4191086"/>
+            <a:off x="561860" y="1872640"/>
+            <a:ext cx="7690550" cy="4054435"/>
           </a:xfrm>
           <a:prstGeom prst="rect">
             <a:avLst/>
@@ -8055,7 +8016,7 @@
           <p:cNvPr id="5" name="TextBox 4">
             <a:extLst>
               <a:ext uri="{FF2B5EF4-FFF2-40B4-BE49-F238E27FC236}">
-                <a16:creationId xmlns:a16="http://schemas.microsoft.com/office/drawing/2014/main" xmlns="" id="{4DCC699E-A326-430A-8F1B-29C397404BE0}"/>
+                <a16:creationId xmlns="" xmlns:a16="http://schemas.microsoft.com/office/drawing/2014/main" id="{D99B2D6F-704A-4629-8F33-9A6A63627A46}"/>
               </a:ext>
             </a:extLst>
           </p:cNvPr>
@@ -8064,8 +8025,8 @@
         </p:nvSpPr>
         <p:spPr>
           <a:xfrm>
-            <a:off x="8537119" y="2120747"/>
-            <a:ext cx="2530426" cy="3693319"/>
+            <a:off x="8414240" y="2162907"/>
+            <a:ext cx="2523392" cy="3416320"/>
           </a:xfrm>
           <a:prstGeom prst="rect">
             <a:avLst/>
@@ -8087,7 +8048,7 @@
                 <a:latin typeface="Times New Roman" panose="02020603050405020304" pitchFamily="18" charset="0"/>
                 <a:cs typeface="Times New Roman" panose="02020603050405020304" pitchFamily="18" charset="0"/>
               </a:rPr>
-              <a:t>China tops the list with around $4379 million trade Import followed by United Arab Emirates, Saudi Arab and USA. </a:t>
+              <a:t>27 for Mineral Fuels and Mineral Oils and the product of there distillation.</a:t>
             </a:r>
           </a:p>
           <a:p>
@@ -8100,35 +8061,20 @@
                 <a:latin typeface="Times New Roman" panose="02020603050405020304" pitchFamily="18" charset="0"/>
                 <a:cs typeface="Times New Roman" panose="02020603050405020304" pitchFamily="18" charset="0"/>
               </a:rPr>
-              <a:t>While USA </a:t>
-            </a:r>
-            <a:r>
-              <a:rPr lang="en-US" dirty="0" smtClean="0">
-                <a:latin typeface="Times New Roman" panose="02020603050405020304" pitchFamily="18" charset="0"/>
-                <a:cs typeface="Times New Roman" panose="02020603050405020304" pitchFamily="18" charset="0"/>
-              </a:rPr>
-              <a:t>is the </a:t>
-            </a:r>
-            <a:r>
-              <a:rPr lang="en-US" dirty="0">
-                <a:latin typeface="Times New Roman" panose="02020603050405020304" pitchFamily="18" charset="0"/>
-                <a:cs typeface="Times New Roman" panose="02020603050405020304" pitchFamily="18" charset="0"/>
-              </a:rPr>
-              <a:t>top </a:t>
-            </a:r>
-            <a:r>
-              <a:rPr lang="en-US" dirty="0" smtClean="0">
-                <a:latin typeface="Times New Roman" panose="02020603050405020304" pitchFamily="18" charset="0"/>
-                <a:cs typeface="Times New Roman" panose="02020603050405020304" pitchFamily="18" charset="0"/>
-              </a:rPr>
-              <a:t>country </a:t>
-            </a:r>
-            <a:r>
-              <a:rPr lang="en-US" dirty="0">
-                <a:latin typeface="Times New Roman" panose="02020603050405020304" pitchFamily="18" charset="0"/>
-                <a:cs typeface="Times New Roman" panose="02020603050405020304" pitchFamily="18" charset="0"/>
-              </a:rPr>
-              <a:t>to which India exports the most $3013 million followed by UAE, China, Hong Kong and Singapore.</a:t>
+              <a:t>71 for natural or cultured pearls, precious or semiprecious stones, Pre-Metals, Coins etc.</a:t>
+            </a:r>
+          </a:p>
+          <a:p>
+            <a:pPr marL="285750" indent="-285750">
+              <a:buFont typeface="Arial" pitchFamily="34" charset="0"/>
+              <a:buChar char="•"/>
+            </a:pPr>
+            <a:r>
+              <a:rPr lang="en-US" dirty="0">
+                <a:latin typeface="Times New Roman" panose="02020603050405020304" pitchFamily="18" charset="0"/>
+                <a:cs typeface="Times New Roman" panose="02020603050405020304" pitchFamily="18" charset="0"/>
+              </a:rPr>
+              <a:t>85 for Electrical Machinery and Equipment</a:t>
             </a:r>
           </a:p>
         </p:txBody>
@@ -8138,7 +8084,7 @@
           <p:cNvPr id="3" name="Slide Number Placeholder 2">
             <a:extLst>
               <a:ext uri="{FF2B5EF4-FFF2-40B4-BE49-F238E27FC236}">
-                <a16:creationId xmlns:a16="http://schemas.microsoft.com/office/drawing/2014/main" xmlns="" id="{C7C847A6-4A8E-4B65-A738-3703496D8216}"/>
+                <a16:creationId xmlns="" xmlns:a16="http://schemas.microsoft.com/office/drawing/2014/main" id="{EFD55A3F-581D-486B-872C-90B0A238A33C}"/>
               </a:ext>
             </a:extLst>
           </p:cNvPr>
@@ -8165,7 +8111,7 @@
     </p:spTree>
     <p:extLst>
       <p:ext uri="{BB962C8B-B14F-4D97-AF65-F5344CB8AC3E}">
-        <p14:creationId xmlns:p14="http://schemas.microsoft.com/office/powerpoint/2010/main" val="2726008319"/>
+        <p14:creationId xmlns:p14="http://schemas.microsoft.com/office/powerpoint/2010/main" val="355253069"/>
       </p:ext>
     </p:extLst>
   </p:cSld>
@@ -8197,7 +8143,7 @@
           <p:cNvPr id="2" name="Title 1">
             <a:extLst>
               <a:ext uri="{FF2B5EF4-FFF2-40B4-BE49-F238E27FC236}">
-                <a16:creationId xmlns:a16="http://schemas.microsoft.com/office/drawing/2014/main" xmlns="" id="{FA0B0F23-AA5A-482B-9292-21909CD3D244}"/>
+                <a16:creationId xmlns="" xmlns:a16="http://schemas.microsoft.com/office/drawing/2014/main" id="{1A6B5522-BFDE-4C02-BE49-85BD361D3A50}"/>
               </a:ext>
             </a:extLst>
           </p:cNvPr>
@@ -8218,123 +8164,138 @@
                 <a:latin typeface="Times New Roman" panose="02020603050405020304" pitchFamily="18" charset="0"/>
                 <a:cs typeface="Times New Roman" panose="02020603050405020304" pitchFamily="18" charset="0"/>
               </a:rPr>
-              <a:t>Models we Used for Forecasting</a:t>
-            </a:r>
-          </a:p>
-        </p:txBody>
-      </p:sp>
-      <p:sp>
-        <p:nvSpPr>
-          <p:cNvPr id="3" name="Content Placeholder 2">
+              <a:t>Countries which we traded the most</a:t>
+            </a:r>
+          </a:p>
+        </p:txBody>
+      </p:sp>
+      <p:pic>
+        <p:nvPicPr>
+          <p:cNvPr id="4" name="Content Placeholder 3">
             <a:extLst>
               <a:ext uri="{FF2B5EF4-FFF2-40B4-BE49-F238E27FC236}">
-                <a16:creationId xmlns:a16="http://schemas.microsoft.com/office/drawing/2014/main" xmlns="" id="{5891B381-2B71-49EA-A683-A3160B6C07B2}"/>
+                <a16:creationId xmlns="" xmlns:a16="http://schemas.microsoft.com/office/drawing/2014/main" id="{BB5653EC-DCFD-4B94-B431-1BF773E6E561}"/>
               </a:ext>
             </a:extLst>
           </p:cNvPr>
-          <p:cNvSpPr>
-            <a:spLocks noGrp="1"/>
-          </p:cNvSpPr>
+          <p:cNvPicPr>
+            <a:picLocks noGrp="1"/>
+          </p:cNvPicPr>
           <p:nvPr>
             <p:ph idx="1"/>
           </p:nvPr>
-        </p:nvSpPr>
-        <p:spPr/>
-        <p:txBody>
-          <a:bodyPr/>
-          <a:lstStyle/>
-          <a:p>
-            <a:r>
-              <a:rPr lang="en-US" dirty="0">
-                <a:latin typeface="Times New Roman" panose="02020603050405020304" pitchFamily="18" charset="0"/>
-                <a:cs typeface="Times New Roman" panose="02020603050405020304" pitchFamily="18" charset="0"/>
-              </a:rPr>
-              <a:t>Exponential Smoothing</a:t>
-            </a:r>
-          </a:p>
-          <a:p>
-            <a:r>
-              <a:rPr lang="en-US" dirty="0">
-                <a:latin typeface="Times New Roman" panose="02020603050405020304" pitchFamily="18" charset="0"/>
-                <a:cs typeface="Times New Roman" panose="02020603050405020304" pitchFamily="18" charset="0"/>
-              </a:rPr>
-              <a:t>Auto Regressive Model</a:t>
-            </a:r>
-          </a:p>
-          <a:p>
-            <a:r>
-              <a:rPr lang="en-US" dirty="0">
-                <a:latin typeface="Times New Roman" panose="02020603050405020304" pitchFamily="18" charset="0"/>
-                <a:cs typeface="Times New Roman" panose="02020603050405020304" pitchFamily="18" charset="0"/>
-              </a:rPr>
-              <a:t>Moving Average Model</a:t>
-            </a:r>
-          </a:p>
-          <a:p>
-            <a:r>
-              <a:rPr lang="en-US" dirty="0">
-                <a:latin typeface="Times New Roman" panose="02020603050405020304" pitchFamily="18" charset="0"/>
-                <a:cs typeface="Times New Roman" panose="02020603050405020304" pitchFamily="18" charset="0"/>
-              </a:rPr>
-              <a:t>Holt-Winters Model</a:t>
-            </a:r>
-          </a:p>
-          <a:p>
-            <a:r>
-              <a:rPr lang="en-US" dirty="0">
-                <a:latin typeface="Times New Roman" panose="02020603050405020304" pitchFamily="18" charset="0"/>
-                <a:cs typeface="Times New Roman" panose="02020603050405020304" pitchFamily="18" charset="0"/>
-              </a:rPr>
-              <a:t>ARIMA Additive</a:t>
-            </a:r>
-          </a:p>
-          <a:p>
-            <a:r>
-              <a:rPr lang="en-US" dirty="0">
-                <a:latin typeface="Times New Roman" panose="02020603050405020304" pitchFamily="18" charset="0"/>
-                <a:cs typeface="Times New Roman" panose="02020603050405020304" pitchFamily="18" charset="0"/>
-              </a:rPr>
-              <a:t>ARIMA Multiplicative</a:t>
-            </a:r>
-          </a:p>
-          <a:p>
-            <a:r>
-              <a:rPr lang="en-US" dirty="0">
-                <a:latin typeface="Times New Roman" panose="02020603050405020304" pitchFamily="18" charset="0"/>
-                <a:cs typeface="Times New Roman" panose="02020603050405020304" pitchFamily="18" charset="0"/>
-              </a:rPr>
-              <a:t>ARIMA Seasonal</a:t>
-            </a:r>
-          </a:p>
-          <a:p>
-            <a:r>
-              <a:rPr lang="en-US" dirty="0">
-                <a:latin typeface="Times New Roman" panose="02020603050405020304" pitchFamily="18" charset="0"/>
-                <a:cs typeface="Times New Roman" panose="02020603050405020304" pitchFamily="18" charset="0"/>
-              </a:rPr>
-              <a:t>RNN </a:t>
-            </a:r>
-            <a:r>
-              <a:rPr lang="en-US" dirty="0">
-                <a:latin typeface="Times New Roman" panose="02020603050405020304" pitchFamily="18" charset="0"/>
-                <a:cs typeface="Times New Roman" panose="02020603050405020304" pitchFamily="18" charset="0"/>
-                <a:sym typeface="Wingdings" panose="05000000000000000000" pitchFamily="2" charset="2"/>
-              </a:rPr>
-              <a:t> LSTM (Long Short Term Memory)</a:t>
-            </a:r>
-            <a:endParaRPr lang="en-US" dirty="0">
-              <a:latin typeface="Times New Roman" panose="02020603050405020304" pitchFamily="18" charset="0"/>
-              <a:cs typeface="Times New Roman" panose="02020603050405020304" pitchFamily="18" charset="0"/>
-            </a:endParaRPr>
-          </a:p>
-        </p:txBody>
-      </p:sp>
-      <p:sp>
-        <p:nvSpPr>
-          <p:cNvPr id="4" name="Slide Number Placeholder 3">
+        </p:nvPicPr>
+        <p:blipFill>
+          <a:blip r:embed="rId2">
+            <a:extLst>
+              <a:ext uri="{28A0092B-C50C-407E-A947-70E740481C1C}">
+                <a14:useLocalDpi xmlns:a14="http://schemas.microsoft.com/office/drawing/2010/main" val="0"/>
+              </a:ext>
+            </a:extLst>
+          </a:blip>
+          <a:stretch>
+            <a:fillRect/>
+          </a:stretch>
+        </p:blipFill>
+        <p:spPr>
+          <a:xfrm>
+            <a:off x="517793" y="1890225"/>
+            <a:ext cx="7724973" cy="4191086"/>
+          </a:xfrm>
+          <a:prstGeom prst="rect">
+            <a:avLst/>
+          </a:prstGeom>
+        </p:spPr>
+      </p:pic>
+      <p:sp>
+        <p:nvSpPr>
+          <p:cNvPr id="5" name="TextBox 4">
             <a:extLst>
               <a:ext uri="{FF2B5EF4-FFF2-40B4-BE49-F238E27FC236}">
-                <a16:creationId xmlns:a16="http://schemas.microsoft.com/office/drawing/2014/main" xmlns="" id="{0B22DF0D-8D91-4829-A4D1-ADB83A2BA515}"/>
+                <a16:creationId xmlns="" xmlns:a16="http://schemas.microsoft.com/office/drawing/2014/main" id="{4DCC699E-A326-430A-8F1B-29C397404BE0}"/>
+              </a:ext>
+            </a:extLst>
+          </p:cNvPr>
+          <p:cNvSpPr txBox="1"/>
+          <p:nvPr/>
+        </p:nvSpPr>
+        <p:spPr>
+          <a:xfrm>
+            <a:off x="8537119" y="2120747"/>
+            <a:ext cx="2530426" cy="3693319"/>
+          </a:xfrm>
+          <a:prstGeom prst="rect">
+            <a:avLst/>
+          </a:prstGeom>
+          <a:noFill/>
+        </p:spPr>
+        <p:txBody>
+          <a:bodyPr wrap="square" rtlCol="0">
+            <a:spAutoFit/>
+          </a:bodyPr>
+          <a:lstStyle/>
+          <a:p>
+            <a:pPr marL="285750" indent="-285750">
+              <a:buFont typeface="Arial" pitchFamily="34" charset="0"/>
+              <a:buChar char="•"/>
+            </a:pPr>
+            <a:r>
+              <a:rPr lang="en-US" dirty="0">
+                <a:latin typeface="Times New Roman" panose="02020603050405020304" pitchFamily="18" charset="0"/>
+                <a:cs typeface="Times New Roman" panose="02020603050405020304" pitchFamily="18" charset="0"/>
+              </a:rPr>
+              <a:t>China tops the list with around $4379 million trade Import followed by United Arab Emirates, Saudi Arab and USA. </a:t>
+            </a:r>
+          </a:p>
+          <a:p>
+            <a:pPr marL="285750" indent="-285750">
+              <a:buFont typeface="Arial" pitchFamily="34" charset="0"/>
+              <a:buChar char="•"/>
+            </a:pPr>
+            <a:r>
+              <a:rPr lang="en-US" dirty="0">
+                <a:latin typeface="Times New Roman" panose="02020603050405020304" pitchFamily="18" charset="0"/>
+                <a:cs typeface="Times New Roman" panose="02020603050405020304" pitchFamily="18" charset="0"/>
+              </a:rPr>
+              <a:t>While USA </a:t>
+            </a:r>
+            <a:r>
+              <a:rPr lang="en-US" dirty="0" smtClean="0">
+                <a:latin typeface="Times New Roman" panose="02020603050405020304" pitchFamily="18" charset="0"/>
+                <a:cs typeface="Times New Roman" panose="02020603050405020304" pitchFamily="18" charset="0"/>
+              </a:rPr>
+              <a:t>is the </a:t>
+            </a:r>
+            <a:r>
+              <a:rPr lang="en-US" dirty="0">
+                <a:latin typeface="Times New Roman" panose="02020603050405020304" pitchFamily="18" charset="0"/>
+                <a:cs typeface="Times New Roman" panose="02020603050405020304" pitchFamily="18" charset="0"/>
+              </a:rPr>
+              <a:t>top </a:t>
+            </a:r>
+            <a:r>
+              <a:rPr lang="en-US" dirty="0" smtClean="0">
+                <a:latin typeface="Times New Roman" panose="02020603050405020304" pitchFamily="18" charset="0"/>
+                <a:cs typeface="Times New Roman" panose="02020603050405020304" pitchFamily="18" charset="0"/>
+              </a:rPr>
+              <a:t>country </a:t>
+            </a:r>
+            <a:r>
+              <a:rPr lang="en-US" dirty="0">
+                <a:latin typeface="Times New Roman" panose="02020603050405020304" pitchFamily="18" charset="0"/>
+                <a:cs typeface="Times New Roman" panose="02020603050405020304" pitchFamily="18" charset="0"/>
+              </a:rPr>
+              <a:t>to which India exports the most $3013 million followed by UAE, China, Hong Kong and Singapore.</a:t>
+            </a:r>
+          </a:p>
+        </p:txBody>
+      </p:sp>
+      <p:sp>
+        <p:nvSpPr>
+          <p:cNvPr id="3" name="Slide Number Placeholder 2">
+            <a:extLst>
+              <a:ext uri="{FF2B5EF4-FFF2-40B4-BE49-F238E27FC236}">
+                <a16:creationId xmlns="" xmlns:a16="http://schemas.microsoft.com/office/drawing/2014/main" id="{C7C847A6-4A8E-4B65-A738-3703496D8216}"/>
               </a:ext>
             </a:extLst>
           </p:cNvPr>
@@ -8361,7 +8322,7 @@
     </p:spTree>
     <p:extLst>
       <p:ext uri="{BB962C8B-B14F-4D97-AF65-F5344CB8AC3E}">
-        <p14:creationId xmlns:p14="http://schemas.microsoft.com/office/powerpoint/2010/main" val="2176103284"/>
+        <p14:creationId xmlns:p14="http://schemas.microsoft.com/office/powerpoint/2010/main" val="2726008319"/>
       </p:ext>
     </p:extLst>
   </p:cSld>
@@ -8390,7 +8351,13 @@
       </p:grpSpPr>
       <p:sp>
         <p:nvSpPr>
-          <p:cNvPr id="2" name="Title 1"/>
+          <p:cNvPr id="2" name="Title 1">
+            <a:extLst>
+              <a:ext uri="{FF2B5EF4-FFF2-40B4-BE49-F238E27FC236}">
+                <a16:creationId xmlns="" xmlns:a16="http://schemas.microsoft.com/office/drawing/2014/main" id="{FA0B0F23-AA5A-482B-9292-21909CD3D244}"/>
+              </a:ext>
+            </a:extLst>
+          </p:cNvPr>
           <p:cNvSpPr>
             <a:spLocks noGrp="1"/>
           </p:cNvSpPr>
@@ -8404,16 +8371,24 @@
           <a:lstStyle/>
           <a:p>
             <a:r>
-              <a:rPr lang="en-IN" dirty="0" smtClean="0"/>
-              <a:t>Technologies Used</a:t>
-            </a:r>
-            <a:endParaRPr lang="en-IN" dirty="0"/>
-          </a:p>
-        </p:txBody>
-      </p:sp>
-      <p:sp>
-        <p:nvSpPr>
-          <p:cNvPr id="3" name="Content Placeholder 2"/>
+              <a:rPr lang="en-US" dirty="0">
+                <a:latin typeface="Times New Roman" panose="02020603050405020304" pitchFamily="18" charset="0"/>
+                <a:cs typeface="Times New Roman" panose="02020603050405020304" pitchFamily="18" charset="0"/>
+              </a:rPr>
+              <a:t>Models we Used for Forecasting</a:t>
+            </a:r>
+          </a:p>
+        </p:txBody>
+      </p:sp>
+      <p:sp>
+        <p:nvSpPr>
+          <p:cNvPr id="3" name="Content Placeholder 2">
+            <a:extLst>
+              <a:ext uri="{FF2B5EF4-FFF2-40B4-BE49-F238E27FC236}">
+                <a16:creationId xmlns="" xmlns:a16="http://schemas.microsoft.com/office/drawing/2014/main" id="{5891B381-2B71-49EA-A683-A3160B6C07B2}"/>
+              </a:ext>
+            </a:extLst>
+          </p:cNvPr>
           <p:cNvSpPr>
             <a:spLocks noGrp="1"/>
           </p:cNvSpPr>
@@ -8421,102 +8396,105 @@
             <p:ph idx="1"/>
           </p:nvPr>
         </p:nvSpPr>
-        <p:spPr>
-          <a:xfrm>
-            <a:off x="609600" y="1612232"/>
-            <a:ext cx="10160000" cy="4800600"/>
-          </a:xfrm>
-        </p:spPr>
-        <p:txBody>
-          <a:bodyPr/>
-          <a:lstStyle/>
-          <a:p>
-            <a:r>
-              <a:rPr lang="en-IN" dirty="0" err="1" smtClean="0"/>
-              <a:t>Jupyter</a:t>
-            </a:r>
-            <a:r>
-              <a:rPr lang="en-IN" dirty="0" smtClean="0"/>
-              <a:t> Notebook</a:t>
-            </a:r>
-          </a:p>
-          <a:p>
-            <a:r>
-              <a:rPr lang="en-IN" dirty="0" smtClean="0"/>
-              <a:t>Python3</a:t>
-            </a:r>
-          </a:p>
-          <a:p>
-            <a:r>
-              <a:rPr lang="en-IN" dirty="0" smtClean="0"/>
-              <a:t>Libraries used for trade analysis – Numpy, Matplotlib, </a:t>
-            </a:r>
-            <a:r>
-              <a:rPr lang="en-IN" dirty="0" err="1" smtClean="0"/>
-              <a:t>Seaborn</a:t>
-            </a:r>
-            <a:r>
-              <a:rPr lang="en-IN" dirty="0" smtClean="0"/>
-              <a:t>, Pandas, Random, Math, </a:t>
-            </a:r>
-            <a:r>
-              <a:rPr lang="en-IN" dirty="0" err="1" smtClean="0"/>
-              <a:t>Datetime</a:t>
-            </a:r>
-            <a:r>
-              <a:rPr lang="en-IN" dirty="0" smtClean="0"/>
-              <a:t>, Warnings</a:t>
-            </a:r>
-          </a:p>
-          <a:p>
-            <a:r>
-              <a:rPr lang="en-IN" dirty="0" err="1" smtClean="0"/>
-              <a:t>Tensorflow</a:t>
-            </a:r>
-            <a:r>
-              <a:rPr lang="en-IN" dirty="0" smtClean="0"/>
-              <a:t>, </a:t>
-            </a:r>
-            <a:r>
-              <a:rPr lang="en-IN" dirty="0" err="1" smtClean="0"/>
-              <a:t>Keras</a:t>
-            </a:r>
-            <a:r>
-              <a:rPr lang="en-IN" dirty="0" smtClean="0"/>
-              <a:t> and </a:t>
-            </a:r>
-            <a:r>
-              <a:rPr lang="en-IN" dirty="0" err="1" smtClean="0"/>
-              <a:t>Scikit</a:t>
-            </a:r>
-            <a:r>
-              <a:rPr lang="en-IN" dirty="0" smtClean="0"/>
-              <a:t>-learn for LSTM Implementation </a:t>
-            </a:r>
-          </a:p>
-          <a:p>
-            <a:r>
-              <a:rPr lang="en-IN" dirty="0" err="1" smtClean="0"/>
-              <a:t>Scikit</a:t>
-            </a:r>
-            <a:r>
-              <a:rPr lang="en-IN" dirty="0" smtClean="0"/>
-              <a:t>-learn and </a:t>
-            </a:r>
-            <a:r>
-              <a:rPr lang="en-IN" dirty="0" err="1" smtClean="0"/>
-              <a:t>Statmodels</a:t>
-            </a:r>
-            <a:r>
-              <a:rPr lang="en-IN" dirty="0" smtClean="0"/>
-              <a:t> for other statistical models implementation e.g. ARIMA and Holt winters method.</a:t>
-            </a:r>
-          </a:p>
-        </p:txBody>
-      </p:sp>
-      <p:sp>
-        <p:nvSpPr>
-          <p:cNvPr id="4" name="Slide Number Placeholder 3"/>
+        <p:spPr/>
+        <p:txBody>
+          <a:bodyPr/>
+          <a:lstStyle/>
+          <a:p>
+            <a:r>
+              <a:rPr lang="en-US" dirty="0">
+                <a:latin typeface="Times New Roman" panose="02020603050405020304" pitchFamily="18" charset="0"/>
+                <a:cs typeface="Times New Roman" panose="02020603050405020304" pitchFamily="18" charset="0"/>
+              </a:rPr>
+              <a:t>Exponential Smoothing</a:t>
+            </a:r>
+          </a:p>
+          <a:p>
+            <a:r>
+              <a:rPr lang="en-US" dirty="0">
+                <a:latin typeface="Times New Roman" panose="02020603050405020304" pitchFamily="18" charset="0"/>
+                <a:cs typeface="Times New Roman" panose="02020603050405020304" pitchFamily="18" charset="0"/>
+              </a:rPr>
+              <a:t>Auto Regressive Model</a:t>
+            </a:r>
+          </a:p>
+          <a:p>
+            <a:r>
+              <a:rPr lang="en-US" dirty="0">
+                <a:latin typeface="Times New Roman" panose="02020603050405020304" pitchFamily="18" charset="0"/>
+                <a:cs typeface="Times New Roman" panose="02020603050405020304" pitchFamily="18" charset="0"/>
+              </a:rPr>
+              <a:t>Moving Average Model</a:t>
+            </a:r>
+          </a:p>
+          <a:p>
+            <a:r>
+              <a:rPr lang="en-US" dirty="0">
+                <a:latin typeface="Times New Roman" panose="02020603050405020304" pitchFamily="18" charset="0"/>
+                <a:cs typeface="Times New Roman" panose="02020603050405020304" pitchFamily="18" charset="0"/>
+              </a:rPr>
+              <a:t>Holt-Winters Model</a:t>
+            </a:r>
+          </a:p>
+          <a:p>
+            <a:r>
+              <a:rPr lang="en-US" dirty="0">
+                <a:latin typeface="Times New Roman" panose="02020603050405020304" pitchFamily="18" charset="0"/>
+                <a:cs typeface="Times New Roman" panose="02020603050405020304" pitchFamily="18" charset="0"/>
+              </a:rPr>
+              <a:t>ARIMA Additive</a:t>
+            </a:r>
+          </a:p>
+          <a:p>
+            <a:r>
+              <a:rPr lang="en-US" dirty="0">
+                <a:latin typeface="Times New Roman" panose="02020603050405020304" pitchFamily="18" charset="0"/>
+                <a:cs typeface="Times New Roman" panose="02020603050405020304" pitchFamily="18" charset="0"/>
+              </a:rPr>
+              <a:t>ARIMA Multiplicative</a:t>
+            </a:r>
+          </a:p>
+          <a:p>
+            <a:r>
+              <a:rPr lang="en-US" dirty="0">
+                <a:latin typeface="Times New Roman" panose="02020603050405020304" pitchFamily="18" charset="0"/>
+                <a:cs typeface="Times New Roman" panose="02020603050405020304" pitchFamily="18" charset="0"/>
+              </a:rPr>
+              <a:t>ARIMA Seasonal</a:t>
+            </a:r>
+          </a:p>
+          <a:p>
+            <a:r>
+              <a:rPr lang="en-US" dirty="0">
+                <a:latin typeface="Times New Roman" panose="02020603050405020304" pitchFamily="18" charset="0"/>
+                <a:cs typeface="Times New Roman" panose="02020603050405020304" pitchFamily="18" charset="0"/>
+              </a:rPr>
+              <a:t>RNN </a:t>
+            </a:r>
+            <a:r>
+              <a:rPr lang="en-US" dirty="0">
+                <a:latin typeface="Times New Roman" panose="02020603050405020304" pitchFamily="18" charset="0"/>
+                <a:cs typeface="Times New Roman" panose="02020603050405020304" pitchFamily="18" charset="0"/>
+                <a:sym typeface="Wingdings" panose="05000000000000000000" pitchFamily="2" charset="2"/>
+              </a:rPr>
+              <a:t> LSTM (Long Short Term Memory)</a:t>
+            </a:r>
+            <a:endParaRPr lang="en-US" dirty="0">
+              <a:latin typeface="Times New Roman" panose="02020603050405020304" pitchFamily="18" charset="0"/>
+              <a:cs typeface="Times New Roman" panose="02020603050405020304" pitchFamily="18" charset="0"/>
+            </a:endParaRPr>
+          </a:p>
+        </p:txBody>
+      </p:sp>
+      <p:sp>
+        <p:nvSpPr>
+          <p:cNvPr id="4" name="Slide Number Placeholder 3">
+            <a:extLst>
+              <a:ext uri="{FF2B5EF4-FFF2-40B4-BE49-F238E27FC236}">
+                <a16:creationId xmlns="" xmlns:a16="http://schemas.microsoft.com/office/drawing/2014/main" id="{0B22DF0D-8D91-4829-A4D1-ADB83A2BA515}"/>
+              </a:ext>
+            </a:extLst>
+          </p:cNvPr>
           <p:cNvSpPr>
             <a:spLocks noGrp="1"/>
           </p:cNvSpPr>
@@ -8540,7 +8518,7 @@
     </p:spTree>
     <p:extLst>
       <p:ext uri="{BB962C8B-B14F-4D97-AF65-F5344CB8AC3E}">
-        <p14:creationId xmlns:p14="http://schemas.microsoft.com/office/powerpoint/2010/main" val="618403057"/>
+        <p14:creationId xmlns:p14="http://schemas.microsoft.com/office/powerpoint/2010/main" val="2176103284"/>
       </p:ext>
     </p:extLst>
   </p:cSld>
@@ -9072,7 +9050,7 @@
   <a:extraClrSchemeLst/>
   <a:extLst>
     <a:ext uri="{05A4C25C-085E-4340-85A3-A5531E510DB2}">
-      <thm15:themeFamily xmlns:thm15="http://schemas.microsoft.com/office/thememl/2012/main" xmlns="" name="Office Theme" id="{62F939B6-93AF-4DB8-9C6B-D6C7DFDC589F}" vid="{4A3C46E8-61CC-4603-A589-7422A47A8E4A}"/>
+      <thm15:themeFamily xmlns="" xmlns:thm15="http://schemas.microsoft.com/office/thememl/2012/main" name="Office Theme" id="{62F939B6-93AF-4DB8-9C6B-D6C7DFDC589F}" vid="{4A3C46E8-61CC-4603-A589-7422A47A8E4A}"/>
     </a:ext>
   </a:extLst>
 </a:theme>

</xml_diff>

<commit_message>
Placed Tech to right position
</commit_message>
<xml_diff>
--- a/Documents/Thesis/Indian Trade Analysis and Forecasting.pptx
+++ b/Documents/Thesis/Indian Trade Analysis and Forecasting.pptx
@@ -12,8 +12,8 @@
     <p:sldId id="257" r:id="rId3"/>
     <p:sldId id="258" r:id="rId4"/>
     <p:sldId id="259" r:id="rId5"/>
-    <p:sldId id="260" r:id="rId6"/>
-    <p:sldId id="274" r:id="rId7"/>
+    <p:sldId id="274" r:id="rId6"/>
+    <p:sldId id="260" r:id="rId7"/>
     <p:sldId id="261" r:id="rId8"/>
     <p:sldId id="262" r:id="rId9"/>
     <p:sldId id="263" r:id="rId10"/>
@@ -128,7 +128,7 @@
   </p:defaultTextStyle>
   <p:extLst>
     <p:ext uri="{EFAFB233-063F-42B5-8137-9DF3F51BA10A}">
-      <p15:sldGuideLst xmlns="" xmlns:p15="http://schemas.microsoft.com/office/powerpoint/2012/main">
+      <p15:sldGuideLst xmlns:p15="http://schemas.microsoft.com/office/powerpoint/2012/main">
         <p15:guide id="1" orient="horz" pos="2160">
           <p15:clr>
             <a:srgbClr val="A4A3A4"/>
@@ -3561,7 +3561,7 @@
           <p:cNvPr id="2" name="Title 1">
             <a:extLst>
               <a:ext uri="{FF2B5EF4-FFF2-40B4-BE49-F238E27FC236}">
-                <a16:creationId xmlns="" xmlns:a16="http://schemas.microsoft.com/office/drawing/2014/main" id="{BC60F0FA-7D3E-489E-B4A8-3579C35DE747}"/>
+                <a16:creationId xmlns:a16="http://schemas.microsoft.com/office/drawing/2014/main" id="{BC60F0FA-7D3E-489E-B4A8-3579C35DE747}"/>
               </a:ext>
             </a:extLst>
           </p:cNvPr>
@@ -3598,7 +3598,7 @@
           <p:cNvPr id="3" name="Subtitle 2">
             <a:extLst>
               <a:ext uri="{FF2B5EF4-FFF2-40B4-BE49-F238E27FC236}">
-                <a16:creationId xmlns="" xmlns:a16="http://schemas.microsoft.com/office/drawing/2014/main" id="{59138817-A4AB-42F6-9ED0-5D7A4A0C4583}"/>
+                <a16:creationId xmlns:a16="http://schemas.microsoft.com/office/drawing/2014/main" id="{59138817-A4AB-42F6-9ED0-5D7A4A0C4583}"/>
               </a:ext>
             </a:extLst>
           </p:cNvPr>
@@ -3679,7 +3679,7 @@
           <p:cNvPr id="4" name="Slide Number Placeholder 3">
             <a:extLst>
               <a:ext uri="{FF2B5EF4-FFF2-40B4-BE49-F238E27FC236}">
-                <a16:creationId xmlns="" xmlns:a16="http://schemas.microsoft.com/office/drawing/2014/main" id="{0A86AE17-1A1B-4C63-A60B-07DD0275EB2B}"/>
+                <a16:creationId xmlns:a16="http://schemas.microsoft.com/office/drawing/2014/main" id="{0A86AE17-1A1B-4C63-A60B-07DD0275EB2B}"/>
               </a:ext>
             </a:extLst>
           </p:cNvPr>
@@ -3738,7 +3738,7 @@
           <p:cNvPr id="2" name="Title 1">
             <a:extLst>
               <a:ext uri="{FF2B5EF4-FFF2-40B4-BE49-F238E27FC236}">
-                <a16:creationId xmlns="" xmlns:a16="http://schemas.microsoft.com/office/drawing/2014/main" id="{79732034-DF0D-4F26-84D8-CD1B8D30179B}"/>
+                <a16:creationId xmlns:a16="http://schemas.microsoft.com/office/drawing/2014/main" id="{79732034-DF0D-4F26-84D8-CD1B8D30179B}"/>
               </a:ext>
             </a:extLst>
           </p:cNvPr>
@@ -3769,7 +3769,7 @@
           <p:cNvPr id="3" name="Content Placeholder 2">
             <a:extLst>
               <a:ext uri="{FF2B5EF4-FFF2-40B4-BE49-F238E27FC236}">
-                <a16:creationId xmlns="" xmlns:a16="http://schemas.microsoft.com/office/drawing/2014/main" id="{3C057F40-40A7-4CAE-B87C-F65A17102C19}"/>
+                <a16:creationId xmlns:a16="http://schemas.microsoft.com/office/drawing/2014/main" id="{3C057F40-40A7-4CAE-B87C-F65A17102C19}"/>
               </a:ext>
             </a:extLst>
           </p:cNvPr>
@@ -3800,18 +3800,11 @@
               <a:t>Auto Regressive</a:t>
             </a:r>
             <a:r>
-              <a:rPr lang="en-US" dirty="0" smtClean="0">
-                <a:latin typeface="Times New Roman" panose="02020603050405020304" pitchFamily="18" charset="0"/>
-                <a:cs typeface="Times New Roman" panose="02020603050405020304" pitchFamily="18" charset="0"/>
-              </a:rPr>
-              <a:t>) model </a:t>
-            </a:r>
-            <a:r>
               <a:rPr lang="en-US" dirty="0">
                 <a:latin typeface="Times New Roman" panose="02020603050405020304" pitchFamily="18" charset="0"/>
                 <a:cs typeface="Times New Roman" panose="02020603050405020304" pitchFamily="18" charset="0"/>
               </a:rPr>
-              <a:t>is used when a value from the time series has dependency on previous values e.g. </a:t>
+              <a:t>) model is used when a value from the time series has dependency on previous values e.g. </a:t>
             </a:r>
             <a:r>
               <a:rPr lang="en-US" dirty="0" err="1">
@@ -3846,156 +3839,79 @@
                 <a:latin typeface="Times New Roman" panose="02020603050405020304" pitchFamily="18" charset="0"/>
                 <a:cs typeface="Times New Roman" panose="02020603050405020304" pitchFamily="18" charset="0"/>
               </a:rPr>
-              <a:t>). O</a:t>
-            </a:r>
-            <a:r>
-              <a:rPr lang="en-US" dirty="0" smtClean="0">
-                <a:latin typeface="Times New Roman" panose="02020603050405020304" pitchFamily="18" charset="0"/>
-                <a:cs typeface="Times New Roman" panose="02020603050405020304" pitchFamily="18" charset="0"/>
-              </a:rPr>
-              <a:t>rder </a:t>
+              <a:t>). Order of an AR model is the number of immediately preceding values in the series that are used to forecast the current value e.g. order = 2 denotes that </a:t>
+            </a:r>
+            <a:r>
+              <a:rPr lang="en-US" dirty="0" err="1">
+                <a:latin typeface="Times New Roman" panose="02020603050405020304" pitchFamily="18" charset="0"/>
+                <a:cs typeface="Times New Roman" panose="02020603050405020304" pitchFamily="18" charset="0"/>
+              </a:rPr>
+              <a:t>X</a:t>
+            </a:r>
+            <a:r>
+              <a:rPr lang="en-US" baseline="-25000" dirty="0" err="1">
+                <a:latin typeface="Times New Roman" panose="02020603050405020304" pitchFamily="18" charset="0"/>
+                <a:cs typeface="Times New Roman" panose="02020603050405020304" pitchFamily="18" charset="0"/>
+              </a:rPr>
+              <a:t>t</a:t>
             </a:r>
             <a:r>
               <a:rPr lang="en-US" dirty="0">
                 <a:latin typeface="Times New Roman" panose="02020603050405020304" pitchFamily="18" charset="0"/>
                 <a:cs typeface="Times New Roman" panose="02020603050405020304" pitchFamily="18" charset="0"/>
               </a:rPr>
-              <a:t>of an </a:t>
-            </a:r>
-            <a:r>
-              <a:rPr lang="en-US" dirty="0" smtClean="0">
-                <a:latin typeface="Times New Roman" panose="02020603050405020304" pitchFamily="18" charset="0"/>
-                <a:cs typeface="Times New Roman" panose="02020603050405020304" pitchFamily="18" charset="0"/>
-              </a:rPr>
-              <a:t>AR model is </a:t>
+              <a:t> is dependent on X</a:t>
+            </a:r>
+            <a:r>
+              <a:rPr lang="en-US" baseline="-25000" dirty="0">
+                <a:latin typeface="Times New Roman" panose="02020603050405020304" pitchFamily="18" charset="0"/>
+                <a:cs typeface="Times New Roman" panose="02020603050405020304" pitchFamily="18" charset="0"/>
+              </a:rPr>
+              <a:t>t-1</a:t>
             </a:r>
             <a:r>
               <a:rPr lang="en-US" dirty="0">
                 <a:latin typeface="Times New Roman" panose="02020603050405020304" pitchFamily="18" charset="0"/>
                 <a:cs typeface="Times New Roman" panose="02020603050405020304" pitchFamily="18" charset="0"/>
               </a:rPr>
-              <a:t>the number of immediately preceding values in the series </a:t>
-            </a:r>
-            <a:r>
-              <a:rPr lang="en-US" dirty="0" smtClean="0">
-                <a:latin typeface="Times New Roman" panose="02020603050405020304" pitchFamily="18" charset="0"/>
-                <a:cs typeface="Times New Roman" panose="02020603050405020304" pitchFamily="18" charset="0"/>
-              </a:rPr>
-              <a:t>that are used </a:t>
+              <a:t> and X</a:t>
+            </a:r>
+            <a:r>
+              <a:rPr lang="en-US" baseline="-25000" dirty="0">
+                <a:latin typeface="Times New Roman" panose="02020603050405020304" pitchFamily="18" charset="0"/>
+                <a:cs typeface="Times New Roman" panose="02020603050405020304" pitchFamily="18" charset="0"/>
+              </a:rPr>
+              <a:t>t-2</a:t>
             </a:r>
             <a:r>
               <a:rPr lang="en-US" dirty="0">
                 <a:latin typeface="Times New Roman" panose="02020603050405020304" pitchFamily="18" charset="0"/>
                 <a:cs typeface="Times New Roman" panose="02020603050405020304" pitchFamily="18" charset="0"/>
               </a:rPr>
-              <a:t>to forecast the current value e.g. order </a:t>
-            </a:r>
-            <a:r>
-              <a:rPr lang="en-US" dirty="0" smtClean="0">
-                <a:latin typeface="Times New Roman" panose="02020603050405020304" pitchFamily="18" charset="0"/>
-                <a:cs typeface="Times New Roman" panose="02020603050405020304" pitchFamily="18" charset="0"/>
-              </a:rPr>
-              <a:t>= </a:t>
-            </a:r>
+              <a:t>.</a:t>
+            </a:r>
+          </a:p>
+          <a:p>
             <a:r>
               <a:rPr lang="en-US" dirty="0">
                 <a:latin typeface="Times New Roman" panose="02020603050405020304" pitchFamily="18" charset="0"/>
                 <a:cs typeface="Times New Roman" panose="02020603050405020304" pitchFamily="18" charset="0"/>
               </a:rPr>
-              <a:t>2 denotes </a:t>
-            </a:r>
-            <a:r>
-              <a:rPr lang="en-US" dirty="0" smtClean="0">
-                <a:latin typeface="Times New Roman" panose="02020603050405020304" pitchFamily="18" charset="0"/>
-                <a:cs typeface="Times New Roman" panose="02020603050405020304" pitchFamily="18" charset="0"/>
-              </a:rPr>
-              <a:t>that </a:t>
-            </a:r>
-            <a:r>
-              <a:rPr lang="en-US" dirty="0" err="1">
-                <a:latin typeface="Times New Roman" panose="02020603050405020304" pitchFamily="18" charset="0"/>
-                <a:cs typeface="Times New Roman" panose="02020603050405020304" pitchFamily="18" charset="0"/>
-              </a:rPr>
-              <a:t>X</a:t>
-            </a:r>
-            <a:r>
-              <a:rPr lang="en-US" baseline="-25000" dirty="0" err="1">
-                <a:latin typeface="Times New Roman" panose="02020603050405020304" pitchFamily="18" charset="0"/>
-                <a:cs typeface="Times New Roman" panose="02020603050405020304" pitchFamily="18" charset="0"/>
-              </a:rPr>
-              <a:t>t</a:t>
+              <a:t>MA (</a:t>
+            </a:r>
+            <a:r>
+              <a:rPr lang="en-US" b="1" dirty="0">
+                <a:latin typeface="Times New Roman" panose="02020603050405020304" pitchFamily="18" charset="0"/>
+                <a:cs typeface="Times New Roman" panose="02020603050405020304" pitchFamily="18" charset="0"/>
+              </a:rPr>
+              <a:t>Moving Average)</a:t>
             </a:r>
             <a:r>
               <a:rPr lang="en-US" dirty="0">
                 <a:latin typeface="Times New Roman" panose="02020603050405020304" pitchFamily="18" charset="0"/>
                 <a:cs typeface="Times New Roman" panose="02020603050405020304" pitchFamily="18" charset="0"/>
               </a:rPr>
-              <a:t> is dependent on X</a:t>
-            </a:r>
-            <a:r>
-              <a:rPr lang="en-US" baseline="-25000" dirty="0">
-                <a:latin typeface="Times New Roman" panose="02020603050405020304" pitchFamily="18" charset="0"/>
-                <a:cs typeface="Times New Roman" panose="02020603050405020304" pitchFamily="18" charset="0"/>
-              </a:rPr>
-              <a:t>t-1</a:t>
-            </a:r>
-            <a:r>
-              <a:rPr lang="en-US" dirty="0">
-                <a:latin typeface="Times New Roman" panose="02020603050405020304" pitchFamily="18" charset="0"/>
-                <a:cs typeface="Times New Roman" panose="02020603050405020304" pitchFamily="18" charset="0"/>
-              </a:rPr>
-              <a:t> and X</a:t>
-            </a:r>
-            <a:r>
-              <a:rPr lang="en-US" baseline="-25000" dirty="0">
-                <a:latin typeface="Times New Roman" panose="02020603050405020304" pitchFamily="18" charset="0"/>
-                <a:cs typeface="Times New Roman" panose="02020603050405020304" pitchFamily="18" charset="0"/>
-              </a:rPr>
-              <a:t>t-2</a:t>
-            </a:r>
-            <a:r>
-              <a:rPr lang="en-US" dirty="0">
-                <a:latin typeface="Times New Roman" panose="02020603050405020304" pitchFamily="18" charset="0"/>
-                <a:cs typeface="Times New Roman" panose="02020603050405020304" pitchFamily="18" charset="0"/>
-              </a:rPr>
-              <a:t>.</a:t>
-            </a:r>
-          </a:p>
-          <a:p>
-            <a:r>
-              <a:rPr lang="en-US" dirty="0">
-                <a:latin typeface="Times New Roman" panose="02020603050405020304" pitchFamily="18" charset="0"/>
-                <a:cs typeface="Times New Roman" panose="02020603050405020304" pitchFamily="18" charset="0"/>
-              </a:rPr>
-              <a:t>MA (</a:t>
-            </a:r>
-            <a:r>
-              <a:rPr lang="en-US" b="1" dirty="0">
-                <a:latin typeface="Times New Roman" panose="02020603050405020304" pitchFamily="18" charset="0"/>
-                <a:cs typeface="Times New Roman" panose="02020603050405020304" pitchFamily="18" charset="0"/>
-              </a:rPr>
-              <a:t>Moving Average)</a:t>
-            </a:r>
-            <a:r>
-              <a:rPr lang="en-US" dirty="0">
-                <a:latin typeface="Times New Roman" panose="02020603050405020304" pitchFamily="18" charset="0"/>
-                <a:cs typeface="Times New Roman" panose="02020603050405020304" pitchFamily="18" charset="0"/>
-              </a:rPr>
-              <a:t> is a technique that calculates the overall trend in the dataset. As the name suggest that </a:t>
-            </a:r>
-            <a:r>
-              <a:rPr lang="en-US" dirty="0" smtClean="0">
-                <a:latin typeface="Times New Roman" panose="02020603050405020304" pitchFamily="18" charset="0"/>
-                <a:cs typeface="Times New Roman" panose="02020603050405020304" pitchFamily="18" charset="0"/>
-              </a:rPr>
-              <a:t>we take </a:t>
-            </a:r>
-            <a:r>
-              <a:rPr lang="en-US" dirty="0">
-                <a:latin typeface="Times New Roman" panose="02020603050405020304" pitchFamily="18" charset="0"/>
-                <a:cs typeface="Times New Roman" panose="02020603050405020304" pitchFamily="18" charset="0"/>
-              </a:rPr>
-              <a:t>the Average over a fixed rolling size window. </a:t>
+              <a:t> is a technique that calculates the overall trend in the dataset. As the name suggest that we take the Average over a fixed rolling size window. </a:t>
             </a:r>
           </a:p>
           <a:p>
@@ -4017,7 +3933,7 @@
           <p:cNvPr id="4" name="Picture 3">
             <a:extLst>
               <a:ext uri="{FF2B5EF4-FFF2-40B4-BE49-F238E27FC236}">
-                <a16:creationId xmlns="" xmlns:a16="http://schemas.microsoft.com/office/drawing/2014/main" id="{AD170295-B5A2-4CA5-B861-2B95FC69247C}"/>
+                <a16:creationId xmlns:a16="http://schemas.microsoft.com/office/drawing/2014/main" id="{AD170295-B5A2-4CA5-B861-2B95FC69247C}"/>
               </a:ext>
             </a:extLst>
           </p:cNvPr>
@@ -4045,7 +3961,7 @@
           <p:cNvPr id="5" name="Slide Number Placeholder 4">
             <a:extLst>
               <a:ext uri="{FF2B5EF4-FFF2-40B4-BE49-F238E27FC236}">
-                <a16:creationId xmlns="" xmlns:a16="http://schemas.microsoft.com/office/drawing/2014/main" id="{E95D4AFB-E8FA-4E9E-BD5E-873DED22E275}"/>
+                <a16:creationId xmlns:a16="http://schemas.microsoft.com/office/drawing/2014/main" id="{E95D4AFB-E8FA-4E9E-BD5E-873DED22E275}"/>
               </a:ext>
             </a:extLst>
           </p:cNvPr>
@@ -4104,7 +4020,7 @@
           <p:cNvPr id="2" name="Title 1">
             <a:extLst>
               <a:ext uri="{FF2B5EF4-FFF2-40B4-BE49-F238E27FC236}">
-                <a16:creationId xmlns="" xmlns:a16="http://schemas.microsoft.com/office/drawing/2014/main" id="{459E159F-BDAE-4DB6-9B02-31C1E5F53E4D}"/>
+                <a16:creationId xmlns:a16="http://schemas.microsoft.com/office/drawing/2014/main" id="{459E159F-BDAE-4DB6-9B02-31C1E5F53E4D}"/>
               </a:ext>
             </a:extLst>
           </p:cNvPr>
@@ -4135,7 +4051,7 @@
           <p:cNvPr id="3" name="Content Placeholder 2">
             <a:extLst>
               <a:ext uri="{FF2B5EF4-FFF2-40B4-BE49-F238E27FC236}">
-                <a16:creationId xmlns="" xmlns:a16="http://schemas.microsoft.com/office/drawing/2014/main" id="{87DBCE6D-BA6C-4D4B-B563-745E1C7B3536}"/>
+                <a16:creationId xmlns:a16="http://schemas.microsoft.com/office/drawing/2014/main" id="{87DBCE6D-BA6C-4D4B-B563-745E1C7B3536}"/>
               </a:ext>
             </a:extLst>
           </p:cNvPr>
@@ -4202,7 +4118,7 @@
           <p:cNvPr id="4" name="Slide Number Placeholder 3">
             <a:extLst>
               <a:ext uri="{FF2B5EF4-FFF2-40B4-BE49-F238E27FC236}">
-                <a16:creationId xmlns="" xmlns:a16="http://schemas.microsoft.com/office/drawing/2014/main" id="{5B3E101C-24F8-4EA6-8DF9-4090DB1444FB}"/>
+                <a16:creationId xmlns:a16="http://schemas.microsoft.com/office/drawing/2014/main" id="{5B3E101C-24F8-4EA6-8DF9-4090DB1444FB}"/>
               </a:ext>
             </a:extLst>
           </p:cNvPr>
@@ -4261,7 +4177,7 @@
           <p:cNvPr id="2" name="Title 1">
             <a:extLst>
               <a:ext uri="{FF2B5EF4-FFF2-40B4-BE49-F238E27FC236}">
-                <a16:creationId xmlns="" xmlns:a16="http://schemas.microsoft.com/office/drawing/2014/main" id="{9D5A07A9-3CA7-4EB1-A906-558AA61068B0}"/>
+                <a16:creationId xmlns:a16="http://schemas.microsoft.com/office/drawing/2014/main" id="{9D5A07A9-3CA7-4EB1-A906-558AA61068B0}"/>
               </a:ext>
             </a:extLst>
           </p:cNvPr>
@@ -4292,7 +4208,7 @@
           <p:cNvPr id="3" name="Content Placeholder 2">
             <a:extLst>
               <a:ext uri="{FF2B5EF4-FFF2-40B4-BE49-F238E27FC236}">
-                <a16:creationId xmlns="" xmlns:a16="http://schemas.microsoft.com/office/drawing/2014/main" id="{466AA86D-DFED-4E3C-A03D-60FF211AEB75}"/>
+                <a16:creationId xmlns:a16="http://schemas.microsoft.com/office/drawing/2014/main" id="{466AA86D-DFED-4E3C-A03D-60FF211AEB75}"/>
               </a:ext>
             </a:extLst>
           </p:cNvPr>
@@ -4442,7 +4358,7 @@
           <p:cNvPr id="4" name="Slide Number Placeholder 3">
             <a:extLst>
               <a:ext uri="{FF2B5EF4-FFF2-40B4-BE49-F238E27FC236}">
-                <a16:creationId xmlns="" xmlns:a16="http://schemas.microsoft.com/office/drawing/2014/main" id="{E129BBB6-068B-4391-B822-EF585842D724}"/>
+                <a16:creationId xmlns:a16="http://schemas.microsoft.com/office/drawing/2014/main" id="{E129BBB6-068B-4391-B822-EF585842D724}"/>
               </a:ext>
             </a:extLst>
           </p:cNvPr>
@@ -4501,7 +4417,7 @@
           <p:cNvPr id="2" name="Title 1">
             <a:extLst>
               <a:ext uri="{FF2B5EF4-FFF2-40B4-BE49-F238E27FC236}">
-                <a16:creationId xmlns="" xmlns:a16="http://schemas.microsoft.com/office/drawing/2014/main" id="{305F9FD6-CEE3-4E89-A3D2-9A94AF45028D}"/>
+                <a16:creationId xmlns:a16="http://schemas.microsoft.com/office/drawing/2014/main" id="{305F9FD6-CEE3-4E89-A3D2-9A94AF45028D}"/>
               </a:ext>
             </a:extLst>
           </p:cNvPr>
@@ -4532,7 +4448,7 @@
           <p:cNvPr id="3" name="Content Placeholder 2">
             <a:extLst>
               <a:ext uri="{FF2B5EF4-FFF2-40B4-BE49-F238E27FC236}">
-                <a16:creationId xmlns="" xmlns:a16="http://schemas.microsoft.com/office/drawing/2014/main" id="{F2256217-6441-4524-88F5-92A4181A19DD}"/>
+                <a16:creationId xmlns:a16="http://schemas.microsoft.com/office/drawing/2014/main" id="{F2256217-6441-4524-88F5-92A4181A19DD}"/>
               </a:ext>
             </a:extLst>
           </p:cNvPr>
@@ -4553,49 +4469,7 @@
                 <a:latin typeface="Times New Roman" panose="02020603050405020304" pitchFamily="18" charset="0"/>
                 <a:cs typeface="Times New Roman" panose="02020603050405020304" pitchFamily="18" charset="0"/>
               </a:rPr>
-              <a:t>Seasonal ARIMA </a:t>
-            </a:r>
-            <a:r>
-              <a:rPr lang="en-US" dirty="0" smtClean="0">
-                <a:latin typeface="Times New Roman" panose="02020603050405020304" pitchFamily="18" charset="0"/>
-                <a:cs typeface="Times New Roman" panose="02020603050405020304" pitchFamily="18" charset="0"/>
-              </a:rPr>
-              <a:t>is an </a:t>
-            </a:r>
-            <a:r>
-              <a:rPr lang="en-US" dirty="0">
-                <a:latin typeface="Times New Roman" panose="02020603050405020304" pitchFamily="18" charset="0"/>
-                <a:cs typeface="Times New Roman" panose="02020603050405020304" pitchFamily="18" charset="0"/>
-              </a:rPr>
-              <a:t>ARIMA Multiplicative method </a:t>
-            </a:r>
-            <a:r>
-              <a:rPr lang="en-US" dirty="0" smtClean="0">
-                <a:latin typeface="Times New Roman" panose="02020603050405020304" pitchFamily="18" charset="0"/>
-                <a:cs typeface="Times New Roman" panose="02020603050405020304" pitchFamily="18" charset="0"/>
-              </a:rPr>
-              <a:t>with </a:t>
-            </a:r>
-            <a:r>
-              <a:rPr lang="en-US" dirty="0">
-                <a:latin typeface="Times New Roman" panose="02020603050405020304" pitchFamily="18" charset="0"/>
-                <a:cs typeface="Times New Roman" panose="02020603050405020304" pitchFamily="18" charset="0"/>
-              </a:rPr>
-              <a:t>seasonality factor </a:t>
-            </a:r>
-            <a:r>
-              <a:rPr lang="en-US" dirty="0" smtClean="0">
-                <a:latin typeface="Times New Roman" panose="02020603050405020304" pitchFamily="18" charset="0"/>
-                <a:cs typeface="Times New Roman" panose="02020603050405020304" pitchFamily="18" charset="0"/>
-              </a:rPr>
-              <a:t>(m). </a:t>
-            </a:r>
-            <a:r>
-              <a:rPr lang="en-US" dirty="0">
-                <a:latin typeface="Times New Roman" panose="02020603050405020304" pitchFamily="18" charset="0"/>
-                <a:cs typeface="Times New Roman" panose="02020603050405020304" pitchFamily="18" charset="0"/>
-              </a:rPr>
-              <a:t>Here we have chosen the multiplicative factor of 12 as ours is a monthly data.</a:t>
+              <a:t>Seasonal ARIMA is an ARIMA Multiplicative method with seasonality factor (m). Here we have chosen the multiplicative factor of 12 as ours is a monthly data.</a:t>
             </a:r>
           </a:p>
           <a:p>
@@ -4611,7 +4485,7 @@
           <p:cNvPr id="4" name="Picture 3">
             <a:extLst>
               <a:ext uri="{FF2B5EF4-FFF2-40B4-BE49-F238E27FC236}">
-                <a16:creationId xmlns="" xmlns:a16="http://schemas.microsoft.com/office/drawing/2014/main" id="{1207F182-2C5B-4884-B493-5D3D39E3791B}"/>
+                <a16:creationId xmlns:a16="http://schemas.microsoft.com/office/drawing/2014/main" id="{1207F182-2C5B-4884-B493-5D3D39E3791B}"/>
               </a:ext>
             </a:extLst>
           </p:cNvPr>
@@ -4650,7 +4524,7 @@
           <p:cNvPr id="5" name="Slide Number Placeholder 4">
             <a:extLst>
               <a:ext uri="{FF2B5EF4-FFF2-40B4-BE49-F238E27FC236}">
-                <a16:creationId xmlns="" xmlns:a16="http://schemas.microsoft.com/office/drawing/2014/main" id="{41B51C23-AF9C-406D-A710-68EF2CF27265}"/>
+                <a16:creationId xmlns:a16="http://schemas.microsoft.com/office/drawing/2014/main" id="{41B51C23-AF9C-406D-A710-68EF2CF27265}"/>
               </a:ext>
             </a:extLst>
           </p:cNvPr>
@@ -4709,7 +4583,7 @@
           <p:cNvPr id="2" name="Title 1">
             <a:extLst>
               <a:ext uri="{FF2B5EF4-FFF2-40B4-BE49-F238E27FC236}">
-                <a16:creationId xmlns="" xmlns:a16="http://schemas.microsoft.com/office/drawing/2014/main" id="{9848A2EE-C121-43C9-BA4B-A9B242509668}"/>
+                <a16:creationId xmlns:a16="http://schemas.microsoft.com/office/drawing/2014/main" id="{9848A2EE-C121-43C9-BA4B-A9B242509668}"/>
               </a:ext>
             </a:extLst>
           </p:cNvPr>
@@ -4740,7 +4614,7 @@
           <p:cNvPr id="3" name="Content Placeholder 2">
             <a:extLst>
               <a:ext uri="{FF2B5EF4-FFF2-40B4-BE49-F238E27FC236}">
-                <a16:creationId xmlns="" xmlns:a16="http://schemas.microsoft.com/office/drawing/2014/main" id="{3082308F-9D52-4858-BB10-F94701C2AC44}"/>
+                <a16:creationId xmlns:a16="http://schemas.microsoft.com/office/drawing/2014/main" id="{3082308F-9D52-4858-BB10-F94701C2AC44}"/>
               </a:ext>
             </a:extLst>
           </p:cNvPr>
@@ -4815,7 +4689,7 @@
           <p:cNvPr id="5" name="Slide Number Placeholder 4">
             <a:extLst>
               <a:ext uri="{FF2B5EF4-FFF2-40B4-BE49-F238E27FC236}">
-                <a16:creationId xmlns="" xmlns:a16="http://schemas.microsoft.com/office/drawing/2014/main" id="{D2609442-B16A-41A6-9580-3008C9639646}"/>
+                <a16:creationId xmlns:a16="http://schemas.microsoft.com/office/drawing/2014/main" id="{D2609442-B16A-41A6-9580-3008C9639646}"/>
               </a:ext>
             </a:extLst>
           </p:cNvPr>
@@ -4874,7 +4748,7 @@
           <p:cNvPr id="2" name="Title 1">
             <a:extLst>
               <a:ext uri="{FF2B5EF4-FFF2-40B4-BE49-F238E27FC236}">
-                <a16:creationId xmlns="" xmlns:a16="http://schemas.microsoft.com/office/drawing/2014/main" id="{02C04A12-9663-4F93-A4CF-C3FCE901FB72}"/>
+                <a16:creationId xmlns:a16="http://schemas.microsoft.com/office/drawing/2014/main" id="{02C04A12-9663-4F93-A4CF-C3FCE901FB72}"/>
               </a:ext>
             </a:extLst>
           </p:cNvPr>
@@ -4966,7 +4840,7 @@
           <p:cNvPr id="3" name="Slide Number Placeholder 2">
             <a:extLst>
               <a:ext uri="{FF2B5EF4-FFF2-40B4-BE49-F238E27FC236}">
-                <a16:creationId xmlns="" xmlns:a16="http://schemas.microsoft.com/office/drawing/2014/main" id="{0B71A8FC-BA34-47D9-8027-241899433F22}"/>
+                <a16:creationId xmlns:a16="http://schemas.microsoft.com/office/drawing/2014/main" id="{0B71A8FC-BA34-47D9-8027-241899433F22}"/>
               </a:ext>
             </a:extLst>
           </p:cNvPr>
@@ -5074,21 +4948,21 @@
                 <a:gridCol w="2505873">
                   <a:extLst>
                     <a:ext uri="{9D8B030D-6E8A-4147-A177-3AD203B41FA5}">
-                      <a16:colId xmlns="" xmlns:a16="http://schemas.microsoft.com/office/drawing/2014/main" val="20000"/>
+                      <a16:colId xmlns:a16="http://schemas.microsoft.com/office/drawing/2014/main" val="20000"/>
                     </a:ext>
                   </a:extLst>
                 </a:gridCol>
                 <a:gridCol w="2125351">
                   <a:extLst>
                     <a:ext uri="{9D8B030D-6E8A-4147-A177-3AD203B41FA5}">
-                      <a16:colId xmlns="" xmlns:a16="http://schemas.microsoft.com/office/drawing/2014/main" val="20001"/>
+                      <a16:colId xmlns:a16="http://schemas.microsoft.com/office/drawing/2014/main" val="20001"/>
                     </a:ext>
                   </a:extLst>
                 </a:gridCol>
                 <a:gridCol w="2043964">
                   <a:extLst>
                     <a:ext uri="{9D8B030D-6E8A-4147-A177-3AD203B41FA5}">
-                      <a16:colId xmlns="" xmlns:a16="http://schemas.microsoft.com/office/drawing/2014/main" val="20002"/>
+                      <a16:colId xmlns:a16="http://schemas.microsoft.com/office/drawing/2014/main" val="20002"/>
                     </a:ext>
                   </a:extLst>
                 </a:gridCol>
@@ -5183,7 +5057,7 @@
                 </a:tc>
                 <a:extLst>
                   <a:ext uri="{0D108BD9-81ED-4DB2-BD59-A6C34878D82A}">
-                    <a16:rowId xmlns="" xmlns:a16="http://schemas.microsoft.com/office/drawing/2014/main" val="10000"/>
+                    <a16:rowId xmlns:a16="http://schemas.microsoft.com/office/drawing/2014/main" val="10000"/>
                   </a:ext>
                 </a:extLst>
               </a:tr>
@@ -5277,7 +5151,7 @@
                 </a:tc>
                 <a:extLst>
                   <a:ext uri="{0D108BD9-81ED-4DB2-BD59-A6C34878D82A}">
-                    <a16:rowId xmlns="" xmlns:a16="http://schemas.microsoft.com/office/drawing/2014/main" val="10001"/>
+                    <a16:rowId xmlns:a16="http://schemas.microsoft.com/office/drawing/2014/main" val="10001"/>
                   </a:ext>
                 </a:extLst>
               </a:tr>
@@ -5407,7 +5281,7 @@
                 </a:tc>
                 <a:extLst>
                   <a:ext uri="{0D108BD9-81ED-4DB2-BD59-A6C34878D82A}">
-                    <a16:rowId xmlns="" xmlns:a16="http://schemas.microsoft.com/office/drawing/2014/main" val="10002"/>
+                    <a16:rowId xmlns:a16="http://schemas.microsoft.com/office/drawing/2014/main" val="10002"/>
                   </a:ext>
                 </a:extLst>
               </a:tr>
@@ -5537,7 +5411,7 @@
                 </a:tc>
                 <a:extLst>
                   <a:ext uri="{0D108BD9-81ED-4DB2-BD59-A6C34878D82A}">
-                    <a16:rowId xmlns="" xmlns:a16="http://schemas.microsoft.com/office/drawing/2014/main" val="10003"/>
+                    <a16:rowId xmlns:a16="http://schemas.microsoft.com/office/drawing/2014/main" val="10003"/>
                   </a:ext>
                 </a:extLst>
               </a:tr>
@@ -5667,7 +5541,7 @@
                 </a:tc>
                 <a:extLst>
                   <a:ext uri="{0D108BD9-81ED-4DB2-BD59-A6C34878D82A}">
-                    <a16:rowId xmlns="" xmlns:a16="http://schemas.microsoft.com/office/drawing/2014/main" val="10004"/>
+                    <a16:rowId xmlns:a16="http://schemas.microsoft.com/office/drawing/2014/main" val="10004"/>
                   </a:ext>
                 </a:extLst>
               </a:tr>
@@ -5797,7 +5671,7 @@
                 </a:tc>
                 <a:extLst>
                   <a:ext uri="{0D108BD9-81ED-4DB2-BD59-A6C34878D82A}">
-                    <a16:rowId xmlns="" xmlns:a16="http://schemas.microsoft.com/office/drawing/2014/main" val="10005"/>
+                    <a16:rowId xmlns:a16="http://schemas.microsoft.com/office/drawing/2014/main" val="10005"/>
                   </a:ext>
                 </a:extLst>
               </a:tr>
@@ -5927,7 +5801,7 @@
                 </a:tc>
                 <a:extLst>
                   <a:ext uri="{0D108BD9-81ED-4DB2-BD59-A6C34878D82A}">
-                    <a16:rowId xmlns="" xmlns:a16="http://schemas.microsoft.com/office/drawing/2014/main" val="10006"/>
+                    <a16:rowId xmlns:a16="http://schemas.microsoft.com/office/drawing/2014/main" val="10006"/>
                   </a:ext>
                 </a:extLst>
               </a:tr>
@@ -6057,7 +5931,7 @@
                 </a:tc>
                 <a:extLst>
                   <a:ext uri="{0D108BD9-81ED-4DB2-BD59-A6C34878D82A}">
-                    <a16:rowId xmlns="" xmlns:a16="http://schemas.microsoft.com/office/drawing/2014/main" val="10007"/>
+                    <a16:rowId xmlns:a16="http://schemas.microsoft.com/office/drawing/2014/main" val="10007"/>
                   </a:ext>
                 </a:extLst>
               </a:tr>
@@ -6151,7 +6025,7 @@
                 </a:tc>
                 <a:extLst>
                   <a:ext uri="{0D108BD9-81ED-4DB2-BD59-A6C34878D82A}">
-                    <a16:rowId xmlns="" xmlns:a16="http://schemas.microsoft.com/office/drawing/2014/main" val="10008"/>
+                    <a16:rowId xmlns:a16="http://schemas.microsoft.com/office/drawing/2014/main" val="10008"/>
                   </a:ext>
                 </a:extLst>
               </a:tr>
@@ -6213,7 +6087,7 @@
           <p:cNvPr id="3" name="Slide Number Placeholder 2">
             <a:extLst>
               <a:ext uri="{FF2B5EF4-FFF2-40B4-BE49-F238E27FC236}">
-                <a16:creationId xmlns="" xmlns:a16="http://schemas.microsoft.com/office/drawing/2014/main" id="{D637FC5F-1629-47D5-A3A0-3A0A73136ED2}"/>
+                <a16:creationId xmlns:a16="http://schemas.microsoft.com/office/drawing/2014/main" id="{D637FC5F-1629-47D5-A3A0-3A0A73136ED2}"/>
               </a:ext>
             </a:extLst>
           </p:cNvPr>
@@ -6337,56 +6211,17 @@
                 <a:latin typeface="Times New Roman" panose="02020603050405020304" pitchFamily="18" charset="0"/>
                 <a:cs typeface="Times New Roman" panose="02020603050405020304" pitchFamily="18" charset="0"/>
               </a:rPr>
-              <a:t>LSTM model performed better for Import Data because of it’s capability of retaining information </a:t>
-            </a:r>
-            <a:r>
-              <a:rPr lang="en-US" dirty="0" smtClean="0">
-                <a:latin typeface="Times New Roman" panose="02020603050405020304" pitchFamily="18" charset="0"/>
-                <a:cs typeface="Times New Roman" panose="02020603050405020304" pitchFamily="18" charset="0"/>
-              </a:rPr>
-              <a:t>for </a:t>
-            </a:r>
+              <a:t>LSTM model performed better for Import Data because of it’s capability of retaining information for long periods of time.</a:t>
+            </a:r>
+          </a:p>
+          <a:p>
             <a:r>
               <a:rPr lang="en-US" dirty="0">
                 <a:latin typeface="Times New Roman" panose="02020603050405020304" pitchFamily="18" charset="0"/>
                 <a:cs typeface="Times New Roman" panose="02020603050405020304" pitchFamily="18" charset="0"/>
               </a:rPr>
-              <a:t>long </a:t>
-            </a:r>
-            <a:r>
-              <a:rPr lang="en-US" dirty="0" smtClean="0">
-                <a:latin typeface="Times New Roman" panose="02020603050405020304" pitchFamily="18" charset="0"/>
-                <a:cs typeface="Times New Roman" panose="02020603050405020304" pitchFamily="18" charset="0"/>
-              </a:rPr>
-              <a:t>periods </a:t>
-            </a:r>
-            <a:r>
-              <a:rPr lang="en-US" dirty="0">
-                <a:latin typeface="Times New Roman" panose="02020603050405020304" pitchFamily="18" charset="0"/>
-                <a:cs typeface="Times New Roman" panose="02020603050405020304" pitchFamily="18" charset="0"/>
-              </a:rPr>
-              <a:t>of time.</a:t>
-            </a:r>
-          </a:p>
-          <a:p>
-            <a:r>
-              <a:rPr lang="en-US" dirty="0">
-                <a:latin typeface="Times New Roman" panose="02020603050405020304" pitchFamily="18" charset="0"/>
-                <a:cs typeface="Times New Roman" panose="02020603050405020304" pitchFamily="18" charset="0"/>
-              </a:rPr>
-              <a:t>We’re in huge trade deficit (Export-Import) with China in terms of trade. Hence we need to make strict policies towards Chinese products as soon as possible</a:t>
-            </a:r>
-            <a:r>
-              <a:rPr lang="en-US" dirty="0" smtClean="0">
-                <a:latin typeface="Times New Roman" panose="02020603050405020304" pitchFamily="18" charset="0"/>
-                <a:cs typeface="Times New Roman" panose="02020603050405020304" pitchFamily="18" charset="0"/>
-              </a:rPr>
-              <a:t>.</a:t>
-            </a:r>
-            <a:endParaRPr lang="en-US" dirty="0">
-              <a:latin typeface="Times New Roman" panose="02020603050405020304" pitchFamily="18" charset="0"/>
-              <a:cs typeface="Times New Roman" panose="02020603050405020304" pitchFamily="18" charset="0"/>
-            </a:endParaRPr>
+              <a:t>We’re in huge trade deficit (Export-Import) with China in terms of trade. Hence we need to make strict policies towards Chinese products as soon as possible.</a:t>
+            </a:r>
           </a:p>
         </p:txBody>
       </p:sp>
@@ -6395,7 +6230,7 @@
           <p:cNvPr id="4" name="Slide Number Placeholder 3">
             <a:extLst>
               <a:ext uri="{FF2B5EF4-FFF2-40B4-BE49-F238E27FC236}">
-                <a16:creationId xmlns="" xmlns:a16="http://schemas.microsoft.com/office/drawing/2014/main" id="{5EB171F2-7743-4C10-A1C3-5323B50613A5}"/>
+                <a16:creationId xmlns:a16="http://schemas.microsoft.com/office/drawing/2014/main" id="{5EB171F2-7743-4C10-A1C3-5323B50613A5}"/>
               </a:ext>
             </a:extLst>
           </p:cNvPr>
@@ -6523,35 +6358,7 @@
                 <a:latin typeface="Times New Roman" panose="02020603050405020304" pitchFamily="18" charset="0"/>
                 <a:cs typeface="Times New Roman" panose="02020603050405020304" pitchFamily="18" charset="0"/>
               </a:rPr>
-              <a:t>Include some factor to encounter the randomness in data which causes high frequency fluctuations which </a:t>
-            </a:r>
-            <a:r>
-              <a:rPr lang="en-US" dirty="0" smtClean="0">
-                <a:latin typeface="Times New Roman" panose="02020603050405020304" pitchFamily="18" charset="0"/>
-                <a:cs typeface="Times New Roman" panose="02020603050405020304" pitchFamily="18" charset="0"/>
-              </a:rPr>
-              <a:t>results </a:t>
-            </a:r>
-            <a:r>
-              <a:rPr lang="en-US" dirty="0">
-                <a:latin typeface="Times New Roman" panose="02020603050405020304" pitchFamily="18" charset="0"/>
-                <a:cs typeface="Times New Roman" panose="02020603050405020304" pitchFamily="18" charset="0"/>
-              </a:rPr>
-              <a:t>in </a:t>
-            </a:r>
-            <a:r>
-              <a:rPr lang="en-US" dirty="0" smtClean="0">
-                <a:latin typeface="Times New Roman" panose="02020603050405020304" pitchFamily="18" charset="0"/>
-                <a:cs typeface="Times New Roman" panose="02020603050405020304" pitchFamily="18" charset="0"/>
-              </a:rPr>
-              <a:t>under-performance </a:t>
-            </a:r>
-            <a:r>
-              <a:rPr lang="en-US" dirty="0">
-                <a:latin typeface="Times New Roman" panose="02020603050405020304" pitchFamily="18" charset="0"/>
-                <a:cs typeface="Times New Roman" panose="02020603050405020304" pitchFamily="18" charset="0"/>
-              </a:rPr>
-              <a:t>of models.</a:t>
+              <a:t>Include some factor to encounter the randomness in data which causes high frequency fluctuations which results in under-performance of models.</a:t>
             </a:r>
             <a:endParaRPr lang="en-IN" dirty="0">
               <a:latin typeface="Times New Roman" panose="02020603050405020304" pitchFamily="18" charset="0"/>
@@ -6565,35 +6372,7 @@
                 <a:latin typeface="Times New Roman" panose="02020603050405020304" pitchFamily="18" charset="0"/>
                 <a:cs typeface="Times New Roman" panose="02020603050405020304" pitchFamily="18" charset="0"/>
               </a:rPr>
-              <a:t>Getting more data points for better forecasting specially for LSTM model </a:t>
-            </a:r>
-            <a:r>
-              <a:rPr lang="en-US" dirty="0" smtClean="0">
-                <a:latin typeface="Times New Roman" panose="02020603050405020304" pitchFamily="18" charset="0"/>
-                <a:cs typeface="Times New Roman" panose="02020603050405020304" pitchFamily="18" charset="0"/>
-              </a:rPr>
-              <a:t>since </a:t>
-            </a:r>
-            <a:r>
-              <a:rPr lang="en-US" dirty="0">
-                <a:latin typeface="Times New Roman" panose="02020603050405020304" pitchFamily="18" charset="0"/>
-                <a:cs typeface="Times New Roman" panose="02020603050405020304" pitchFamily="18" charset="0"/>
-              </a:rPr>
-              <a:t>a neural </a:t>
-            </a:r>
-            <a:r>
-              <a:rPr lang="en-US" dirty="0" smtClean="0">
-                <a:latin typeface="Times New Roman" panose="02020603050405020304" pitchFamily="18" charset="0"/>
-                <a:cs typeface="Times New Roman" panose="02020603050405020304" pitchFamily="18" charset="0"/>
-              </a:rPr>
-              <a:t>network </a:t>
-            </a:r>
-            <a:r>
-              <a:rPr lang="en-US" dirty="0">
-                <a:latin typeface="Times New Roman" panose="02020603050405020304" pitchFamily="18" charset="0"/>
-                <a:cs typeface="Times New Roman" panose="02020603050405020304" pitchFamily="18" charset="0"/>
-              </a:rPr>
-              <a:t>needs more and more data for better predictions.</a:t>
+              <a:t>Getting more data points for better forecasting specially for LSTM model since a neural network needs more and more data for better predictions.</a:t>
             </a:r>
             <a:endParaRPr lang="en-IN" dirty="0">
               <a:latin typeface="Times New Roman" panose="02020603050405020304" pitchFamily="18" charset="0"/>
@@ -6607,7 +6386,7 @@
           <p:cNvPr id="4" name="Slide Number Placeholder 3">
             <a:extLst>
               <a:ext uri="{FF2B5EF4-FFF2-40B4-BE49-F238E27FC236}">
-                <a16:creationId xmlns="" xmlns:a16="http://schemas.microsoft.com/office/drawing/2014/main" id="{F4CAD629-4519-4FAA-BFF2-E80BBA664C96}"/>
+                <a16:creationId xmlns:a16="http://schemas.microsoft.com/office/drawing/2014/main" id="{F4CAD629-4519-4FAA-BFF2-E80BBA664C96}"/>
               </a:ext>
             </a:extLst>
           </p:cNvPr>
@@ -6677,10 +6456,9 @@
           <a:lstStyle/>
           <a:p>
             <a:r>
-              <a:rPr lang="en-IN" dirty="0" smtClean="0"/>
+              <a:rPr lang="en-IN" dirty="0"/>
               <a:t>References</a:t>
             </a:r>
-            <a:endParaRPr lang="en-IN" dirty="0"/>
           </a:p>
         </p:txBody>
       </p:sp>
@@ -6709,16 +6487,12 @@
             </a:r>
             <a:r>
               <a:rPr lang="en-IN" dirty="0"/>
-              <a:t>, 1978</a:t>
-            </a:r>
-            <a:r>
-              <a:rPr lang="en-IN" dirty="0" smtClean="0"/>
-              <a:t>.</a:t>
-            </a:r>
-          </a:p>
-          <a:p>
-            <a:r>
-              <a:rPr lang="en-IN" dirty="0" err="1" smtClean="0"/>
+              <a:t>, 1978.</a:t>
+            </a:r>
+          </a:p>
+          <a:p>
+            <a:r>
+              <a:rPr lang="en-IN" dirty="0" err="1"/>
               <a:t>Lyashenko</a:t>
             </a:r>
             <a:r>
@@ -6731,20 +6505,16 @@
             </a:r>
             <a:r>
               <a:rPr lang="en-IN" dirty="0"/>
-              <a:t>, 2020</a:t>
-            </a:r>
-            <a:r>
-              <a:rPr lang="en-IN" dirty="0" smtClean="0"/>
-              <a:t>.</a:t>
-            </a:r>
-          </a:p>
-          <a:p>
-            <a:r>
-              <a:rPr lang="en-IN" dirty="0" err="1" smtClean="0"/>
+              <a:t>, 2020.</a:t>
+            </a:r>
+          </a:p>
+          <a:p>
+            <a:r>
+              <a:rPr lang="en-IN" dirty="0" err="1"/>
               <a:t>Nimisha</a:t>
             </a:r>
             <a:r>
-              <a:rPr lang="en-IN" dirty="0" smtClean="0"/>
+              <a:rPr lang="en-IN" dirty="0"/>
               <a:t> </a:t>
             </a:r>
             <a:r>
@@ -6777,17 +6547,17 @@
             </a:r>
             <a:r>
               <a:rPr lang="en-IN" dirty="0"/>
-              <a:t>, 2020</a:t>
-            </a:r>
-            <a:r>
-              <a:rPr lang="en-IN" dirty="0" smtClean="0"/>
-              <a:t>.</a:t>
-            </a:r>
-          </a:p>
-          <a:p>
-            <a:r>
-              <a:rPr lang="en-IN" dirty="0" smtClean="0"/>
-              <a:t>S</a:t>
+              <a:t>, 2020.</a:t>
+            </a:r>
+          </a:p>
+          <a:p>
+            <a:r>
+              <a:rPr lang="en-IN" dirty="0"/>
+              <a:t>S. </a:t>
+            </a:r>
+            <a:r>
+              <a:rPr lang="en-IN" dirty="0" err="1"/>
+              <a:t>Vemuri,R</a:t>
             </a:r>
             <a:r>
               <a:rPr lang="en-IN" dirty="0"/>
@@ -6795,14 +6565,6 @@
             </a:r>
             <a:r>
               <a:rPr lang="en-IN" dirty="0" err="1"/>
-              <a:t>Vemuri,R</a:t>
-            </a:r>
-            <a:r>
-              <a:rPr lang="en-IN" dirty="0"/>
-              <a:t>. </a:t>
-            </a:r>
-            <a:r>
-              <a:rPr lang="en-IN" dirty="0" err="1"/>
               <a:t>Balasubramanian</a:t>
             </a:r>
             <a:r>
@@ -6815,25 +6577,17 @@
             </a:r>
             <a:r>
               <a:rPr lang="en-IN" dirty="0"/>
-              <a:t>, 1974</a:t>
-            </a:r>
-            <a:r>
-              <a:rPr lang="en-IN" dirty="0" smtClean="0"/>
-              <a:t>.</a:t>
-            </a:r>
-          </a:p>
-          <a:p>
-            <a:r>
-              <a:rPr lang="en-IN" dirty="0" err="1" smtClean="0"/>
+              <a:t>, 1974.</a:t>
+            </a:r>
+          </a:p>
+          <a:p>
+            <a:r>
+              <a:rPr lang="en-IN" dirty="0" err="1"/>
               <a:t>Sandip</a:t>
             </a:r>
             <a:r>
-              <a:rPr lang="en-IN" dirty="0" smtClean="0"/>
-              <a:t> </a:t>
-            </a:r>
-            <a:r>
               <a:rPr lang="en-IN" dirty="0"/>
-              <a:t>Roy, </a:t>
+              <a:t> Roy, </a:t>
             </a:r>
             <a:r>
               <a:rPr lang="en-IN" dirty="0" err="1"/>
@@ -6873,21 +6627,13 @@
             </a:r>
             <a:r>
               <a:rPr lang="en-IN" dirty="0"/>
-              <a:t>, 2018</a:t>
-            </a:r>
-            <a:r>
-              <a:rPr lang="en-IN" dirty="0" smtClean="0"/>
-              <a:t>.</a:t>
-            </a:r>
-          </a:p>
-          <a:p>
-            <a:r>
-              <a:rPr lang="en-IN" dirty="0" smtClean="0"/>
-              <a:t>Yi-Ting </a:t>
-            </a:r>
+              <a:t>, 2018.</a:t>
+            </a:r>
+          </a:p>
+          <a:p>
             <a:r>
               <a:rPr lang="en-IN" dirty="0"/>
-              <a:t>Tsai, Yu-</a:t>
+              <a:t>Yi-Ting Tsai, Yu-</a:t>
             </a:r>
             <a:r>
               <a:rPr lang="en-IN" dirty="0" err="1"/>
@@ -6982,7 +6728,7 @@
           <p:cNvPr id="2" name="Title 1">
             <a:extLst>
               <a:ext uri="{FF2B5EF4-FFF2-40B4-BE49-F238E27FC236}">
-                <a16:creationId xmlns="" xmlns:a16="http://schemas.microsoft.com/office/drawing/2014/main" id="{AEADAB91-8980-4F53-9688-21BED7326DE7}"/>
+                <a16:creationId xmlns:a16="http://schemas.microsoft.com/office/drawing/2014/main" id="{AEADAB91-8980-4F53-9688-21BED7326DE7}"/>
               </a:ext>
             </a:extLst>
           </p:cNvPr>
@@ -7013,7 +6759,7 @@
           <p:cNvPr id="3" name="Content Placeholder 2">
             <a:extLst>
               <a:ext uri="{FF2B5EF4-FFF2-40B4-BE49-F238E27FC236}">
-                <a16:creationId xmlns="" xmlns:a16="http://schemas.microsoft.com/office/drawing/2014/main" id="{A879210D-023D-4D55-84FD-4CB00233888D}"/>
+                <a16:creationId xmlns:a16="http://schemas.microsoft.com/office/drawing/2014/main" id="{A879210D-023D-4D55-84FD-4CB00233888D}"/>
               </a:ext>
             </a:extLst>
           </p:cNvPr>
@@ -7052,42 +6798,17 @@
                 <a:latin typeface="Times New Roman" panose="02020603050405020304" pitchFamily="18" charset="0"/>
                 <a:cs typeface="Times New Roman" panose="02020603050405020304" pitchFamily="18" charset="0"/>
               </a:rPr>
-              <a:t>India doesn’t produce petroleum products so we import it from Arab countries and </a:t>
-            </a:r>
-            <a:r>
-              <a:rPr lang="en-US" dirty="0" smtClean="0">
-                <a:latin typeface="Times New Roman" panose="02020603050405020304" pitchFamily="18" charset="0"/>
-                <a:cs typeface="Times New Roman" panose="02020603050405020304" pitchFamily="18" charset="0"/>
-              </a:rPr>
-              <a:t>export </a:t>
-            </a:r>
+              <a:t>India doesn’t produce petroleum products so we import it from Arab countries and export commodities like metals, pearls, clothes and mineral oils to them.</a:t>
+            </a:r>
+          </a:p>
+          <a:p>
             <a:r>
               <a:rPr lang="en-US" dirty="0">
                 <a:latin typeface="Times New Roman" panose="02020603050405020304" pitchFamily="18" charset="0"/>
                 <a:cs typeface="Times New Roman" panose="02020603050405020304" pitchFamily="18" charset="0"/>
               </a:rPr>
-              <a:t>commodities like metals, pearls, clothes and mineral </a:t>
-            </a:r>
-            <a:r>
-              <a:rPr lang="en-US" dirty="0" smtClean="0">
-                <a:latin typeface="Times New Roman" panose="02020603050405020304" pitchFamily="18" charset="0"/>
-                <a:cs typeface="Times New Roman" panose="02020603050405020304" pitchFamily="18" charset="0"/>
-              </a:rPr>
-              <a:t>oils to them.</a:t>
-            </a:r>
-          </a:p>
-          <a:p>
-            <a:r>
-              <a:rPr lang="en-US" dirty="0" smtClean="0">
-                <a:latin typeface="Times New Roman" panose="02020603050405020304" pitchFamily="18" charset="0"/>
-                <a:cs typeface="Times New Roman" panose="02020603050405020304" pitchFamily="18" charset="0"/>
-              </a:rPr>
               <a:t>This way countries help each other using trade.</a:t>
             </a:r>
-            <a:endParaRPr lang="en-US" dirty="0">
-              <a:latin typeface="Times New Roman" panose="02020603050405020304" pitchFamily="18" charset="0"/>
-              <a:cs typeface="Times New Roman" panose="02020603050405020304" pitchFamily="18" charset="0"/>
-            </a:endParaRPr>
           </a:p>
         </p:txBody>
       </p:sp>
@@ -7096,7 +6817,7 @@
           <p:cNvPr id="4" name="Slide Number Placeholder 3">
             <a:extLst>
               <a:ext uri="{FF2B5EF4-FFF2-40B4-BE49-F238E27FC236}">
-                <a16:creationId xmlns="" xmlns:a16="http://schemas.microsoft.com/office/drawing/2014/main" id="{66E1CA14-90D6-43A5-9C6F-E30227221CD7}"/>
+                <a16:creationId xmlns:a16="http://schemas.microsoft.com/office/drawing/2014/main" id="{66E1CA14-90D6-43A5-9C6F-E30227221CD7}"/>
               </a:ext>
             </a:extLst>
           </p:cNvPr>
@@ -7180,7 +6901,7 @@
           <p:cNvPr id="3" name="Slide Number Placeholder 2">
             <a:extLst>
               <a:ext uri="{FF2B5EF4-FFF2-40B4-BE49-F238E27FC236}">
-                <a16:creationId xmlns="" xmlns:a16="http://schemas.microsoft.com/office/drawing/2014/main" id="{CF50768F-32BC-4171-85D7-92F5DC437E5E}"/>
+                <a16:creationId xmlns:a16="http://schemas.microsoft.com/office/drawing/2014/main" id="{CF50768F-32BC-4171-85D7-92F5DC437E5E}"/>
               </a:ext>
             </a:extLst>
           </p:cNvPr>
@@ -7239,7 +6960,7 @@
           <p:cNvPr id="2" name="Title 1">
             <a:extLst>
               <a:ext uri="{FF2B5EF4-FFF2-40B4-BE49-F238E27FC236}">
-                <a16:creationId xmlns="" xmlns:a16="http://schemas.microsoft.com/office/drawing/2014/main" id="{7B3B6C76-254B-4957-AFE9-EA111965FE94}"/>
+                <a16:creationId xmlns:a16="http://schemas.microsoft.com/office/drawing/2014/main" id="{7B3B6C76-254B-4957-AFE9-EA111965FE94}"/>
               </a:ext>
             </a:extLst>
           </p:cNvPr>
@@ -7270,7 +6991,7 @@
           <p:cNvPr id="3" name="Content Placeholder 2">
             <a:extLst>
               <a:ext uri="{FF2B5EF4-FFF2-40B4-BE49-F238E27FC236}">
-                <a16:creationId xmlns="" xmlns:a16="http://schemas.microsoft.com/office/drawing/2014/main" id="{E344AEE5-F668-445D-8291-E46207E99A59}"/>
+                <a16:creationId xmlns:a16="http://schemas.microsoft.com/office/drawing/2014/main" id="{E344AEE5-F668-445D-8291-E46207E99A59}"/>
               </a:ext>
             </a:extLst>
           </p:cNvPr>
@@ -7322,21 +7043,7 @@
                 <a:latin typeface="Times New Roman" panose="02020603050405020304" pitchFamily="18" charset="0"/>
                 <a:cs typeface="Times New Roman" panose="02020603050405020304" pitchFamily="18" charset="0"/>
               </a:rPr>
-              <a:t>Knowing Future’s import/export value, we can take </a:t>
-            </a:r>
-            <a:r>
-              <a:rPr lang="en-US" dirty="0" smtClean="0">
-                <a:latin typeface="Times New Roman" panose="02020603050405020304" pitchFamily="18" charset="0"/>
-                <a:cs typeface="Times New Roman" panose="02020603050405020304" pitchFamily="18" charset="0"/>
-              </a:rPr>
-              <a:t>precautionary </a:t>
-            </a:r>
-            <a:r>
-              <a:rPr lang="en-US" dirty="0">
-                <a:latin typeface="Times New Roman" panose="02020603050405020304" pitchFamily="18" charset="0"/>
-                <a:cs typeface="Times New Roman" panose="02020603050405020304" pitchFamily="18" charset="0"/>
-              </a:rPr>
-              <a:t>measures for the smooth trading.</a:t>
+              <a:t>Knowing Future’s import/export value, we can take precautionary measures for the smooth trading.</a:t>
             </a:r>
           </a:p>
         </p:txBody>
@@ -7346,7 +7053,7 @@
           <p:cNvPr id="4" name="Slide Number Placeholder 3">
             <a:extLst>
               <a:ext uri="{FF2B5EF4-FFF2-40B4-BE49-F238E27FC236}">
-                <a16:creationId xmlns="" xmlns:a16="http://schemas.microsoft.com/office/drawing/2014/main" id="{7BA8CF41-44B1-46C6-BCE6-5CA6D3465D06}"/>
+                <a16:creationId xmlns:a16="http://schemas.microsoft.com/office/drawing/2014/main" id="{7BA8CF41-44B1-46C6-BCE6-5CA6D3465D06}"/>
               </a:ext>
             </a:extLst>
           </p:cNvPr>
@@ -7405,7 +7112,7 @@
           <p:cNvPr id="2" name="Title 1">
             <a:extLst>
               <a:ext uri="{FF2B5EF4-FFF2-40B4-BE49-F238E27FC236}">
-                <a16:creationId xmlns="" xmlns:a16="http://schemas.microsoft.com/office/drawing/2014/main" id="{DF397BB6-61D8-41C1-818D-83C8A4F7E683}"/>
+                <a16:creationId xmlns:a16="http://schemas.microsoft.com/office/drawing/2014/main" id="{DF397BB6-61D8-41C1-818D-83C8A4F7E683}"/>
               </a:ext>
             </a:extLst>
           </p:cNvPr>
@@ -7436,7 +7143,7 @@
           <p:cNvPr id="3" name="Content Placeholder 2">
             <a:extLst>
               <a:ext uri="{FF2B5EF4-FFF2-40B4-BE49-F238E27FC236}">
-                <a16:creationId xmlns="" xmlns:a16="http://schemas.microsoft.com/office/drawing/2014/main" id="{8E5BF401-6CA6-4DF9-BEDA-266E07986AA8}"/>
+                <a16:creationId xmlns:a16="http://schemas.microsoft.com/office/drawing/2014/main" id="{8E5BF401-6CA6-4DF9-BEDA-266E07986AA8}"/>
               </a:ext>
             </a:extLst>
           </p:cNvPr>
@@ -7466,21 +7173,16 @@
                 <a:latin typeface="Times New Roman" panose="02020603050405020304" pitchFamily="18" charset="0"/>
                 <a:cs typeface="Times New Roman" panose="02020603050405020304" pitchFamily="18" charset="0"/>
               </a:rPr>
-              <a:t>Monthly Trade data is available from January, 2006 to January, 2020 - Country wise </a:t>
-            </a:r>
-            <a:r>
-              <a:rPr lang="en-US" dirty="0" smtClean="0">
-                <a:latin typeface="Times New Roman" panose="02020603050405020304" pitchFamily="18" charset="0"/>
-                <a:cs typeface="Times New Roman" panose="02020603050405020304" pitchFamily="18" charset="0"/>
-              </a:rPr>
-              <a:t>and </a:t>
-            </a:r>
+              <a:t>Monthly Trade data is available from January, 2006 to January, 2020 - Country wise and HS code wise. </a:t>
+            </a:r>
+          </a:p>
+          <a:p>
             <a:r>
               <a:rPr lang="en-US" dirty="0">
                 <a:latin typeface="Times New Roman" panose="02020603050405020304" pitchFamily="18" charset="0"/>
                 <a:cs typeface="Times New Roman" panose="02020603050405020304" pitchFamily="18" charset="0"/>
               </a:rPr>
-              <a:t>HS code wise. </a:t>
+              <a:t>Trade amount (Import/Export) for each month is expressed in million US dollars. </a:t>
             </a:r>
           </a:p>
           <a:p>
@@ -7489,91 +7191,29 @@
                 <a:latin typeface="Times New Roman" panose="02020603050405020304" pitchFamily="18" charset="0"/>
                 <a:cs typeface="Times New Roman" panose="02020603050405020304" pitchFamily="18" charset="0"/>
               </a:rPr>
-              <a:t>Trade amount (Import/Export) for each month </a:t>
-            </a:r>
-            <a:r>
-              <a:rPr lang="en-US" dirty="0" smtClean="0">
-                <a:latin typeface="Times New Roman" panose="02020603050405020304" pitchFamily="18" charset="0"/>
-                <a:cs typeface="Times New Roman" panose="02020603050405020304" pitchFamily="18" charset="0"/>
-              </a:rPr>
-              <a:t>is </a:t>
-            </a:r>
+              <a:t>Harmonized System (HS code) of tariff nomenclature is an internationally standardized system of names and numbers to classify traded products, </a:t>
+            </a:r>
+            <a:r>
+              <a:rPr lang="en-US" sz="2200" dirty="0">
+                <a:latin typeface="Times New Roman" panose="02020603050405020304" pitchFamily="18" charset="0"/>
+                <a:cs typeface="Times New Roman" panose="02020603050405020304" pitchFamily="18" charset="0"/>
+              </a:rPr>
+              <a:t>e.g. 1 for Live Animal, 95 for Toys, Games and Sports Requisites etc.</a:t>
+            </a:r>
+          </a:p>
+          <a:p>
             <a:r>
               <a:rPr lang="en-US" dirty="0">
                 <a:latin typeface="Times New Roman" panose="02020603050405020304" pitchFamily="18" charset="0"/>
                 <a:cs typeface="Times New Roman" panose="02020603050405020304" pitchFamily="18" charset="0"/>
               </a:rPr>
-              <a:t>expressed in million US dollars. </a:t>
-            </a:r>
-          </a:p>
-          <a:p>
-            <a:r>
-              <a:rPr lang="en-US" dirty="0" smtClean="0">
-                <a:latin typeface="Times New Roman" panose="02020603050405020304" pitchFamily="18" charset="0"/>
-                <a:cs typeface="Times New Roman" panose="02020603050405020304" pitchFamily="18" charset="0"/>
-              </a:rPr>
-              <a:t>Harmonized </a:t>
-            </a:r>
-            <a:r>
-              <a:rPr lang="en-US" dirty="0">
-                <a:latin typeface="Times New Roman" panose="02020603050405020304" pitchFamily="18" charset="0"/>
-                <a:cs typeface="Times New Roman" panose="02020603050405020304" pitchFamily="18" charset="0"/>
-              </a:rPr>
-              <a:t>System (</a:t>
-            </a:r>
-            <a:r>
-              <a:rPr lang="en-US" dirty="0" smtClean="0">
-                <a:latin typeface="Times New Roman" panose="02020603050405020304" pitchFamily="18" charset="0"/>
-                <a:cs typeface="Times New Roman" panose="02020603050405020304" pitchFamily="18" charset="0"/>
-              </a:rPr>
-              <a:t>HS code) </a:t>
-            </a:r>
-            <a:r>
-              <a:rPr lang="en-US" dirty="0">
-                <a:latin typeface="Times New Roman" panose="02020603050405020304" pitchFamily="18" charset="0"/>
-                <a:cs typeface="Times New Roman" panose="02020603050405020304" pitchFamily="18" charset="0"/>
-              </a:rPr>
-              <a:t>of tariff nomenclature is an internationally standardized system of names and numbers to classify traded products, </a:t>
-            </a:r>
-            <a:r>
-              <a:rPr lang="en-US" sz="2200" dirty="0">
-                <a:latin typeface="Times New Roman" panose="02020603050405020304" pitchFamily="18" charset="0"/>
-                <a:cs typeface="Times New Roman" panose="02020603050405020304" pitchFamily="18" charset="0"/>
-              </a:rPr>
-              <a:t>e.g. 1 for Live Animal, 95 for Toys, Games and Sports </a:t>
-            </a:r>
-            <a:r>
-              <a:rPr lang="en-US" sz="2200" dirty="0" smtClean="0">
-                <a:latin typeface="Times New Roman" panose="02020603050405020304" pitchFamily="18" charset="0"/>
-                <a:cs typeface="Times New Roman" panose="02020603050405020304" pitchFamily="18" charset="0"/>
-              </a:rPr>
-              <a:t>Requisites etc.</a:t>
+              <a:t>Commodity is the description of the Harmonized System items.</a:t>
             </a:r>
             <a:endParaRPr lang="en-US" sz="2200" dirty="0">
               <a:latin typeface="Times New Roman" panose="02020603050405020304" pitchFamily="18" charset="0"/>
               <a:cs typeface="Times New Roman" panose="02020603050405020304" pitchFamily="18" charset="0"/>
             </a:endParaRPr>
           </a:p>
-          <a:p>
-            <a:r>
-              <a:rPr lang="en-US" dirty="0" smtClean="0">
-                <a:latin typeface="Times New Roman" panose="02020603050405020304" pitchFamily="18" charset="0"/>
-                <a:cs typeface="Times New Roman" panose="02020603050405020304" pitchFamily="18" charset="0"/>
-              </a:rPr>
-              <a:t>Commodity </a:t>
-            </a:r>
-            <a:r>
-              <a:rPr lang="en-US" dirty="0">
-                <a:latin typeface="Times New Roman" panose="02020603050405020304" pitchFamily="18" charset="0"/>
-                <a:cs typeface="Times New Roman" panose="02020603050405020304" pitchFamily="18" charset="0"/>
-              </a:rPr>
-              <a:t>is the description of the Harmonized System items.</a:t>
-            </a:r>
-            <a:endParaRPr lang="en-US" sz="2200" dirty="0">
-              <a:latin typeface="Times New Roman" panose="02020603050405020304" pitchFamily="18" charset="0"/>
-              <a:cs typeface="Times New Roman" panose="02020603050405020304" pitchFamily="18" charset="0"/>
-            </a:endParaRPr>
-          </a:p>
         </p:txBody>
       </p:sp>
       <p:sp>
@@ -7581,7 +7221,7 @@
           <p:cNvPr id="4" name="Slide Number Placeholder 3">
             <a:extLst>
               <a:ext uri="{FF2B5EF4-FFF2-40B4-BE49-F238E27FC236}">
-                <a16:creationId xmlns="" xmlns:a16="http://schemas.microsoft.com/office/drawing/2014/main" id="{00CCD94F-6B9D-40B2-8BBA-DEFBF5BD2335}"/>
+                <a16:creationId xmlns:a16="http://schemas.microsoft.com/office/drawing/2014/main" id="{00CCD94F-6B9D-40B2-8BBA-DEFBF5BD2335}"/>
               </a:ext>
             </a:extLst>
           </p:cNvPr>
@@ -7637,13 +7277,7 @@
       </p:grpSpPr>
       <p:sp>
         <p:nvSpPr>
-          <p:cNvPr id="2" name="Title 1">
-            <a:extLst>
-              <a:ext uri="{FF2B5EF4-FFF2-40B4-BE49-F238E27FC236}">
-                <a16:creationId xmlns="" xmlns:a16="http://schemas.microsoft.com/office/drawing/2014/main" id="{4C89A33E-AACB-49C0-819F-8920338CF076}"/>
-              </a:ext>
-            </a:extLst>
-          </p:cNvPr>
+          <p:cNvPr id="2" name="Title 1"/>
           <p:cNvSpPr>
             <a:spLocks noGrp="1"/>
           </p:cNvSpPr>
@@ -7657,62 +7291,118 @@
           <a:lstStyle/>
           <a:p>
             <a:r>
-              <a:rPr lang="en-US" dirty="0">
-                <a:latin typeface="Times New Roman" panose="02020603050405020304" pitchFamily="18" charset="0"/>
-                <a:cs typeface="Times New Roman" panose="02020603050405020304" pitchFamily="18" charset="0"/>
-              </a:rPr>
-              <a:t>How the Trade Data Looks</a:t>
-            </a:r>
-          </a:p>
-        </p:txBody>
-      </p:sp>
-      <p:pic>
-        <p:nvPicPr>
-          <p:cNvPr id="4" name="Content Placeholder 3">
-            <a:extLst>
-              <a:ext uri="{FF2B5EF4-FFF2-40B4-BE49-F238E27FC236}">
-                <a16:creationId xmlns="" xmlns:a16="http://schemas.microsoft.com/office/drawing/2014/main" id="{DBAF1874-DCD5-42BA-B8F9-7F6F1308CD2A}"/>
-              </a:ext>
-            </a:extLst>
-          </p:cNvPr>
-          <p:cNvPicPr>
-            <a:picLocks noGrp="1"/>
-          </p:cNvPicPr>
+              <a:rPr lang="en-IN" dirty="0"/>
+              <a:t>Technologies Used</a:t>
+            </a:r>
+          </a:p>
+        </p:txBody>
+      </p:sp>
+      <p:sp>
+        <p:nvSpPr>
+          <p:cNvPr id="3" name="Content Placeholder 2"/>
+          <p:cNvSpPr>
+            <a:spLocks noGrp="1"/>
+          </p:cNvSpPr>
           <p:nvPr>
             <p:ph idx="1"/>
           </p:nvPr>
-        </p:nvPicPr>
-        <p:blipFill>
-          <a:blip r:embed="rId2">
-            <a:extLst>
-              <a:ext uri="{28A0092B-C50C-407E-A947-70E740481C1C}">
-                <a14:useLocalDpi xmlns:a14="http://schemas.microsoft.com/office/drawing/2010/main" val="0"/>
-              </a:ext>
-            </a:extLst>
-          </a:blip>
-          <a:stretch>
-            <a:fillRect/>
-          </a:stretch>
-        </p:blipFill>
+        </p:nvSpPr>
         <p:spPr>
           <a:xfrm>
-            <a:off x="893485" y="1852831"/>
-            <a:ext cx="9231016" cy="4415766"/>
+            <a:off x="609600" y="1612232"/>
+            <a:ext cx="10160000" cy="4800600"/>
           </a:xfrm>
-          <a:prstGeom prst="rect">
-            <a:avLst/>
-          </a:prstGeom>
         </p:spPr>
-      </p:pic>
-      <p:sp>
-        <p:nvSpPr>
-          <p:cNvPr id="3" name="Slide Number Placeholder 2">
-            <a:extLst>
-              <a:ext uri="{FF2B5EF4-FFF2-40B4-BE49-F238E27FC236}">
-                <a16:creationId xmlns="" xmlns:a16="http://schemas.microsoft.com/office/drawing/2014/main" id="{120FF20B-E954-4E5A-95AB-691E2CBBDDB2}"/>
-              </a:ext>
-            </a:extLst>
-          </p:cNvPr>
+        <p:txBody>
+          <a:bodyPr/>
+          <a:lstStyle/>
+          <a:p>
+            <a:r>
+              <a:rPr lang="en-IN" dirty="0" err="1"/>
+              <a:t>Jupyter</a:t>
+            </a:r>
+            <a:r>
+              <a:rPr lang="en-IN" dirty="0"/>
+              <a:t> Notebook</a:t>
+            </a:r>
+          </a:p>
+          <a:p>
+            <a:r>
+              <a:rPr lang="en-IN" dirty="0"/>
+              <a:t>Python3</a:t>
+            </a:r>
+          </a:p>
+          <a:p>
+            <a:r>
+              <a:rPr lang="en-IN" dirty="0"/>
+              <a:t>Libraries used for trade analysis – Numpy, Matplotlib, </a:t>
+            </a:r>
+            <a:r>
+              <a:rPr lang="en-IN" dirty="0" err="1"/>
+              <a:t>Seaborn</a:t>
+            </a:r>
+            <a:r>
+              <a:rPr lang="en-IN" dirty="0"/>
+              <a:t>, Pandas, Random, Math, </a:t>
+            </a:r>
+            <a:r>
+              <a:rPr lang="en-IN" dirty="0" err="1"/>
+              <a:t>Datetime</a:t>
+            </a:r>
+            <a:r>
+              <a:rPr lang="en-IN" dirty="0"/>
+              <a:t>, Warnings</a:t>
+            </a:r>
+          </a:p>
+          <a:p>
+            <a:r>
+              <a:rPr lang="en-IN" dirty="0" err="1"/>
+              <a:t>Tensorflow</a:t>
+            </a:r>
+            <a:r>
+              <a:rPr lang="en-IN" dirty="0"/>
+              <a:t>, </a:t>
+            </a:r>
+            <a:r>
+              <a:rPr lang="en-IN" dirty="0" err="1"/>
+              <a:t>Keras</a:t>
+            </a:r>
+            <a:r>
+              <a:rPr lang="en-IN" dirty="0"/>
+              <a:t> and </a:t>
+            </a:r>
+            <a:r>
+              <a:rPr lang="en-IN" dirty="0" err="1"/>
+              <a:t>Scikit</a:t>
+            </a:r>
+            <a:r>
+              <a:rPr lang="en-IN" dirty="0"/>
+              <a:t>-learn for LSTM Implementation </a:t>
+            </a:r>
+          </a:p>
+          <a:p>
+            <a:r>
+              <a:rPr lang="en-IN" dirty="0" err="1"/>
+              <a:t>Scikit</a:t>
+            </a:r>
+            <a:r>
+              <a:rPr lang="en-IN" dirty="0"/>
+              <a:t>-learn and </a:t>
+            </a:r>
+            <a:r>
+              <a:rPr lang="en-IN" dirty="0" err="1"/>
+              <a:t>Statmodels</a:t>
+            </a:r>
+            <a:r>
+              <a:rPr lang="en-IN" dirty="0"/>
+              <a:t> for other statistical models implementation e.g. ARIMA and Holt winters method.</a:t>
+            </a:r>
+          </a:p>
+        </p:txBody>
+      </p:sp>
+      <p:sp>
+        <p:nvSpPr>
+          <p:cNvPr id="4" name="Slide Number Placeholder 3"/>
           <p:cNvSpPr>
             <a:spLocks noGrp="1"/>
           </p:cNvSpPr>
@@ -7736,7 +7426,7 @@
     </p:spTree>
     <p:extLst>
       <p:ext uri="{BB962C8B-B14F-4D97-AF65-F5344CB8AC3E}">
-        <p14:creationId xmlns:p14="http://schemas.microsoft.com/office/powerpoint/2010/main" val="3698722340"/>
+        <p14:creationId xmlns:p14="http://schemas.microsoft.com/office/powerpoint/2010/main" val="618403057"/>
       </p:ext>
     </p:extLst>
   </p:cSld>
@@ -7765,7 +7455,13 @@
       </p:grpSpPr>
       <p:sp>
         <p:nvSpPr>
-          <p:cNvPr id="2" name="Title 1"/>
+          <p:cNvPr id="2" name="Title 1">
+            <a:extLst>
+              <a:ext uri="{FF2B5EF4-FFF2-40B4-BE49-F238E27FC236}">
+                <a16:creationId xmlns:a16="http://schemas.microsoft.com/office/drawing/2014/main" id="{4C89A33E-AACB-49C0-819F-8920338CF076}"/>
+              </a:ext>
+            </a:extLst>
+          </p:cNvPr>
           <p:cNvSpPr>
             <a:spLocks noGrp="1"/>
           </p:cNvSpPr>
@@ -7779,119 +7475,62 @@
           <a:lstStyle/>
           <a:p>
             <a:r>
-              <a:rPr lang="en-IN" dirty="0" smtClean="0"/>
-              <a:t>Technologies Used</a:t>
-            </a:r>
-            <a:endParaRPr lang="en-IN" dirty="0"/>
-          </a:p>
-        </p:txBody>
-      </p:sp>
-      <p:sp>
-        <p:nvSpPr>
-          <p:cNvPr id="3" name="Content Placeholder 2"/>
-          <p:cNvSpPr>
-            <a:spLocks noGrp="1"/>
-          </p:cNvSpPr>
+              <a:rPr lang="en-US" dirty="0">
+                <a:latin typeface="Times New Roman" panose="02020603050405020304" pitchFamily="18" charset="0"/>
+                <a:cs typeface="Times New Roman" panose="02020603050405020304" pitchFamily="18" charset="0"/>
+              </a:rPr>
+              <a:t>How the Trade Data Looks</a:t>
+            </a:r>
+          </a:p>
+        </p:txBody>
+      </p:sp>
+      <p:pic>
+        <p:nvPicPr>
+          <p:cNvPr id="4" name="Content Placeholder 3">
+            <a:extLst>
+              <a:ext uri="{FF2B5EF4-FFF2-40B4-BE49-F238E27FC236}">
+                <a16:creationId xmlns:a16="http://schemas.microsoft.com/office/drawing/2014/main" id="{DBAF1874-DCD5-42BA-B8F9-7F6F1308CD2A}"/>
+              </a:ext>
+            </a:extLst>
+          </p:cNvPr>
+          <p:cNvPicPr>
+            <a:picLocks noGrp="1"/>
+          </p:cNvPicPr>
           <p:nvPr>
             <p:ph idx="1"/>
           </p:nvPr>
-        </p:nvSpPr>
+        </p:nvPicPr>
+        <p:blipFill>
+          <a:blip r:embed="rId2">
+            <a:extLst>
+              <a:ext uri="{28A0092B-C50C-407E-A947-70E740481C1C}">
+                <a14:useLocalDpi xmlns:a14="http://schemas.microsoft.com/office/drawing/2010/main" val="0"/>
+              </a:ext>
+            </a:extLst>
+          </a:blip>
+          <a:stretch>
+            <a:fillRect/>
+          </a:stretch>
+        </p:blipFill>
         <p:spPr>
           <a:xfrm>
-            <a:off x="609600" y="1612232"/>
-            <a:ext cx="10160000" cy="4800600"/>
+            <a:off x="893485" y="1852831"/>
+            <a:ext cx="9231016" cy="4415766"/>
           </a:xfrm>
+          <a:prstGeom prst="rect">
+            <a:avLst/>
+          </a:prstGeom>
         </p:spPr>
-        <p:txBody>
-          <a:bodyPr/>
-          <a:lstStyle/>
-          <a:p>
-            <a:r>
-              <a:rPr lang="en-IN" dirty="0" err="1" smtClean="0"/>
-              <a:t>Jupyter</a:t>
-            </a:r>
-            <a:r>
-              <a:rPr lang="en-IN" dirty="0" smtClean="0"/>
-              <a:t> Notebook</a:t>
-            </a:r>
-          </a:p>
-          <a:p>
-            <a:r>
-              <a:rPr lang="en-IN" dirty="0" smtClean="0"/>
-              <a:t>Python3</a:t>
-            </a:r>
-          </a:p>
-          <a:p>
-            <a:r>
-              <a:rPr lang="en-IN" dirty="0" smtClean="0"/>
-              <a:t>Libraries used for trade analysis – Numpy, Matplotlib, </a:t>
-            </a:r>
-            <a:r>
-              <a:rPr lang="en-IN" dirty="0" err="1" smtClean="0"/>
-              <a:t>Seaborn</a:t>
-            </a:r>
-            <a:r>
-              <a:rPr lang="en-IN" dirty="0" smtClean="0"/>
-              <a:t>, Pandas, Random, Math, </a:t>
-            </a:r>
-            <a:r>
-              <a:rPr lang="en-IN" dirty="0" err="1" smtClean="0"/>
-              <a:t>Datetime</a:t>
-            </a:r>
-            <a:r>
-              <a:rPr lang="en-IN" dirty="0" smtClean="0"/>
-              <a:t>, Warnings</a:t>
-            </a:r>
-          </a:p>
-          <a:p>
-            <a:r>
-              <a:rPr lang="en-IN" dirty="0" err="1" smtClean="0"/>
-              <a:t>Tensorflow</a:t>
-            </a:r>
-            <a:r>
-              <a:rPr lang="en-IN" dirty="0" smtClean="0"/>
-              <a:t>, </a:t>
-            </a:r>
-            <a:r>
-              <a:rPr lang="en-IN" dirty="0" err="1" smtClean="0"/>
-              <a:t>Keras</a:t>
-            </a:r>
-            <a:r>
-              <a:rPr lang="en-IN" dirty="0" smtClean="0"/>
-              <a:t> and </a:t>
-            </a:r>
-            <a:r>
-              <a:rPr lang="en-IN" dirty="0" err="1" smtClean="0"/>
-              <a:t>Scikit</a:t>
-            </a:r>
-            <a:r>
-              <a:rPr lang="en-IN" dirty="0" smtClean="0"/>
-              <a:t>-learn for LSTM Implementation </a:t>
-            </a:r>
-          </a:p>
-          <a:p>
-            <a:r>
-              <a:rPr lang="en-IN" dirty="0" err="1" smtClean="0"/>
-              <a:t>Scikit</a:t>
-            </a:r>
-            <a:r>
-              <a:rPr lang="en-IN" dirty="0" smtClean="0"/>
-              <a:t>-learn and </a:t>
-            </a:r>
-            <a:r>
-              <a:rPr lang="en-IN" dirty="0" err="1" smtClean="0"/>
-              <a:t>Statmodels</a:t>
-            </a:r>
-            <a:r>
-              <a:rPr lang="en-IN" dirty="0" smtClean="0"/>
-              <a:t> for other statistical models implementation e.g. ARIMA and Holt winters method.</a:t>
-            </a:r>
-          </a:p>
-        </p:txBody>
-      </p:sp>
-      <p:sp>
-        <p:nvSpPr>
-          <p:cNvPr id="4" name="Slide Number Placeholder 3"/>
+      </p:pic>
+      <p:sp>
+        <p:nvSpPr>
+          <p:cNvPr id="3" name="Slide Number Placeholder 2">
+            <a:extLst>
+              <a:ext uri="{FF2B5EF4-FFF2-40B4-BE49-F238E27FC236}">
+                <a16:creationId xmlns:a16="http://schemas.microsoft.com/office/drawing/2014/main" id="{120FF20B-E954-4E5A-95AB-691E2CBBDDB2}"/>
+              </a:ext>
+            </a:extLst>
+          </p:cNvPr>
           <p:cNvSpPr>
             <a:spLocks noGrp="1"/>
           </p:cNvSpPr>
@@ -7915,7 +7554,7 @@
     </p:spTree>
     <p:extLst>
       <p:ext uri="{BB962C8B-B14F-4D97-AF65-F5344CB8AC3E}">
-        <p14:creationId xmlns:p14="http://schemas.microsoft.com/office/powerpoint/2010/main" val="618403057"/>
+        <p14:creationId xmlns:p14="http://schemas.microsoft.com/office/powerpoint/2010/main" val="3698722340"/>
       </p:ext>
     </p:extLst>
   </p:cSld>
@@ -7947,7 +7586,7 @@
           <p:cNvPr id="2" name="Title 1">
             <a:extLst>
               <a:ext uri="{FF2B5EF4-FFF2-40B4-BE49-F238E27FC236}">
-                <a16:creationId xmlns="" xmlns:a16="http://schemas.microsoft.com/office/drawing/2014/main" id="{DF09CCE7-7DE4-4276-8546-CC34212408B6}"/>
+                <a16:creationId xmlns:a16="http://schemas.microsoft.com/office/drawing/2014/main" id="{DF09CCE7-7DE4-4276-8546-CC34212408B6}"/>
               </a:ext>
             </a:extLst>
           </p:cNvPr>
@@ -7978,7 +7617,7 @@
           <p:cNvPr id="4" name="Content Placeholder 3">
             <a:extLst>
               <a:ext uri="{FF2B5EF4-FFF2-40B4-BE49-F238E27FC236}">
-                <a16:creationId xmlns="" xmlns:a16="http://schemas.microsoft.com/office/drawing/2014/main" id="{C7BEF372-F27F-4DDC-91E8-5D485CDD8622}"/>
+                <a16:creationId xmlns:a16="http://schemas.microsoft.com/office/drawing/2014/main" id="{C7BEF372-F27F-4DDC-91E8-5D485CDD8622}"/>
               </a:ext>
             </a:extLst>
           </p:cNvPr>
@@ -8016,7 +7655,7 @@
           <p:cNvPr id="5" name="TextBox 4">
             <a:extLst>
               <a:ext uri="{FF2B5EF4-FFF2-40B4-BE49-F238E27FC236}">
-                <a16:creationId xmlns="" xmlns:a16="http://schemas.microsoft.com/office/drawing/2014/main" id="{D99B2D6F-704A-4629-8F33-9A6A63627A46}"/>
+                <a16:creationId xmlns:a16="http://schemas.microsoft.com/office/drawing/2014/main" id="{D99B2D6F-704A-4629-8F33-9A6A63627A46}"/>
               </a:ext>
             </a:extLst>
           </p:cNvPr>
@@ -8084,7 +7723,7 @@
           <p:cNvPr id="3" name="Slide Number Placeholder 2">
             <a:extLst>
               <a:ext uri="{FF2B5EF4-FFF2-40B4-BE49-F238E27FC236}">
-                <a16:creationId xmlns="" xmlns:a16="http://schemas.microsoft.com/office/drawing/2014/main" id="{EFD55A3F-581D-486B-872C-90B0A238A33C}"/>
+                <a16:creationId xmlns:a16="http://schemas.microsoft.com/office/drawing/2014/main" id="{EFD55A3F-581D-486B-872C-90B0A238A33C}"/>
               </a:ext>
             </a:extLst>
           </p:cNvPr>
@@ -8143,7 +7782,7 @@
           <p:cNvPr id="2" name="Title 1">
             <a:extLst>
               <a:ext uri="{FF2B5EF4-FFF2-40B4-BE49-F238E27FC236}">
-                <a16:creationId xmlns="" xmlns:a16="http://schemas.microsoft.com/office/drawing/2014/main" id="{1A6B5522-BFDE-4C02-BE49-85BD361D3A50}"/>
+                <a16:creationId xmlns:a16="http://schemas.microsoft.com/office/drawing/2014/main" id="{1A6B5522-BFDE-4C02-BE49-85BD361D3A50}"/>
               </a:ext>
             </a:extLst>
           </p:cNvPr>
@@ -8174,7 +7813,7 @@
           <p:cNvPr id="4" name="Content Placeholder 3">
             <a:extLst>
               <a:ext uri="{FF2B5EF4-FFF2-40B4-BE49-F238E27FC236}">
-                <a16:creationId xmlns="" xmlns:a16="http://schemas.microsoft.com/office/drawing/2014/main" id="{BB5653EC-DCFD-4B94-B431-1BF773E6E561}"/>
+                <a16:creationId xmlns:a16="http://schemas.microsoft.com/office/drawing/2014/main" id="{BB5653EC-DCFD-4B94-B431-1BF773E6E561}"/>
               </a:ext>
             </a:extLst>
           </p:cNvPr>
@@ -8212,7 +7851,7 @@
           <p:cNvPr id="5" name="TextBox 4">
             <a:extLst>
               <a:ext uri="{FF2B5EF4-FFF2-40B4-BE49-F238E27FC236}">
-                <a16:creationId xmlns="" xmlns:a16="http://schemas.microsoft.com/office/drawing/2014/main" id="{4DCC699E-A326-430A-8F1B-29C397404BE0}"/>
+                <a16:creationId xmlns:a16="http://schemas.microsoft.com/office/drawing/2014/main" id="{4DCC699E-A326-430A-8F1B-29C397404BE0}"/>
               </a:ext>
             </a:extLst>
           </p:cNvPr>
@@ -8257,35 +7896,7 @@
                 <a:latin typeface="Times New Roman" panose="02020603050405020304" pitchFamily="18" charset="0"/>
                 <a:cs typeface="Times New Roman" panose="02020603050405020304" pitchFamily="18" charset="0"/>
               </a:rPr>
-              <a:t>While USA </a:t>
-            </a:r>
-            <a:r>
-              <a:rPr lang="en-US" dirty="0" smtClean="0">
-                <a:latin typeface="Times New Roman" panose="02020603050405020304" pitchFamily="18" charset="0"/>
-                <a:cs typeface="Times New Roman" panose="02020603050405020304" pitchFamily="18" charset="0"/>
-              </a:rPr>
-              <a:t>is the </a:t>
-            </a:r>
-            <a:r>
-              <a:rPr lang="en-US" dirty="0">
-                <a:latin typeface="Times New Roman" panose="02020603050405020304" pitchFamily="18" charset="0"/>
-                <a:cs typeface="Times New Roman" panose="02020603050405020304" pitchFamily="18" charset="0"/>
-              </a:rPr>
-              <a:t>top </a:t>
-            </a:r>
-            <a:r>
-              <a:rPr lang="en-US" dirty="0" smtClean="0">
-                <a:latin typeface="Times New Roman" panose="02020603050405020304" pitchFamily="18" charset="0"/>
-                <a:cs typeface="Times New Roman" panose="02020603050405020304" pitchFamily="18" charset="0"/>
-              </a:rPr>
-              <a:t>country </a:t>
-            </a:r>
-            <a:r>
-              <a:rPr lang="en-US" dirty="0">
-                <a:latin typeface="Times New Roman" panose="02020603050405020304" pitchFamily="18" charset="0"/>
-                <a:cs typeface="Times New Roman" panose="02020603050405020304" pitchFamily="18" charset="0"/>
-              </a:rPr>
-              <a:t>to which India exports the most $3013 million followed by UAE, China, Hong Kong and Singapore.</a:t>
+              <a:t>While USA is the top country to which India exports the most $3013 million followed by UAE, China, Hong Kong and Singapore.</a:t>
             </a:r>
           </a:p>
         </p:txBody>
@@ -8295,7 +7906,7 @@
           <p:cNvPr id="3" name="Slide Number Placeholder 2">
             <a:extLst>
               <a:ext uri="{FF2B5EF4-FFF2-40B4-BE49-F238E27FC236}">
-                <a16:creationId xmlns="" xmlns:a16="http://schemas.microsoft.com/office/drawing/2014/main" id="{C7C847A6-4A8E-4B65-A738-3703496D8216}"/>
+                <a16:creationId xmlns:a16="http://schemas.microsoft.com/office/drawing/2014/main" id="{C7C847A6-4A8E-4B65-A738-3703496D8216}"/>
               </a:ext>
             </a:extLst>
           </p:cNvPr>
@@ -8354,7 +7965,7 @@
           <p:cNvPr id="2" name="Title 1">
             <a:extLst>
               <a:ext uri="{FF2B5EF4-FFF2-40B4-BE49-F238E27FC236}">
-                <a16:creationId xmlns="" xmlns:a16="http://schemas.microsoft.com/office/drawing/2014/main" id="{FA0B0F23-AA5A-482B-9292-21909CD3D244}"/>
+                <a16:creationId xmlns:a16="http://schemas.microsoft.com/office/drawing/2014/main" id="{FA0B0F23-AA5A-482B-9292-21909CD3D244}"/>
               </a:ext>
             </a:extLst>
           </p:cNvPr>
@@ -8385,7 +7996,7 @@
           <p:cNvPr id="3" name="Content Placeholder 2">
             <a:extLst>
               <a:ext uri="{FF2B5EF4-FFF2-40B4-BE49-F238E27FC236}">
-                <a16:creationId xmlns="" xmlns:a16="http://schemas.microsoft.com/office/drawing/2014/main" id="{5891B381-2B71-49EA-A683-A3160B6C07B2}"/>
+                <a16:creationId xmlns:a16="http://schemas.microsoft.com/office/drawing/2014/main" id="{5891B381-2B71-49EA-A683-A3160B6C07B2}"/>
               </a:ext>
             </a:extLst>
           </p:cNvPr>
@@ -8491,7 +8102,7 @@
           <p:cNvPr id="4" name="Slide Number Placeholder 3">
             <a:extLst>
               <a:ext uri="{FF2B5EF4-FFF2-40B4-BE49-F238E27FC236}">
-                <a16:creationId xmlns="" xmlns:a16="http://schemas.microsoft.com/office/drawing/2014/main" id="{0B22DF0D-8D91-4829-A4D1-ADB83A2BA515}"/>
+                <a16:creationId xmlns:a16="http://schemas.microsoft.com/office/drawing/2014/main" id="{0B22DF0D-8D91-4829-A4D1-ADB83A2BA515}"/>
               </a:ext>
             </a:extLst>
           </p:cNvPr>
@@ -9050,7 +8661,7 @@
   <a:extraClrSchemeLst/>
   <a:extLst>
     <a:ext uri="{05A4C25C-085E-4340-85A3-A5531E510DB2}">
-      <thm15:themeFamily xmlns="" xmlns:thm15="http://schemas.microsoft.com/office/thememl/2012/main" name="Office Theme" id="{62F939B6-93AF-4DB8-9C6B-D6C7DFDC589F}" vid="{4A3C46E8-61CC-4603-A589-7422A47A8E4A}"/>
+      <thm15:themeFamily xmlns:thm15="http://schemas.microsoft.com/office/thememl/2012/main" name="Office Theme" id="{62F939B6-93AF-4DB8-9C6B-D6C7DFDC589F}" vid="{4A3C46E8-61CC-4603-A589-7422A47A8E4A}"/>
     </a:ext>
   </a:extLst>
 </a:theme>

</xml_diff>